<commit_message>
Finishing Main Form and editing the pdf
</commit_message>
<xml_diff>
--- a/Stuff/Conexão Bluetooth usando Delphi.pptx
+++ b/Stuff/Conexão Bluetooth usando Delphi.pptx
@@ -20,6 +20,12 @@
     <p:sldId id="268" r:id="rId14"/>
     <p:sldId id="269" r:id="rId15"/>
     <p:sldId id="270" r:id="rId16"/>
+    <p:sldId id="271" r:id="rId17"/>
+    <p:sldId id="272" r:id="rId18"/>
+    <p:sldId id="273" r:id="rId19"/>
+    <p:sldId id="274" r:id="rId20"/>
+    <p:sldId id="276" r:id="rId21"/>
+    <p:sldId id="277" r:id="rId22"/>
   </p:sldIdLst>
   <p:sldSz cx="9144000" cy="6858000" type="screen4x3"/>
   <p:notesSz cx="6858000" cy="9144000"/>
@@ -300,7 +306,7 @@
           <a:p>
             <a:fld id="{715CD462-00F3-4312-AF53-03FBFE4C9BB8}" type="datetimeFigureOut">
               <a:rPr lang="pt-BR" smtClean="0"/>
-              <a:t>31/08/2021</a:t>
+              <a:t>01/09/2021</a:t>
             </a:fld>
             <a:endParaRPr lang="pt-BR"/>
           </a:p>
@@ -1169,7 +1175,7 @@
           <a:p>
             <a:fld id="{715CD462-00F3-4312-AF53-03FBFE4C9BB8}" type="datetimeFigureOut">
               <a:rPr lang="pt-BR" smtClean="0"/>
-              <a:t>31/08/2021</a:t>
+              <a:t>01/09/2021</a:t>
             </a:fld>
             <a:endParaRPr lang="pt-BR"/>
           </a:p>
@@ -1344,7 +1350,7 @@
           <a:p>
             <a:fld id="{715CD462-00F3-4312-AF53-03FBFE4C9BB8}" type="datetimeFigureOut">
               <a:rPr lang="pt-BR" smtClean="0"/>
-              <a:t>31/08/2021</a:t>
+              <a:t>01/09/2021</a:t>
             </a:fld>
             <a:endParaRPr lang="pt-BR"/>
           </a:p>
@@ -1514,7 +1520,7 @@
           <a:p>
             <a:fld id="{715CD462-00F3-4312-AF53-03FBFE4C9BB8}" type="datetimeFigureOut">
               <a:rPr lang="pt-BR" smtClean="0"/>
-              <a:t>31/08/2021</a:t>
+              <a:t>01/09/2021</a:t>
             </a:fld>
             <a:endParaRPr lang="pt-BR"/>
           </a:p>
@@ -1724,7 +1730,7 @@
           <a:p>
             <a:fld id="{715CD462-00F3-4312-AF53-03FBFE4C9BB8}" type="datetimeFigureOut">
               <a:rPr lang="pt-BR" smtClean="0"/>
-              <a:t>31/08/2021</a:t>
+              <a:t>01/09/2021</a:t>
             </a:fld>
             <a:endParaRPr lang="pt-BR"/>
           </a:p>
@@ -2538,7 +2544,7 @@
           <a:p>
             <a:fld id="{715CD462-00F3-4312-AF53-03FBFE4C9BB8}" type="datetimeFigureOut">
               <a:rPr lang="pt-BR" smtClean="0"/>
-              <a:t>31/08/2021</a:t>
+              <a:t>01/09/2021</a:t>
             </a:fld>
             <a:endParaRPr lang="pt-BR"/>
           </a:p>
@@ -2774,7 +2780,7 @@
           <a:p>
             <a:fld id="{715CD462-00F3-4312-AF53-03FBFE4C9BB8}" type="datetimeFigureOut">
               <a:rPr lang="pt-BR" smtClean="0"/>
-              <a:t>31/08/2021</a:t>
+              <a:t>01/09/2021</a:t>
             </a:fld>
             <a:endParaRPr lang="pt-BR"/>
           </a:p>
@@ -3097,7 +3103,7 @@
           <a:p>
             <a:fld id="{715CD462-00F3-4312-AF53-03FBFE4C9BB8}" type="datetimeFigureOut">
               <a:rPr lang="pt-BR" smtClean="0"/>
-              <a:t>31/08/2021</a:t>
+              <a:t>01/09/2021</a:t>
             </a:fld>
             <a:endParaRPr lang="pt-BR"/>
           </a:p>
@@ -3187,7 +3193,7 @@
           <a:p>
             <a:fld id="{715CD462-00F3-4312-AF53-03FBFE4C9BB8}" type="datetimeFigureOut">
               <a:rPr lang="pt-BR" smtClean="0"/>
-              <a:t>31/08/2021</a:t>
+              <a:t>01/09/2021</a:t>
             </a:fld>
             <a:endParaRPr lang="pt-BR"/>
           </a:p>
@@ -3704,7 +3710,7 @@
           <a:p>
             <a:fld id="{715CD462-00F3-4312-AF53-03FBFE4C9BB8}" type="datetimeFigureOut">
               <a:rPr lang="pt-BR" smtClean="0"/>
-              <a:t>31/08/2021</a:t>
+              <a:t>01/09/2021</a:t>
             </a:fld>
             <a:endParaRPr lang="pt-BR"/>
           </a:p>
@@ -4215,7 +4221,7 @@
           <a:p>
             <a:fld id="{715CD462-00F3-4312-AF53-03FBFE4C9BB8}" type="datetimeFigureOut">
               <a:rPr lang="pt-BR" smtClean="0"/>
-              <a:t>31/08/2021</a:t>
+              <a:t>01/09/2021</a:t>
             </a:fld>
             <a:endParaRPr lang="pt-BR"/>
           </a:p>
@@ -4460,7 +4466,7 @@
           <a:p>
             <a:fld id="{715CD462-00F3-4312-AF53-03FBFE4C9BB8}" type="datetimeFigureOut">
               <a:rPr lang="pt-BR" smtClean="0"/>
-              <a:t>31/08/2021</a:t>
+              <a:t>01/09/2021</a:t>
             </a:fld>
             <a:endParaRPr lang="pt-BR"/>
           </a:p>
@@ -6983,6 +6989,974 @@
 </p:sld>
 </file>
 
+<file path=ppt/slides/slide16.xml><?xml version="1.0" encoding="utf-8"?>
+<p:sld xmlns:a="http://schemas.openxmlformats.org/drawingml/2006/main" xmlns:r="http://schemas.openxmlformats.org/officeDocument/2006/relationships" xmlns:p="http://schemas.openxmlformats.org/presentationml/2006/main">
+  <p:cSld>
+    <p:spTree>
+      <p:nvGrpSpPr>
+        <p:cNvPr id="1" name=""/>
+        <p:cNvGrpSpPr/>
+        <p:nvPr/>
+      </p:nvGrpSpPr>
+      <p:grpSpPr>
+        <a:xfrm>
+          <a:off x="0" y="0"/>
+          <a:ext cx="0" cy="0"/>
+          <a:chOff x="0" y="0"/>
+          <a:chExt cx="0" cy="0"/>
+        </a:xfrm>
+      </p:grpSpPr>
+      <p:sp>
+        <p:nvSpPr>
+          <p:cNvPr id="4" name="Título 1">
+            <a:extLst>
+              <a:ext uri="{FF2B5EF4-FFF2-40B4-BE49-F238E27FC236}">
+                <a16:creationId xmlns:a16="http://schemas.microsoft.com/office/drawing/2014/main" id="{60A75E4B-7E19-4478-8745-3BC66AB97BFC}"/>
+              </a:ext>
+            </a:extLst>
+          </p:cNvPr>
+          <p:cNvSpPr>
+            <a:spLocks noGrp="1"/>
+          </p:cNvSpPr>
+          <p:nvPr>
+            <p:ph type="title"/>
+          </p:nvPr>
+        </p:nvSpPr>
+        <p:spPr>
+          <a:xfrm>
+            <a:off x="457200" y="274638"/>
+            <a:ext cx="7467600" cy="1143000"/>
+          </a:xfrm>
+        </p:spPr>
+        <p:txBody>
+          <a:bodyPr/>
+          <a:lstStyle/>
+          <a:p>
+            <a:r>
+              <a:rPr lang="en-US" dirty="0" err="1"/>
+              <a:t>Montagem</a:t>
+            </a:r>
+            <a:r>
+              <a:rPr lang="en-US" dirty="0"/>
+              <a:t> do </a:t>
+            </a:r>
+            <a:r>
+              <a:rPr lang="en-US" dirty="0" err="1"/>
+              <a:t>Formulário</a:t>
+            </a:r>
+            <a:r>
+              <a:rPr lang="en-US" dirty="0"/>
+              <a:t> – </a:t>
+            </a:r>
+            <a:br>
+              <a:rPr lang="en-US" dirty="0"/>
+            </a:br>
+            <a:r>
+              <a:rPr lang="en-US" dirty="0"/>
+              <a:t>Unit </a:t>
+            </a:r>
+            <a:r>
+              <a:rPr lang="en-US" dirty="0" err="1"/>
+              <a:t>pricipal</a:t>
+            </a:r>
+            <a:endParaRPr lang="pt-BR" dirty="0"/>
+          </a:p>
+        </p:txBody>
+      </p:sp>
+      <p:pic>
+        <p:nvPicPr>
+          <p:cNvPr id="6" name="Imagem 5">
+            <a:extLst>
+              <a:ext uri="{FF2B5EF4-FFF2-40B4-BE49-F238E27FC236}">
+                <a16:creationId xmlns:a16="http://schemas.microsoft.com/office/drawing/2014/main" id="{708E4402-4313-4824-9F33-006E4F50C551}"/>
+              </a:ext>
+            </a:extLst>
+          </p:cNvPr>
+          <p:cNvPicPr>
+            <a:picLocks noChangeAspect="1"/>
+          </p:cNvPicPr>
+          <p:nvPr/>
+        </p:nvPicPr>
+        <p:blipFill>
+          <a:blip r:embed="rId2"/>
+          <a:stretch>
+            <a:fillRect/>
+          </a:stretch>
+        </p:blipFill>
+        <p:spPr>
+          <a:xfrm>
+            <a:off x="5267325" y="1676400"/>
+            <a:ext cx="2657475" cy="2562225"/>
+          </a:xfrm>
+          <a:prstGeom prst="rect">
+            <a:avLst/>
+          </a:prstGeom>
+        </p:spPr>
+      </p:pic>
+      <p:sp>
+        <p:nvSpPr>
+          <p:cNvPr id="7" name="CaixaDeTexto 6">
+            <a:extLst>
+              <a:ext uri="{FF2B5EF4-FFF2-40B4-BE49-F238E27FC236}">
+                <a16:creationId xmlns:a16="http://schemas.microsoft.com/office/drawing/2014/main" id="{4970EE55-C750-4AAF-B7DF-39F21CFDA81B}"/>
+              </a:ext>
+            </a:extLst>
+          </p:cNvPr>
+          <p:cNvSpPr txBox="1"/>
+          <p:nvPr/>
+        </p:nvSpPr>
+        <p:spPr>
+          <a:xfrm>
+            <a:off x="533400" y="2209800"/>
+            <a:ext cx="4572000" cy="1200329"/>
+          </a:xfrm>
+          <a:prstGeom prst="rect">
+            <a:avLst/>
+          </a:prstGeom>
+          <a:noFill/>
+        </p:spPr>
+        <p:txBody>
+          <a:bodyPr wrap="square" rtlCol="0">
+            <a:spAutoFit/>
+          </a:bodyPr>
+          <a:lstStyle/>
+          <a:p>
+            <a:pPr marL="342900" indent="-342900">
+              <a:buFont typeface="Arial" panose="020B0604020202020204" pitchFamily="34" charset="0"/>
+              <a:buChar char="•"/>
+            </a:pPr>
+            <a:r>
+              <a:rPr lang="en-US" sz="2400" dirty="0" err="1"/>
+              <a:t>Insira</a:t>
+            </a:r>
+            <a:r>
+              <a:rPr lang="en-US" sz="2400" dirty="0"/>
+              <a:t> dentro do </a:t>
+            </a:r>
+            <a:r>
+              <a:rPr lang="en-US" sz="2400" dirty="0" err="1"/>
+              <a:t>formulário</a:t>
+            </a:r>
+            <a:r>
+              <a:rPr lang="en-US" sz="2400" dirty="0"/>
+              <a:t> da aba </a:t>
+            </a:r>
+            <a:r>
+              <a:rPr lang="en-US" sz="2400" b="1" dirty="0"/>
+              <a:t>System</a:t>
+            </a:r>
+            <a:r>
+              <a:rPr lang="en-US" sz="2400" dirty="0"/>
+              <a:t> um </a:t>
+            </a:r>
+            <a:r>
+              <a:rPr lang="en-US" sz="2400" dirty="0" err="1"/>
+              <a:t>componente</a:t>
+            </a:r>
+            <a:r>
+              <a:rPr lang="en-US" sz="2400" dirty="0"/>
+              <a:t> </a:t>
+            </a:r>
+            <a:r>
+              <a:rPr lang="en-US" sz="2400" b="1" dirty="0" err="1"/>
+              <a:t>TBluetooth</a:t>
+            </a:r>
+            <a:endParaRPr lang="en-US" sz="2400" b="1" dirty="0"/>
+          </a:p>
+        </p:txBody>
+      </p:sp>
+      <p:pic>
+        <p:nvPicPr>
+          <p:cNvPr id="9" name="Imagem 8">
+            <a:extLst>
+              <a:ext uri="{FF2B5EF4-FFF2-40B4-BE49-F238E27FC236}">
+                <a16:creationId xmlns:a16="http://schemas.microsoft.com/office/drawing/2014/main" id="{3B9B734E-EC65-4D18-8693-05902F23B0D7}"/>
+              </a:ext>
+            </a:extLst>
+          </p:cNvPr>
+          <p:cNvPicPr>
+            <a:picLocks noChangeAspect="1"/>
+          </p:cNvPicPr>
+          <p:nvPr/>
+        </p:nvPicPr>
+        <p:blipFill>
+          <a:blip r:embed="rId3"/>
+          <a:stretch>
+            <a:fillRect/>
+          </a:stretch>
+        </p:blipFill>
+        <p:spPr>
+          <a:xfrm>
+            <a:off x="533400" y="4494460"/>
+            <a:ext cx="1524000" cy="2066925"/>
+          </a:xfrm>
+          <a:prstGeom prst="rect">
+            <a:avLst/>
+          </a:prstGeom>
+        </p:spPr>
+      </p:pic>
+      <p:sp>
+        <p:nvSpPr>
+          <p:cNvPr id="10" name="CaixaDeTexto 9">
+            <a:extLst>
+              <a:ext uri="{FF2B5EF4-FFF2-40B4-BE49-F238E27FC236}">
+                <a16:creationId xmlns:a16="http://schemas.microsoft.com/office/drawing/2014/main" id="{D8BF8355-C3D7-4875-A548-32943D28C49D}"/>
+              </a:ext>
+            </a:extLst>
+          </p:cNvPr>
+          <p:cNvSpPr txBox="1"/>
+          <p:nvPr/>
+        </p:nvSpPr>
+        <p:spPr>
+          <a:xfrm>
+            <a:off x="2332846" y="4590587"/>
+            <a:ext cx="5744354" cy="1200329"/>
+          </a:xfrm>
+          <a:prstGeom prst="rect">
+            <a:avLst/>
+          </a:prstGeom>
+          <a:noFill/>
+        </p:spPr>
+        <p:txBody>
+          <a:bodyPr wrap="square" rtlCol="0">
+            <a:spAutoFit/>
+          </a:bodyPr>
+          <a:lstStyle/>
+          <a:p>
+            <a:pPr marL="285750" indent="-285750">
+              <a:buFont typeface="Arial" panose="020B0604020202020204" pitchFamily="34" charset="0"/>
+              <a:buChar char="•"/>
+            </a:pPr>
+            <a:r>
+              <a:rPr lang="en-US" sz="2400" dirty="0"/>
+              <a:t>Clique no </a:t>
+            </a:r>
+            <a:r>
+              <a:rPr lang="en-US" sz="2400" dirty="0" err="1"/>
+              <a:t>componente</a:t>
+            </a:r>
+            <a:r>
+              <a:rPr lang="en-US" sz="2400" dirty="0"/>
+              <a:t> </a:t>
+            </a:r>
+            <a:r>
+              <a:rPr lang="en-US" sz="2400" b="1" dirty="0"/>
+              <a:t>Bluetooth1 </a:t>
+            </a:r>
+            <a:r>
+              <a:rPr lang="en-US" sz="2400" dirty="0"/>
+              <a:t>e configure-o da </a:t>
+            </a:r>
+            <a:r>
+              <a:rPr lang="en-US" sz="2400" dirty="0" err="1"/>
+              <a:t>seguinte</a:t>
+            </a:r>
+            <a:r>
+              <a:rPr lang="en-US" sz="2400" dirty="0"/>
+              <a:t> forma:</a:t>
+            </a:r>
+          </a:p>
+          <a:p>
+            <a:pPr marL="742950" lvl="1" indent="-285750">
+              <a:buFont typeface="Arial" panose="020B0604020202020204" pitchFamily="34" charset="0"/>
+              <a:buChar char="•"/>
+            </a:pPr>
+            <a:r>
+              <a:rPr lang="en-US" sz="2400" dirty="0"/>
+              <a:t>Enabled: True</a:t>
+            </a:r>
+            <a:r>
+              <a:rPr lang="en-US" sz="2400" b="1" dirty="0"/>
+              <a:t> </a:t>
+            </a:r>
+          </a:p>
+        </p:txBody>
+      </p:sp>
+    </p:spTree>
+    <p:extLst>
+      <p:ext uri="{BB962C8B-B14F-4D97-AF65-F5344CB8AC3E}">
+        <p14:creationId xmlns:p14="http://schemas.microsoft.com/office/powerpoint/2010/main" val="4224496208"/>
+      </p:ext>
+    </p:extLst>
+  </p:cSld>
+  <p:clrMapOvr>
+    <a:masterClrMapping/>
+  </p:clrMapOvr>
+</p:sld>
+</file>
+
+<file path=ppt/slides/slide17.xml><?xml version="1.0" encoding="utf-8"?>
+<p:sld xmlns:a="http://schemas.openxmlformats.org/drawingml/2006/main" xmlns:r="http://schemas.openxmlformats.org/officeDocument/2006/relationships" xmlns:p="http://schemas.openxmlformats.org/presentationml/2006/main">
+  <p:cSld>
+    <p:spTree>
+      <p:nvGrpSpPr>
+        <p:cNvPr id="1" name=""/>
+        <p:cNvGrpSpPr/>
+        <p:nvPr/>
+      </p:nvGrpSpPr>
+      <p:grpSpPr>
+        <a:xfrm>
+          <a:off x="0" y="0"/>
+          <a:ext cx="0" cy="0"/>
+          <a:chOff x="0" y="0"/>
+          <a:chExt cx="0" cy="0"/>
+        </a:xfrm>
+      </p:grpSpPr>
+      <p:sp>
+        <p:nvSpPr>
+          <p:cNvPr id="5" name="Título 1">
+            <a:extLst>
+              <a:ext uri="{FF2B5EF4-FFF2-40B4-BE49-F238E27FC236}">
+                <a16:creationId xmlns:a16="http://schemas.microsoft.com/office/drawing/2014/main" id="{5D305FD6-E68A-4B9B-9743-839D27B0C745}"/>
+              </a:ext>
+            </a:extLst>
+          </p:cNvPr>
+          <p:cNvSpPr>
+            <a:spLocks noGrp="1"/>
+          </p:cNvSpPr>
+          <p:nvPr>
+            <p:ph type="title"/>
+          </p:nvPr>
+        </p:nvSpPr>
+        <p:spPr>
+          <a:xfrm>
+            <a:off x="457200" y="274638"/>
+            <a:ext cx="7467600" cy="1143000"/>
+          </a:xfrm>
+        </p:spPr>
+        <p:txBody>
+          <a:bodyPr/>
+          <a:lstStyle/>
+          <a:p>
+            <a:r>
+              <a:rPr lang="en-US" dirty="0" err="1"/>
+              <a:t>Montagem</a:t>
+            </a:r>
+            <a:r>
+              <a:rPr lang="en-US" dirty="0"/>
+              <a:t> do </a:t>
+            </a:r>
+            <a:r>
+              <a:rPr lang="en-US" dirty="0" err="1"/>
+              <a:t>Formulário</a:t>
+            </a:r>
+            <a:r>
+              <a:rPr lang="en-US" dirty="0"/>
+              <a:t> – </a:t>
+            </a:r>
+            <a:br>
+              <a:rPr lang="en-US" dirty="0"/>
+            </a:br>
+            <a:r>
+              <a:rPr lang="en-US" dirty="0"/>
+              <a:t>Unit </a:t>
+            </a:r>
+            <a:r>
+              <a:rPr lang="en-US" dirty="0" err="1"/>
+              <a:t>pricipal</a:t>
+            </a:r>
+            <a:endParaRPr lang="pt-BR" dirty="0"/>
+          </a:p>
+        </p:txBody>
+      </p:sp>
+      <p:pic>
+        <p:nvPicPr>
+          <p:cNvPr id="7" name="Imagem 6">
+            <a:extLst>
+              <a:ext uri="{FF2B5EF4-FFF2-40B4-BE49-F238E27FC236}">
+                <a16:creationId xmlns:a16="http://schemas.microsoft.com/office/drawing/2014/main" id="{2C8EE6D2-669F-4D4F-8CC0-1FC287CFC0A1}"/>
+              </a:ext>
+            </a:extLst>
+          </p:cNvPr>
+          <p:cNvPicPr>
+            <a:picLocks noChangeAspect="1"/>
+          </p:cNvPicPr>
+          <p:nvPr/>
+        </p:nvPicPr>
+        <p:blipFill>
+          <a:blip r:embed="rId2"/>
+          <a:stretch>
+            <a:fillRect/>
+          </a:stretch>
+        </p:blipFill>
+        <p:spPr>
+          <a:xfrm>
+            <a:off x="609600" y="1676400"/>
+            <a:ext cx="5445348" cy="2807493"/>
+          </a:xfrm>
+          <a:prstGeom prst="rect">
+            <a:avLst/>
+          </a:prstGeom>
+        </p:spPr>
+      </p:pic>
+      <p:sp>
+        <p:nvSpPr>
+          <p:cNvPr id="8" name="CaixaDeTexto 7">
+            <a:extLst>
+              <a:ext uri="{FF2B5EF4-FFF2-40B4-BE49-F238E27FC236}">
+                <a16:creationId xmlns:a16="http://schemas.microsoft.com/office/drawing/2014/main" id="{D4A9EF5F-A7BE-4640-8C96-DB1EDF39F652}"/>
+              </a:ext>
+            </a:extLst>
+          </p:cNvPr>
+          <p:cNvSpPr txBox="1"/>
+          <p:nvPr/>
+        </p:nvSpPr>
+        <p:spPr>
+          <a:xfrm>
+            <a:off x="457200" y="4742655"/>
+            <a:ext cx="7467600" cy="1200329"/>
+          </a:xfrm>
+          <a:prstGeom prst="rect">
+            <a:avLst/>
+          </a:prstGeom>
+          <a:noFill/>
+        </p:spPr>
+        <p:txBody>
+          <a:bodyPr wrap="square" rtlCol="0">
+            <a:spAutoFit/>
+          </a:bodyPr>
+          <a:lstStyle/>
+          <a:p>
+            <a:pPr marL="342900" indent="-342900">
+              <a:buFont typeface="Arial" panose="020B0604020202020204" pitchFamily="34" charset="0"/>
+              <a:buChar char="•"/>
+            </a:pPr>
+            <a:r>
+              <a:rPr lang="en-US" sz="2400" dirty="0"/>
+              <a:t>Dentro da pasta do </a:t>
+            </a:r>
+            <a:r>
+              <a:rPr lang="en-US" sz="2400" dirty="0" err="1"/>
+              <a:t>projeto</a:t>
+            </a:r>
+            <a:r>
+              <a:rPr lang="en-US" sz="2400" dirty="0"/>
+              <a:t>, </a:t>
+            </a:r>
+            <a:r>
+              <a:rPr lang="en-US" sz="2400" dirty="0" err="1"/>
+              <a:t>crie</a:t>
+            </a:r>
+            <a:r>
+              <a:rPr lang="en-US" sz="2400" dirty="0"/>
+              <a:t> </a:t>
+            </a:r>
+            <a:r>
+              <a:rPr lang="en-US" sz="2400" dirty="0" err="1"/>
+              <a:t>uma</a:t>
+            </a:r>
+            <a:r>
+              <a:rPr lang="en-US" sz="2400" dirty="0"/>
+              <a:t> pasta </a:t>
+            </a:r>
+            <a:r>
+              <a:rPr lang="en-US" sz="2400" dirty="0" err="1"/>
+              <a:t>chamada</a:t>
+            </a:r>
+            <a:r>
+              <a:rPr lang="en-US" sz="2400" dirty="0"/>
+              <a:t> </a:t>
+            </a:r>
+            <a:r>
+              <a:rPr lang="en-US" sz="2400" b="1" dirty="0"/>
+              <a:t>Stuff</a:t>
+            </a:r>
+            <a:r>
+              <a:rPr lang="en-US" sz="2400" dirty="0"/>
+              <a:t>, </a:t>
+            </a:r>
+            <a:r>
+              <a:rPr lang="en-US" sz="2400" dirty="0" err="1"/>
+              <a:t>nela</a:t>
+            </a:r>
+            <a:r>
+              <a:rPr lang="en-US" sz="2400" dirty="0"/>
+              <a:t> </a:t>
+            </a:r>
+            <a:r>
+              <a:rPr lang="en-US" sz="2400" dirty="0" err="1"/>
+              <a:t>colocaremos</a:t>
+            </a:r>
+            <a:r>
+              <a:rPr lang="en-US" sz="2400" dirty="0"/>
+              <a:t> </a:t>
+            </a:r>
+            <a:r>
+              <a:rPr lang="en-US" sz="2400" dirty="0" err="1"/>
+              <a:t>arquivos</a:t>
+            </a:r>
+            <a:r>
+              <a:rPr lang="en-US" sz="2400" dirty="0"/>
+              <a:t> de </a:t>
+            </a:r>
+            <a:r>
+              <a:rPr lang="en-US" sz="2400" dirty="0" err="1"/>
+              <a:t>imagem</a:t>
+            </a:r>
+            <a:r>
+              <a:rPr lang="en-US" sz="2400" dirty="0"/>
+              <a:t> e outros que </a:t>
+            </a:r>
+            <a:r>
+              <a:rPr lang="en-US" sz="2400" dirty="0" err="1"/>
+              <a:t>usaremos</a:t>
+            </a:r>
+            <a:r>
+              <a:rPr lang="en-US" sz="2400" dirty="0"/>
+              <a:t> no </a:t>
+            </a:r>
+            <a:r>
+              <a:rPr lang="en-US" sz="2400" dirty="0" err="1"/>
+              <a:t>programa</a:t>
+            </a:r>
+            <a:r>
+              <a:rPr lang="en-US" sz="2400" dirty="0"/>
+              <a:t>.</a:t>
+            </a:r>
+            <a:endParaRPr lang="en-US" sz="2400" b="1" dirty="0"/>
+          </a:p>
+        </p:txBody>
+      </p:sp>
+    </p:spTree>
+    <p:extLst>
+      <p:ext uri="{BB962C8B-B14F-4D97-AF65-F5344CB8AC3E}">
+        <p14:creationId xmlns:p14="http://schemas.microsoft.com/office/powerpoint/2010/main" val="1222645481"/>
+      </p:ext>
+    </p:extLst>
+  </p:cSld>
+  <p:clrMapOvr>
+    <a:masterClrMapping/>
+  </p:clrMapOvr>
+</p:sld>
+</file>
+
+<file path=ppt/slides/slide18.xml><?xml version="1.0" encoding="utf-8"?>
+<p:sld xmlns:a="http://schemas.openxmlformats.org/drawingml/2006/main" xmlns:r="http://schemas.openxmlformats.org/officeDocument/2006/relationships" xmlns:p="http://schemas.openxmlformats.org/presentationml/2006/main">
+  <p:cSld>
+    <p:spTree>
+      <p:nvGrpSpPr>
+        <p:cNvPr id="1" name=""/>
+        <p:cNvGrpSpPr/>
+        <p:nvPr/>
+      </p:nvGrpSpPr>
+      <p:grpSpPr>
+        <a:xfrm>
+          <a:off x="0" y="0"/>
+          <a:ext cx="0" cy="0"/>
+          <a:chOff x="0" y="0"/>
+          <a:chExt cx="0" cy="0"/>
+        </a:xfrm>
+      </p:grpSpPr>
+      <p:pic>
+        <p:nvPicPr>
+          <p:cNvPr id="5" name="Imagem 4">
+            <a:extLst>
+              <a:ext uri="{FF2B5EF4-FFF2-40B4-BE49-F238E27FC236}">
+                <a16:creationId xmlns:a16="http://schemas.microsoft.com/office/drawing/2014/main" id="{0F019574-F4EA-4943-AF80-6DC1A79447B3}"/>
+              </a:ext>
+            </a:extLst>
+          </p:cNvPr>
+          <p:cNvPicPr>
+            <a:picLocks noChangeAspect="1"/>
+          </p:cNvPicPr>
+          <p:nvPr/>
+        </p:nvPicPr>
+        <p:blipFill>
+          <a:blip r:embed="rId2"/>
+          <a:stretch>
+            <a:fillRect/>
+          </a:stretch>
+        </p:blipFill>
+        <p:spPr>
+          <a:xfrm>
+            <a:off x="632791" y="2286000"/>
+            <a:ext cx="6076950" cy="2057400"/>
+          </a:xfrm>
+          <a:prstGeom prst="rect">
+            <a:avLst/>
+          </a:prstGeom>
+        </p:spPr>
+      </p:pic>
+      <p:sp>
+        <p:nvSpPr>
+          <p:cNvPr id="6" name="Título 1">
+            <a:extLst>
+              <a:ext uri="{FF2B5EF4-FFF2-40B4-BE49-F238E27FC236}">
+                <a16:creationId xmlns:a16="http://schemas.microsoft.com/office/drawing/2014/main" id="{B6C27A5F-B7F7-4DF1-B811-AEACF2963C42}"/>
+              </a:ext>
+            </a:extLst>
+          </p:cNvPr>
+          <p:cNvSpPr>
+            <a:spLocks noGrp="1"/>
+          </p:cNvSpPr>
+          <p:nvPr>
+            <p:ph type="title"/>
+          </p:nvPr>
+        </p:nvSpPr>
+        <p:spPr>
+          <a:xfrm>
+            <a:off x="457200" y="274638"/>
+            <a:ext cx="7467600" cy="1143000"/>
+          </a:xfrm>
+        </p:spPr>
+        <p:txBody>
+          <a:bodyPr/>
+          <a:lstStyle/>
+          <a:p>
+            <a:r>
+              <a:rPr lang="en-US" dirty="0" err="1"/>
+              <a:t>Montagem</a:t>
+            </a:r>
+            <a:r>
+              <a:rPr lang="en-US" dirty="0"/>
+              <a:t> do </a:t>
+            </a:r>
+            <a:r>
+              <a:rPr lang="en-US" dirty="0" err="1"/>
+              <a:t>Formulário</a:t>
+            </a:r>
+            <a:r>
+              <a:rPr lang="en-US" dirty="0"/>
+              <a:t> – </a:t>
+            </a:r>
+            <a:br>
+              <a:rPr lang="en-US" dirty="0"/>
+            </a:br>
+            <a:r>
+              <a:rPr lang="en-US" dirty="0"/>
+              <a:t>Unit </a:t>
+            </a:r>
+            <a:r>
+              <a:rPr lang="en-US" dirty="0" err="1"/>
+              <a:t>pricipal</a:t>
+            </a:r>
+            <a:endParaRPr lang="pt-BR" dirty="0"/>
+          </a:p>
+        </p:txBody>
+      </p:sp>
+      <p:sp>
+        <p:nvSpPr>
+          <p:cNvPr id="7" name="CaixaDeTexto 6">
+            <a:extLst>
+              <a:ext uri="{FF2B5EF4-FFF2-40B4-BE49-F238E27FC236}">
+                <a16:creationId xmlns:a16="http://schemas.microsoft.com/office/drawing/2014/main" id="{E0F058CE-895F-4973-9DB1-5F1C5739FD07}"/>
+              </a:ext>
+            </a:extLst>
+          </p:cNvPr>
+          <p:cNvSpPr txBox="1"/>
+          <p:nvPr/>
+        </p:nvSpPr>
+        <p:spPr>
+          <a:xfrm>
+            <a:off x="632791" y="4533165"/>
+            <a:ext cx="7315200" cy="830997"/>
+          </a:xfrm>
+          <a:prstGeom prst="rect">
+            <a:avLst/>
+          </a:prstGeom>
+          <a:noFill/>
+        </p:spPr>
+        <p:txBody>
+          <a:bodyPr wrap="square" rtlCol="0">
+            <a:spAutoFit/>
+          </a:bodyPr>
+          <a:lstStyle/>
+          <a:p>
+            <a:pPr marL="342900" indent="-342900">
+              <a:buFont typeface="Arial" panose="020B0604020202020204" pitchFamily="34" charset="0"/>
+              <a:buChar char="•"/>
+            </a:pPr>
+            <a:r>
+              <a:rPr lang="en-US" sz="2400" dirty="0" err="1"/>
+              <a:t>Copie</a:t>
+            </a:r>
+            <a:r>
+              <a:rPr lang="en-US" sz="2400" dirty="0"/>
+              <a:t> </a:t>
+            </a:r>
+            <a:r>
+              <a:rPr lang="en-US" sz="2400" dirty="0" err="1"/>
+              <a:t>os</a:t>
+            </a:r>
+            <a:r>
+              <a:rPr lang="en-US" sz="2400" dirty="0"/>
+              <a:t> </a:t>
+            </a:r>
+            <a:r>
+              <a:rPr lang="en-US" sz="2400" dirty="0" err="1"/>
+              <a:t>icones</a:t>
+            </a:r>
+            <a:r>
+              <a:rPr lang="en-US" sz="2400" dirty="0"/>
+              <a:t> </a:t>
+            </a:r>
+            <a:r>
+              <a:rPr lang="en-US" sz="2400" dirty="0" err="1"/>
+              <a:t>disponibilizados</a:t>
+            </a:r>
+            <a:r>
+              <a:rPr lang="en-US" sz="2400" dirty="0"/>
+              <a:t> para download dentro da pasta </a:t>
+            </a:r>
+            <a:r>
+              <a:rPr lang="en-US" sz="2400" b="1" dirty="0"/>
+              <a:t>Stuff</a:t>
+            </a:r>
+            <a:r>
+              <a:rPr lang="en-US" sz="2400" dirty="0"/>
+              <a:t> que </a:t>
+            </a:r>
+            <a:r>
+              <a:rPr lang="en-US" sz="2400" dirty="0" err="1"/>
+              <a:t>acabamos</a:t>
+            </a:r>
+            <a:r>
+              <a:rPr lang="en-US" sz="2400" dirty="0"/>
+              <a:t> de </a:t>
+            </a:r>
+            <a:r>
+              <a:rPr lang="en-US" sz="2400" dirty="0" err="1"/>
+              <a:t>criar</a:t>
+            </a:r>
+            <a:r>
+              <a:rPr lang="en-US" sz="2400" dirty="0"/>
+              <a:t> </a:t>
+            </a:r>
+          </a:p>
+        </p:txBody>
+      </p:sp>
+    </p:spTree>
+    <p:extLst>
+      <p:ext uri="{BB962C8B-B14F-4D97-AF65-F5344CB8AC3E}">
+        <p14:creationId xmlns:p14="http://schemas.microsoft.com/office/powerpoint/2010/main" val="1862815067"/>
+      </p:ext>
+    </p:extLst>
+  </p:cSld>
+  <p:clrMapOvr>
+    <a:masterClrMapping/>
+  </p:clrMapOvr>
+</p:sld>
+</file>
+
+<file path=ppt/slides/slide19.xml><?xml version="1.0" encoding="utf-8"?>
+<p:sld xmlns:a="http://schemas.openxmlformats.org/drawingml/2006/main" xmlns:r="http://schemas.openxmlformats.org/officeDocument/2006/relationships" xmlns:p="http://schemas.openxmlformats.org/presentationml/2006/main">
+  <p:cSld>
+    <p:spTree>
+      <p:nvGrpSpPr>
+        <p:cNvPr id="1" name=""/>
+        <p:cNvGrpSpPr/>
+        <p:nvPr/>
+      </p:nvGrpSpPr>
+      <p:grpSpPr>
+        <a:xfrm>
+          <a:off x="0" y="0"/>
+          <a:ext cx="0" cy="0"/>
+          <a:chOff x="0" y="0"/>
+          <a:chExt cx="0" cy="0"/>
+        </a:xfrm>
+      </p:grpSpPr>
+      <p:sp>
+        <p:nvSpPr>
+          <p:cNvPr id="4" name="Título 1">
+            <a:extLst>
+              <a:ext uri="{FF2B5EF4-FFF2-40B4-BE49-F238E27FC236}">
+                <a16:creationId xmlns:a16="http://schemas.microsoft.com/office/drawing/2014/main" id="{480751D8-12FC-426A-8044-FFC37E8ECC34}"/>
+              </a:ext>
+            </a:extLst>
+          </p:cNvPr>
+          <p:cNvSpPr>
+            <a:spLocks noGrp="1"/>
+          </p:cNvSpPr>
+          <p:nvPr>
+            <p:ph type="title"/>
+          </p:nvPr>
+        </p:nvSpPr>
+        <p:spPr>
+          <a:xfrm>
+            <a:off x="457200" y="274638"/>
+            <a:ext cx="7467600" cy="1143000"/>
+          </a:xfrm>
+        </p:spPr>
+        <p:txBody>
+          <a:bodyPr/>
+          <a:lstStyle/>
+          <a:p>
+            <a:r>
+              <a:rPr lang="en-US" dirty="0" err="1"/>
+              <a:t>Montagem</a:t>
+            </a:r>
+            <a:r>
+              <a:rPr lang="en-US" dirty="0"/>
+              <a:t> do </a:t>
+            </a:r>
+            <a:r>
+              <a:rPr lang="en-US" dirty="0" err="1"/>
+              <a:t>Formulário</a:t>
+            </a:r>
+            <a:r>
+              <a:rPr lang="en-US" dirty="0"/>
+              <a:t> – </a:t>
+            </a:r>
+            <a:br>
+              <a:rPr lang="en-US" dirty="0"/>
+            </a:br>
+            <a:r>
+              <a:rPr lang="en-US" dirty="0"/>
+              <a:t>Unit </a:t>
+            </a:r>
+            <a:r>
+              <a:rPr lang="en-US" dirty="0" err="1"/>
+              <a:t>pricipal</a:t>
+            </a:r>
+            <a:endParaRPr lang="pt-BR" dirty="0"/>
+          </a:p>
+        </p:txBody>
+      </p:sp>
+      <p:pic>
+        <p:nvPicPr>
+          <p:cNvPr id="6" name="Imagem 5">
+            <a:extLst>
+              <a:ext uri="{FF2B5EF4-FFF2-40B4-BE49-F238E27FC236}">
+                <a16:creationId xmlns:a16="http://schemas.microsoft.com/office/drawing/2014/main" id="{5EA69064-DB52-441C-8332-5B8500904D1B}"/>
+              </a:ext>
+            </a:extLst>
+          </p:cNvPr>
+          <p:cNvPicPr>
+            <a:picLocks noChangeAspect="1"/>
+          </p:cNvPicPr>
+          <p:nvPr/>
+        </p:nvPicPr>
+        <p:blipFill>
+          <a:blip r:embed="rId2"/>
+          <a:stretch>
+            <a:fillRect/>
+          </a:stretch>
+        </p:blipFill>
+        <p:spPr>
+          <a:xfrm>
+            <a:off x="5276850" y="1828800"/>
+            <a:ext cx="2647950" cy="2590800"/>
+          </a:xfrm>
+          <a:prstGeom prst="rect">
+            <a:avLst/>
+          </a:prstGeom>
+        </p:spPr>
+      </p:pic>
+      <p:sp>
+        <p:nvSpPr>
+          <p:cNvPr id="7" name="CaixaDeTexto 6">
+            <a:extLst>
+              <a:ext uri="{FF2B5EF4-FFF2-40B4-BE49-F238E27FC236}">
+                <a16:creationId xmlns:a16="http://schemas.microsoft.com/office/drawing/2014/main" id="{35D04688-11D1-4A83-8304-A750697DF8F3}"/>
+              </a:ext>
+            </a:extLst>
+          </p:cNvPr>
+          <p:cNvSpPr txBox="1"/>
+          <p:nvPr/>
+        </p:nvSpPr>
+        <p:spPr>
+          <a:xfrm>
+            <a:off x="533400" y="2209800"/>
+            <a:ext cx="4495800" cy="1569660"/>
+          </a:xfrm>
+          <a:prstGeom prst="rect">
+            <a:avLst/>
+          </a:prstGeom>
+          <a:noFill/>
+        </p:spPr>
+        <p:txBody>
+          <a:bodyPr wrap="square" rtlCol="0">
+            <a:spAutoFit/>
+          </a:bodyPr>
+          <a:lstStyle/>
+          <a:p>
+            <a:pPr marL="342900" indent="-342900">
+              <a:buFont typeface="Arial" panose="020B0604020202020204" pitchFamily="34" charset="0"/>
+              <a:buChar char="•"/>
+            </a:pPr>
+            <a:r>
+              <a:rPr lang="en-US" sz="2400" dirty="0" err="1"/>
+              <a:t>Adicione</a:t>
+            </a:r>
+            <a:r>
+              <a:rPr lang="en-US" sz="2400" dirty="0"/>
+              <a:t> um </a:t>
+            </a:r>
+            <a:r>
+              <a:rPr lang="en-US" sz="2400" dirty="0" err="1"/>
+              <a:t>componente</a:t>
+            </a:r>
+            <a:r>
+              <a:rPr lang="en-US" sz="2400" dirty="0"/>
+              <a:t> </a:t>
+            </a:r>
+            <a:r>
+              <a:rPr lang="en-US" sz="2400" b="1" dirty="0" err="1"/>
+              <a:t>TImageList</a:t>
+            </a:r>
+            <a:r>
+              <a:rPr lang="en-US" sz="2400" dirty="0"/>
+              <a:t> da aba </a:t>
+            </a:r>
+            <a:r>
+              <a:rPr lang="en-US" sz="2400" b="1" dirty="0"/>
+              <a:t>Standard</a:t>
+            </a:r>
+            <a:r>
+              <a:rPr lang="en-US" sz="2400" dirty="0"/>
+              <a:t> para o </a:t>
+            </a:r>
+            <a:r>
+              <a:rPr lang="en-US" sz="2400" dirty="0" err="1"/>
+              <a:t>formulário</a:t>
+            </a:r>
+            <a:endParaRPr lang="en-US" sz="2400" dirty="0"/>
+          </a:p>
+        </p:txBody>
+      </p:sp>
+      <p:pic>
+        <p:nvPicPr>
+          <p:cNvPr id="9" name="Imagem 8">
+            <a:extLst>
+              <a:ext uri="{FF2B5EF4-FFF2-40B4-BE49-F238E27FC236}">
+                <a16:creationId xmlns:a16="http://schemas.microsoft.com/office/drawing/2014/main" id="{44689A46-806E-4FC4-B327-A242DF36B3B8}"/>
+              </a:ext>
+            </a:extLst>
+          </p:cNvPr>
+          <p:cNvPicPr>
+            <a:picLocks noChangeAspect="1"/>
+          </p:cNvPicPr>
+          <p:nvPr/>
+        </p:nvPicPr>
+        <p:blipFill>
+          <a:blip r:embed="rId3"/>
+          <a:stretch>
+            <a:fillRect/>
+          </a:stretch>
+        </p:blipFill>
+        <p:spPr>
+          <a:xfrm>
+            <a:off x="838200" y="4369182"/>
+            <a:ext cx="2152650" cy="2105025"/>
+          </a:xfrm>
+          <a:prstGeom prst="rect">
+            <a:avLst/>
+          </a:prstGeom>
+        </p:spPr>
+      </p:pic>
+    </p:spTree>
+    <p:extLst>
+      <p:ext uri="{BB962C8B-B14F-4D97-AF65-F5344CB8AC3E}">
+        <p14:creationId xmlns:p14="http://schemas.microsoft.com/office/powerpoint/2010/main" val="3734076908"/>
+      </p:ext>
+    </p:extLst>
+  </p:cSld>
+  <p:clrMapOvr>
+    <a:masterClrMapping/>
+  </p:clrMapOvr>
+</p:sld>
+</file>
+
 <file path=ppt/slides/slide2.xml><?xml version="1.0" encoding="utf-8"?>
 <p:sld xmlns:a="http://schemas.openxmlformats.org/drawingml/2006/main" xmlns:r="http://schemas.openxmlformats.org/officeDocument/2006/relationships" xmlns:p="http://schemas.openxmlformats.org/presentationml/2006/main">
   <p:cSld>
@@ -7273,6 +8247,361 @@
     <p:extLst>
       <p:ext uri="{BB962C8B-B14F-4D97-AF65-F5344CB8AC3E}">
         <p14:creationId xmlns:p14="http://schemas.microsoft.com/office/powerpoint/2010/main" val="1541273016"/>
+      </p:ext>
+    </p:extLst>
+  </p:cSld>
+  <p:clrMapOvr>
+    <a:masterClrMapping/>
+  </p:clrMapOvr>
+</p:sld>
+</file>
+
+<file path=ppt/slides/slide20.xml><?xml version="1.0" encoding="utf-8"?>
+<p:sld xmlns:a="http://schemas.openxmlformats.org/drawingml/2006/main" xmlns:r="http://schemas.openxmlformats.org/officeDocument/2006/relationships" xmlns:p="http://schemas.openxmlformats.org/presentationml/2006/main">
+  <p:cSld>
+    <p:spTree>
+      <p:nvGrpSpPr>
+        <p:cNvPr id="1" name=""/>
+        <p:cNvGrpSpPr/>
+        <p:nvPr/>
+      </p:nvGrpSpPr>
+      <p:grpSpPr>
+        <a:xfrm>
+          <a:off x="0" y="0"/>
+          <a:ext cx="0" cy="0"/>
+          <a:chOff x="0" y="0"/>
+          <a:chExt cx="0" cy="0"/>
+        </a:xfrm>
+      </p:grpSpPr>
+      <p:sp>
+        <p:nvSpPr>
+          <p:cNvPr id="4" name="Título 1">
+            <a:extLst>
+              <a:ext uri="{FF2B5EF4-FFF2-40B4-BE49-F238E27FC236}">
+                <a16:creationId xmlns:a16="http://schemas.microsoft.com/office/drawing/2014/main" id="{1EA000F0-8F96-4A66-8202-C5B7B6354079}"/>
+              </a:ext>
+            </a:extLst>
+          </p:cNvPr>
+          <p:cNvSpPr>
+            <a:spLocks noGrp="1"/>
+          </p:cNvSpPr>
+          <p:nvPr>
+            <p:ph type="title"/>
+          </p:nvPr>
+        </p:nvSpPr>
+        <p:spPr>
+          <a:xfrm>
+            <a:off x="457200" y="274638"/>
+            <a:ext cx="7467600" cy="1143000"/>
+          </a:xfrm>
+        </p:spPr>
+        <p:txBody>
+          <a:bodyPr/>
+          <a:lstStyle/>
+          <a:p>
+            <a:r>
+              <a:rPr lang="en-US" dirty="0" err="1"/>
+              <a:t>Montagem</a:t>
+            </a:r>
+            <a:r>
+              <a:rPr lang="en-US" dirty="0"/>
+              <a:t> do </a:t>
+            </a:r>
+            <a:r>
+              <a:rPr lang="en-US" dirty="0" err="1"/>
+              <a:t>Formulário</a:t>
+            </a:r>
+            <a:r>
+              <a:rPr lang="en-US" dirty="0"/>
+              <a:t> – </a:t>
+            </a:r>
+            <a:br>
+              <a:rPr lang="en-US" dirty="0"/>
+            </a:br>
+            <a:r>
+              <a:rPr lang="en-US" dirty="0"/>
+              <a:t>Unit </a:t>
+            </a:r>
+            <a:r>
+              <a:rPr lang="en-US" dirty="0" err="1"/>
+              <a:t>pricipal</a:t>
+            </a:r>
+            <a:endParaRPr lang="pt-BR" dirty="0"/>
+          </a:p>
+        </p:txBody>
+      </p:sp>
+      <p:sp>
+        <p:nvSpPr>
+          <p:cNvPr id="5" name="CaixaDeTexto 4">
+            <a:extLst>
+              <a:ext uri="{FF2B5EF4-FFF2-40B4-BE49-F238E27FC236}">
+                <a16:creationId xmlns:a16="http://schemas.microsoft.com/office/drawing/2014/main" id="{F12A178A-4180-4AE4-B274-1414117C6D87}"/>
+              </a:ext>
+            </a:extLst>
+          </p:cNvPr>
+          <p:cNvSpPr txBox="1"/>
+          <p:nvPr/>
+        </p:nvSpPr>
+        <p:spPr>
+          <a:xfrm>
+            <a:off x="457200" y="1676400"/>
+            <a:ext cx="6781800" cy="1200329"/>
+          </a:xfrm>
+          <a:prstGeom prst="rect">
+            <a:avLst/>
+          </a:prstGeom>
+          <a:noFill/>
+        </p:spPr>
+        <p:txBody>
+          <a:bodyPr wrap="square" rtlCol="0">
+            <a:spAutoFit/>
+          </a:bodyPr>
+          <a:lstStyle/>
+          <a:p>
+            <a:pPr marL="342900" indent="-342900">
+              <a:buFont typeface="Arial" panose="020B0604020202020204" pitchFamily="34" charset="0"/>
+              <a:buChar char="•"/>
+            </a:pPr>
+            <a:r>
+              <a:rPr lang="en-US" sz="2400" dirty="0" err="1"/>
+              <a:t>Adicione</a:t>
+            </a:r>
+            <a:r>
+              <a:rPr lang="en-US" sz="2400" dirty="0"/>
+              <a:t> </a:t>
+            </a:r>
+            <a:r>
+              <a:rPr lang="en-US" sz="2400" dirty="0" err="1"/>
+              <a:t>os</a:t>
+            </a:r>
+            <a:r>
+              <a:rPr lang="en-US" sz="2400" dirty="0"/>
+              <a:t> </a:t>
+            </a:r>
+            <a:r>
+              <a:rPr lang="en-US" sz="2400" dirty="0" err="1"/>
+              <a:t>icones</a:t>
+            </a:r>
+            <a:r>
+              <a:rPr lang="en-US" sz="2400" dirty="0"/>
+              <a:t> que </a:t>
+            </a:r>
+            <a:r>
+              <a:rPr lang="en-US" sz="2400" dirty="0" err="1"/>
+              <a:t>salvamos</a:t>
+            </a:r>
+            <a:r>
+              <a:rPr lang="en-US" sz="2400" dirty="0"/>
+              <a:t> dentro da pasta </a:t>
+            </a:r>
+            <a:r>
+              <a:rPr lang="en-US" sz="2400" b="1" dirty="0"/>
+              <a:t>Stuff </a:t>
+            </a:r>
+            <a:r>
+              <a:rPr lang="en-US" sz="2400" dirty="0"/>
+              <a:t>para o </a:t>
+            </a:r>
+            <a:r>
+              <a:rPr lang="en-US" sz="2400" b="1" dirty="0"/>
+              <a:t>ImageList1</a:t>
+            </a:r>
+            <a:r>
+              <a:rPr lang="en-US" sz="2400" dirty="0"/>
+              <a:t>, </a:t>
+            </a:r>
+            <a:r>
+              <a:rPr lang="en-US" sz="2400" dirty="0" err="1"/>
+              <a:t>abaixo</a:t>
+            </a:r>
+            <a:r>
+              <a:rPr lang="en-US" sz="2400" dirty="0"/>
+              <a:t> um gif </a:t>
+            </a:r>
+            <a:r>
+              <a:rPr lang="en-US" sz="2400" dirty="0" err="1"/>
+              <a:t>mostrando</a:t>
+            </a:r>
+            <a:r>
+              <a:rPr lang="en-US" sz="2400" dirty="0"/>
+              <a:t> </a:t>
+            </a:r>
+            <a:r>
+              <a:rPr lang="en-US" sz="2400" dirty="0" err="1"/>
+              <a:t>como</a:t>
+            </a:r>
+            <a:r>
+              <a:rPr lang="en-US" sz="2400" dirty="0"/>
+              <a:t> </a:t>
+            </a:r>
+            <a:r>
+              <a:rPr lang="en-US" sz="2400" dirty="0" err="1"/>
+              <a:t>fazer</a:t>
+            </a:r>
+            <a:r>
+              <a:rPr lang="en-US" sz="2400" dirty="0"/>
+              <a:t>:</a:t>
+            </a:r>
+          </a:p>
+        </p:txBody>
+      </p:sp>
+      <p:pic>
+        <p:nvPicPr>
+          <p:cNvPr id="6" name="Imagem 5" descr="Interface gráfica do usuário, Texto&#10;&#10;Descrição gerada automaticamente">
+            <a:extLst>
+              <a:ext uri="{FF2B5EF4-FFF2-40B4-BE49-F238E27FC236}">
+                <a16:creationId xmlns:a16="http://schemas.microsoft.com/office/drawing/2014/main" id="{1F2385B1-F96D-4BD6-A77A-CFA891E41006}"/>
+              </a:ext>
+            </a:extLst>
+          </p:cNvPr>
+          <p:cNvPicPr>
+            <a:picLocks noChangeAspect="1"/>
+          </p:cNvPicPr>
+          <p:nvPr/>
+        </p:nvPicPr>
+        <p:blipFill>
+          <a:blip r:embed="rId2">
+            <a:extLst>
+              <a:ext uri="{28A0092B-C50C-407E-A947-70E740481C1C}">
+                <a14:useLocalDpi xmlns:a14="http://schemas.microsoft.com/office/drawing/2010/main" val="0"/>
+              </a:ext>
+            </a:extLst>
+          </a:blip>
+          <a:stretch>
+            <a:fillRect/>
+          </a:stretch>
+        </p:blipFill>
+        <p:spPr>
+          <a:xfrm>
+            <a:off x="722659" y="3135491"/>
+            <a:ext cx="4585938" cy="3447871"/>
+          </a:xfrm>
+          <a:prstGeom prst="rect">
+            <a:avLst/>
+          </a:prstGeom>
+        </p:spPr>
+      </p:pic>
+    </p:spTree>
+    <p:extLst>
+      <p:ext uri="{BB962C8B-B14F-4D97-AF65-F5344CB8AC3E}">
+        <p14:creationId xmlns:p14="http://schemas.microsoft.com/office/powerpoint/2010/main" val="72522743"/>
+      </p:ext>
+    </p:extLst>
+  </p:cSld>
+  <p:clrMapOvr>
+    <a:masterClrMapping/>
+  </p:clrMapOvr>
+</p:sld>
+</file>
+
+<file path=ppt/slides/slide21.xml><?xml version="1.0" encoding="utf-8"?>
+<p:sld xmlns:a="http://schemas.openxmlformats.org/drawingml/2006/main" xmlns:r="http://schemas.openxmlformats.org/officeDocument/2006/relationships" xmlns:p="http://schemas.openxmlformats.org/presentationml/2006/main">
+  <p:cSld>
+    <p:spTree>
+      <p:nvGrpSpPr>
+        <p:cNvPr id="1" name=""/>
+        <p:cNvGrpSpPr/>
+        <p:nvPr/>
+      </p:nvGrpSpPr>
+      <p:grpSpPr>
+        <a:xfrm>
+          <a:off x="0" y="0"/>
+          <a:ext cx="0" cy="0"/>
+          <a:chOff x="0" y="0"/>
+          <a:chExt cx="0" cy="0"/>
+        </a:xfrm>
+      </p:grpSpPr>
+      <p:sp>
+        <p:nvSpPr>
+          <p:cNvPr id="4" name="Título 1">
+            <a:extLst>
+              <a:ext uri="{FF2B5EF4-FFF2-40B4-BE49-F238E27FC236}">
+                <a16:creationId xmlns:a16="http://schemas.microsoft.com/office/drawing/2014/main" id="{143B7F70-40C9-4EA1-871D-F58842C83D46}"/>
+              </a:ext>
+            </a:extLst>
+          </p:cNvPr>
+          <p:cNvSpPr>
+            <a:spLocks noGrp="1"/>
+          </p:cNvSpPr>
+          <p:nvPr>
+            <p:ph type="title"/>
+          </p:nvPr>
+        </p:nvSpPr>
+        <p:spPr>
+          <a:xfrm>
+            <a:off x="457200" y="274638"/>
+            <a:ext cx="7467600" cy="1143000"/>
+          </a:xfrm>
+        </p:spPr>
+        <p:txBody>
+          <a:bodyPr/>
+          <a:lstStyle/>
+          <a:p>
+            <a:r>
+              <a:rPr lang="en-US" dirty="0" err="1"/>
+              <a:t>Montagem</a:t>
+            </a:r>
+            <a:r>
+              <a:rPr lang="en-US" dirty="0"/>
+              <a:t> do </a:t>
+            </a:r>
+            <a:r>
+              <a:rPr lang="en-US" dirty="0" err="1"/>
+              <a:t>Formulário</a:t>
+            </a:r>
+            <a:r>
+              <a:rPr lang="en-US" dirty="0"/>
+              <a:t> – </a:t>
+            </a:r>
+            <a:br>
+              <a:rPr lang="en-US" dirty="0"/>
+            </a:br>
+            <a:r>
+              <a:rPr lang="en-US" dirty="0"/>
+              <a:t>Unit </a:t>
+            </a:r>
+            <a:r>
+              <a:rPr lang="en-US" dirty="0" err="1"/>
+              <a:t>pricipal</a:t>
+            </a:r>
+            <a:endParaRPr lang="pt-BR" dirty="0"/>
+          </a:p>
+        </p:txBody>
+      </p:sp>
+      <p:pic>
+        <p:nvPicPr>
+          <p:cNvPr id="8" name="Imagem 7">
+            <a:extLst>
+              <a:ext uri="{FF2B5EF4-FFF2-40B4-BE49-F238E27FC236}">
+                <a16:creationId xmlns:a16="http://schemas.microsoft.com/office/drawing/2014/main" id="{8A095F99-743F-4689-BEBC-DD3FFDA7AC23}"/>
+              </a:ext>
+            </a:extLst>
+          </p:cNvPr>
+          <p:cNvPicPr>
+            <a:picLocks noChangeAspect="1"/>
+          </p:cNvPicPr>
+          <p:nvPr/>
+        </p:nvPicPr>
+        <p:blipFill>
+          <a:blip r:embed="rId2"/>
+          <a:stretch>
+            <a:fillRect/>
+          </a:stretch>
+        </p:blipFill>
+        <p:spPr>
+          <a:xfrm>
+            <a:off x="457200" y="1740521"/>
+            <a:ext cx="5943600" cy="4819650"/>
+          </a:xfrm>
+          <a:prstGeom prst="rect">
+            <a:avLst/>
+          </a:prstGeom>
+        </p:spPr>
+      </p:pic>
+    </p:spTree>
+    <p:extLst>
+      <p:ext uri="{BB962C8B-B14F-4D97-AF65-F5344CB8AC3E}">
+        <p14:creationId xmlns:p14="http://schemas.microsoft.com/office/powerpoint/2010/main" val="2704080107"/>
       </p:ext>
     </p:extLst>
   </p:cSld>

</xml_diff>

<commit_message>
New Form Chat with Design done and PDF Edited
</commit_message>
<xml_diff>
--- a/Stuff/Conexão Bluetooth usando Delphi.pptx
+++ b/Stuff/Conexão Bluetooth usando Delphi.pptx
@@ -26,6 +26,22 @@
     <p:sldId id="274" r:id="rId20"/>
     <p:sldId id="276" r:id="rId21"/>
     <p:sldId id="277" r:id="rId22"/>
+    <p:sldId id="278" r:id="rId23"/>
+    <p:sldId id="279" r:id="rId24"/>
+    <p:sldId id="280" r:id="rId25"/>
+    <p:sldId id="281" r:id="rId26"/>
+    <p:sldId id="282" r:id="rId27"/>
+    <p:sldId id="283" r:id="rId28"/>
+    <p:sldId id="284" r:id="rId29"/>
+    <p:sldId id="285" r:id="rId30"/>
+    <p:sldId id="286" r:id="rId31"/>
+    <p:sldId id="287" r:id="rId32"/>
+    <p:sldId id="288" r:id="rId33"/>
+    <p:sldId id="289" r:id="rId34"/>
+    <p:sldId id="290" r:id="rId35"/>
+    <p:sldId id="291" r:id="rId36"/>
+    <p:sldId id="292" r:id="rId37"/>
+    <p:sldId id="293" r:id="rId38"/>
   </p:sldIdLst>
   <p:sldSz cx="9144000" cy="6858000" type="screen4x3"/>
   <p:notesSz cx="6858000" cy="9144000"/>
@@ -306,7 +322,7 @@
           <a:p>
             <a:fld id="{715CD462-00F3-4312-AF53-03FBFE4C9BB8}" type="datetimeFigureOut">
               <a:rPr lang="pt-BR" smtClean="0"/>
-              <a:t>01/09/2021</a:t>
+              <a:t>03/09/2021</a:t>
             </a:fld>
             <a:endParaRPr lang="pt-BR"/>
           </a:p>
@@ -1175,7 +1191,7 @@
           <a:p>
             <a:fld id="{715CD462-00F3-4312-AF53-03FBFE4C9BB8}" type="datetimeFigureOut">
               <a:rPr lang="pt-BR" smtClean="0"/>
-              <a:t>01/09/2021</a:t>
+              <a:t>03/09/2021</a:t>
             </a:fld>
             <a:endParaRPr lang="pt-BR"/>
           </a:p>
@@ -1350,7 +1366,7 @@
           <a:p>
             <a:fld id="{715CD462-00F3-4312-AF53-03FBFE4C9BB8}" type="datetimeFigureOut">
               <a:rPr lang="pt-BR" smtClean="0"/>
-              <a:t>01/09/2021</a:t>
+              <a:t>03/09/2021</a:t>
             </a:fld>
             <a:endParaRPr lang="pt-BR"/>
           </a:p>
@@ -1520,7 +1536,7 @@
           <a:p>
             <a:fld id="{715CD462-00F3-4312-AF53-03FBFE4C9BB8}" type="datetimeFigureOut">
               <a:rPr lang="pt-BR" smtClean="0"/>
-              <a:t>01/09/2021</a:t>
+              <a:t>03/09/2021</a:t>
             </a:fld>
             <a:endParaRPr lang="pt-BR"/>
           </a:p>
@@ -1730,7 +1746,7 @@
           <a:p>
             <a:fld id="{715CD462-00F3-4312-AF53-03FBFE4C9BB8}" type="datetimeFigureOut">
               <a:rPr lang="pt-BR" smtClean="0"/>
-              <a:t>01/09/2021</a:t>
+              <a:t>03/09/2021</a:t>
             </a:fld>
             <a:endParaRPr lang="pt-BR"/>
           </a:p>
@@ -2544,7 +2560,7 @@
           <a:p>
             <a:fld id="{715CD462-00F3-4312-AF53-03FBFE4C9BB8}" type="datetimeFigureOut">
               <a:rPr lang="pt-BR" smtClean="0"/>
-              <a:t>01/09/2021</a:t>
+              <a:t>03/09/2021</a:t>
             </a:fld>
             <a:endParaRPr lang="pt-BR"/>
           </a:p>
@@ -2780,7 +2796,7 @@
           <a:p>
             <a:fld id="{715CD462-00F3-4312-AF53-03FBFE4C9BB8}" type="datetimeFigureOut">
               <a:rPr lang="pt-BR" smtClean="0"/>
-              <a:t>01/09/2021</a:t>
+              <a:t>03/09/2021</a:t>
             </a:fld>
             <a:endParaRPr lang="pt-BR"/>
           </a:p>
@@ -3103,7 +3119,7 @@
           <a:p>
             <a:fld id="{715CD462-00F3-4312-AF53-03FBFE4C9BB8}" type="datetimeFigureOut">
               <a:rPr lang="pt-BR" smtClean="0"/>
-              <a:t>01/09/2021</a:t>
+              <a:t>03/09/2021</a:t>
             </a:fld>
             <a:endParaRPr lang="pt-BR"/>
           </a:p>
@@ -3193,7 +3209,7 @@
           <a:p>
             <a:fld id="{715CD462-00F3-4312-AF53-03FBFE4C9BB8}" type="datetimeFigureOut">
               <a:rPr lang="pt-BR" smtClean="0"/>
-              <a:t>01/09/2021</a:t>
+              <a:t>03/09/2021</a:t>
             </a:fld>
             <a:endParaRPr lang="pt-BR"/>
           </a:p>
@@ -3710,7 +3726,7 @@
           <a:p>
             <a:fld id="{715CD462-00F3-4312-AF53-03FBFE4C9BB8}" type="datetimeFigureOut">
               <a:rPr lang="pt-BR" smtClean="0"/>
-              <a:t>01/09/2021</a:t>
+              <a:t>03/09/2021</a:t>
             </a:fld>
             <a:endParaRPr lang="pt-BR"/>
           </a:p>
@@ -4221,7 +4237,7 @@
           <a:p>
             <a:fld id="{715CD462-00F3-4312-AF53-03FBFE4C9BB8}" type="datetimeFigureOut">
               <a:rPr lang="pt-BR" smtClean="0"/>
-              <a:t>01/09/2021</a:t>
+              <a:t>03/09/2021</a:t>
             </a:fld>
             <a:endParaRPr lang="pt-BR"/>
           </a:p>
@@ -4466,7 +4482,7 @@
           <a:p>
             <a:fld id="{715CD462-00F3-4312-AF53-03FBFE4C9BB8}" type="datetimeFigureOut">
               <a:rPr lang="pt-BR" smtClean="0"/>
-              <a:t>01/09/2021</a:t>
+              <a:t>03/09/2021</a:t>
             </a:fld>
             <a:endParaRPr lang="pt-BR"/>
           </a:p>
@@ -8611,6 +8627,2309 @@
 </p:sld>
 </file>
 
+<file path=ppt/slides/slide22.xml><?xml version="1.0" encoding="utf-8"?>
+<p:sld xmlns:a="http://schemas.openxmlformats.org/drawingml/2006/main" xmlns:r="http://schemas.openxmlformats.org/officeDocument/2006/relationships" xmlns:p="http://schemas.openxmlformats.org/presentationml/2006/main">
+  <p:cSld>
+    <p:spTree>
+      <p:nvGrpSpPr>
+        <p:cNvPr id="1" name=""/>
+        <p:cNvGrpSpPr/>
+        <p:nvPr/>
+      </p:nvGrpSpPr>
+      <p:grpSpPr>
+        <a:xfrm>
+          <a:off x="0" y="0"/>
+          <a:ext cx="0" cy="0"/>
+          <a:chOff x="0" y="0"/>
+          <a:chExt cx="0" cy="0"/>
+        </a:xfrm>
+      </p:grpSpPr>
+      <p:sp>
+        <p:nvSpPr>
+          <p:cNvPr id="5" name="Título 1">
+            <a:extLst>
+              <a:ext uri="{FF2B5EF4-FFF2-40B4-BE49-F238E27FC236}">
+                <a16:creationId xmlns:a16="http://schemas.microsoft.com/office/drawing/2014/main" id="{296D28C2-C8BF-47DB-9CBC-ADD02F83D903}"/>
+              </a:ext>
+            </a:extLst>
+          </p:cNvPr>
+          <p:cNvSpPr>
+            <a:spLocks noGrp="1"/>
+          </p:cNvSpPr>
+          <p:nvPr>
+            <p:ph type="title"/>
+          </p:nvPr>
+        </p:nvSpPr>
+        <p:spPr>
+          <a:xfrm>
+            <a:off x="457200" y="274638"/>
+            <a:ext cx="7467600" cy="1143000"/>
+          </a:xfrm>
+        </p:spPr>
+        <p:txBody>
+          <a:bodyPr/>
+          <a:lstStyle/>
+          <a:p>
+            <a:r>
+              <a:rPr lang="en-US" dirty="0" err="1"/>
+              <a:t>Montagem</a:t>
+            </a:r>
+            <a:r>
+              <a:rPr lang="en-US" dirty="0"/>
+              <a:t> do </a:t>
+            </a:r>
+            <a:r>
+              <a:rPr lang="en-US" dirty="0" err="1"/>
+              <a:t>Formulário</a:t>
+            </a:r>
+            <a:r>
+              <a:rPr lang="en-US" dirty="0"/>
+              <a:t> – </a:t>
+            </a:r>
+            <a:br>
+              <a:rPr lang="en-US" dirty="0"/>
+            </a:br>
+            <a:r>
+              <a:rPr lang="en-US" dirty="0"/>
+              <a:t>Unit chat</a:t>
+            </a:r>
+            <a:endParaRPr lang="pt-BR" dirty="0"/>
+          </a:p>
+        </p:txBody>
+      </p:sp>
+      <p:pic>
+        <p:nvPicPr>
+          <p:cNvPr id="7" name="Imagem 6" descr="Tela de computador&#10;&#10;Descrição gerada automaticamente">
+            <a:extLst>
+              <a:ext uri="{FF2B5EF4-FFF2-40B4-BE49-F238E27FC236}">
+                <a16:creationId xmlns:a16="http://schemas.microsoft.com/office/drawing/2014/main" id="{EC399DF9-8961-4DF6-A582-719CEE89E605}"/>
+              </a:ext>
+            </a:extLst>
+          </p:cNvPr>
+          <p:cNvPicPr>
+            <a:picLocks noChangeAspect="1"/>
+          </p:cNvPicPr>
+          <p:nvPr/>
+        </p:nvPicPr>
+        <p:blipFill>
+          <a:blip r:embed="rId2">
+            <a:extLst>
+              <a:ext uri="{28A0092B-C50C-407E-A947-70E740481C1C}">
+                <a14:useLocalDpi xmlns:a14="http://schemas.microsoft.com/office/drawing/2010/main" val="0"/>
+              </a:ext>
+            </a:extLst>
+          </a:blip>
+          <a:stretch>
+            <a:fillRect/>
+          </a:stretch>
+        </p:blipFill>
+        <p:spPr>
+          <a:xfrm>
+            <a:off x="3753678" y="1490007"/>
+            <a:ext cx="4343400" cy="3422313"/>
+          </a:xfrm>
+          <a:prstGeom prst="rect">
+            <a:avLst/>
+          </a:prstGeom>
+        </p:spPr>
+      </p:pic>
+      <p:sp>
+        <p:nvSpPr>
+          <p:cNvPr id="8" name="CaixaDeTexto 7">
+            <a:extLst>
+              <a:ext uri="{FF2B5EF4-FFF2-40B4-BE49-F238E27FC236}">
+                <a16:creationId xmlns:a16="http://schemas.microsoft.com/office/drawing/2014/main" id="{07DAF337-8AAF-4F3E-946C-8E317BDBB262}"/>
+              </a:ext>
+            </a:extLst>
+          </p:cNvPr>
+          <p:cNvSpPr txBox="1"/>
+          <p:nvPr/>
+        </p:nvSpPr>
+        <p:spPr>
+          <a:xfrm>
+            <a:off x="457200" y="2209800"/>
+            <a:ext cx="3276600" cy="1938992"/>
+          </a:xfrm>
+          <a:prstGeom prst="rect">
+            <a:avLst/>
+          </a:prstGeom>
+          <a:noFill/>
+        </p:spPr>
+        <p:txBody>
+          <a:bodyPr wrap="square" rtlCol="0">
+            <a:spAutoFit/>
+          </a:bodyPr>
+          <a:lstStyle/>
+          <a:p>
+            <a:pPr marL="342900" indent="-342900">
+              <a:buFont typeface="Arial" panose="020B0604020202020204" pitchFamily="34" charset="0"/>
+              <a:buChar char="•"/>
+            </a:pPr>
+            <a:r>
+              <a:rPr lang="en-US" sz="2400" dirty="0" err="1"/>
+              <a:t>Adicione</a:t>
+            </a:r>
+            <a:r>
+              <a:rPr lang="en-US" sz="2400" dirty="0"/>
+              <a:t> um novo </a:t>
+            </a:r>
+            <a:r>
+              <a:rPr lang="en-US" sz="2400" dirty="0" err="1"/>
+              <a:t>formulário</a:t>
+            </a:r>
+            <a:r>
+              <a:rPr lang="en-US" sz="2400" dirty="0"/>
+              <a:t> </a:t>
+            </a:r>
+            <a:r>
+              <a:rPr lang="en-US" sz="2400" dirty="0" err="1"/>
+              <a:t>ao</a:t>
+            </a:r>
+            <a:r>
+              <a:rPr lang="en-US" sz="2400" dirty="0"/>
+              <a:t> </a:t>
+            </a:r>
+            <a:r>
+              <a:rPr lang="en-US" sz="2400" dirty="0" err="1"/>
+              <a:t>projeto</a:t>
+            </a:r>
+            <a:r>
+              <a:rPr lang="en-US" sz="2400" dirty="0"/>
+              <a:t>, com o </a:t>
+            </a:r>
+            <a:r>
+              <a:rPr lang="en-US" sz="2400" dirty="0" err="1"/>
+              <a:t>nome</a:t>
+            </a:r>
+            <a:r>
+              <a:rPr lang="en-US" sz="2400" dirty="0"/>
+              <a:t> </a:t>
+            </a:r>
+            <a:r>
+              <a:rPr lang="en-US" sz="2400" b="1" dirty="0" err="1"/>
+              <a:t>frmChatU</a:t>
+            </a:r>
+            <a:endParaRPr lang="en-US" sz="2400" b="1" dirty="0"/>
+          </a:p>
+          <a:p>
+            <a:pPr marL="342900" indent="-342900">
+              <a:buFont typeface="Arial" panose="020B0604020202020204" pitchFamily="34" charset="0"/>
+              <a:buChar char="•"/>
+            </a:pPr>
+            <a:endParaRPr lang="en-US" sz="2400" b="1" dirty="0"/>
+          </a:p>
+        </p:txBody>
+      </p:sp>
+      <p:sp>
+        <p:nvSpPr>
+          <p:cNvPr id="9" name="CaixaDeTexto 8">
+            <a:extLst>
+              <a:ext uri="{FF2B5EF4-FFF2-40B4-BE49-F238E27FC236}">
+                <a16:creationId xmlns:a16="http://schemas.microsoft.com/office/drawing/2014/main" id="{B17C869C-DB44-4F43-A517-211501D892A0}"/>
+              </a:ext>
+            </a:extLst>
+          </p:cNvPr>
+          <p:cNvSpPr txBox="1"/>
+          <p:nvPr/>
+        </p:nvSpPr>
+        <p:spPr>
+          <a:xfrm>
+            <a:off x="443948" y="4873485"/>
+            <a:ext cx="4343400" cy="1200329"/>
+          </a:xfrm>
+          <a:prstGeom prst="rect">
+            <a:avLst/>
+          </a:prstGeom>
+          <a:noFill/>
+        </p:spPr>
+        <p:txBody>
+          <a:bodyPr wrap="square" rtlCol="0">
+            <a:spAutoFit/>
+          </a:bodyPr>
+          <a:lstStyle/>
+          <a:p>
+            <a:pPr marL="342900" indent="-342900">
+              <a:buFont typeface="Arial" panose="020B0604020202020204" pitchFamily="34" charset="0"/>
+              <a:buChar char="•"/>
+            </a:pPr>
+            <a:r>
+              <a:rPr lang="en-US" sz="2400" dirty="0"/>
+              <a:t>Configure o </a:t>
+            </a:r>
+            <a:r>
+              <a:rPr lang="en-US" sz="2400" dirty="0" err="1"/>
+              <a:t>formulário</a:t>
+            </a:r>
+            <a:r>
+              <a:rPr lang="en-US" sz="2400" dirty="0"/>
+              <a:t> </a:t>
+            </a:r>
+            <a:r>
+              <a:rPr lang="en-US" sz="2400" dirty="0" err="1"/>
+              <a:t>como</a:t>
+            </a:r>
+            <a:r>
+              <a:rPr lang="en-US" sz="2400" dirty="0"/>
+              <a:t> </a:t>
+            </a:r>
+            <a:r>
+              <a:rPr lang="en-US" sz="2400" dirty="0" err="1"/>
+              <a:t>abaixo</a:t>
+            </a:r>
+            <a:r>
+              <a:rPr lang="en-US" sz="2400" dirty="0"/>
+              <a:t>:</a:t>
+            </a:r>
+          </a:p>
+          <a:p>
+            <a:pPr marL="800100" lvl="1" indent="-342900">
+              <a:buFont typeface="Arial" panose="020B0604020202020204" pitchFamily="34" charset="0"/>
+              <a:buChar char="•"/>
+            </a:pPr>
+            <a:r>
+              <a:rPr lang="en-US" sz="2400" b="1" dirty="0"/>
+              <a:t>Name: </a:t>
+            </a:r>
+            <a:r>
+              <a:rPr lang="en-US" sz="2400" b="1" dirty="0" err="1"/>
+              <a:t>frmChat</a:t>
+            </a:r>
+            <a:endParaRPr lang="en-US" sz="2400" b="1" dirty="0"/>
+          </a:p>
+        </p:txBody>
+      </p:sp>
+    </p:spTree>
+    <p:extLst>
+      <p:ext uri="{BB962C8B-B14F-4D97-AF65-F5344CB8AC3E}">
+        <p14:creationId xmlns:p14="http://schemas.microsoft.com/office/powerpoint/2010/main" val="3209516893"/>
+      </p:ext>
+    </p:extLst>
+  </p:cSld>
+  <p:clrMapOvr>
+    <a:masterClrMapping/>
+  </p:clrMapOvr>
+</p:sld>
+</file>
+
+<file path=ppt/slides/slide23.xml><?xml version="1.0" encoding="utf-8"?>
+<p:sld xmlns:a="http://schemas.openxmlformats.org/drawingml/2006/main" xmlns:r="http://schemas.openxmlformats.org/officeDocument/2006/relationships" xmlns:p="http://schemas.openxmlformats.org/presentationml/2006/main">
+  <p:cSld>
+    <p:spTree>
+      <p:nvGrpSpPr>
+        <p:cNvPr id="1" name=""/>
+        <p:cNvGrpSpPr/>
+        <p:nvPr/>
+      </p:nvGrpSpPr>
+      <p:grpSpPr>
+        <a:xfrm>
+          <a:off x="0" y="0"/>
+          <a:ext cx="0" cy="0"/>
+          <a:chOff x="0" y="0"/>
+          <a:chExt cx="0" cy="0"/>
+        </a:xfrm>
+      </p:grpSpPr>
+      <p:sp>
+        <p:nvSpPr>
+          <p:cNvPr id="4" name="Título 1">
+            <a:extLst>
+              <a:ext uri="{FF2B5EF4-FFF2-40B4-BE49-F238E27FC236}">
+                <a16:creationId xmlns:a16="http://schemas.microsoft.com/office/drawing/2014/main" id="{B80B5167-1D8A-49BC-A9C7-0EF1A4DA4849}"/>
+              </a:ext>
+            </a:extLst>
+          </p:cNvPr>
+          <p:cNvSpPr>
+            <a:spLocks noGrp="1"/>
+          </p:cNvSpPr>
+          <p:nvPr>
+            <p:ph type="title"/>
+          </p:nvPr>
+        </p:nvSpPr>
+        <p:spPr>
+          <a:xfrm>
+            <a:off x="457200" y="274638"/>
+            <a:ext cx="7467600" cy="1143000"/>
+          </a:xfrm>
+        </p:spPr>
+        <p:txBody>
+          <a:bodyPr/>
+          <a:lstStyle/>
+          <a:p>
+            <a:r>
+              <a:rPr lang="en-US" dirty="0" err="1"/>
+              <a:t>Montagem</a:t>
+            </a:r>
+            <a:r>
+              <a:rPr lang="en-US" dirty="0"/>
+              <a:t> do </a:t>
+            </a:r>
+            <a:r>
+              <a:rPr lang="en-US" dirty="0" err="1"/>
+              <a:t>Formulário</a:t>
+            </a:r>
+            <a:r>
+              <a:rPr lang="en-US" dirty="0"/>
+              <a:t> – </a:t>
+            </a:r>
+            <a:br>
+              <a:rPr lang="en-US" dirty="0"/>
+            </a:br>
+            <a:r>
+              <a:rPr lang="en-US" dirty="0"/>
+              <a:t>Unit chat</a:t>
+            </a:r>
+            <a:endParaRPr lang="pt-BR" dirty="0"/>
+          </a:p>
+        </p:txBody>
+      </p:sp>
+      <p:pic>
+        <p:nvPicPr>
+          <p:cNvPr id="6" name="Imagem 5">
+            <a:extLst>
+              <a:ext uri="{FF2B5EF4-FFF2-40B4-BE49-F238E27FC236}">
+                <a16:creationId xmlns:a16="http://schemas.microsoft.com/office/drawing/2014/main" id="{60F69534-A409-4FAB-9469-E13C77852286}"/>
+              </a:ext>
+            </a:extLst>
+          </p:cNvPr>
+          <p:cNvPicPr>
+            <a:picLocks noChangeAspect="1"/>
+          </p:cNvPicPr>
+          <p:nvPr/>
+        </p:nvPicPr>
+        <p:blipFill>
+          <a:blip r:embed="rId2"/>
+          <a:stretch>
+            <a:fillRect/>
+          </a:stretch>
+        </p:blipFill>
+        <p:spPr>
+          <a:xfrm>
+            <a:off x="5303768" y="1600200"/>
+            <a:ext cx="2657475" cy="2628900"/>
+          </a:xfrm>
+          <a:prstGeom prst="rect">
+            <a:avLst/>
+          </a:prstGeom>
+        </p:spPr>
+      </p:pic>
+      <p:sp>
+        <p:nvSpPr>
+          <p:cNvPr id="7" name="CaixaDeTexto 6">
+            <a:extLst>
+              <a:ext uri="{FF2B5EF4-FFF2-40B4-BE49-F238E27FC236}">
+                <a16:creationId xmlns:a16="http://schemas.microsoft.com/office/drawing/2014/main" id="{32F526CF-EF43-4627-BA5D-73803136A2EB}"/>
+              </a:ext>
+            </a:extLst>
+          </p:cNvPr>
+          <p:cNvSpPr txBox="1"/>
+          <p:nvPr/>
+        </p:nvSpPr>
+        <p:spPr>
+          <a:xfrm>
+            <a:off x="368191" y="2286000"/>
+            <a:ext cx="4657725" cy="830997"/>
+          </a:xfrm>
+          <a:prstGeom prst="rect">
+            <a:avLst/>
+          </a:prstGeom>
+          <a:noFill/>
+        </p:spPr>
+        <p:txBody>
+          <a:bodyPr wrap="square" rtlCol="0">
+            <a:spAutoFit/>
+          </a:bodyPr>
+          <a:lstStyle/>
+          <a:p>
+            <a:pPr marL="342900" indent="-342900">
+              <a:buFont typeface="Arial" panose="020B0604020202020204" pitchFamily="34" charset="0"/>
+              <a:buChar char="•"/>
+            </a:pPr>
+            <a:r>
+              <a:rPr lang="en-US" sz="2400" dirty="0" err="1"/>
+              <a:t>Adicione</a:t>
+            </a:r>
+            <a:r>
+              <a:rPr lang="en-US" sz="2400" dirty="0"/>
+              <a:t> da aba </a:t>
+            </a:r>
+            <a:r>
+              <a:rPr lang="en-US" sz="2400" b="1" dirty="0"/>
+              <a:t>Standard </a:t>
+            </a:r>
+            <a:r>
+              <a:rPr lang="en-US" sz="2400" dirty="0"/>
+              <a:t>um </a:t>
+            </a:r>
+            <a:r>
+              <a:rPr lang="en-US" sz="2400" dirty="0" err="1"/>
+              <a:t>componente</a:t>
+            </a:r>
+            <a:r>
+              <a:rPr lang="en-US" sz="2400" dirty="0"/>
+              <a:t> </a:t>
+            </a:r>
+            <a:r>
+              <a:rPr lang="en-US" sz="2400" b="1" dirty="0" err="1"/>
+              <a:t>TRectangle</a:t>
+            </a:r>
+            <a:endParaRPr lang="en-US" sz="2400" dirty="0"/>
+          </a:p>
+        </p:txBody>
+      </p:sp>
+      <p:sp>
+        <p:nvSpPr>
+          <p:cNvPr id="8" name="CaixaDeTexto 7">
+            <a:extLst>
+              <a:ext uri="{FF2B5EF4-FFF2-40B4-BE49-F238E27FC236}">
+                <a16:creationId xmlns:a16="http://schemas.microsoft.com/office/drawing/2014/main" id="{5F7797A7-C627-4DEE-9030-96B1FCC94DA2}"/>
+              </a:ext>
+            </a:extLst>
+          </p:cNvPr>
+          <p:cNvSpPr txBox="1"/>
+          <p:nvPr/>
+        </p:nvSpPr>
+        <p:spPr>
+          <a:xfrm>
+            <a:off x="3085095" y="4432637"/>
+            <a:ext cx="4839705" cy="1569660"/>
+          </a:xfrm>
+          <a:prstGeom prst="rect">
+            <a:avLst/>
+          </a:prstGeom>
+          <a:noFill/>
+        </p:spPr>
+        <p:txBody>
+          <a:bodyPr wrap="square" rtlCol="0">
+            <a:spAutoFit/>
+          </a:bodyPr>
+          <a:lstStyle/>
+          <a:p>
+            <a:pPr marL="342900" indent="-342900">
+              <a:buFont typeface="Arial" panose="020B0604020202020204" pitchFamily="34" charset="0"/>
+              <a:buChar char="•"/>
+            </a:pPr>
+            <a:r>
+              <a:rPr lang="en-US" sz="2400" dirty="0"/>
+              <a:t>Configure o </a:t>
+            </a:r>
+            <a:r>
+              <a:rPr lang="en-US" sz="2400" dirty="0" err="1"/>
+              <a:t>componente</a:t>
+            </a:r>
+            <a:r>
+              <a:rPr lang="en-US" sz="2400" dirty="0"/>
+              <a:t> </a:t>
+            </a:r>
+            <a:r>
+              <a:rPr lang="en-US" sz="2400" b="1" dirty="0"/>
+              <a:t>Rectangle1</a:t>
+            </a:r>
+            <a:r>
+              <a:rPr lang="en-US" sz="2400" dirty="0"/>
+              <a:t> da </a:t>
+            </a:r>
+            <a:r>
+              <a:rPr lang="en-US" sz="2400" dirty="0" err="1"/>
+              <a:t>seguinte</a:t>
+            </a:r>
+            <a:r>
+              <a:rPr lang="en-US" sz="2400" dirty="0"/>
+              <a:t> forma:</a:t>
+            </a:r>
+          </a:p>
+          <a:p>
+            <a:pPr marL="800100" lvl="1" indent="-342900">
+              <a:buFont typeface="Arial" panose="020B0604020202020204" pitchFamily="34" charset="0"/>
+              <a:buChar char="•"/>
+            </a:pPr>
+            <a:r>
+              <a:rPr lang="en-US" sz="2400" dirty="0"/>
+              <a:t>Fill -&gt; Color: #FFFFBA06</a:t>
+            </a:r>
+          </a:p>
+        </p:txBody>
+      </p:sp>
+      <p:pic>
+        <p:nvPicPr>
+          <p:cNvPr id="10" name="Imagem 9">
+            <a:extLst>
+              <a:ext uri="{FF2B5EF4-FFF2-40B4-BE49-F238E27FC236}">
+                <a16:creationId xmlns:a16="http://schemas.microsoft.com/office/drawing/2014/main" id="{AA080429-8CA8-43AE-B327-151EDB292587}"/>
+              </a:ext>
+            </a:extLst>
+          </p:cNvPr>
+          <p:cNvPicPr>
+            <a:picLocks noChangeAspect="1"/>
+          </p:cNvPicPr>
+          <p:nvPr/>
+        </p:nvPicPr>
+        <p:blipFill>
+          <a:blip r:embed="rId3"/>
+          <a:stretch>
+            <a:fillRect/>
+          </a:stretch>
+        </p:blipFill>
+        <p:spPr>
+          <a:xfrm>
+            <a:off x="384756" y="4414760"/>
+            <a:ext cx="2553706" cy="1933575"/>
+          </a:xfrm>
+          <a:prstGeom prst="rect">
+            <a:avLst/>
+          </a:prstGeom>
+        </p:spPr>
+      </p:pic>
+    </p:spTree>
+    <p:extLst>
+      <p:ext uri="{BB962C8B-B14F-4D97-AF65-F5344CB8AC3E}">
+        <p14:creationId xmlns:p14="http://schemas.microsoft.com/office/powerpoint/2010/main" val="2301296634"/>
+      </p:ext>
+    </p:extLst>
+  </p:cSld>
+  <p:clrMapOvr>
+    <a:masterClrMapping/>
+  </p:clrMapOvr>
+</p:sld>
+</file>
+
+<file path=ppt/slides/slide24.xml><?xml version="1.0" encoding="utf-8"?>
+<p:sld xmlns:a="http://schemas.openxmlformats.org/drawingml/2006/main" xmlns:r="http://schemas.openxmlformats.org/officeDocument/2006/relationships" xmlns:p="http://schemas.openxmlformats.org/presentationml/2006/main">
+  <p:cSld>
+    <p:spTree>
+      <p:nvGrpSpPr>
+        <p:cNvPr id="1" name=""/>
+        <p:cNvGrpSpPr/>
+        <p:nvPr/>
+      </p:nvGrpSpPr>
+      <p:grpSpPr>
+        <a:xfrm>
+          <a:off x="0" y="0"/>
+          <a:ext cx="0" cy="0"/>
+          <a:chOff x="0" y="0"/>
+          <a:chExt cx="0" cy="0"/>
+        </a:xfrm>
+      </p:grpSpPr>
+      <p:sp>
+        <p:nvSpPr>
+          <p:cNvPr id="5" name="Título 1">
+            <a:extLst>
+              <a:ext uri="{FF2B5EF4-FFF2-40B4-BE49-F238E27FC236}">
+                <a16:creationId xmlns:a16="http://schemas.microsoft.com/office/drawing/2014/main" id="{35F358C9-70BB-47AF-B6D7-DA7D6BE3AC00}"/>
+              </a:ext>
+            </a:extLst>
+          </p:cNvPr>
+          <p:cNvSpPr>
+            <a:spLocks noGrp="1"/>
+          </p:cNvSpPr>
+          <p:nvPr>
+            <p:ph type="title"/>
+          </p:nvPr>
+        </p:nvSpPr>
+        <p:spPr>
+          <a:xfrm>
+            <a:off x="457200" y="274638"/>
+            <a:ext cx="7467600" cy="1143000"/>
+          </a:xfrm>
+        </p:spPr>
+        <p:txBody>
+          <a:bodyPr/>
+          <a:lstStyle/>
+          <a:p>
+            <a:r>
+              <a:rPr lang="en-US" dirty="0" err="1"/>
+              <a:t>Montagem</a:t>
+            </a:r>
+            <a:r>
+              <a:rPr lang="en-US" dirty="0"/>
+              <a:t> do </a:t>
+            </a:r>
+            <a:r>
+              <a:rPr lang="en-US" dirty="0" err="1"/>
+              <a:t>Formulário</a:t>
+            </a:r>
+            <a:r>
+              <a:rPr lang="en-US" dirty="0"/>
+              <a:t> – </a:t>
+            </a:r>
+            <a:br>
+              <a:rPr lang="en-US" dirty="0"/>
+            </a:br>
+            <a:r>
+              <a:rPr lang="en-US" dirty="0"/>
+              <a:t>Unit chat</a:t>
+            </a:r>
+            <a:endParaRPr lang="pt-BR" dirty="0"/>
+          </a:p>
+        </p:txBody>
+      </p:sp>
+      <p:pic>
+        <p:nvPicPr>
+          <p:cNvPr id="7" name="Imagem 6">
+            <a:extLst>
+              <a:ext uri="{FF2B5EF4-FFF2-40B4-BE49-F238E27FC236}">
+                <a16:creationId xmlns:a16="http://schemas.microsoft.com/office/drawing/2014/main" id="{5C593F37-9435-446B-A5AA-32F61244C93F}"/>
+              </a:ext>
+            </a:extLst>
+          </p:cNvPr>
+          <p:cNvPicPr>
+            <a:picLocks noChangeAspect="1"/>
+          </p:cNvPicPr>
+          <p:nvPr/>
+        </p:nvPicPr>
+        <p:blipFill>
+          <a:blip r:embed="rId2"/>
+          <a:stretch>
+            <a:fillRect/>
+          </a:stretch>
+        </p:blipFill>
+        <p:spPr>
+          <a:xfrm>
+            <a:off x="5895975" y="1676400"/>
+            <a:ext cx="2638425" cy="2590800"/>
+          </a:xfrm>
+          <a:prstGeom prst="rect">
+            <a:avLst/>
+          </a:prstGeom>
+        </p:spPr>
+      </p:pic>
+      <p:sp>
+        <p:nvSpPr>
+          <p:cNvPr id="8" name="CaixaDeTexto 7">
+            <a:extLst>
+              <a:ext uri="{FF2B5EF4-FFF2-40B4-BE49-F238E27FC236}">
+                <a16:creationId xmlns:a16="http://schemas.microsoft.com/office/drawing/2014/main" id="{33BF7581-C686-4A89-AF3C-64A3ADC019B9}"/>
+              </a:ext>
+            </a:extLst>
+          </p:cNvPr>
+          <p:cNvSpPr txBox="1"/>
+          <p:nvPr/>
+        </p:nvSpPr>
+        <p:spPr>
+          <a:xfrm>
+            <a:off x="504826" y="1676400"/>
+            <a:ext cx="5486400" cy="1200329"/>
+          </a:xfrm>
+          <a:prstGeom prst="rect">
+            <a:avLst/>
+          </a:prstGeom>
+          <a:noFill/>
+        </p:spPr>
+        <p:txBody>
+          <a:bodyPr wrap="square" rtlCol="0">
+            <a:spAutoFit/>
+          </a:bodyPr>
+          <a:lstStyle/>
+          <a:p>
+            <a:pPr marL="342900" indent="-342900">
+              <a:buFont typeface="Arial" panose="020B0604020202020204" pitchFamily="34" charset="0"/>
+              <a:buChar char="•"/>
+            </a:pPr>
+            <a:r>
+              <a:rPr lang="en-US" sz="2400" dirty="0"/>
+              <a:t>Da aba </a:t>
+            </a:r>
+            <a:r>
+              <a:rPr lang="en-US" sz="2400" b="1" dirty="0"/>
+              <a:t>Standard</a:t>
+            </a:r>
+            <a:r>
+              <a:rPr lang="en-US" sz="2400" dirty="0"/>
+              <a:t> </a:t>
+            </a:r>
+            <a:r>
+              <a:rPr lang="en-US" sz="2400" dirty="0" err="1"/>
+              <a:t>adicione</a:t>
+            </a:r>
+            <a:r>
+              <a:rPr lang="en-US" sz="2400" dirty="0"/>
+              <a:t> </a:t>
+            </a:r>
+            <a:r>
+              <a:rPr lang="en-US" sz="2400" dirty="0" err="1"/>
+              <a:t>dois</a:t>
+            </a:r>
+            <a:r>
+              <a:rPr lang="en-US" sz="2400" dirty="0"/>
+              <a:t> </a:t>
+            </a:r>
+            <a:r>
+              <a:rPr lang="en-US" sz="2400" dirty="0" err="1"/>
+              <a:t>componentes</a:t>
+            </a:r>
+            <a:r>
+              <a:rPr lang="en-US" sz="2400" dirty="0"/>
+              <a:t> </a:t>
+            </a:r>
+            <a:r>
+              <a:rPr lang="en-US" sz="2400" b="1" dirty="0" err="1"/>
+              <a:t>TButton</a:t>
+            </a:r>
+            <a:r>
+              <a:rPr lang="en-US" sz="2400" b="1" dirty="0"/>
+              <a:t> </a:t>
+            </a:r>
+            <a:r>
+              <a:rPr lang="en-US" sz="2400" dirty="0"/>
+              <a:t>e um </a:t>
+            </a:r>
+            <a:r>
+              <a:rPr lang="en-US" sz="2400" dirty="0" err="1"/>
+              <a:t>componente</a:t>
+            </a:r>
+            <a:r>
+              <a:rPr lang="en-US" sz="2400" dirty="0"/>
+              <a:t> </a:t>
+            </a:r>
+            <a:r>
+              <a:rPr lang="en-US" sz="2400" b="1" dirty="0" err="1"/>
+              <a:t>TLabel</a:t>
+            </a:r>
+            <a:r>
+              <a:rPr lang="en-US" sz="2400" b="1" dirty="0"/>
+              <a:t> </a:t>
+            </a:r>
+            <a:r>
+              <a:rPr lang="en-US" sz="2400" dirty="0" err="1"/>
+              <a:t>ao</a:t>
+            </a:r>
+            <a:r>
+              <a:rPr lang="en-US" sz="2400" dirty="0"/>
+              <a:t> </a:t>
+            </a:r>
+            <a:r>
+              <a:rPr lang="en-US" sz="2400" dirty="0" err="1"/>
+              <a:t>formulário</a:t>
+            </a:r>
+            <a:r>
+              <a:rPr lang="en-US" sz="2400" b="1" dirty="0"/>
+              <a:t> </a:t>
+            </a:r>
+          </a:p>
+        </p:txBody>
+      </p:sp>
+      <p:pic>
+        <p:nvPicPr>
+          <p:cNvPr id="10" name="Imagem 9" descr="Tela de computador com texto preto sobre fundo branco&#10;&#10;Descrição gerada automaticamente">
+            <a:extLst>
+              <a:ext uri="{FF2B5EF4-FFF2-40B4-BE49-F238E27FC236}">
+                <a16:creationId xmlns:a16="http://schemas.microsoft.com/office/drawing/2014/main" id="{DB7FFCB9-6C8B-452D-A663-1BD51619B715}"/>
+              </a:ext>
+            </a:extLst>
+          </p:cNvPr>
+          <p:cNvPicPr>
+            <a:picLocks noChangeAspect="1"/>
+          </p:cNvPicPr>
+          <p:nvPr/>
+        </p:nvPicPr>
+        <p:blipFill>
+          <a:blip r:embed="rId3">
+            <a:extLst>
+              <a:ext uri="{28A0092B-C50C-407E-A947-70E740481C1C}">
+                <a14:useLocalDpi xmlns:a14="http://schemas.microsoft.com/office/drawing/2010/main" val="0"/>
+              </a:ext>
+            </a:extLst>
+          </a:blip>
+          <a:stretch>
+            <a:fillRect/>
+          </a:stretch>
+        </p:blipFill>
+        <p:spPr>
+          <a:xfrm>
+            <a:off x="609600" y="3657600"/>
+            <a:ext cx="2495550" cy="2733675"/>
+          </a:xfrm>
+          <a:prstGeom prst="rect">
+            <a:avLst/>
+          </a:prstGeom>
+        </p:spPr>
+      </p:pic>
+      <p:sp>
+        <p:nvSpPr>
+          <p:cNvPr id="11" name="CaixaDeTexto 10">
+            <a:extLst>
+              <a:ext uri="{FF2B5EF4-FFF2-40B4-BE49-F238E27FC236}">
+                <a16:creationId xmlns:a16="http://schemas.microsoft.com/office/drawing/2014/main" id="{217D3BE9-A86E-4F80-A8F6-13DD234FC97D}"/>
+              </a:ext>
+            </a:extLst>
+          </p:cNvPr>
+          <p:cNvSpPr txBox="1"/>
+          <p:nvPr/>
+        </p:nvSpPr>
+        <p:spPr>
+          <a:xfrm>
+            <a:off x="3429000" y="4724400"/>
+            <a:ext cx="5105400" cy="1569660"/>
+          </a:xfrm>
+          <a:prstGeom prst="rect">
+            <a:avLst/>
+          </a:prstGeom>
+          <a:noFill/>
+        </p:spPr>
+        <p:txBody>
+          <a:bodyPr wrap="square" rtlCol="0">
+            <a:spAutoFit/>
+          </a:bodyPr>
+          <a:lstStyle/>
+          <a:p>
+            <a:pPr marL="285750" indent="-285750" algn="ctr">
+              <a:buFont typeface="Arial" panose="020B0604020202020204" pitchFamily="34" charset="0"/>
+              <a:buChar char="•"/>
+            </a:pPr>
+            <a:r>
+              <a:rPr lang="en-US" sz="2400" dirty="0" err="1"/>
+              <a:t>Mova</a:t>
+            </a:r>
+            <a:r>
+              <a:rPr lang="en-US" sz="2400" dirty="0"/>
+              <a:t> </a:t>
+            </a:r>
+            <a:r>
+              <a:rPr lang="en-US" sz="2400" dirty="0" err="1"/>
+              <a:t>esses</a:t>
+            </a:r>
+            <a:r>
+              <a:rPr lang="en-US" sz="2400" dirty="0"/>
+              <a:t> 3 </a:t>
+            </a:r>
+            <a:r>
+              <a:rPr lang="en-US" sz="2400" dirty="0" err="1"/>
+              <a:t>componentes</a:t>
+            </a:r>
+            <a:r>
+              <a:rPr lang="en-US" sz="2400" dirty="0"/>
+              <a:t> para dentro do </a:t>
+            </a:r>
+            <a:r>
+              <a:rPr lang="en-US" sz="2400" dirty="0" err="1"/>
+              <a:t>componente</a:t>
+            </a:r>
+            <a:r>
+              <a:rPr lang="en-US" sz="2400" dirty="0"/>
+              <a:t> </a:t>
+            </a:r>
+            <a:r>
+              <a:rPr lang="en-US" sz="2400" b="1" dirty="0"/>
+              <a:t>Rectangle</a:t>
+            </a:r>
+            <a:r>
+              <a:rPr lang="en-US" sz="2400" dirty="0"/>
+              <a:t> </a:t>
+            </a:r>
+            <a:r>
+              <a:rPr lang="en-US" sz="2400" dirty="0" err="1"/>
+              <a:t>usando</a:t>
+            </a:r>
+            <a:r>
+              <a:rPr lang="en-US" sz="2400" dirty="0"/>
+              <a:t> a </a:t>
+            </a:r>
+            <a:r>
+              <a:rPr lang="en-US" sz="2400" dirty="0" err="1"/>
+              <a:t>janela</a:t>
+            </a:r>
+            <a:r>
+              <a:rPr lang="en-US" sz="2400" dirty="0"/>
+              <a:t> </a:t>
+            </a:r>
+            <a:r>
+              <a:rPr lang="en-US" sz="2400" b="1" dirty="0"/>
+              <a:t>Structure</a:t>
+            </a:r>
+            <a:r>
+              <a:rPr lang="en-US" sz="2400" dirty="0"/>
+              <a:t> </a:t>
+            </a:r>
+          </a:p>
+        </p:txBody>
+      </p:sp>
+    </p:spTree>
+    <p:extLst>
+      <p:ext uri="{BB962C8B-B14F-4D97-AF65-F5344CB8AC3E}">
+        <p14:creationId xmlns:p14="http://schemas.microsoft.com/office/powerpoint/2010/main" val="1673555746"/>
+      </p:ext>
+    </p:extLst>
+  </p:cSld>
+  <p:clrMapOvr>
+    <a:masterClrMapping/>
+  </p:clrMapOvr>
+</p:sld>
+</file>
+
+<file path=ppt/slides/slide25.xml><?xml version="1.0" encoding="utf-8"?>
+<p:sld xmlns:a="http://schemas.openxmlformats.org/drawingml/2006/main" xmlns:r="http://schemas.openxmlformats.org/officeDocument/2006/relationships" xmlns:p="http://schemas.openxmlformats.org/presentationml/2006/main">
+  <p:cSld>
+    <p:spTree>
+      <p:nvGrpSpPr>
+        <p:cNvPr id="1" name=""/>
+        <p:cNvGrpSpPr/>
+        <p:nvPr/>
+      </p:nvGrpSpPr>
+      <p:grpSpPr>
+        <a:xfrm>
+          <a:off x="0" y="0"/>
+          <a:ext cx="0" cy="0"/>
+          <a:chOff x="0" y="0"/>
+          <a:chExt cx="0" cy="0"/>
+        </a:xfrm>
+      </p:grpSpPr>
+      <p:sp>
+        <p:nvSpPr>
+          <p:cNvPr id="4" name="Título 1">
+            <a:extLst>
+              <a:ext uri="{FF2B5EF4-FFF2-40B4-BE49-F238E27FC236}">
+                <a16:creationId xmlns:a16="http://schemas.microsoft.com/office/drawing/2014/main" id="{AED5BBAE-19ED-4400-A333-2801D97D08AB}"/>
+              </a:ext>
+            </a:extLst>
+          </p:cNvPr>
+          <p:cNvSpPr>
+            <a:spLocks noGrp="1"/>
+          </p:cNvSpPr>
+          <p:nvPr>
+            <p:ph type="title"/>
+          </p:nvPr>
+        </p:nvSpPr>
+        <p:spPr>
+          <a:xfrm>
+            <a:off x="457200" y="274638"/>
+            <a:ext cx="7467600" cy="1143000"/>
+          </a:xfrm>
+        </p:spPr>
+        <p:txBody>
+          <a:bodyPr/>
+          <a:lstStyle/>
+          <a:p>
+            <a:r>
+              <a:rPr lang="en-US" dirty="0" err="1"/>
+              <a:t>Montagem</a:t>
+            </a:r>
+            <a:r>
+              <a:rPr lang="en-US" dirty="0"/>
+              <a:t> do </a:t>
+            </a:r>
+            <a:r>
+              <a:rPr lang="en-US" dirty="0" err="1"/>
+              <a:t>Formulário</a:t>
+            </a:r>
+            <a:r>
+              <a:rPr lang="en-US" dirty="0"/>
+              <a:t> – </a:t>
+            </a:r>
+            <a:br>
+              <a:rPr lang="en-US" dirty="0"/>
+            </a:br>
+            <a:r>
+              <a:rPr lang="en-US" dirty="0"/>
+              <a:t>Unit chat</a:t>
+            </a:r>
+            <a:endParaRPr lang="pt-BR" dirty="0"/>
+          </a:p>
+        </p:txBody>
+      </p:sp>
+      <p:sp>
+        <p:nvSpPr>
+          <p:cNvPr id="5" name="CaixaDeTexto 4">
+            <a:extLst>
+              <a:ext uri="{FF2B5EF4-FFF2-40B4-BE49-F238E27FC236}">
+                <a16:creationId xmlns:a16="http://schemas.microsoft.com/office/drawing/2014/main" id="{D569752A-C3DF-475F-83B7-F3F6D1644067}"/>
+              </a:ext>
+            </a:extLst>
+          </p:cNvPr>
+          <p:cNvSpPr txBox="1"/>
+          <p:nvPr/>
+        </p:nvSpPr>
+        <p:spPr>
+          <a:xfrm>
+            <a:off x="457200" y="1567162"/>
+            <a:ext cx="7760458" cy="1200329"/>
+          </a:xfrm>
+          <a:prstGeom prst="rect">
+            <a:avLst/>
+          </a:prstGeom>
+          <a:noFill/>
+        </p:spPr>
+        <p:txBody>
+          <a:bodyPr wrap="none" rtlCol="0">
+            <a:spAutoFit/>
+          </a:bodyPr>
+          <a:lstStyle/>
+          <a:p>
+            <a:pPr marL="285750" indent="-285750">
+              <a:buFont typeface="Arial" panose="020B0604020202020204" pitchFamily="34" charset="0"/>
+              <a:buChar char="•"/>
+            </a:pPr>
+            <a:r>
+              <a:rPr lang="en-US" sz="2400" dirty="0"/>
+              <a:t>Configure o </a:t>
+            </a:r>
+            <a:r>
+              <a:rPr lang="en-US" sz="2400" dirty="0" err="1"/>
+              <a:t>componente</a:t>
+            </a:r>
+            <a:r>
+              <a:rPr lang="en-US" sz="2400" dirty="0"/>
+              <a:t> </a:t>
+            </a:r>
+            <a:r>
+              <a:rPr lang="en-US" sz="2400" b="1" dirty="0"/>
+              <a:t>Button1 </a:t>
+            </a:r>
+            <a:r>
+              <a:rPr lang="en-US" sz="2400" dirty="0" err="1"/>
+              <a:t>conforme</a:t>
+            </a:r>
+            <a:r>
+              <a:rPr lang="en-US" sz="2400" dirty="0"/>
+              <a:t> </a:t>
+            </a:r>
+            <a:r>
+              <a:rPr lang="en-US" sz="2400" dirty="0" err="1"/>
+              <a:t>abaixo</a:t>
+            </a:r>
+            <a:r>
+              <a:rPr lang="en-US" sz="2400" dirty="0"/>
+              <a:t>:</a:t>
+            </a:r>
+          </a:p>
+          <a:p>
+            <a:pPr marL="742950" lvl="1" indent="-285750">
+              <a:buFont typeface="Arial" panose="020B0604020202020204" pitchFamily="34" charset="0"/>
+              <a:buChar char="•"/>
+            </a:pPr>
+            <a:r>
+              <a:rPr lang="en-US" sz="2400" b="1" dirty="0"/>
+              <a:t>Align: Left</a:t>
+            </a:r>
+          </a:p>
+          <a:p>
+            <a:pPr marL="742950" lvl="1" indent="-285750">
+              <a:buFont typeface="Arial" panose="020B0604020202020204" pitchFamily="34" charset="0"/>
+              <a:buChar char="•"/>
+            </a:pPr>
+            <a:r>
+              <a:rPr lang="en-US" sz="2400" b="1" dirty="0" err="1"/>
+              <a:t>StyleLookup</a:t>
+            </a:r>
+            <a:r>
+              <a:rPr lang="en-US" sz="2400" b="1" dirty="0"/>
+              <a:t>: </a:t>
+            </a:r>
+            <a:r>
+              <a:rPr lang="en-US" sz="2400" b="1" dirty="0" err="1"/>
+              <a:t>priortoolbutton</a:t>
+            </a:r>
+            <a:endParaRPr lang="en-US" sz="2400" b="1" dirty="0"/>
+          </a:p>
+        </p:txBody>
+      </p:sp>
+      <p:sp>
+        <p:nvSpPr>
+          <p:cNvPr id="6" name="CaixaDeTexto 5">
+            <a:extLst>
+              <a:ext uri="{FF2B5EF4-FFF2-40B4-BE49-F238E27FC236}">
+                <a16:creationId xmlns:a16="http://schemas.microsoft.com/office/drawing/2014/main" id="{77074F6B-9BB5-4015-B8D3-4AB12A70D4DB}"/>
+              </a:ext>
+            </a:extLst>
+          </p:cNvPr>
+          <p:cNvSpPr txBox="1"/>
+          <p:nvPr/>
+        </p:nvSpPr>
+        <p:spPr>
+          <a:xfrm>
+            <a:off x="420757" y="3102453"/>
+            <a:ext cx="7760458" cy="1200329"/>
+          </a:xfrm>
+          <a:prstGeom prst="rect">
+            <a:avLst/>
+          </a:prstGeom>
+          <a:noFill/>
+        </p:spPr>
+        <p:txBody>
+          <a:bodyPr wrap="none" rtlCol="0">
+            <a:spAutoFit/>
+          </a:bodyPr>
+          <a:lstStyle/>
+          <a:p>
+            <a:pPr marL="285750" indent="-285750">
+              <a:buFont typeface="Arial" panose="020B0604020202020204" pitchFamily="34" charset="0"/>
+              <a:buChar char="•"/>
+            </a:pPr>
+            <a:r>
+              <a:rPr lang="en-US" sz="2400" dirty="0"/>
+              <a:t>Configure o </a:t>
+            </a:r>
+            <a:r>
+              <a:rPr lang="en-US" sz="2400" dirty="0" err="1"/>
+              <a:t>componente</a:t>
+            </a:r>
+            <a:r>
+              <a:rPr lang="en-US" sz="2400" dirty="0"/>
+              <a:t> </a:t>
+            </a:r>
+            <a:r>
+              <a:rPr lang="en-US" sz="2400" b="1" dirty="0"/>
+              <a:t>Button2 </a:t>
+            </a:r>
+            <a:r>
+              <a:rPr lang="en-US" sz="2400" dirty="0" err="1"/>
+              <a:t>conforme</a:t>
+            </a:r>
+            <a:r>
+              <a:rPr lang="en-US" sz="2400" dirty="0"/>
+              <a:t> </a:t>
+            </a:r>
+            <a:r>
+              <a:rPr lang="en-US" sz="2400" dirty="0" err="1"/>
+              <a:t>abaixo</a:t>
+            </a:r>
+            <a:r>
+              <a:rPr lang="en-US" sz="2400" dirty="0"/>
+              <a:t>:</a:t>
+            </a:r>
+          </a:p>
+          <a:p>
+            <a:pPr marL="742950" lvl="1" indent="-285750">
+              <a:buFont typeface="Arial" panose="020B0604020202020204" pitchFamily="34" charset="0"/>
+              <a:buChar char="•"/>
+            </a:pPr>
+            <a:r>
+              <a:rPr lang="en-US" sz="2400" b="1" dirty="0"/>
+              <a:t>Align: Right</a:t>
+            </a:r>
+          </a:p>
+          <a:p>
+            <a:pPr marL="742950" lvl="1" indent="-285750">
+              <a:buFont typeface="Arial" panose="020B0604020202020204" pitchFamily="34" charset="0"/>
+              <a:buChar char="•"/>
+            </a:pPr>
+            <a:r>
+              <a:rPr lang="en-US" sz="2400" b="1" dirty="0" err="1"/>
+              <a:t>StyleLookup</a:t>
+            </a:r>
+            <a:r>
+              <a:rPr lang="en-US" sz="2400" b="1" dirty="0"/>
+              <a:t>: </a:t>
+            </a:r>
+            <a:r>
+              <a:rPr lang="en-US" sz="2400" b="1" dirty="0" err="1"/>
+              <a:t>trashtoolbutton</a:t>
+            </a:r>
+            <a:endParaRPr lang="en-US" sz="2400" b="1" dirty="0"/>
+          </a:p>
+        </p:txBody>
+      </p:sp>
+      <p:sp>
+        <p:nvSpPr>
+          <p:cNvPr id="7" name="CaixaDeTexto 6">
+            <a:extLst>
+              <a:ext uri="{FF2B5EF4-FFF2-40B4-BE49-F238E27FC236}">
+                <a16:creationId xmlns:a16="http://schemas.microsoft.com/office/drawing/2014/main" id="{AEA9392E-F4C6-48D4-A59B-C837BF892ACE}"/>
+              </a:ext>
+            </a:extLst>
+          </p:cNvPr>
+          <p:cNvSpPr txBox="1"/>
+          <p:nvPr/>
+        </p:nvSpPr>
+        <p:spPr>
+          <a:xfrm>
+            <a:off x="609600" y="4637744"/>
+            <a:ext cx="7542449" cy="1938992"/>
+          </a:xfrm>
+          <a:prstGeom prst="rect">
+            <a:avLst/>
+          </a:prstGeom>
+          <a:noFill/>
+        </p:spPr>
+        <p:txBody>
+          <a:bodyPr wrap="none" rtlCol="0">
+            <a:spAutoFit/>
+          </a:bodyPr>
+          <a:lstStyle/>
+          <a:p>
+            <a:pPr marL="285750" indent="-285750">
+              <a:buFont typeface="Arial" panose="020B0604020202020204" pitchFamily="34" charset="0"/>
+              <a:buChar char="•"/>
+            </a:pPr>
+            <a:r>
+              <a:rPr lang="en-US" sz="2400" dirty="0"/>
+              <a:t>Configure o </a:t>
+            </a:r>
+            <a:r>
+              <a:rPr lang="en-US" sz="2400" dirty="0" err="1"/>
+              <a:t>componente</a:t>
+            </a:r>
+            <a:r>
+              <a:rPr lang="en-US" sz="2400" dirty="0"/>
+              <a:t> </a:t>
+            </a:r>
+            <a:r>
+              <a:rPr lang="en-US" sz="2400" b="1" dirty="0"/>
+              <a:t>Label1 </a:t>
+            </a:r>
+            <a:r>
+              <a:rPr lang="en-US" sz="2400" dirty="0" err="1"/>
+              <a:t>conforme</a:t>
+            </a:r>
+            <a:r>
+              <a:rPr lang="en-US" sz="2400" dirty="0"/>
+              <a:t> </a:t>
+            </a:r>
+            <a:r>
+              <a:rPr lang="en-US" sz="2400" dirty="0" err="1"/>
+              <a:t>abaixo</a:t>
+            </a:r>
+            <a:r>
+              <a:rPr lang="en-US" sz="2400" dirty="0"/>
+              <a:t>:</a:t>
+            </a:r>
+          </a:p>
+          <a:p>
+            <a:pPr marL="742950" lvl="1" indent="-285750">
+              <a:buFont typeface="Arial" panose="020B0604020202020204" pitchFamily="34" charset="0"/>
+              <a:buChar char="•"/>
+            </a:pPr>
+            <a:r>
+              <a:rPr lang="en-US" sz="2400" b="1" dirty="0"/>
+              <a:t>Align: Center</a:t>
+            </a:r>
+          </a:p>
+          <a:p>
+            <a:pPr marL="742950" lvl="1" indent="-285750">
+              <a:buFont typeface="Arial" panose="020B0604020202020204" pitchFamily="34" charset="0"/>
+              <a:buChar char="•"/>
+            </a:pPr>
+            <a:r>
+              <a:rPr lang="en-US" sz="2400" b="1" dirty="0" err="1"/>
+              <a:t>AutoSize</a:t>
+            </a:r>
+            <a:r>
+              <a:rPr lang="en-US" sz="2400" b="1" dirty="0"/>
+              <a:t>: True</a:t>
+            </a:r>
+          </a:p>
+          <a:p>
+            <a:pPr marL="742950" lvl="1" indent="-285750">
+              <a:buFont typeface="Arial" panose="020B0604020202020204" pitchFamily="34" charset="0"/>
+              <a:buChar char="•"/>
+            </a:pPr>
+            <a:r>
+              <a:rPr lang="en-US" sz="2400" b="1" dirty="0"/>
+              <a:t>Text: </a:t>
+            </a:r>
+            <a:r>
+              <a:rPr lang="en-US" sz="2400" b="1" dirty="0" err="1"/>
+              <a:t>Eletrô</a:t>
+            </a:r>
+            <a:r>
+              <a:rPr lang="en-US" sz="2400" b="1" dirty="0"/>
+              <a:t> – Chat</a:t>
+            </a:r>
+          </a:p>
+          <a:p>
+            <a:pPr marL="742950" lvl="1" indent="-285750">
+              <a:buFont typeface="Arial" panose="020B0604020202020204" pitchFamily="34" charset="0"/>
+              <a:buChar char="•"/>
+            </a:pPr>
+            <a:r>
+              <a:rPr lang="en-US" sz="2400" b="1" dirty="0" err="1"/>
+              <a:t>TextSettings</a:t>
+            </a:r>
+            <a:r>
+              <a:rPr lang="en-US" sz="2400" b="1" dirty="0"/>
+              <a:t> -&gt; Font -&gt; Size: 20</a:t>
+            </a:r>
+          </a:p>
+        </p:txBody>
+      </p:sp>
+    </p:spTree>
+    <p:extLst>
+      <p:ext uri="{BB962C8B-B14F-4D97-AF65-F5344CB8AC3E}">
+        <p14:creationId xmlns:p14="http://schemas.microsoft.com/office/powerpoint/2010/main" val="1971362421"/>
+      </p:ext>
+    </p:extLst>
+  </p:cSld>
+  <p:clrMapOvr>
+    <a:masterClrMapping/>
+  </p:clrMapOvr>
+</p:sld>
+</file>
+
+<file path=ppt/slides/slide26.xml><?xml version="1.0" encoding="utf-8"?>
+<p:sld xmlns:a="http://schemas.openxmlformats.org/drawingml/2006/main" xmlns:r="http://schemas.openxmlformats.org/officeDocument/2006/relationships" xmlns:p="http://schemas.openxmlformats.org/presentationml/2006/main">
+  <p:cSld>
+    <p:spTree>
+      <p:nvGrpSpPr>
+        <p:cNvPr id="1" name=""/>
+        <p:cNvGrpSpPr/>
+        <p:nvPr/>
+      </p:nvGrpSpPr>
+      <p:grpSpPr>
+        <a:xfrm>
+          <a:off x="0" y="0"/>
+          <a:ext cx="0" cy="0"/>
+          <a:chOff x="0" y="0"/>
+          <a:chExt cx="0" cy="0"/>
+        </a:xfrm>
+      </p:grpSpPr>
+      <p:sp>
+        <p:nvSpPr>
+          <p:cNvPr id="4" name="Título 1">
+            <a:extLst>
+              <a:ext uri="{FF2B5EF4-FFF2-40B4-BE49-F238E27FC236}">
+                <a16:creationId xmlns:a16="http://schemas.microsoft.com/office/drawing/2014/main" id="{655790D4-470A-4F86-AF40-9762407CB6DE}"/>
+              </a:ext>
+            </a:extLst>
+          </p:cNvPr>
+          <p:cNvSpPr>
+            <a:spLocks noGrp="1"/>
+          </p:cNvSpPr>
+          <p:nvPr>
+            <p:ph type="title"/>
+          </p:nvPr>
+        </p:nvSpPr>
+        <p:spPr>
+          <a:xfrm>
+            <a:off x="457200" y="274638"/>
+            <a:ext cx="7467600" cy="1143000"/>
+          </a:xfrm>
+        </p:spPr>
+        <p:txBody>
+          <a:bodyPr/>
+          <a:lstStyle/>
+          <a:p>
+            <a:r>
+              <a:rPr lang="en-US" dirty="0" err="1"/>
+              <a:t>Montagem</a:t>
+            </a:r>
+            <a:r>
+              <a:rPr lang="en-US" dirty="0"/>
+              <a:t> do </a:t>
+            </a:r>
+            <a:r>
+              <a:rPr lang="en-US" dirty="0" err="1"/>
+              <a:t>Formulário</a:t>
+            </a:r>
+            <a:r>
+              <a:rPr lang="en-US" dirty="0"/>
+              <a:t> – </a:t>
+            </a:r>
+            <a:br>
+              <a:rPr lang="en-US" dirty="0"/>
+            </a:br>
+            <a:r>
+              <a:rPr lang="en-US" dirty="0"/>
+              <a:t>Unit chat</a:t>
+            </a:r>
+            <a:endParaRPr lang="pt-BR" dirty="0"/>
+          </a:p>
+        </p:txBody>
+      </p:sp>
+      <p:pic>
+        <p:nvPicPr>
+          <p:cNvPr id="6" name="Imagem 5">
+            <a:extLst>
+              <a:ext uri="{FF2B5EF4-FFF2-40B4-BE49-F238E27FC236}">
+                <a16:creationId xmlns:a16="http://schemas.microsoft.com/office/drawing/2014/main" id="{2D62EE6F-4233-40AB-B871-1D65B945593E}"/>
+              </a:ext>
+            </a:extLst>
+          </p:cNvPr>
+          <p:cNvPicPr>
+            <a:picLocks noChangeAspect="1"/>
+          </p:cNvPicPr>
+          <p:nvPr/>
+        </p:nvPicPr>
+        <p:blipFill>
+          <a:blip r:embed="rId2"/>
+          <a:stretch>
+            <a:fillRect/>
+          </a:stretch>
+        </p:blipFill>
+        <p:spPr>
+          <a:xfrm>
+            <a:off x="457200" y="1524000"/>
+            <a:ext cx="6372225" cy="4857750"/>
+          </a:xfrm>
+          <a:prstGeom prst="rect">
+            <a:avLst/>
+          </a:prstGeom>
+        </p:spPr>
+      </p:pic>
+    </p:spTree>
+    <p:extLst>
+      <p:ext uri="{BB962C8B-B14F-4D97-AF65-F5344CB8AC3E}">
+        <p14:creationId xmlns:p14="http://schemas.microsoft.com/office/powerpoint/2010/main" val="2122796782"/>
+      </p:ext>
+    </p:extLst>
+  </p:cSld>
+  <p:clrMapOvr>
+    <a:masterClrMapping/>
+  </p:clrMapOvr>
+</p:sld>
+</file>
+
+<file path=ppt/slides/slide27.xml><?xml version="1.0" encoding="utf-8"?>
+<p:sld xmlns:a="http://schemas.openxmlformats.org/drawingml/2006/main" xmlns:r="http://schemas.openxmlformats.org/officeDocument/2006/relationships" xmlns:p="http://schemas.openxmlformats.org/presentationml/2006/main">
+  <p:cSld>
+    <p:spTree>
+      <p:nvGrpSpPr>
+        <p:cNvPr id="1" name=""/>
+        <p:cNvGrpSpPr/>
+        <p:nvPr/>
+      </p:nvGrpSpPr>
+      <p:grpSpPr>
+        <a:xfrm>
+          <a:off x="0" y="0"/>
+          <a:ext cx="0" cy="0"/>
+          <a:chOff x="0" y="0"/>
+          <a:chExt cx="0" cy="0"/>
+        </a:xfrm>
+      </p:grpSpPr>
+      <p:sp>
+        <p:nvSpPr>
+          <p:cNvPr id="7" name="Título 1">
+            <a:extLst>
+              <a:ext uri="{FF2B5EF4-FFF2-40B4-BE49-F238E27FC236}">
+                <a16:creationId xmlns:a16="http://schemas.microsoft.com/office/drawing/2014/main" id="{FB804A4B-3FD5-4223-8254-9122E820CB6D}"/>
+              </a:ext>
+            </a:extLst>
+          </p:cNvPr>
+          <p:cNvSpPr>
+            <a:spLocks noGrp="1"/>
+          </p:cNvSpPr>
+          <p:nvPr>
+            <p:ph type="title"/>
+          </p:nvPr>
+        </p:nvSpPr>
+        <p:spPr>
+          <a:xfrm>
+            <a:off x="457200" y="274638"/>
+            <a:ext cx="7467600" cy="1143000"/>
+          </a:xfrm>
+        </p:spPr>
+        <p:txBody>
+          <a:bodyPr/>
+          <a:lstStyle/>
+          <a:p>
+            <a:r>
+              <a:rPr lang="en-US" dirty="0" err="1"/>
+              <a:t>Montagem</a:t>
+            </a:r>
+            <a:r>
+              <a:rPr lang="en-US" dirty="0"/>
+              <a:t> do </a:t>
+            </a:r>
+            <a:r>
+              <a:rPr lang="en-US" dirty="0" err="1"/>
+              <a:t>Formulário</a:t>
+            </a:r>
+            <a:r>
+              <a:rPr lang="en-US" dirty="0"/>
+              <a:t> – </a:t>
+            </a:r>
+            <a:br>
+              <a:rPr lang="en-US" dirty="0"/>
+            </a:br>
+            <a:r>
+              <a:rPr lang="en-US" dirty="0"/>
+              <a:t>Unit chat</a:t>
+            </a:r>
+            <a:endParaRPr lang="pt-BR" dirty="0"/>
+          </a:p>
+        </p:txBody>
+      </p:sp>
+      <p:sp>
+        <p:nvSpPr>
+          <p:cNvPr id="10" name="CaixaDeTexto 9">
+            <a:extLst>
+              <a:ext uri="{FF2B5EF4-FFF2-40B4-BE49-F238E27FC236}">
+                <a16:creationId xmlns:a16="http://schemas.microsoft.com/office/drawing/2014/main" id="{F718AE45-7615-44D8-BEEA-2553ED33D21D}"/>
+              </a:ext>
+            </a:extLst>
+          </p:cNvPr>
+          <p:cNvSpPr txBox="1"/>
+          <p:nvPr/>
+        </p:nvSpPr>
+        <p:spPr>
+          <a:xfrm>
+            <a:off x="3581400" y="1981200"/>
+            <a:ext cx="4953000" cy="1200329"/>
+          </a:xfrm>
+          <a:prstGeom prst="rect">
+            <a:avLst/>
+          </a:prstGeom>
+          <a:noFill/>
+        </p:spPr>
+        <p:txBody>
+          <a:bodyPr wrap="square" rtlCol="0">
+            <a:spAutoFit/>
+          </a:bodyPr>
+          <a:lstStyle/>
+          <a:p>
+            <a:pPr marL="342900" indent="-342900">
+              <a:buFont typeface="Arial" panose="020B0604020202020204" pitchFamily="34" charset="0"/>
+              <a:buChar char="•"/>
+            </a:pPr>
+            <a:r>
+              <a:rPr lang="en-US" sz="2400" dirty="0"/>
+              <a:t>Da aba </a:t>
+            </a:r>
+            <a:r>
+              <a:rPr lang="en-US" sz="2400" b="1" dirty="0"/>
+              <a:t>Layouts</a:t>
+            </a:r>
+            <a:r>
+              <a:rPr lang="en-US" sz="2400" dirty="0"/>
+              <a:t> </a:t>
+            </a:r>
+            <a:r>
+              <a:rPr lang="en-US" sz="2400" dirty="0" err="1"/>
+              <a:t>adicione</a:t>
+            </a:r>
+            <a:r>
+              <a:rPr lang="en-US" sz="2400" dirty="0"/>
+              <a:t> 3 </a:t>
+            </a:r>
+            <a:r>
+              <a:rPr lang="en-US" sz="2400" dirty="0" err="1"/>
+              <a:t>componentes</a:t>
+            </a:r>
+            <a:r>
+              <a:rPr lang="en-US" sz="2400" dirty="0"/>
+              <a:t> </a:t>
+            </a:r>
+            <a:r>
+              <a:rPr lang="en-US" sz="2400" b="1" dirty="0" err="1"/>
+              <a:t>TLayout</a:t>
+            </a:r>
+            <a:r>
+              <a:rPr lang="en-US" sz="2400" b="1" dirty="0"/>
+              <a:t> </a:t>
+            </a:r>
+            <a:r>
+              <a:rPr lang="en-US" sz="2400" dirty="0"/>
+              <a:t>no </a:t>
+            </a:r>
+            <a:r>
+              <a:rPr lang="en-US" sz="2400" dirty="0" err="1"/>
+              <a:t>formulário</a:t>
+            </a:r>
+            <a:r>
+              <a:rPr lang="en-US" sz="2400" dirty="0"/>
+              <a:t> </a:t>
+            </a:r>
+          </a:p>
+        </p:txBody>
+      </p:sp>
+      <p:sp>
+        <p:nvSpPr>
+          <p:cNvPr id="11" name="CaixaDeTexto 10">
+            <a:extLst>
+              <a:ext uri="{FF2B5EF4-FFF2-40B4-BE49-F238E27FC236}">
+                <a16:creationId xmlns:a16="http://schemas.microsoft.com/office/drawing/2014/main" id="{727333D0-76B5-4E75-871D-2E8D67CB1F40}"/>
+              </a:ext>
+            </a:extLst>
+          </p:cNvPr>
+          <p:cNvSpPr txBox="1"/>
+          <p:nvPr/>
+        </p:nvSpPr>
+        <p:spPr>
+          <a:xfrm>
+            <a:off x="457200" y="4838054"/>
+            <a:ext cx="4724400" cy="1569660"/>
+          </a:xfrm>
+          <a:prstGeom prst="rect">
+            <a:avLst/>
+          </a:prstGeom>
+          <a:noFill/>
+        </p:spPr>
+        <p:txBody>
+          <a:bodyPr wrap="square" rtlCol="0">
+            <a:spAutoFit/>
+          </a:bodyPr>
+          <a:lstStyle/>
+          <a:p>
+            <a:pPr marL="342900" indent="-342900">
+              <a:buFont typeface="Arial" panose="020B0604020202020204" pitchFamily="34" charset="0"/>
+              <a:buChar char="•"/>
+            </a:pPr>
+            <a:r>
+              <a:rPr lang="en-US" sz="2400" dirty="0"/>
+              <a:t>Configure </a:t>
+            </a:r>
+            <a:r>
+              <a:rPr lang="en-US" sz="2400" dirty="0" err="1"/>
+              <a:t>os</a:t>
+            </a:r>
+            <a:r>
+              <a:rPr lang="en-US" sz="2400" dirty="0"/>
+              <a:t> 3 Layout’s com as </a:t>
+            </a:r>
+            <a:r>
+              <a:rPr lang="en-US" sz="2400" dirty="0" err="1"/>
+              <a:t>configurações</a:t>
+            </a:r>
+            <a:r>
+              <a:rPr lang="en-US" sz="2400" dirty="0"/>
+              <a:t>:</a:t>
+            </a:r>
+          </a:p>
+          <a:p>
+            <a:pPr marL="800100" lvl="1" indent="-342900">
+              <a:buFont typeface="Arial" panose="020B0604020202020204" pitchFamily="34" charset="0"/>
+              <a:buChar char="•"/>
+            </a:pPr>
+            <a:r>
+              <a:rPr lang="en-US" sz="2400" b="1" dirty="0"/>
+              <a:t>Align:</a:t>
+            </a:r>
+            <a:r>
+              <a:rPr lang="en-US" sz="2400" dirty="0"/>
+              <a:t> </a:t>
+            </a:r>
+            <a:r>
+              <a:rPr lang="en-US" sz="2400" b="1" dirty="0"/>
+              <a:t>Top</a:t>
+            </a:r>
+          </a:p>
+          <a:p>
+            <a:pPr marL="800100" lvl="1" indent="-342900">
+              <a:buFont typeface="Arial" panose="020B0604020202020204" pitchFamily="34" charset="0"/>
+              <a:buChar char="•"/>
+            </a:pPr>
+            <a:endParaRPr lang="en-US" sz="2400" b="1" dirty="0"/>
+          </a:p>
+        </p:txBody>
+      </p:sp>
+      <p:pic>
+        <p:nvPicPr>
+          <p:cNvPr id="15" name="Imagem 14">
+            <a:extLst>
+              <a:ext uri="{FF2B5EF4-FFF2-40B4-BE49-F238E27FC236}">
+                <a16:creationId xmlns:a16="http://schemas.microsoft.com/office/drawing/2014/main" id="{5979481D-8CAB-43C4-BA1D-25692ED096FF}"/>
+              </a:ext>
+            </a:extLst>
+          </p:cNvPr>
+          <p:cNvPicPr>
+            <a:picLocks noChangeAspect="1"/>
+          </p:cNvPicPr>
+          <p:nvPr/>
+        </p:nvPicPr>
+        <p:blipFill>
+          <a:blip r:embed="rId2"/>
+          <a:stretch>
+            <a:fillRect/>
+          </a:stretch>
+        </p:blipFill>
+        <p:spPr>
+          <a:xfrm>
+            <a:off x="460513" y="1764475"/>
+            <a:ext cx="2638425" cy="2619375"/>
+          </a:xfrm>
+          <a:prstGeom prst="rect">
+            <a:avLst/>
+          </a:prstGeom>
+        </p:spPr>
+      </p:pic>
+      <p:pic>
+        <p:nvPicPr>
+          <p:cNvPr id="17" name="Imagem 16">
+            <a:extLst>
+              <a:ext uri="{FF2B5EF4-FFF2-40B4-BE49-F238E27FC236}">
+                <a16:creationId xmlns:a16="http://schemas.microsoft.com/office/drawing/2014/main" id="{A12A18FF-4169-47F6-A441-EF39A131A5FA}"/>
+              </a:ext>
+            </a:extLst>
+          </p:cNvPr>
+          <p:cNvPicPr>
+            <a:picLocks noChangeAspect="1"/>
+          </p:cNvPicPr>
+          <p:nvPr/>
+        </p:nvPicPr>
+        <p:blipFill>
+          <a:blip r:embed="rId3"/>
+          <a:stretch>
+            <a:fillRect/>
+          </a:stretch>
+        </p:blipFill>
+        <p:spPr>
+          <a:xfrm>
+            <a:off x="4891711" y="3997526"/>
+            <a:ext cx="3261689" cy="2479474"/>
+          </a:xfrm>
+          <a:prstGeom prst="rect">
+            <a:avLst/>
+          </a:prstGeom>
+        </p:spPr>
+      </p:pic>
+    </p:spTree>
+    <p:extLst>
+      <p:ext uri="{BB962C8B-B14F-4D97-AF65-F5344CB8AC3E}">
+        <p14:creationId xmlns:p14="http://schemas.microsoft.com/office/powerpoint/2010/main" val="4073938099"/>
+      </p:ext>
+    </p:extLst>
+  </p:cSld>
+  <p:clrMapOvr>
+    <a:masterClrMapping/>
+  </p:clrMapOvr>
+</p:sld>
+</file>
+
+<file path=ppt/slides/slide28.xml><?xml version="1.0" encoding="utf-8"?>
+<p:sld xmlns:a="http://schemas.openxmlformats.org/drawingml/2006/main" xmlns:r="http://schemas.openxmlformats.org/officeDocument/2006/relationships" xmlns:p="http://schemas.openxmlformats.org/presentationml/2006/main">
+  <p:cSld>
+    <p:spTree>
+      <p:nvGrpSpPr>
+        <p:cNvPr id="1" name=""/>
+        <p:cNvGrpSpPr/>
+        <p:nvPr/>
+      </p:nvGrpSpPr>
+      <p:grpSpPr>
+        <a:xfrm>
+          <a:off x="0" y="0"/>
+          <a:ext cx="0" cy="0"/>
+          <a:chOff x="0" y="0"/>
+          <a:chExt cx="0" cy="0"/>
+        </a:xfrm>
+      </p:grpSpPr>
+      <p:sp>
+        <p:nvSpPr>
+          <p:cNvPr id="4" name="Título 1">
+            <a:extLst>
+              <a:ext uri="{FF2B5EF4-FFF2-40B4-BE49-F238E27FC236}">
+                <a16:creationId xmlns:a16="http://schemas.microsoft.com/office/drawing/2014/main" id="{128248F7-613B-4A3E-BDE2-E7DE2AD16397}"/>
+              </a:ext>
+            </a:extLst>
+          </p:cNvPr>
+          <p:cNvSpPr>
+            <a:spLocks noGrp="1"/>
+          </p:cNvSpPr>
+          <p:nvPr>
+            <p:ph type="title"/>
+          </p:nvPr>
+        </p:nvSpPr>
+        <p:spPr>
+          <a:xfrm>
+            <a:off x="457200" y="274638"/>
+            <a:ext cx="7467600" cy="1143000"/>
+          </a:xfrm>
+        </p:spPr>
+        <p:txBody>
+          <a:bodyPr/>
+          <a:lstStyle/>
+          <a:p>
+            <a:r>
+              <a:rPr lang="en-US" dirty="0" err="1"/>
+              <a:t>Montagem</a:t>
+            </a:r>
+            <a:r>
+              <a:rPr lang="en-US" dirty="0"/>
+              <a:t> do </a:t>
+            </a:r>
+            <a:r>
+              <a:rPr lang="en-US" dirty="0" err="1"/>
+              <a:t>Formulário</a:t>
+            </a:r>
+            <a:r>
+              <a:rPr lang="en-US" dirty="0"/>
+              <a:t> – </a:t>
+            </a:r>
+            <a:br>
+              <a:rPr lang="en-US" dirty="0"/>
+            </a:br>
+            <a:r>
+              <a:rPr lang="en-US" dirty="0"/>
+              <a:t>Unit chat</a:t>
+            </a:r>
+            <a:endParaRPr lang="pt-BR" dirty="0"/>
+          </a:p>
+        </p:txBody>
+      </p:sp>
+      <p:pic>
+        <p:nvPicPr>
+          <p:cNvPr id="6" name="Imagem 5">
+            <a:extLst>
+              <a:ext uri="{FF2B5EF4-FFF2-40B4-BE49-F238E27FC236}">
+                <a16:creationId xmlns:a16="http://schemas.microsoft.com/office/drawing/2014/main" id="{553772A1-D487-43C4-B909-DCA7EB73A080}"/>
+              </a:ext>
+            </a:extLst>
+          </p:cNvPr>
+          <p:cNvPicPr>
+            <a:picLocks noChangeAspect="1"/>
+          </p:cNvPicPr>
+          <p:nvPr/>
+        </p:nvPicPr>
+        <p:blipFill>
+          <a:blip r:embed="rId2"/>
+          <a:stretch>
+            <a:fillRect/>
+          </a:stretch>
+        </p:blipFill>
+        <p:spPr>
+          <a:xfrm>
+            <a:off x="470452" y="1828800"/>
+            <a:ext cx="2619375" cy="2638425"/>
+          </a:xfrm>
+          <a:prstGeom prst="rect">
+            <a:avLst/>
+          </a:prstGeom>
+        </p:spPr>
+      </p:pic>
+      <p:sp>
+        <p:nvSpPr>
+          <p:cNvPr id="7" name="CaixaDeTexto 6">
+            <a:extLst>
+              <a:ext uri="{FF2B5EF4-FFF2-40B4-BE49-F238E27FC236}">
+                <a16:creationId xmlns:a16="http://schemas.microsoft.com/office/drawing/2014/main" id="{E7E5904F-1D98-4FB5-A400-97AFA777C620}"/>
+              </a:ext>
+            </a:extLst>
+          </p:cNvPr>
+          <p:cNvSpPr txBox="1"/>
+          <p:nvPr/>
+        </p:nvSpPr>
+        <p:spPr>
+          <a:xfrm>
+            <a:off x="3200400" y="1828800"/>
+            <a:ext cx="5473148" cy="830997"/>
+          </a:xfrm>
+          <a:prstGeom prst="rect">
+            <a:avLst/>
+          </a:prstGeom>
+          <a:noFill/>
+        </p:spPr>
+        <p:txBody>
+          <a:bodyPr wrap="square" rtlCol="0">
+            <a:spAutoFit/>
+          </a:bodyPr>
+          <a:lstStyle/>
+          <a:p>
+            <a:pPr marL="342900" indent="-342900">
+              <a:buFont typeface="Arial" panose="020B0604020202020204" pitchFamily="34" charset="0"/>
+              <a:buChar char="•"/>
+            </a:pPr>
+            <a:r>
+              <a:rPr lang="en-US" sz="2400" dirty="0" err="1"/>
+              <a:t>Adicione</a:t>
+            </a:r>
+            <a:r>
+              <a:rPr lang="en-US" sz="2400" dirty="0"/>
+              <a:t> um </a:t>
+            </a:r>
+            <a:r>
+              <a:rPr lang="en-US" sz="2400" dirty="0" err="1"/>
+              <a:t>componente</a:t>
+            </a:r>
+            <a:r>
+              <a:rPr lang="en-US" sz="2400" dirty="0"/>
+              <a:t> </a:t>
+            </a:r>
+            <a:r>
+              <a:rPr lang="en-US" sz="2400" b="1" dirty="0" err="1"/>
+              <a:t>TMemo</a:t>
+            </a:r>
+            <a:r>
+              <a:rPr lang="en-US" sz="2400" b="1" dirty="0"/>
+              <a:t> </a:t>
+            </a:r>
+            <a:r>
+              <a:rPr lang="en-US" sz="2400" dirty="0"/>
+              <a:t>da aba </a:t>
+            </a:r>
+            <a:r>
+              <a:rPr lang="en-US" sz="2400" b="1" dirty="0"/>
+              <a:t>Standard</a:t>
+            </a:r>
+          </a:p>
+        </p:txBody>
+      </p:sp>
+      <p:sp>
+        <p:nvSpPr>
+          <p:cNvPr id="9" name="CaixaDeTexto 8">
+            <a:extLst>
+              <a:ext uri="{FF2B5EF4-FFF2-40B4-BE49-F238E27FC236}">
+                <a16:creationId xmlns:a16="http://schemas.microsoft.com/office/drawing/2014/main" id="{7C94FCDA-E598-445A-8E36-0EC45D281D9C}"/>
+              </a:ext>
+            </a:extLst>
+          </p:cNvPr>
+          <p:cNvSpPr txBox="1"/>
+          <p:nvPr/>
+        </p:nvSpPr>
+        <p:spPr>
+          <a:xfrm>
+            <a:off x="457200" y="4878387"/>
+            <a:ext cx="5473148" cy="1569660"/>
+          </a:xfrm>
+          <a:prstGeom prst="rect">
+            <a:avLst/>
+          </a:prstGeom>
+          <a:noFill/>
+        </p:spPr>
+        <p:txBody>
+          <a:bodyPr wrap="square" rtlCol="0">
+            <a:spAutoFit/>
+          </a:bodyPr>
+          <a:lstStyle/>
+          <a:p>
+            <a:pPr marL="342900" indent="-342900">
+              <a:buFont typeface="Arial" panose="020B0604020202020204" pitchFamily="34" charset="0"/>
+              <a:buChar char="•"/>
+            </a:pPr>
+            <a:r>
+              <a:rPr lang="en-US" sz="2400" dirty="0"/>
+              <a:t>Configure o </a:t>
+            </a:r>
+            <a:r>
+              <a:rPr lang="en-US" sz="2400" dirty="0" err="1"/>
+              <a:t>componente</a:t>
+            </a:r>
+            <a:r>
+              <a:rPr lang="en-US" sz="2400" dirty="0"/>
+              <a:t> </a:t>
+            </a:r>
+            <a:r>
+              <a:rPr lang="en-US" sz="2400" b="1" dirty="0"/>
+              <a:t>Memo1 </a:t>
+            </a:r>
+            <a:r>
+              <a:rPr lang="en-US" sz="2400" dirty="0" err="1"/>
+              <a:t>como</a:t>
+            </a:r>
+            <a:r>
+              <a:rPr lang="en-US" sz="2400" dirty="0"/>
+              <a:t> </a:t>
+            </a:r>
+            <a:r>
+              <a:rPr lang="en-US" sz="2400" dirty="0" err="1"/>
+              <a:t>indicado</a:t>
+            </a:r>
+            <a:r>
+              <a:rPr lang="en-US" sz="2400" dirty="0"/>
+              <a:t> </a:t>
+            </a:r>
+            <a:r>
+              <a:rPr lang="en-US" sz="2400" dirty="0" err="1"/>
+              <a:t>abaixo</a:t>
+            </a:r>
+            <a:r>
+              <a:rPr lang="en-US" sz="2400" dirty="0"/>
+              <a:t>:</a:t>
+            </a:r>
+          </a:p>
+          <a:p>
+            <a:pPr marL="800100" lvl="1" indent="-342900">
+              <a:buFont typeface="Arial" panose="020B0604020202020204" pitchFamily="34" charset="0"/>
+              <a:buChar char="•"/>
+            </a:pPr>
+            <a:r>
+              <a:rPr lang="en-US" sz="2400" b="1" dirty="0"/>
+              <a:t>Align: Client</a:t>
+            </a:r>
+          </a:p>
+          <a:p>
+            <a:pPr marL="800100" lvl="1" indent="-342900">
+              <a:buFont typeface="Arial" panose="020B0604020202020204" pitchFamily="34" charset="0"/>
+              <a:buChar char="•"/>
+            </a:pPr>
+            <a:r>
+              <a:rPr lang="en-US" sz="2400" b="1" dirty="0"/>
+              <a:t>Name: </a:t>
+            </a:r>
+            <a:r>
+              <a:rPr lang="en-US" sz="2400" b="1" dirty="0" err="1"/>
+              <a:t>memHistorico</a:t>
+            </a:r>
+            <a:endParaRPr lang="en-US" sz="2400" b="1" dirty="0"/>
+          </a:p>
+        </p:txBody>
+      </p:sp>
+      <p:pic>
+        <p:nvPicPr>
+          <p:cNvPr id="11" name="Imagem 10">
+            <a:extLst>
+              <a:ext uri="{FF2B5EF4-FFF2-40B4-BE49-F238E27FC236}">
+                <a16:creationId xmlns:a16="http://schemas.microsoft.com/office/drawing/2014/main" id="{74DE5F37-93D4-4178-960D-FB1927EE717D}"/>
+              </a:ext>
+            </a:extLst>
+          </p:cNvPr>
+          <p:cNvPicPr>
+            <a:picLocks noChangeAspect="1"/>
+          </p:cNvPicPr>
+          <p:nvPr/>
+        </p:nvPicPr>
+        <p:blipFill>
+          <a:blip r:embed="rId3"/>
+          <a:stretch>
+            <a:fillRect/>
+          </a:stretch>
+        </p:blipFill>
+        <p:spPr>
+          <a:xfrm>
+            <a:off x="5638800" y="3383756"/>
+            <a:ext cx="2856222" cy="2166938"/>
+          </a:xfrm>
+          <a:prstGeom prst="rect">
+            <a:avLst/>
+          </a:prstGeom>
+        </p:spPr>
+      </p:pic>
+    </p:spTree>
+    <p:extLst>
+      <p:ext uri="{BB962C8B-B14F-4D97-AF65-F5344CB8AC3E}">
+        <p14:creationId xmlns:p14="http://schemas.microsoft.com/office/powerpoint/2010/main" val="1440106668"/>
+      </p:ext>
+    </p:extLst>
+  </p:cSld>
+  <p:clrMapOvr>
+    <a:masterClrMapping/>
+  </p:clrMapOvr>
+</p:sld>
+</file>
+
+<file path=ppt/slides/slide29.xml><?xml version="1.0" encoding="utf-8"?>
+<p:sld xmlns:a="http://schemas.openxmlformats.org/drawingml/2006/main" xmlns:r="http://schemas.openxmlformats.org/officeDocument/2006/relationships" xmlns:p="http://schemas.openxmlformats.org/presentationml/2006/main">
+  <p:cSld>
+    <p:spTree>
+      <p:nvGrpSpPr>
+        <p:cNvPr id="1" name=""/>
+        <p:cNvGrpSpPr/>
+        <p:nvPr/>
+      </p:nvGrpSpPr>
+      <p:grpSpPr>
+        <a:xfrm>
+          <a:off x="0" y="0"/>
+          <a:ext cx="0" cy="0"/>
+          <a:chOff x="0" y="0"/>
+          <a:chExt cx="0" cy="0"/>
+        </a:xfrm>
+      </p:grpSpPr>
+      <p:sp>
+        <p:nvSpPr>
+          <p:cNvPr id="4" name="Título 1">
+            <a:extLst>
+              <a:ext uri="{FF2B5EF4-FFF2-40B4-BE49-F238E27FC236}">
+                <a16:creationId xmlns:a16="http://schemas.microsoft.com/office/drawing/2014/main" id="{40AA8D51-0543-40D4-B961-B4A5DFCE9069}"/>
+              </a:ext>
+            </a:extLst>
+          </p:cNvPr>
+          <p:cNvSpPr>
+            <a:spLocks noGrp="1"/>
+          </p:cNvSpPr>
+          <p:nvPr>
+            <p:ph type="title"/>
+          </p:nvPr>
+        </p:nvSpPr>
+        <p:spPr>
+          <a:xfrm>
+            <a:off x="457200" y="274638"/>
+            <a:ext cx="7467600" cy="1143000"/>
+          </a:xfrm>
+        </p:spPr>
+        <p:txBody>
+          <a:bodyPr/>
+          <a:lstStyle/>
+          <a:p>
+            <a:r>
+              <a:rPr lang="en-US" dirty="0" err="1"/>
+              <a:t>Montagem</a:t>
+            </a:r>
+            <a:r>
+              <a:rPr lang="en-US" dirty="0"/>
+              <a:t> do </a:t>
+            </a:r>
+            <a:r>
+              <a:rPr lang="en-US" dirty="0" err="1"/>
+              <a:t>Formulário</a:t>
+            </a:r>
+            <a:r>
+              <a:rPr lang="en-US" dirty="0"/>
+              <a:t> – </a:t>
+            </a:r>
+            <a:br>
+              <a:rPr lang="en-US" dirty="0"/>
+            </a:br>
+            <a:r>
+              <a:rPr lang="en-US" dirty="0"/>
+              <a:t>Unit chat</a:t>
+            </a:r>
+            <a:endParaRPr lang="pt-BR" dirty="0"/>
+          </a:p>
+        </p:txBody>
+      </p:sp>
+      <p:sp>
+        <p:nvSpPr>
+          <p:cNvPr id="5" name="CaixaDeTexto 4">
+            <a:extLst>
+              <a:ext uri="{FF2B5EF4-FFF2-40B4-BE49-F238E27FC236}">
+                <a16:creationId xmlns:a16="http://schemas.microsoft.com/office/drawing/2014/main" id="{E750E506-4B90-4998-8F26-BCA4E98DF957}"/>
+              </a:ext>
+            </a:extLst>
+          </p:cNvPr>
+          <p:cNvSpPr txBox="1"/>
+          <p:nvPr/>
+        </p:nvSpPr>
+        <p:spPr>
+          <a:xfrm>
+            <a:off x="457201" y="1676400"/>
+            <a:ext cx="8153400" cy="1200329"/>
+          </a:xfrm>
+          <a:prstGeom prst="rect">
+            <a:avLst/>
+          </a:prstGeom>
+          <a:noFill/>
+        </p:spPr>
+        <p:txBody>
+          <a:bodyPr wrap="square" rtlCol="0">
+            <a:spAutoFit/>
+          </a:bodyPr>
+          <a:lstStyle/>
+          <a:p>
+            <a:pPr marL="457200" indent="-457200">
+              <a:buFont typeface="Arial" panose="020B0604020202020204" pitchFamily="34" charset="0"/>
+              <a:buChar char="•"/>
+            </a:pPr>
+            <a:r>
+              <a:rPr lang="en-US" sz="2400" dirty="0"/>
+              <a:t>Dentro do </a:t>
+            </a:r>
+            <a:r>
+              <a:rPr lang="en-US" sz="2400" dirty="0" err="1"/>
+              <a:t>primeiro</a:t>
+            </a:r>
+            <a:r>
+              <a:rPr lang="en-US" sz="2400" dirty="0"/>
+              <a:t> </a:t>
+            </a:r>
+            <a:r>
+              <a:rPr lang="en-US" sz="2400" b="1" dirty="0"/>
+              <a:t>Layout</a:t>
+            </a:r>
+            <a:r>
+              <a:rPr lang="en-US" sz="2400" dirty="0"/>
+              <a:t> de </a:t>
+            </a:r>
+            <a:r>
+              <a:rPr lang="en-US" sz="2400" dirty="0" err="1"/>
+              <a:t>cima</a:t>
+            </a:r>
+            <a:r>
+              <a:rPr lang="en-US" sz="2400" dirty="0"/>
+              <a:t> para </a:t>
+            </a:r>
+            <a:r>
+              <a:rPr lang="en-US" sz="2400" dirty="0" err="1"/>
+              <a:t>baixo</a:t>
+            </a:r>
+            <a:r>
+              <a:rPr lang="en-US" sz="2400" dirty="0"/>
+              <a:t> </a:t>
+            </a:r>
+            <a:r>
+              <a:rPr lang="en-US" sz="2400" dirty="0" err="1"/>
+              <a:t>adicione</a:t>
+            </a:r>
+            <a:r>
+              <a:rPr lang="en-US" sz="2400" dirty="0"/>
+              <a:t> um </a:t>
+            </a:r>
+            <a:r>
+              <a:rPr lang="en-US" sz="2400" dirty="0" err="1"/>
+              <a:t>componente</a:t>
+            </a:r>
+            <a:r>
+              <a:rPr lang="en-US" sz="2400" dirty="0"/>
+              <a:t> </a:t>
+            </a:r>
+            <a:r>
+              <a:rPr lang="en-US" sz="2400" b="1" dirty="0" err="1"/>
+              <a:t>TLabel</a:t>
+            </a:r>
+            <a:r>
+              <a:rPr lang="en-US" sz="2400" b="1" dirty="0"/>
+              <a:t> </a:t>
+            </a:r>
+            <a:r>
+              <a:rPr lang="en-US" sz="2400" dirty="0"/>
+              <a:t>da aba </a:t>
+            </a:r>
+            <a:r>
+              <a:rPr lang="en-US" sz="2400" b="1" dirty="0"/>
+              <a:t>Standard </a:t>
+            </a:r>
+            <a:r>
+              <a:rPr lang="en-US" sz="2400" dirty="0"/>
+              <a:t>e um </a:t>
+            </a:r>
+            <a:r>
+              <a:rPr lang="en-US" sz="2400" dirty="0" err="1"/>
+              <a:t>componente</a:t>
+            </a:r>
+            <a:r>
+              <a:rPr lang="en-US" sz="2400" dirty="0"/>
+              <a:t> </a:t>
+            </a:r>
+            <a:r>
+              <a:rPr lang="en-US" sz="2400" b="1" dirty="0" err="1"/>
+              <a:t>TComboBox</a:t>
+            </a:r>
+            <a:r>
+              <a:rPr lang="en-US" sz="2400" b="1" dirty="0"/>
+              <a:t> </a:t>
+            </a:r>
+            <a:r>
+              <a:rPr lang="en-US" sz="2400" dirty="0"/>
+              <a:t>da </a:t>
+            </a:r>
+            <a:r>
+              <a:rPr lang="en-US" sz="2400" dirty="0" err="1"/>
+              <a:t>mesma</a:t>
+            </a:r>
+            <a:r>
+              <a:rPr lang="en-US" sz="2400" dirty="0"/>
+              <a:t> aba</a:t>
+            </a:r>
+            <a:endParaRPr lang="en-US" sz="2400" b="1" dirty="0"/>
+          </a:p>
+        </p:txBody>
+      </p:sp>
+      <p:pic>
+        <p:nvPicPr>
+          <p:cNvPr id="7" name="Imagem 6">
+            <a:extLst>
+              <a:ext uri="{FF2B5EF4-FFF2-40B4-BE49-F238E27FC236}">
+                <a16:creationId xmlns:a16="http://schemas.microsoft.com/office/drawing/2014/main" id="{0C1BF8F9-2C01-4618-9687-D2EA315832B4}"/>
+              </a:ext>
+            </a:extLst>
+          </p:cNvPr>
+          <p:cNvPicPr>
+            <a:picLocks noChangeAspect="1"/>
+          </p:cNvPicPr>
+          <p:nvPr/>
+        </p:nvPicPr>
+        <p:blipFill>
+          <a:blip r:embed="rId2"/>
+          <a:stretch>
+            <a:fillRect/>
+          </a:stretch>
+        </p:blipFill>
+        <p:spPr>
+          <a:xfrm>
+            <a:off x="990600" y="3205066"/>
+            <a:ext cx="4176712" cy="3165708"/>
+          </a:xfrm>
+          <a:prstGeom prst="rect">
+            <a:avLst/>
+          </a:prstGeom>
+        </p:spPr>
+      </p:pic>
+    </p:spTree>
+    <p:extLst>
+      <p:ext uri="{BB962C8B-B14F-4D97-AF65-F5344CB8AC3E}">
+        <p14:creationId xmlns:p14="http://schemas.microsoft.com/office/powerpoint/2010/main" val="3722140070"/>
+      </p:ext>
+    </p:extLst>
+  </p:cSld>
+  <p:clrMapOvr>
+    <a:masterClrMapping/>
+  </p:clrMapOvr>
+</p:sld>
+</file>
+
 <file path=ppt/slides/slide3.xml><?xml version="1.0" encoding="utf-8"?>
 <p:sld xmlns:a="http://schemas.openxmlformats.org/drawingml/2006/main" xmlns:r="http://schemas.openxmlformats.org/officeDocument/2006/relationships" xmlns:p="http://schemas.openxmlformats.org/presentationml/2006/main">
   <p:cSld>
@@ -8894,6 +11213,1665 @@
     <p:extLst>
       <p:ext uri="{BB962C8B-B14F-4D97-AF65-F5344CB8AC3E}">
         <p14:creationId xmlns:p14="http://schemas.microsoft.com/office/powerpoint/2010/main" val="539428883"/>
+      </p:ext>
+    </p:extLst>
+  </p:cSld>
+  <p:clrMapOvr>
+    <a:masterClrMapping/>
+  </p:clrMapOvr>
+</p:sld>
+</file>
+
+<file path=ppt/slides/slide30.xml><?xml version="1.0" encoding="utf-8"?>
+<p:sld xmlns:a="http://schemas.openxmlformats.org/drawingml/2006/main" xmlns:r="http://schemas.openxmlformats.org/officeDocument/2006/relationships" xmlns:p="http://schemas.openxmlformats.org/presentationml/2006/main">
+  <p:cSld>
+    <p:spTree>
+      <p:nvGrpSpPr>
+        <p:cNvPr id="1" name=""/>
+        <p:cNvGrpSpPr/>
+        <p:nvPr/>
+      </p:nvGrpSpPr>
+      <p:grpSpPr>
+        <a:xfrm>
+          <a:off x="0" y="0"/>
+          <a:ext cx="0" cy="0"/>
+          <a:chOff x="0" y="0"/>
+          <a:chExt cx="0" cy="0"/>
+        </a:xfrm>
+      </p:grpSpPr>
+      <p:sp>
+        <p:nvSpPr>
+          <p:cNvPr id="4" name="Título 1">
+            <a:extLst>
+              <a:ext uri="{FF2B5EF4-FFF2-40B4-BE49-F238E27FC236}">
+                <a16:creationId xmlns:a16="http://schemas.microsoft.com/office/drawing/2014/main" id="{14A1FB92-3EB3-4DDD-BB66-E504321DEC61}"/>
+              </a:ext>
+            </a:extLst>
+          </p:cNvPr>
+          <p:cNvSpPr>
+            <a:spLocks noGrp="1"/>
+          </p:cNvSpPr>
+          <p:nvPr>
+            <p:ph type="title"/>
+          </p:nvPr>
+        </p:nvSpPr>
+        <p:spPr>
+          <a:xfrm>
+            <a:off x="457200" y="274638"/>
+            <a:ext cx="7467600" cy="1143000"/>
+          </a:xfrm>
+        </p:spPr>
+        <p:txBody>
+          <a:bodyPr/>
+          <a:lstStyle/>
+          <a:p>
+            <a:r>
+              <a:rPr lang="en-US" dirty="0" err="1"/>
+              <a:t>Montagem</a:t>
+            </a:r>
+            <a:r>
+              <a:rPr lang="en-US" dirty="0"/>
+              <a:t> do </a:t>
+            </a:r>
+            <a:r>
+              <a:rPr lang="en-US" dirty="0" err="1"/>
+              <a:t>Formulário</a:t>
+            </a:r>
+            <a:r>
+              <a:rPr lang="en-US" dirty="0"/>
+              <a:t> – </a:t>
+            </a:r>
+            <a:br>
+              <a:rPr lang="en-US" dirty="0"/>
+            </a:br>
+            <a:r>
+              <a:rPr lang="en-US" dirty="0"/>
+              <a:t>Unit chat</a:t>
+            </a:r>
+            <a:endParaRPr lang="pt-BR" dirty="0"/>
+          </a:p>
+        </p:txBody>
+      </p:sp>
+      <p:sp>
+        <p:nvSpPr>
+          <p:cNvPr id="5" name="CaixaDeTexto 4">
+            <a:extLst>
+              <a:ext uri="{FF2B5EF4-FFF2-40B4-BE49-F238E27FC236}">
+                <a16:creationId xmlns:a16="http://schemas.microsoft.com/office/drawing/2014/main" id="{3518F3EA-890C-4083-BD8D-E7540FFAD125}"/>
+              </a:ext>
+            </a:extLst>
+          </p:cNvPr>
+          <p:cNvSpPr txBox="1"/>
+          <p:nvPr/>
+        </p:nvSpPr>
+        <p:spPr>
+          <a:xfrm>
+            <a:off x="457200" y="1676400"/>
+            <a:ext cx="7924800" cy="1200329"/>
+          </a:xfrm>
+          <a:prstGeom prst="rect">
+            <a:avLst/>
+          </a:prstGeom>
+          <a:noFill/>
+        </p:spPr>
+        <p:txBody>
+          <a:bodyPr wrap="square" rtlCol="0">
+            <a:spAutoFit/>
+          </a:bodyPr>
+          <a:lstStyle/>
+          <a:p>
+            <a:pPr marL="342900" indent="-342900">
+              <a:buFont typeface="Arial" panose="020B0604020202020204" pitchFamily="34" charset="0"/>
+              <a:buChar char="•"/>
+            </a:pPr>
+            <a:r>
+              <a:rPr lang="en-US" sz="2400" dirty="0"/>
+              <a:t>Configure o </a:t>
+            </a:r>
+            <a:r>
+              <a:rPr lang="en-US" sz="2400" dirty="0" err="1"/>
+              <a:t>componente</a:t>
+            </a:r>
+            <a:r>
+              <a:rPr lang="en-US" sz="2400" dirty="0"/>
+              <a:t> </a:t>
+            </a:r>
+            <a:r>
+              <a:rPr lang="en-US" sz="2400" b="1" dirty="0"/>
+              <a:t>Label1 </a:t>
+            </a:r>
+            <a:r>
+              <a:rPr lang="en-US" sz="2400" dirty="0"/>
+              <a:t>da </a:t>
+            </a:r>
+            <a:r>
+              <a:rPr lang="en-US" sz="2400" dirty="0" err="1"/>
+              <a:t>seguinte</a:t>
+            </a:r>
+            <a:r>
+              <a:rPr lang="en-US" sz="2400" dirty="0"/>
+              <a:t> forma:</a:t>
+            </a:r>
+          </a:p>
+          <a:p>
+            <a:pPr marL="800100" lvl="1" indent="-342900">
+              <a:buFont typeface="Arial" panose="020B0604020202020204" pitchFamily="34" charset="0"/>
+              <a:buChar char="•"/>
+            </a:pPr>
+            <a:r>
+              <a:rPr lang="en-US" sz="2400" b="1" dirty="0"/>
+              <a:t>Align: Left</a:t>
+            </a:r>
+          </a:p>
+          <a:p>
+            <a:pPr marL="800100" lvl="1" indent="-342900">
+              <a:buFont typeface="Arial" panose="020B0604020202020204" pitchFamily="34" charset="0"/>
+              <a:buChar char="•"/>
+            </a:pPr>
+            <a:r>
+              <a:rPr lang="en-US" sz="2400" b="1" dirty="0"/>
+              <a:t>Text: </a:t>
+            </a:r>
+            <a:r>
+              <a:rPr lang="en-US" sz="2400" b="1" dirty="0" err="1"/>
+              <a:t>Dispositivo</a:t>
+            </a:r>
+            <a:endParaRPr lang="en-US" sz="2400" b="1" dirty="0"/>
+          </a:p>
+        </p:txBody>
+      </p:sp>
+      <p:sp>
+        <p:nvSpPr>
+          <p:cNvPr id="6" name="CaixaDeTexto 5">
+            <a:extLst>
+              <a:ext uri="{FF2B5EF4-FFF2-40B4-BE49-F238E27FC236}">
+                <a16:creationId xmlns:a16="http://schemas.microsoft.com/office/drawing/2014/main" id="{4A3C43D6-3EE1-489E-BB55-C1D165527BB2}"/>
+              </a:ext>
+            </a:extLst>
+          </p:cNvPr>
+          <p:cNvSpPr txBox="1"/>
+          <p:nvPr/>
+        </p:nvSpPr>
+        <p:spPr>
+          <a:xfrm>
+            <a:off x="457200" y="3135491"/>
+            <a:ext cx="7924800" cy="2308324"/>
+          </a:xfrm>
+          <a:prstGeom prst="rect">
+            <a:avLst/>
+          </a:prstGeom>
+          <a:noFill/>
+        </p:spPr>
+        <p:txBody>
+          <a:bodyPr wrap="square" rtlCol="0">
+            <a:spAutoFit/>
+          </a:bodyPr>
+          <a:lstStyle/>
+          <a:p>
+            <a:pPr marL="342900" indent="-342900">
+              <a:buFont typeface="Arial" panose="020B0604020202020204" pitchFamily="34" charset="0"/>
+              <a:buChar char="•"/>
+            </a:pPr>
+            <a:r>
+              <a:rPr lang="en-US" sz="2400" dirty="0"/>
+              <a:t>Configure o </a:t>
+            </a:r>
+            <a:r>
+              <a:rPr lang="en-US" sz="2400" dirty="0" err="1"/>
+              <a:t>componente</a:t>
+            </a:r>
+            <a:r>
+              <a:rPr lang="en-US" sz="2400" dirty="0"/>
+              <a:t> </a:t>
+            </a:r>
+            <a:r>
+              <a:rPr lang="en-US" sz="2400" b="1" dirty="0"/>
+              <a:t>ComboBox1</a:t>
+            </a:r>
+            <a:r>
+              <a:rPr lang="en-US" sz="2400" dirty="0"/>
+              <a:t> da </a:t>
+            </a:r>
+            <a:r>
+              <a:rPr lang="en-US" sz="2400" dirty="0" err="1"/>
+              <a:t>seguinte</a:t>
+            </a:r>
+            <a:r>
+              <a:rPr lang="en-US" sz="2400" dirty="0"/>
+              <a:t> forma:</a:t>
+            </a:r>
+          </a:p>
+          <a:p>
+            <a:pPr marL="800100" lvl="1" indent="-342900">
+              <a:buFont typeface="Arial" panose="020B0604020202020204" pitchFamily="34" charset="0"/>
+              <a:buChar char="•"/>
+            </a:pPr>
+            <a:r>
+              <a:rPr lang="en-US" sz="2400" b="1" dirty="0"/>
+              <a:t>Align: Client</a:t>
+            </a:r>
+          </a:p>
+          <a:p>
+            <a:pPr marL="800100" lvl="1" indent="-342900">
+              <a:buFont typeface="Arial" panose="020B0604020202020204" pitchFamily="34" charset="0"/>
+              <a:buChar char="•"/>
+            </a:pPr>
+            <a:r>
+              <a:rPr lang="en-US" sz="2400" b="1" dirty="0"/>
+              <a:t>Margins -&gt; Right: 5</a:t>
+            </a:r>
+          </a:p>
+          <a:p>
+            <a:pPr marL="800100" lvl="1" indent="-342900">
+              <a:buFont typeface="Arial" panose="020B0604020202020204" pitchFamily="34" charset="0"/>
+              <a:buChar char="•"/>
+            </a:pPr>
+            <a:r>
+              <a:rPr lang="en-US" sz="2400" b="1" dirty="0"/>
+              <a:t>Margins -&gt; Top: 10</a:t>
+            </a:r>
+          </a:p>
+          <a:p>
+            <a:pPr marL="800100" lvl="1" indent="-342900">
+              <a:buFont typeface="Arial" panose="020B0604020202020204" pitchFamily="34" charset="0"/>
+              <a:buChar char="•"/>
+            </a:pPr>
+            <a:r>
+              <a:rPr lang="en-US" sz="2400" b="1" dirty="0"/>
+              <a:t>Name: </a:t>
+            </a:r>
+            <a:r>
+              <a:rPr lang="en-US" sz="2400" b="1" dirty="0" err="1"/>
+              <a:t>cbDispositivo</a:t>
+            </a:r>
+            <a:endParaRPr lang="en-US" sz="2400" b="1" dirty="0"/>
+          </a:p>
+        </p:txBody>
+      </p:sp>
+    </p:spTree>
+    <p:extLst>
+      <p:ext uri="{BB962C8B-B14F-4D97-AF65-F5344CB8AC3E}">
+        <p14:creationId xmlns:p14="http://schemas.microsoft.com/office/powerpoint/2010/main" val="2181578768"/>
+      </p:ext>
+    </p:extLst>
+  </p:cSld>
+  <p:clrMapOvr>
+    <a:masterClrMapping/>
+  </p:clrMapOvr>
+</p:sld>
+</file>
+
+<file path=ppt/slides/slide31.xml><?xml version="1.0" encoding="utf-8"?>
+<p:sld xmlns:a="http://schemas.openxmlformats.org/drawingml/2006/main" xmlns:r="http://schemas.openxmlformats.org/officeDocument/2006/relationships" xmlns:p="http://schemas.openxmlformats.org/presentationml/2006/main">
+  <p:cSld>
+    <p:spTree>
+      <p:nvGrpSpPr>
+        <p:cNvPr id="1" name=""/>
+        <p:cNvGrpSpPr/>
+        <p:nvPr/>
+      </p:nvGrpSpPr>
+      <p:grpSpPr>
+        <a:xfrm>
+          <a:off x="0" y="0"/>
+          <a:ext cx="0" cy="0"/>
+          <a:chOff x="0" y="0"/>
+          <a:chExt cx="0" cy="0"/>
+        </a:xfrm>
+      </p:grpSpPr>
+      <p:sp>
+        <p:nvSpPr>
+          <p:cNvPr id="4" name="Título 1">
+            <a:extLst>
+              <a:ext uri="{FF2B5EF4-FFF2-40B4-BE49-F238E27FC236}">
+                <a16:creationId xmlns:a16="http://schemas.microsoft.com/office/drawing/2014/main" id="{6756C37D-5E70-4B98-A5F5-A291DBCC5DBD}"/>
+              </a:ext>
+            </a:extLst>
+          </p:cNvPr>
+          <p:cNvSpPr>
+            <a:spLocks noGrp="1"/>
+          </p:cNvSpPr>
+          <p:nvPr>
+            <p:ph type="title"/>
+          </p:nvPr>
+        </p:nvSpPr>
+        <p:spPr>
+          <a:xfrm>
+            <a:off x="457200" y="274638"/>
+            <a:ext cx="7467600" cy="1143000"/>
+          </a:xfrm>
+        </p:spPr>
+        <p:txBody>
+          <a:bodyPr/>
+          <a:lstStyle/>
+          <a:p>
+            <a:r>
+              <a:rPr lang="en-US" dirty="0" err="1"/>
+              <a:t>Montagem</a:t>
+            </a:r>
+            <a:r>
+              <a:rPr lang="en-US" dirty="0"/>
+              <a:t> do </a:t>
+            </a:r>
+            <a:r>
+              <a:rPr lang="en-US" dirty="0" err="1"/>
+              <a:t>Formulário</a:t>
+            </a:r>
+            <a:r>
+              <a:rPr lang="en-US" dirty="0"/>
+              <a:t> – </a:t>
+            </a:r>
+            <a:br>
+              <a:rPr lang="en-US" dirty="0"/>
+            </a:br>
+            <a:r>
+              <a:rPr lang="en-US" dirty="0"/>
+              <a:t>Unit chat</a:t>
+            </a:r>
+            <a:endParaRPr lang="pt-BR" dirty="0"/>
+          </a:p>
+        </p:txBody>
+      </p:sp>
+      <p:pic>
+        <p:nvPicPr>
+          <p:cNvPr id="6" name="Imagem 5">
+            <a:extLst>
+              <a:ext uri="{FF2B5EF4-FFF2-40B4-BE49-F238E27FC236}">
+                <a16:creationId xmlns:a16="http://schemas.microsoft.com/office/drawing/2014/main" id="{2F2D470E-D92F-40DE-B95D-5E0EB55484E2}"/>
+              </a:ext>
+            </a:extLst>
+          </p:cNvPr>
+          <p:cNvPicPr>
+            <a:picLocks noChangeAspect="1"/>
+          </p:cNvPicPr>
+          <p:nvPr/>
+        </p:nvPicPr>
+        <p:blipFill>
+          <a:blip r:embed="rId2"/>
+          <a:stretch>
+            <a:fillRect/>
+          </a:stretch>
+        </p:blipFill>
+        <p:spPr>
+          <a:xfrm>
+            <a:off x="609600" y="1676400"/>
+            <a:ext cx="6296025" cy="4781550"/>
+          </a:xfrm>
+          <a:prstGeom prst="rect">
+            <a:avLst/>
+          </a:prstGeom>
+        </p:spPr>
+      </p:pic>
+    </p:spTree>
+    <p:extLst>
+      <p:ext uri="{BB962C8B-B14F-4D97-AF65-F5344CB8AC3E}">
+        <p14:creationId xmlns:p14="http://schemas.microsoft.com/office/powerpoint/2010/main" val="870273813"/>
+      </p:ext>
+    </p:extLst>
+  </p:cSld>
+  <p:clrMapOvr>
+    <a:masterClrMapping/>
+  </p:clrMapOvr>
+</p:sld>
+</file>
+
+<file path=ppt/slides/slide32.xml><?xml version="1.0" encoding="utf-8"?>
+<p:sld xmlns:a="http://schemas.openxmlformats.org/drawingml/2006/main" xmlns:r="http://schemas.openxmlformats.org/officeDocument/2006/relationships" xmlns:p="http://schemas.openxmlformats.org/presentationml/2006/main">
+  <p:cSld>
+    <p:spTree>
+      <p:nvGrpSpPr>
+        <p:cNvPr id="1" name=""/>
+        <p:cNvGrpSpPr/>
+        <p:nvPr/>
+      </p:nvGrpSpPr>
+      <p:grpSpPr>
+        <a:xfrm>
+          <a:off x="0" y="0"/>
+          <a:ext cx="0" cy="0"/>
+          <a:chOff x="0" y="0"/>
+          <a:chExt cx="0" cy="0"/>
+        </a:xfrm>
+      </p:grpSpPr>
+      <p:sp>
+        <p:nvSpPr>
+          <p:cNvPr id="4" name="Título 1">
+            <a:extLst>
+              <a:ext uri="{FF2B5EF4-FFF2-40B4-BE49-F238E27FC236}">
+                <a16:creationId xmlns:a16="http://schemas.microsoft.com/office/drawing/2014/main" id="{DE64ABEE-5583-4B7F-A24C-B592D4305AA2}"/>
+              </a:ext>
+            </a:extLst>
+          </p:cNvPr>
+          <p:cNvSpPr>
+            <a:spLocks noGrp="1"/>
+          </p:cNvSpPr>
+          <p:nvPr>
+            <p:ph type="title"/>
+          </p:nvPr>
+        </p:nvSpPr>
+        <p:spPr>
+          <a:xfrm>
+            <a:off x="457200" y="274638"/>
+            <a:ext cx="7467600" cy="1143000"/>
+          </a:xfrm>
+        </p:spPr>
+        <p:txBody>
+          <a:bodyPr/>
+          <a:lstStyle/>
+          <a:p>
+            <a:r>
+              <a:rPr lang="en-US" dirty="0" err="1"/>
+              <a:t>Montagem</a:t>
+            </a:r>
+            <a:r>
+              <a:rPr lang="en-US" dirty="0"/>
+              <a:t> do </a:t>
+            </a:r>
+            <a:r>
+              <a:rPr lang="en-US" dirty="0" err="1"/>
+              <a:t>Formulário</a:t>
+            </a:r>
+            <a:r>
+              <a:rPr lang="en-US" dirty="0"/>
+              <a:t> – </a:t>
+            </a:r>
+            <a:br>
+              <a:rPr lang="en-US" dirty="0"/>
+            </a:br>
+            <a:r>
+              <a:rPr lang="en-US" dirty="0"/>
+              <a:t>Unit chat</a:t>
+            </a:r>
+            <a:endParaRPr lang="pt-BR" dirty="0"/>
+          </a:p>
+        </p:txBody>
+      </p:sp>
+      <p:sp>
+        <p:nvSpPr>
+          <p:cNvPr id="5" name="CaixaDeTexto 4">
+            <a:extLst>
+              <a:ext uri="{FF2B5EF4-FFF2-40B4-BE49-F238E27FC236}">
+                <a16:creationId xmlns:a16="http://schemas.microsoft.com/office/drawing/2014/main" id="{8895331B-93E5-4FA6-8F40-F6727ACCBF06}"/>
+              </a:ext>
+            </a:extLst>
+          </p:cNvPr>
+          <p:cNvSpPr txBox="1"/>
+          <p:nvPr/>
+        </p:nvSpPr>
+        <p:spPr>
+          <a:xfrm>
+            <a:off x="457201" y="1676400"/>
+            <a:ext cx="8153400" cy="830997"/>
+          </a:xfrm>
+          <a:prstGeom prst="rect">
+            <a:avLst/>
+          </a:prstGeom>
+          <a:noFill/>
+        </p:spPr>
+        <p:txBody>
+          <a:bodyPr wrap="square" rtlCol="0">
+            <a:spAutoFit/>
+          </a:bodyPr>
+          <a:lstStyle/>
+          <a:p>
+            <a:pPr marL="457200" indent="-457200">
+              <a:buFont typeface="Arial" panose="020B0604020202020204" pitchFamily="34" charset="0"/>
+              <a:buChar char="•"/>
+            </a:pPr>
+            <a:r>
+              <a:rPr lang="en-US" sz="2400" dirty="0"/>
+              <a:t>Dentro do </a:t>
+            </a:r>
+            <a:r>
+              <a:rPr lang="en-US" sz="2400" dirty="0" err="1"/>
+              <a:t>segundo</a:t>
+            </a:r>
+            <a:r>
+              <a:rPr lang="en-US" sz="2400" dirty="0"/>
+              <a:t> </a:t>
+            </a:r>
+            <a:r>
+              <a:rPr lang="en-US" sz="2400" b="1" dirty="0"/>
+              <a:t>Layout</a:t>
+            </a:r>
+            <a:r>
+              <a:rPr lang="en-US" sz="2400" dirty="0"/>
+              <a:t> de </a:t>
+            </a:r>
+            <a:r>
+              <a:rPr lang="en-US" sz="2400" dirty="0" err="1"/>
+              <a:t>cima</a:t>
+            </a:r>
+            <a:r>
+              <a:rPr lang="en-US" sz="2400" dirty="0"/>
+              <a:t> para </a:t>
+            </a:r>
+            <a:r>
+              <a:rPr lang="en-US" sz="2400" dirty="0" err="1"/>
+              <a:t>baixo</a:t>
+            </a:r>
+            <a:r>
+              <a:rPr lang="en-US" sz="2400" dirty="0"/>
+              <a:t> </a:t>
+            </a:r>
+            <a:r>
+              <a:rPr lang="en-US" sz="2400" dirty="0" err="1"/>
+              <a:t>adicione</a:t>
+            </a:r>
+            <a:r>
+              <a:rPr lang="en-US" sz="2400" dirty="0"/>
+              <a:t> um </a:t>
+            </a:r>
+            <a:r>
+              <a:rPr lang="en-US" sz="2400" dirty="0" err="1"/>
+              <a:t>componente</a:t>
+            </a:r>
+            <a:r>
+              <a:rPr lang="en-US" sz="2400" dirty="0"/>
+              <a:t> </a:t>
+            </a:r>
+            <a:r>
+              <a:rPr lang="en-US" sz="2400" b="1" dirty="0" err="1"/>
+              <a:t>TButton</a:t>
+            </a:r>
+            <a:r>
+              <a:rPr lang="en-US" sz="2400" b="1" dirty="0"/>
+              <a:t> </a:t>
+            </a:r>
+            <a:r>
+              <a:rPr lang="en-US" sz="2400" dirty="0"/>
+              <a:t>da aba </a:t>
+            </a:r>
+            <a:r>
+              <a:rPr lang="en-US" sz="2400" b="1" dirty="0"/>
+              <a:t>Standard</a:t>
+            </a:r>
+          </a:p>
+        </p:txBody>
+      </p:sp>
+      <p:pic>
+        <p:nvPicPr>
+          <p:cNvPr id="7" name="Imagem 6">
+            <a:extLst>
+              <a:ext uri="{FF2B5EF4-FFF2-40B4-BE49-F238E27FC236}">
+                <a16:creationId xmlns:a16="http://schemas.microsoft.com/office/drawing/2014/main" id="{1DF17493-5899-4842-A09F-B2ED63CCB4E1}"/>
+              </a:ext>
+            </a:extLst>
+          </p:cNvPr>
+          <p:cNvPicPr>
+            <a:picLocks noChangeAspect="1"/>
+          </p:cNvPicPr>
+          <p:nvPr/>
+        </p:nvPicPr>
+        <p:blipFill>
+          <a:blip r:embed="rId2"/>
+          <a:stretch>
+            <a:fillRect/>
+          </a:stretch>
+        </p:blipFill>
+        <p:spPr>
+          <a:xfrm>
+            <a:off x="990600" y="2895600"/>
+            <a:ext cx="4114801" cy="3114071"/>
+          </a:xfrm>
+          <a:prstGeom prst="rect">
+            <a:avLst/>
+          </a:prstGeom>
+        </p:spPr>
+      </p:pic>
+    </p:spTree>
+    <p:extLst>
+      <p:ext uri="{BB962C8B-B14F-4D97-AF65-F5344CB8AC3E}">
+        <p14:creationId xmlns:p14="http://schemas.microsoft.com/office/powerpoint/2010/main" val="1383067221"/>
+      </p:ext>
+    </p:extLst>
+  </p:cSld>
+  <p:clrMapOvr>
+    <a:masterClrMapping/>
+  </p:clrMapOvr>
+</p:sld>
+</file>
+
+<file path=ppt/slides/slide33.xml><?xml version="1.0" encoding="utf-8"?>
+<p:sld xmlns:a="http://schemas.openxmlformats.org/drawingml/2006/main" xmlns:r="http://schemas.openxmlformats.org/officeDocument/2006/relationships" xmlns:p="http://schemas.openxmlformats.org/presentationml/2006/main">
+  <p:cSld>
+    <p:spTree>
+      <p:nvGrpSpPr>
+        <p:cNvPr id="1" name=""/>
+        <p:cNvGrpSpPr/>
+        <p:nvPr/>
+      </p:nvGrpSpPr>
+      <p:grpSpPr>
+        <a:xfrm>
+          <a:off x="0" y="0"/>
+          <a:ext cx="0" cy="0"/>
+          <a:chOff x="0" y="0"/>
+          <a:chExt cx="0" cy="0"/>
+        </a:xfrm>
+      </p:grpSpPr>
+      <p:sp>
+        <p:nvSpPr>
+          <p:cNvPr id="4" name="Título 1">
+            <a:extLst>
+              <a:ext uri="{FF2B5EF4-FFF2-40B4-BE49-F238E27FC236}">
+                <a16:creationId xmlns:a16="http://schemas.microsoft.com/office/drawing/2014/main" id="{81E25DEC-68D8-4276-9FDC-55112C93BA8E}"/>
+              </a:ext>
+            </a:extLst>
+          </p:cNvPr>
+          <p:cNvSpPr>
+            <a:spLocks noGrp="1"/>
+          </p:cNvSpPr>
+          <p:nvPr>
+            <p:ph type="title"/>
+          </p:nvPr>
+        </p:nvSpPr>
+        <p:spPr>
+          <a:xfrm>
+            <a:off x="457200" y="274638"/>
+            <a:ext cx="7467600" cy="1143000"/>
+          </a:xfrm>
+        </p:spPr>
+        <p:txBody>
+          <a:bodyPr/>
+          <a:lstStyle/>
+          <a:p>
+            <a:r>
+              <a:rPr lang="en-US" dirty="0" err="1"/>
+              <a:t>Montagem</a:t>
+            </a:r>
+            <a:r>
+              <a:rPr lang="en-US" dirty="0"/>
+              <a:t> do </a:t>
+            </a:r>
+            <a:r>
+              <a:rPr lang="en-US" dirty="0" err="1"/>
+              <a:t>Formulário</a:t>
+            </a:r>
+            <a:r>
+              <a:rPr lang="en-US" dirty="0"/>
+              <a:t> – </a:t>
+            </a:r>
+            <a:br>
+              <a:rPr lang="en-US" dirty="0"/>
+            </a:br>
+            <a:r>
+              <a:rPr lang="en-US" dirty="0"/>
+              <a:t>Unit chat</a:t>
+            </a:r>
+            <a:endParaRPr lang="pt-BR" dirty="0"/>
+          </a:p>
+        </p:txBody>
+      </p:sp>
+      <p:sp>
+        <p:nvSpPr>
+          <p:cNvPr id="5" name="CaixaDeTexto 4">
+            <a:extLst>
+              <a:ext uri="{FF2B5EF4-FFF2-40B4-BE49-F238E27FC236}">
+                <a16:creationId xmlns:a16="http://schemas.microsoft.com/office/drawing/2014/main" id="{A373CEFC-B2C5-4B26-B8E6-CF62416204AC}"/>
+              </a:ext>
+            </a:extLst>
+          </p:cNvPr>
+          <p:cNvSpPr txBox="1"/>
+          <p:nvPr/>
+        </p:nvSpPr>
+        <p:spPr>
+          <a:xfrm>
+            <a:off x="457200" y="1676400"/>
+            <a:ext cx="7924800" cy="3416320"/>
+          </a:xfrm>
+          <a:prstGeom prst="rect">
+            <a:avLst/>
+          </a:prstGeom>
+          <a:noFill/>
+        </p:spPr>
+        <p:txBody>
+          <a:bodyPr wrap="square" rtlCol="0">
+            <a:spAutoFit/>
+          </a:bodyPr>
+          <a:lstStyle/>
+          <a:p>
+            <a:pPr marL="342900" indent="-342900">
+              <a:buFont typeface="Arial" panose="020B0604020202020204" pitchFamily="34" charset="0"/>
+              <a:buChar char="•"/>
+            </a:pPr>
+            <a:r>
+              <a:rPr lang="en-US" sz="2400" dirty="0"/>
+              <a:t>Configure o </a:t>
+            </a:r>
+            <a:r>
+              <a:rPr lang="en-US" sz="2400" dirty="0" err="1"/>
+              <a:t>componente</a:t>
+            </a:r>
+            <a:r>
+              <a:rPr lang="en-US" sz="2400" dirty="0"/>
+              <a:t> </a:t>
+            </a:r>
+            <a:r>
+              <a:rPr lang="en-US" sz="2400" b="1" dirty="0"/>
+              <a:t>Button3 </a:t>
+            </a:r>
+            <a:r>
+              <a:rPr lang="en-US" sz="2400" dirty="0"/>
+              <a:t>da </a:t>
+            </a:r>
+            <a:r>
+              <a:rPr lang="en-US" sz="2400" dirty="0" err="1"/>
+              <a:t>seguinte</a:t>
+            </a:r>
+            <a:r>
+              <a:rPr lang="en-US" sz="2400" dirty="0"/>
+              <a:t> forma:</a:t>
+            </a:r>
+          </a:p>
+          <a:p>
+            <a:pPr marL="800100" lvl="1" indent="-342900">
+              <a:buFont typeface="Arial" panose="020B0604020202020204" pitchFamily="34" charset="0"/>
+              <a:buChar char="•"/>
+            </a:pPr>
+            <a:r>
+              <a:rPr lang="en-US" sz="2400" b="1" dirty="0"/>
+              <a:t>Align: Client</a:t>
+            </a:r>
+          </a:p>
+          <a:p>
+            <a:pPr marL="800100" lvl="1" indent="-342900">
+              <a:buFont typeface="Arial" panose="020B0604020202020204" pitchFamily="34" charset="0"/>
+              <a:buChar char="•"/>
+            </a:pPr>
+            <a:r>
+              <a:rPr lang="en-US" sz="2400" b="1" dirty="0"/>
+              <a:t>Margins -&gt; Top: 2</a:t>
+            </a:r>
+          </a:p>
+          <a:p>
+            <a:pPr marL="800100" lvl="1" indent="-342900">
+              <a:buFont typeface="Arial" panose="020B0604020202020204" pitchFamily="34" charset="0"/>
+              <a:buChar char="•"/>
+            </a:pPr>
+            <a:r>
+              <a:rPr lang="en-US" sz="2400" b="1" dirty="0"/>
+              <a:t>Margins -&gt; Bottom: 2</a:t>
+            </a:r>
+          </a:p>
+          <a:p>
+            <a:pPr marL="800100" lvl="1" indent="-342900">
+              <a:buFont typeface="Arial" panose="020B0604020202020204" pitchFamily="34" charset="0"/>
+              <a:buChar char="•"/>
+            </a:pPr>
+            <a:r>
+              <a:rPr lang="en-US" sz="2400" b="1" dirty="0"/>
+              <a:t>Margins -&gt; Left: 8</a:t>
+            </a:r>
+          </a:p>
+          <a:p>
+            <a:pPr marL="800100" lvl="1" indent="-342900">
+              <a:buFont typeface="Arial" panose="020B0604020202020204" pitchFamily="34" charset="0"/>
+              <a:buChar char="•"/>
+            </a:pPr>
+            <a:r>
+              <a:rPr lang="en-US" sz="2400" b="1" dirty="0"/>
+              <a:t>Margins -&gt; Right: 8</a:t>
+            </a:r>
+          </a:p>
+          <a:p>
+            <a:pPr marL="800100" lvl="1" indent="-342900">
+              <a:buFont typeface="Arial" panose="020B0604020202020204" pitchFamily="34" charset="0"/>
+              <a:buChar char="•"/>
+            </a:pPr>
+            <a:r>
+              <a:rPr lang="en-US" sz="2400" b="1" dirty="0"/>
+              <a:t>Name: </a:t>
+            </a:r>
+            <a:r>
+              <a:rPr lang="en-US" sz="2400" b="1" dirty="0" err="1"/>
+              <a:t>btnServidor</a:t>
+            </a:r>
+            <a:endParaRPr lang="en-US" sz="2400" b="1" dirty="0"/>
+          </a:p>
+          <a:p>
+            <a:pPr marL="800100" lvl="1" indent="-342900">
+              <a:buFont typeface="Arial" panose="020B0604020202020204" pitchFamily="34" charset="0"/>
+              <a:buChar char="•"/>
+            </a:pPr>
+            <a:r>
+              <a:rPr lang="en-US" sz="2400" b="1" dirty="0"/>
+              <a:t>Text: </a:t>
+            </a:r>
+            <a:r>
+              <a:rPr lang="en-US" sz="2400" b="1" dirty="0" err="1"/>
+              <a:t>Iniciar</a:t>
+            </a:r>
+            <a:r>
+              <a:rPr lang="en-US" sz="2400" b="1" dirty="0"/>
+              <a:t> </a:t>
+            </a:r>
+            <a:r>
+              <a:rPr lang="en-US" sz="2400" b="1" dirty="0" err="1"/>
+              <a:t>Servidor</a:t>
+            </a:r>
+            <a:endParaRPr lang="en-US" sz="2400" b="1" dirty="0"/>
+          </a:p>
+        </p:txBody>
+      </p:sp>
+    </p:spTree>
+    <p:extLst>
+      <p:ext uri="{BB962C8B-B14F-4D97-AF65-F5344CB8AC3E}">
+        <p14:creationId xmlns:p14="http://schemas.microsoft.com/office/powerpoint/2010/main" val="1334870053"/>
+      </p:ext>
+    </p:extLst>
+  </p:cSld>
+  <p:clrMapOvr>
+    <a:masterClrMapping/>
+  </p:clrMapOvr>
+</p:sld>
+</file>
+
+<file path=ppt/slides/slide34.xml><?xml version="1.0" encoding="utf-8"?>
+<p:sld xmlns:a="http://schemas.openxmlformats.org/drawingml/2006/main" xmlns:r="http://schemas.openxmlformats.org/officeDocument/2006/relationships" xmlns:p="http://schemas.openxmlformats.org/presentationml/2006/main">
+  <p:cSld>
+    <p:spTree>
+      <p:nvGrpSpPr>
+        <p:cNvPr id="1" name=""/>
+        <p:cNvGrpSpPr/>
+        <p:nvPr/>
+      </p:nvGrpSpPr>
+      <p:grpSpPr>
+        <a:xfrm>
+          <a:off x="0" y="0"/>
+          <a:ext cx="0" cy="0"/>
+          <a:chOff x="0" y="0"/>
+          <a:chExt cx="0" cy="0"/>
+        </a:xfrm>
+      </p:grpSpPr>
+      <p:sp>
+        <p:nvSpPr>
+          <p:cNvPr id="6" name="Título 1">
+            <a:extLst>
+              <a:ext uri="{FF2B5EF4-FFF2-40B4-BE49-F238E27FC236}">
+                <a16:creationId xmlns:a16="http://schemas.microsoft.com/office/drawing/2014/main" id="{64CFC01C-920F-4E93-B702-D8C5F43DC79A}"/>
+              </a:ext>
+            </a:extLst>
+          </p:cNvPr>
+          <p:cNvSpPr>
+            <a:spLocks noGrp="1"/>
+          </p:cNvSpPr>
+          <p:nvPr>
+            <p:ph type="title"/>
+          </p:nvPr>
+        </p:nvSpPr>
+        <p:spPr>
+          <a:xfrm>
+            <a:off x="457200" y="274638"/>
+            <a:ext cx="7467600" cy="1143000"/>
+          </a:xfrm>
+        </p:spPr>
+        <p:txBody>
+          <a:bodyPr/>
+          <a:lstStyle/>
+          <a:p>
+            <a:r>
+              <a:rPr lang="en-US" dirty="0" err="1"/>
+              <a:t>Montagem</a:t>
+            </a:r>
+            <a:r>
+              <a:rPr lang="en-US" dirty="0"/>
+              <a:t> do </a:t>
+            </a:r>
+            <a:r>
+              <a:rPr lang="en-US" dirty="0" err="1"/>
+              <a:t>Formulário</a:t>
+            </a:r>
+            <a:r>
+              <a:rPr lang="en-US" dirty="0"/>
+              <a:t> – </a:t>
+            </a:r>
+            <a:br>
+              <a:rPr lang="en-US" dirty="0"/>
+            </a:br>
+            <a:r>
+              <a:rPr lang="en-US" dirty="0"/>
+              <a:t>Unit chat</a:t>
+            </a:r>
+            <a:endParaRPr lang="pt-BR" dirty="0"/>
+          </a:p>
+        </p:txBody>
+      </p:sp>
+      <p:pic>
+        <p:nvPicPr>
+          <p:cNvPr id="8" name="Imagem 7">
+            <a:extLst>
+              <a:ext uri="{FF2B5EF4-FFF2-40B4-BE49-F238E27FC236}">
+                <a16:creationId xmlns:a16="http://schemas.microsoft.com/office/drawing/2014/main" id="{E8AF41C0-1786-4539-B4E9-D6BBDAFED201}"/>
+              </a:ext>
+            </a:extLst>
+          </p:cNvPr>
+          <p:cNvPicPr>
+            <a:picLocks noChangeAspect="1"/>
+          </p:cNvPicPr>
+          <p:nvPr/>
+        </p:nvPicPr>
+        <p:blipFill>
+          <a:blip r:embed="rId2"/>
+          <a:stretch>
+            <a:fillRect/>
+          </a:stretch>
+        </p:blipFill>
+        <p:spPr>
+          <a:xfrm>
+            <a:off x="457200" y="1676400"/>
+            <a:ext cx="6324600" cy="4781550"/>
+          </a:xfrm>
+          <a:prstGeom prst="rect">
+            <a:avLst/>
+          </a:prstGeom>
+        </p:spPr>
+      </p:pic>
+    </p:spTree>
+    <p:extLst>
+      <p:ext uri="{BB962C8B-B14F-4D97-AF65-F5344CB8AC3E}">
+        <p14:creationId xmlns:p14="http://schemas.microsoft.com/office/powerpoint/2010/main" val="279930678"/>
+      </p:ext>
+    </p:extLst>
+  </p:cSld>
+  <p:clrMapOvr>
+    <a:masterClrMapping/>
+  </p:clrMapOvr>
+</p:sld>
+</file>
+
+<file path=ppt/slides/slide35.xml><?xml version="1.0" encoding="utf-8"?>
+<p:sld xmlns:a="http://schemas.openxmlformats.org/drawingml/2006/main" xmlns:r="http://schemas.openxmlformats.org/officeDocument/2006/relationships" xmlns:p="http://schemas.openxmlformats.org/presentationml/2006/main">
+  <p:cSld>
+    <p:spTree>
+      <p:nvGrpSpPr>
+        <p:cNvPr id="1" name=""/>
+        <p:cNvGrpSpPr/>
+        <p:nvPr/>
+      </p:nvGrpSpPr>
+      <p:grpSpPr>
+        <a:xfrm>
+          <a:off x="0" y="0"/>
+          <a:ext cx="0" cy="0"/>
+          <a:chOff x="0" y="0"/>
+          <a:chExt cx="0" cy="0"/>
+        </a:xfrm>
+      </p:grpSpPr>
+      <p:sp>
+        <p:nvSpPr>
+          <p:cNvPr id="4" name="Título 1">
+            <a:extLst>
+              <a:ext uri="{FF2B5EF4-FFF2-40B4-BE49-F238E27FC236}">
+                <a16:creationId xmlns:a16="http://schemas.microsoft.com/office/drawing/2014/main" id="{776FD6B3-010F-47DC-8AA6-5D763769524F}"/>
+              </a:ext>
+            </a:extLst>
+          </p:cNvPr>
+          <p:cNvSpPr>
+            <a:spLocks noGrp="1"/>
+          </p:cNvSpPr>
+          <p:nvPr>
+            <p:ph type="title"/>
+          </p:nvPr>
+        </p:nvSpPr>
+        <p:spPr>
+          <a:xfrm>
+            <a:off x="457200" y="274638"/>
+            <a:ext cx="7467600" cy="1143000"/>
+          </a:xfrm>
+        </p:spPr>
+        <p:txBody>
+          <a:bodyPr/>
+          <a:lstStyle/>
+          <a:p>
+            <a:r>
+              <a:rPr lang="en-US" dirty="0" err="1"/>
+              <a:t>Montagem</a:t>
+            </a:r>
+            <a:r>
+              <a:rPr lang="en-US" dirty="0"/>
+              <a:t> do </a:t>
+            </a:r>
+            <a:r>
+              <a:rPr lang="en-US" dirty="0" err="1"/>
+              <a:t>Formulário</a:t>
+            </a:r>
+            <a:r>
+              <a:rPr lang="en-US" dirty="0"/>
+              <a:t> – </a:t>
+            </a:r>
+            <a:br>
+              <a:rPr lang="en-US" dirty="0"/>
+            </a:br>
+            <a:r>
+              <a:rPr lang="en-US" dirty="0"/>
+              <a:t>Unit chat</a:t>
+            </a:r>
+            <a:endParaRPr lang="pt-BR" dirty="0"/>
+          </a:p>
+        </p:txBody>
+      </p:sp>
+      <p:sp>
+        <p:nvSpPr>
+          <p:cNvPr id="5" name="CaixaDeTexto 4">
+            <a:extLst>
+              <a:ext uri="{FF2B5EF4-FFF2-40B4-BE49-F238E27FC236}">
+                <a16:creationId xmlns:a16="http://schemas.microsoft.com/office/drawing/2014/main" id="{B9A20125-4884-46EE-9909-BECBD97E414A}"/>
+              </a:ext>
+            </a:extLst>
+          </p:cNvPr>
+          <p:cNvSpPr txBox="1"/>
+          <p:nvPr/>
+        </p:nvSpPr>
+        <p:spPr>
+          <a:xfrm>
+            <a:off x="457201" y="1676400"/>
+            <a:ext cx="8153400" cy="1200329"/>
+          </a:xfrm>
+          <a:prstGeom prst="rect">
+            <a:avLst/>
+          </a:prstGeom>
+          <a:noFill/>
+        </p:spPr>
+        <p:txBody>
+          <a:bodyPr wrap="square" rtlCol="0">
+            <a:spAutoFit/>
+          </a:bodyPr>
+          <a:lstStyle/>
+          <a:p>
+            <a:pPr marL="457200" indent="-457200">
+              <a:buFont typeface="Arial" panose="020B0604020202020204" pitchFamily="34" charset="0"/>
+              <a:buChar char="•"/>
+            </a:pPr>
+            <a:r>
+              <a:rPr lang="en-US" sz="2400" dirty="0"/>
+              <a:t>Dentro do </a:t>
+            </a:r>
+            <a:r>
+              <a:rPr lang="en-US" sz="2400" dirty="0" err="1"/>
+              <a:t>terceiro</a:t>
+            </a:r>
+            <a:r>
+              <a:rPr lang="en-US" sz="2400" dirty="0"/>
+              <a:t> </a:t>
+            </a:r>
+            <a:r>
+              <a:rPr lang="en-US" sz="2400" b="1" dirty="0"/>
+              <a:t>Layout</a:t>
+            </a:r>
+            <a:r>
+              <a:rPr lang="en-US" sz="2400" dirty="0"/>
+              <a:t> de </a:t>
+            </a:r>
+            <a:r>
+              <a:rPr lang="en-US" sz="2400" dirty="0" err="1"/>
+              <a:t>cima</a:t>
+            </a:r>
+            <a:r>
+              <a:rPr lang="en-US" sz="2400" dirty="0"/>
+              <a:t> para </a:t>
+            </a:r>
+            <a:r>
+              <a:rPr lang="en-US" sz="2400" dirty="0" err="1"/>
+              <a:t>baixo</a:t>
+            </a:r>
+            <a:r>
+              <a:rPr lang="en-US" sz="2400" dirty="0"/>
+              <a:t> </a:t>
+            </a:r>
+            <a:r>
+              <a:rPr lang="en-US" sz="2400" dirty="0" err="1"/>
+              <a:t>adicione</a:t>
+            </a:r>
+            <a:r>
+              <a:rPr lang="en-US" sz="2400" dirty="0"/>
+              <a:t> um </a:t>
+            </a:r>
+            <a:r>
+              <a:rPr lang="en-US" sz="2400" dirty="0" err="1"/>
+              <a:t>componente</a:t>
+            </a:r>
+            <a:r>
+              <a:rPr lang="en-US" sz="2400" dirty="0"/>
+              <a:t> </a:t>
+            </a:r>
+            <a:r>
+              <a:rPr lang="en-US" sz="2400" b="1" dirty="0" err="1"/>
+              <a:t>TButton</a:t>
+            </a:r>
+            <a:r>
+              <a:rPr lang="en-US" sz="2400" b="1" dirty="0"/>
+              <a:t> </a:t>
+            </a:r>
+            <a:r>
+              <a:rPr lang="en-US" sz="2400" dirty="0"/>
+              <a:t>da aba </a:t>
+            </a:r>
+            <a:r>
+              <a:rPr lang="en-US" sz="2400" b="1" dirty="0"/>
+              <a:t>Standard </a:t>
+            </a:r>
+            <a:r>
+              <a:rPr lang="en-US" sz="2400" dirty="0"/>
+              <a:t>e um </a:t>
+            </a:r>
+            <a:r>
+              <a:rPr lang="en-US" sz="2400" dirty="0" err="1"/>
+              <a:t>componente</a:t>
+            </a:r>
+            <a:r>
+              <a:rPr lang="en-US" sz="2400" dirty="0"/>
+              <a:t> </a:t>
+            </a:r>
+            <a:r>
+              <a:rPr lang="en-US" sz="2400" b="1" dirty="0" err="1"/>
+              <a:t>TEdit</a:t>
+            </a:r>
+            <a:r>
+              <a:rPr lang="en-US" sz="2400" b="1" dirty="0"/>
+              <a:t> </a:t>
+            </a:r>
+            <a:r>
+              <a:rPr lang="en-US" sz="2400" dirty="0"/>
+              <a:t>da </a:t>
+            </a:r>
+            <a:r>
+              <a:rPr lang="en-US" sz="2400" dirty="0" err="1"/>
+              <a:t>mesma</a:t>
+            </a:r>
+            <a:r>
+              <a:rPr lang="en-US" sz="2400" dirty="0"/>
+              <a:t> aba</a:t>
+            </a:r>
+            <a:endParaRPr lang="en-US" sz="2400" b="1" dirty="0"/>
+          </a:p>
+        </p:txBody>
+      </p:sp>
+      <p:pic>
+        <p:nvPicPr>
+          <p:cNvPr id="7" name="Imagem 6">
+            <a:extLst>
+              <a:ext uri="{FF2B5EF4-FFF2-40B4-BE49-F238E27FC236}">
+                <a16:creationId xmlns:a16="http://schemas.microsoft.com/office/drawing/2014/main" id="{CA8238B7-A245-496D-814B-D1BE17F833CD}"/>
+              </a:ext>
+            </a:extLst>
+          </p:cNvPr>
+          <p:cNvPicPr>
+            <a:picLocks noChangeAspect="1"/>
+          </p:cNvPicPr>
+          <p:nvPr/>
+        </p:nvPicPr>
+        <p:blipFill>
+          <a:blip r:embed="rId2"/>
+          <a:stretch>
+            <a:fillRect/>
+          </a:stretch>
+        </p:blipFill>
+        <p:spPr>
+          <a:xfrm>
+            <a:off x="914400" y="3135491"/>
+            <a:ext cx="4439968" cy="3367088"/>
+          </a:xfrm>
+          <a:prstGeom prst="rect">
+            <a:avLst/>
+          </a:prstGeom>
+        </p:spPr>
+      </p:pic>
+    </p:spTree>
+    <p:extLst>
+      <p:ext uri="{BB962C8B-B14F-4D97-AF65-F5344CB8AC3E}">
+        <p14:creationId xmlns:p14="http://schemas.microsoft.com/office/powerpoint/2010/main" val="303024661"/>
+      </p:ext>
+    </p:extLst>
+  </p:cSld>
+  <p:clrMapOvr>
+    <a:masterClrMapping/>
+  </p:clrMapOvr>
+</p:sld>
+</file>
+
+<file path=ppt/slides/slide36.xml><?xml version="1.0" encoding="utf-8"?>
+<p:sld xmlns:a="http://schemas.openxmlformats.org/drawingml/2006/main" xmlns:r="http://schemas.openxmlformats.org/officeDocument/2006/relationships" xmlns:p="http://schemas.openxmlformats.org/presentationml/2006/main">
+  <p:cSld>
+    <p:spTree>
+      <p:nvGrpSpPr>
+        <p:cNvPr id="1" name=""/>
+        <p:cNvGrpSpPr/>
+        <p:nvPr/>
+      </p:nvGrpSpPr>
+      <p:grpSpPr>
+        <a:xfrm>
+          <a:off x="0" y="0"/>
+          <a:ext cx="0" cy="0"/>
+          <a:chOff x="0" y="0"/>
+          <a:chExt cx="0" cy="0"/>
+        </a:xfrm>
+      </p:grpSpPr>
+      <p:sp>
+        <p:nvSpPr>
+          <p:cNvPr id="4" name="Título 1">
+            <a:extLst>
+              <a:ext uri="{FF2B5EF4-FFF2-40B4-BE49-F238E27FC236}">
+                <a16:creationId xmlns:a16="http://schemas.microsoft.com/office/drawing/2014/main" id="{2D33340E-297E-4B5D-B378-D26B871C508A}"/>
+              </a:ext>
+            </a:extLst>
+          </p:cNvPr>
+          <p:cNvSpPr>
+            <a:spLocks noGrp="1"/>
+          </p:cNvSpPr>
+          <p:nvPr>
+            <p:ph type="title"/>
+          </p:nvPr>
+        </p:nvSpPr>
+        <p:spPr>
+          <a:xfrm>
+            <a:off x="457200" y="274638"/>
+            <a:ext cx="7467600" cy="1143000"/>
+          </a:xfrm>
+        </p:spPr>
+        <p:txBody>
+          <a:bodyPr/>
+          <a:lstStyle/>
+          <a:p>
+            <a:r>
+              <a:rPr lang="en-US" dirty="0" err="1"/>
+              <a:t>Montagem</a:t>
+            </a:r>
+            <a:r>
+              <a:rPr lang="en-US" dirty="0"/>
+              <a:t> do </a:t>
+            </a:r>
+            <a:r>
+              <a:rPr lang="en-US" dirty="0" err="1"/>
+              <a:t>Formulário</a:t>
+            </a:r>
+            <a:r>
+              <a:rPr lang="en-US" dirty="0"/>
+              <a:t> – </a:t>
+            </a:r>
+            <a:br>
+              <a:rPr lang="en-US" dirty="0"/>
+            </a:br>
+            <a:r>
+              <a:rPr lang="en-US" dirty="0"/>
+              <a:t>Unit chat</a:t>
+            </a:r>
+            <a:endParaRPr lang="pt-BR" dirty="0"/>
+          </a:p>
+        </p:txBody>
+      </p:sp>
+      <p:sp>
+        <p:nvSpPr>
+          <p:cNvPr id="5" name="CaixaDeTexto 4">
+            <a:extLst>
+              <a:ext uri="{FF2B5EF4-FFF2-40B4-BE49-F238E27FC236}">
+                <a16:creationId xmlns:a16="http://schemas.microsoft.com/office/drawing/2014/main" id="{45579C59-4808-4ED6-B2C1-9AD23AACE231}"/>
+              </a:ext>
+            </a:extLst>
+          </p:cNvPr>
+          <p:cNvSpPr txBox="1"/>
+          <p:nvPr/>
+        </p:nvSpPr>
+        <p:spPr>
+          <a:xfrm>
+            <a:off x="457200" y="1676400"/>
+            <a:ext cx="7924800" cy="1938992"/>
+          </a:xfrm>
+          <a:prstGeom prst="rect">
+            <a:avLst/>
+          </a:prstGeom>
+          <a:noFill/>
+        </p:spPr>
+        <p:txBody>
+          <a:bodyPr wrap="square" rtlCol="0">
+            <a:spAutoFit/>
+          </a:bodyPr>
+          <a:lstStyle/>
+          <a:p>
+            <a:pPr marL="342900" indent="-342900">
+              <a:buFont typeface="Arial" panose="020B0604020202020204" pitchFamily="34" charset="0"/>
+              <a:buChar char="•"/>
+            </a:pPr>
+            <a:r>
+              <a:rPr lang="en-US" sz="2400" dirty="0"/>
+              <a:t>Configure o </a:t>
+            </a:r>
+            <a:r>
+              <a:rPr lang="en-US" sz="2400" dirty="0" err="1"/>
+              <a:t>componente</a:t>
+            </a:r>
+            <a:r>
+              <a:rPr lang="en-US" sz="2400" dirty="0"/>
+              <a:t> </a:t>
+            </a:r>
+            <a:r>
+              <a:rPr lang="en-US" sz="2400" b="1" dirty="0"/>
+              <a:t>Button3 </a:t>
+            </a:r>
+            <a:r>
+              <a:rPr lang="en-US" sz="2400" dirty="0"/>
+              <a:t>da </a:t>
+            </a:r>
+            <a:r>
+              <a:rPr lang="en-US" sz="2400" dirty="0" err="1"/>
+              <a:t>seguinte</a:t>
+            </a:r>
+            <a:r>
+              <a:rPr lang="en-US" sz="2400" dirty="0"/>
+              <a:t> forma:</a:t>
+            </a:r>
+          </a:p>
+          <a:p>
+            <a:pPr marL="800100" lvl="1" indent="-342900">
+              <a:buFont typeface="Arial" panose="020B0604020202020204" pitchFamily="34" charset="0"/>
+              <a:buChar char="•"/>
+            </a:pPr>
+            <a:r>
+              <a:rPr lang="en-US" sz="2400" b="1" dirty="0"/>
+              <a:t>Align: Right</a:t>
+            </a:r>
+          </a:p>
+          <a:p>
+            <a:pPr marL="800100" lvl="1" indent="-342900">
+              <a:buFont typeface="Arial" panose="020B0604020202020204" pitchFamily="34" charset="0"/>
+              <a:buChar char="•"/>
+            </a:pPr>
+            <a:r>
+              <a:rPr lang="en-US" sz="2400" b="1" dirty="0"/>
+              <a:t>Name: </a:t>
+            </a:r>
+            <a:r>
+              <a:rPr lang="en-US" sz="2400" b="1" dirty="0" err="1"/>
+              <a:t>btnEnviar</a:t>
+            </a:r>
+            <a:endParaRPr lang="en-US" sz="2400" b="1" dirty="0"/>
+          </a:p>
+          <a:p>
+            <a:pPr marL="800100" lvl="1" indent="-342900">
+              <a:buFont typeface="Arial" panose="020B0604020202020204" pitchFamily="34" charset="0"/>
+              <a:buChar char="•"/>
+            </a:pPr>
+            <a:r>
+              <a:rPr lang="en-US" sz="2400" b="1" dirty="0" err="1"/>
+              <a:t>StyleLookup</a:t>
+            </a:r>
+            <a:r>
+              <a:rPr lang="en-US" sz="2400" b="1" dirty="0"/>
+              <a:t>: </a:t>
+            </a:r>
+            <a:r>
+              <a:rPr lang="en-US" sz="2400" b="1" dirty="0" err="1"/>
+              <a:t>nexttoolbutton</a:t>
+            </a:r>
+            <a:endParaRPr lang="en-US" sz="2400" b="1" dirty="0"/>
+          </a:p>
+        </p:txBody>
+      </p:sp>
+      <p:sp>
+        <p:nvSpPr>
+          <p:cNvPr id="6" name="CaixaDeTexto 5">
+            <a:extLst>
+              <a:ext uri="{FF2B5EF4-FFF2-40B4-BE49-F238E27FC236}">
+                <a16:creationId xmlns:a16="http://schemas.microsoft.com/office/drawing/2014/main" id="{07CF9B55-B236-4188-827F-A5004F016F7E}"/>
+              </a:ext>
+            </a:extLst>
+          </p:cNvPr>
+          <p:cNvSpPr txBox="1"/>
+          <p:nvPr/>
+        </p:nvSpPr>
+        <p:spPr>
+          <a:xfrm>
+            <a:off x="427383" y="3874154"/>
+            <a:ext cx="7924800" cy="3046988"/>
+          </a:xfrm>
+          <a:prstGeom prst="rect">
+            <a:avLst/>
+          </a:prstGeom>
+          <a:noFill/>
+        </p:spPr>
+        <p:txBody>
+          <a:bodyPr wrap="square" rtlCol="0">
+            <a:spAutoFit/>
+          </a:bodyPr>
+          <a:lstStyle/>
+          <a:p>
+            <a:pPr marL="342900" indent="-342900">
+              <a:buFont typeface="Arial" panose="020B0604020202020204" pitchFamily="34" charset="0"/>
+              <a:buChar char="•"/>
+            </a:pPr>
+            <a:r>
+              <a:rPr lang="en-US" sz="2400" dirty="0"/>
+              <a:t>Configure o </a:t>
+            </a:r>
+            <a:r>
+              <a:rPr lang="en-US" sz="2400" dirty="0" err="1"/>
+              <a:t>componente</a:t>
+            </a:r>
+            <a:r>
+              <a:rPr lang="en-US" sz="2400" dirty="0"/>
+              <a:t> </a:t>
+            </a:r>
+            <a:r>
+              <a:rPr lang="en-US" sz="2400" b="1" dirty="0"/>
+              <a:t>Edit1 </a:t>
+            </a:r>
+            <a:r>
+              <a:rPr lang="en-US" sz="2400" dirty="0"/>
+              <a:t>da </a:t>
+            </a:r>
+            <a:r>
+              <a:rPr lang="en-US" sz="2400" dirty="0" err="1"/>
+              <a:t>seguinte</a:t>
+            </a:r>
+            <a:r>
+              <a:rPr lang="en-US" sz="2400" dirty="0"/>
+              <a:t> forma:</a:t>
+            </a:r>
+          </a:p>
+          <a:p>
+            <a:pPr marL="800100" lvl="1" indent="-342900">
+              <a:buFont typeface="Arial" panose="020B0604020202020204" pitchFamily="34" charset="0"/>
+              <a:buChar char="•"/>
+            </a:pPr>
+            <a:r>
+              <a:rPr lang="en-US" sz="2400" b="1" dirty="0"/>
+              <a:t>Align: Client</a:t>
+            </a:r>
+          </a:p>
+          <a:p>
+            <a:pPr marL="800100" lvl="1" indent="-342900">
+              <a:buFont typeface="Arial" panose="020B0604020202020204" pitchFamily="34" charset="0"/>
+              <a:buChar char="•"/>
+            </a:pPr>
+            <a:r>
+              <a:rPr lang="en-US" sz="2400" b="1" dirty="0"/>
+              <a:t>Name: </a:t>
+            </a:r>
+            <a:r>
+              <a:rPr lang="en-US" sz="2400" b="1" dirty="0" err="1"/>
+              <a:t>edtTexto</a:t>
+            </a:r>
+            <a:endParaRPr lang="en-US" sz="2400" b="1" dirty="0"/>
+          </a:p>
+          <a:p>
+            <a:pPr marL="800100" lvl="1" indent="-342900">
+              <a:buFont typeface="Arial" panose="020B0604020202020204" pitchFamily="34" charset="0"/>
+              <a:buChar char="•"/>
+            </a:pPr>
+            <a:r>
+              <a:rPr lang="en-US" sz="2400" b="1" dirty="0"/>
+              <a:t>Margins -&gt; Left: 5</a:t>
+            </a:r>
+          </a:p>
+          <a:p>
+            <a:pPr marL="800100" lvl="1" indent="-342900">
+              <a:buFont typeface="Arial" panose="020B0604020202020204" pitchFamily="34" charset="0"/>
+              <a:buChar char="•"/>
+            </a:pPr>
+            <a:r>
+              <a:rPr lang="en-US" sz="2400" b="1" dirty="0"/>
+              <a:t>Margins -&gt; Right: 5</a:t>
+            </a:r>
+          </a:p>
+          <a:p>
+            <a:pPr marL="800100" lvl="1" indent="-342900">
+              <a:buFont typeface="Arial" panose="020B0604020202020204" pitchFamily="34" charset="0"/>
+              <a:buChar char="•"/>
+            </a:pPr>
+            <a:r>
+              <a:rPr lang="en-US" sz="2400" b="1" dirty="0"/>
+              <a:t>Margins -&gt; Top: 10</a:t>
+            </a:r>
+          </a:p>
+          <a:p>
+            <a:pPr marL="800100" lvl="1" indent="-342900">
+              <a:buFont typeface="Arial" panose="020B0604020202020204" pitchFamily="34" charset="0"/>
+              <a:buChar char="•"/>
+            </a:pPr>
+            <a:r>
+              <a:rPr lang="en-US" sz="2400" b="1" dirty="0" err="1"/>
+              <a:t>TextPrompt</a:t>
+            </a:r>
+            <a:r>
+              <a:rPr lang="en-US" sz="2400" b="1" dirty="0"/>
+              <a:t>: </a:t>
+            </a:r>
+            <a:r>
+              <a:rPr lang="en-US" sz="2400" b="1" dirty="0" err="1"/>
+              <a:t>Enviar</a:t>
+            </a:r>
+            <a:r>
+              <a:rPr lang="en-US" sz="2400" b="1" dirty="0"/>
+              <a:t> </a:t>
+            </a:r>
+            <a:r>
+              <a:rPr lang="en-US" sz="2400" b="1" dirty="0" err="1"/>
+              <a:t>Texto</a:t>
+            </a:r>
+            <a:endParaRPr lang="en-US" sz="2400" b="1" dirty="0"/>
+          </a:p>
+          <a:p>
+            <a:pPr marL="800100" lvl="1" indent="-342900">
+              <a:buFont typeface="Arial" panose="020B0604020202020204" pitchFamily="34" charset="0"/>
+              <a:buChar char="•"/>
+            </a:pPr>
+            <a:endParaRPr lang="en-US" sz="2400" b="1" dirty="0"/>
+          </a:p>
+        </p:txBody>
+      </p:sp>
+    </p:spTree>
+    <p:extLst>
+      <p:ext uri="{BB962C8B-B14F-4D97-AF65-F5344CB8AC3E}">
+        <p14:creationId xmlns:p14="http://schemas.microsoft.com/office/powerpoint/2010/main" val="3622522708"/>
+      </p:ext>
+    </p:extLst>
+  </p:cSld>
+  <p:clrMapOvr>
+    <a:masterClrMapping/>
+  </p:clrMapOvr>
+</p:sld>
+</file>
+
+<file path=ppt/slides/slide37.xml><?xml version="1.0" encoding="utf-8"?>
+<p:sld xmlns:a="http://schemas.openxmlformats.org/drawingml/2006/main" xmlns:r="http://schemas.openxmlformats.org/officeDocument/2006/relationships" xmlns:p="http://schemas.openxmlformats.org/presentationml/2006/main">
+  <p:cSld>
+    <p:spTree>
+      <p:nvGrpSpPr>
+        <p:cNvPr id="1" name=""/>
+        <p:cNvGrpSpPr/>
+        <p:nvPr/>
+      </p:nvGrpSpPr>
+      <p:grpSpPr>
+        <a:xfrm>
+          <a:off x="0" y="0"/>
+          <a:ext cx="0" cy="0"/>
+          <a:chOff x="0" y="0"/>
+          <a:chExt cx="0" cy="0"/>
+        </a:xfrm>
+      </p:grpSpPr>
+      <p:sp>
+        <p:nvSpPr>
+          <p:cNvPr id="4" name="Título 1">
+            <a:extLst>
+              <a:ext uri="{FF2B5EF4-FFF2-40B4-BE49-F238E27FC236}">
+                <a16:creationId xmlns:a16="http://schemas.microsoft.com/office/drawing/2014/main" id="{779F22FD-3BF1-4795-A8BF-4E554485D909}"/>
+              </a:ext>
+            </a:extLst>
+          </p:cNvPr>
+          <p:cNvSpPr>
+            <a:spLocks noGrp="1"/>
+          </p:cNvSpPr>
+          <p:nvPr>
+            <p:ph type="title"/>
+          </p:nvPr>
+        </p:nvSpPr>
+        <p:spPr>
+          <a:xfrm>
+            <a:off x="457200" y="274638"/>
+            <a:ext cx="7467600" cy="1143000"/>
+          </a:xfrm>
+        </p:spPr>
+        <p:txBody>
+          <a:bodyPr/>
+          <a:lstStyle/>
+          <a:p>
+            <a:r>
+              <a:rPr lang="en-US" dirty="0" err="1"/>
+              <a:t>Montagem</a:t>
+            </a:r>
+            <a:r>
+              <a:rPr lang="en-US" dirty="0"/>
+              <a:t> do </a:t>
+            </a:r>
+            <a:r>
+              <a:rPr lang="en-US" dirty="0" err="1"/>
+              <a:t>Formulário</a:t>
+            </a:r>
+            <a:r>
+              <a:rPr lang="en-US" dirty="0"/>
+              <a:t> – </a:t>
+            </a:r>
+            <a:br>
+              <a:rPr lang="en-US" dirty="0"/>
+            </a:br>
+            <a:r>
+              <a:rPr lang="en-US" dirty="0"/>
+              <a:t>Unit chat</a:t>
+            </a:r>
+            <a:endParaRPr lang="pt-BR" dirty="0"/>
+          </a:p>
+        </p:txBody>
+      </p:sp>
+      <p:pic>
+        <p:nvPicPr>
+          <p:cNvPr id="6" name="Imagem 5">
+            <a:extLst>
+              <a:ext uri="{FF2B5EF4-FFF2-40B4-BE49-F238E27FC236}">
+                <a16:creationId xmlns:a16="http://schemas.microsoft.com/office/drawing/2014/main" id="{F12010AD-ABCC-41BF-9ED2-6A6D7C1A05DD}"/>
+              </a:ext>
+            </a:extLst>
+          </p:cNvPr>
+          <p:cNvPicPr>
+            <a:picLocks noChangeAspect="1"/>
+          </p:cNvPicPr>
+          <p:nvPr/>
+        </p:nvPicPr>
+        <p:blipFill>
+          <a:blip r:embed="rId2"/>
+          <a:stretch>
+            <a:fillRect/>
+          </a:stretch>
+        </p:blipFill>
+        <p:spPr>
+          <a:xfrm>
+            <a:off x="609600" y="1600200"/>
+            <a:ext cx="6286500" cy="4781550"/>
+          </a:xfrm>
+          <a:prstGeom prst="rect">
+            <a:avLst/>
+          </a:prstGeom>
+        </p:spPr>
+      </p:pic>
+    </p:spTree>
+    <p:extLst>
+      <p:ext uri="{BB962C8B-B14F-4D97-AF65-F5344CB8AC3E}">
+        <p14:creationId xmlns:p14="http://schemas.microsoft.com/office/powerpoint/2010/main" val="1930601240"/>
       </p:ext>
     </p:extLst>
   </p:cSld>
@@ -9467,8 +13445,8 @@
         </p:nvSpPr>
         <p:spPr>
           <a:xfrm>
-            <a:off x="609600" y="1600200"/>
-            <a:ext cx="7924800" cy="2677656"/>
+            <a:off x="457200" y="1483974"/>
+            <a:ext cx="7924800" cy="3046988"/>
           </a:xfrm>
           <a:prstGeom prst="rect">
             <a:avLst/>
@@ -9592,8 +13570,22 @@
               <a:buChar char="•"/>
             </a:pPr>
             <a:r>
+              <a:rPr lang="en-US" sz="2400" b="1" dirty="0" err="1"/>
+              <a:t>AutoSize</a:t>
+            </a:r>
+            <a:r>
               <a:rPr lang="en-US" sz="2400" b="1" dirty="0"/>
-              <a:t>Width: 192</a:t>
+              <a:t>: True</a:t>
+            </a:r>
+          </a:p>
+          <a:p>
+            <a:pPr marL="742950" lvl="1" indent="-285750">
+              <a:buFont typeface="Arial" panose="020B0604020202020204" pitchFamily="34" charset="0"/>
+              <a:buChar char="•"/>
+            </a:pPr>
+            <a:r>
+              <a:rPr lang="en-US" sz="2400" b="1" dirty="0"/>
+              <a:t>Margins -&gt; Left: -45</a:t>
             </a:r>
           </a:p>
         </p:txBody>
@@ -9612,7 +13604,7 @@
         </p:nvSpPr>
         <p:spPr>
           <a:xfrm>
-            <a:off x="457200" y="4460418"/>
+            <a:off x="457200" y="4624492"/>
             <a:ext cx="7924800" cy="1938992"/>
           </a:xfrm>
           <a:prstGeom prst="rect">

</xml_diff>

<commit_message>
Form Servicos done and Windows started, Slides updated according to development
</commit_message>
<xml_diff>
--- a/Stuff/Conexão Bluetooth usando Delphi.pptx
+++ b/Stuff/Conexão Bluetooth usando Delphi.pptx
@@ -4,6 +4,9 @@
   <p:sldMasterIdLst>
     <p:sldMasterId id="2147483696" r:id="rId1"/>
   </p:sldMasterIdLst>
+  <p:notesMasterIdLst>
+    <p:notesMasterId r:id="rId75"/>
+  </p:notesMasterIdLst>
   <p:sldIdLst>
     <p:sldId id="256" r:id="rId2"/>
     <p:sldId id="257" r:id="rId3"/>
@@ -64,6 +67,20 @@
     <p:sldId id="313" r:id="rId58"/>
     <p:sldId id="314" r:id="rId59"/>
     <p:sldId id="315" r:id="rId60"/>
+    <p:sldId id="316" r:id="rId61"/>
+    <p:sldId id="317" r:id="rId62"/>
+    <p:sldId id="318" r:id="rId63"/>
+    <p:sldId id="319" r:id="rId64"/>
+    <p:sldId id="320" r:id="rId65"/>
+    <p:sldId id="321" r:id="rId66"/>
+    <p:sldId id="322" r:id="rId67"/>
+    <p:sldId id="323" r:id="rId68"/>
+    <p:sldId id="324" r:id="rId69"/>
+    <p:sldId id="325" r:id="rId70"/>
+    <p:sldId id="326" r:id="rId71"/>
+    <p:sldId id="327" r:id="rId72"/>
+    <p:sldId id="328" r:id="rId73"/>
+    <p:sldId id="329" r:id="rId74"/>
   </p:sldIdLst>
   <p:sldSz cx="9144000" cy="6858000" type="screen4x3"/>
   <p:notesSz cx="6858000" cy="9144000"/>
@@ -207,6 +224,356 @@
 </p:cmLst>
 </file>
 
+<file path=ppt/notesMasters/notesMaster1.xml><?xml version="1.0" encoding="utf-8"?>
+<p:notesMaster xmlns:a="http://schemas.openxmlformats.org/drawingml/2006/main" xmlns:r="http://schemas.openxmlformats.org/officeDocument/2006/relationships" xmlns:p="http://schemas.openxmlformats.org/presentationml/2006/main">
+  <p:cSld>
+    <p:bg>
+      <p:bgRef idx="1001">
+        <a:schemeClr val="bg1"/>
+      </p:bgRef>
+    </p:bg>
+    <p:spTree>
+      <p:nvGrpSpPr>
+        <p:cNvPr id="1" name=""/>
+        <p:cNvGrpSpPr/>
+        <p:nvPr/>
+      </p:nvGrpSpPr>
+      <p:grpSpPr>
+        <a:xfrm>
+          <a:off x="0" y="0"/>
+          <a:ext cx="0" cy="0"/>
+          <a:chOff x="0" y="0"/>
+          <a:chExt cx="0" cy="0"/>
+        </a:xfrm>
+      </p:grpSpPr>
+      <p:sp>
+        <p:nvSpPr>
+          <p:cNvPr id="2" name="Espaço Reservado para Cabeçalho 1"/>
+          <p:cNvSpPr>
+            <a:spLocks noGrp="1"/>
+          </p:cNvSpPr>
+          <p:nvPr>
+            <p:ph type="hdr" sz="quarter"/>
+          </p:nvPr>
+        </p:nvSpPr>
+        <p:spPr>
+          <a:xfrm>
+            <a:off x="0" y="0"/>
+            <a:ext cx="2971800" cy="458788"/>
+          </a:xfrm>
+          <a:prstGeom prst="rect">
+            <a:avLst/>
+          </a:prstGeom>
+        </p:spPr>
+        <p:txBody>
+          <a:bodyPr vert="horz" lIns="91440" tIns="45720" rIns="91440" bIns="45720" rtlCol="0"/>
+          <a:lstStyle>
+            <a:lvl1pPr algn="l">
+              <a:defRPr sz="1200"/>
+            </a:lvl1pPr>
+          </a:lstStyle>
+          <a:p>
+            <a:endParaRPr lang="en-US"/>
+          </a:p>
+        </p:txBody>
+      </p:sp>
+      <p:sp>
+        <p:nvSpPr>
+          <p:cNvPr id="3" name="Espaço Reservado para Data 2"/>
+          <p:cNvSpPr>
+            <a:spLocks noGrp="1"/>
+          </p:cNvSpPr>
+          <p:nvPr>
+            <p:ph type="dt" idx="1"/>
+          </p:nvPr>
+        </p:nvSpPr>
+        <p:spPr>
+          <a:xfrm>
+            <a:off x="3884613" y="0"/>
+            <a:ext cx="2971800" cy="458788"/>
+          </a:xfrm>
+          <a:prstGeom prst="rect">
+            <a:avLst/>
+          </a:prstGeom>
+        </p:spPr>
+        <p:txBody>
+          <a:bodyPr vert="horz" lIns="91440" tIns="45720" rIns="91440" bIns="45720" rtlCol="0"/>
+          <a:lstStyle>
+            <a:lvl1pPr algn="r">
+              <a:defRPr sz="1200"/>
+            </a:lvl1pPr>
+          </a:lstStyle>
+          <a:p>
+            <a:fld id="{05C14C5D-2598-4DBB-BB00-F688C4C61F1C}" type="datetimeFigureOut">
+              <a:rPr lang="en-US" smtClean="0"/>
+              <a:t>9/9/2021</a:t>
+            </a:fld>
+            <a:endParaRPr lang="en-US"/>
+          </a:p>
+        </p:txBody>
+      </p:sp>
+      <p:sp>
+        <p:nvSpPr>
+          <p:cNvPr id="4" name="Espaço Reservado para Imagem de Slide 3"/>
+          <p:cNvSpPr>
+            <a:spLocks noGrp="1" noRot="1" noChangeAspect="1"/>
+          </p:cNvSpPr>
+          <p:nvPr>
+            <p:ph type="sldImg" idx="2"/>
+          </p:nvPr>
+        </p:nvSpPr>
+        <p:spPr>
+          <a:xfrm>
+            <a:off x="1371600" y="1143000"/>
+            <a:ext cx="4114800" cy="3086100"/>
+          </a:xfrm>
+          <a:prstGeom prst="rect">
+            <a:avLst/>
+          </a:prstGeom>
+          <a:noFill/>
+          <a:ln w="12700">
+            <a:solidFill>
+              <a:prstClr val="black"/>
+            </a:solidFill>
+          </a:ln>
+        </p:spPr>
+        <p:txBody>
+          <a:bodyPr vert="horz" lIns="91440" tIns="45720" rIns="91440" bIns="45720" rtlCol="0" anchor="ctr"/>
+          <a:lstStyle/>
+          <a:p>
+            <a:endParaRPr lang="en-US"/>
+          </a:p>
+        </p:txBody>
+      </p:sp>
+      <p:sp>
+        <p:nvSpPr>
+          <p:cNvPr id="5" name="Espaço Reservado para Anotações 4"/>
+          <p:cNvSpPr>
+            <a:spLocks noGrp="1"/>
+          </p:cNvSpPr>
+          <p:nvPr>
+            <p:ph type="body" sz="quarter" idx="3"/>
+          </p:nvPr>
+        </p:nvSpPr>
+        <p:spPr>
+          <a:xfrm>
+            <a:off x="685800" y="4400550"/>
+            <a:ext cx="5486400" cy="3600450"/>
+          </a:xfrm>
+          <a:prstGeom prst="rect">
+            <a:avLst/>
+          </a:prstGeom>
+        </p:spPr>
+        <p:txBody>
+          <a:bodyPr vert="horz" lIns="91440" tIns="45720" rIns="91440" bIns="45720" rtlCol="0"/>
+          <a:lstStyle/>
+          <a:p>
+            <a:pPr lvl="0"/>
+            <a:r>
+              <a:rPr lang="pt-BR"/>
+              <a:t>Clique para editar os estilos de texto Mestres</a:t>
+            </a:r>
+          </a:p>
+          <a:p>
+            <a:pPr lvl="1"/>
+            <a:r>
+              <a:rPr lang="pt-BR"/>
+              <a:t>Segundo nível</a:t>
+            </a:r>
+          </a:p>
+          <a:p>
+            <a:pPr lvl="2"/>
+            <a:r>
+              <a:rPr lang="pt-BR"/>
+              <a:t>Terceiro nível</a:t>
+            </a:r>
+          </a:p>
+          <a:p>
+            <a:pPr lvl="3"/>
+            <a:r>
+              <a:rPr lang="pt-BR"/>
+              <a:t>Quarto nível</a:t>
+            </a:r>
+          </a:p>
+          <a:p>
+            <a:pPr lvl="4"/>
+            <a:r>
+              <a:rPr lang="pt-BR"/>
+              <a:t>Quinto nível</a:t>
+            </a:r>
+            <a:endParaRPr lang="en-US"/>
+          </a:p>
+        </p:txBody>
+      </p:sp>
+      <p:sp>
+        <p:nvSpPr>
+          <p:cNvPr id="6" name="Espaço Reservado para Rodapé 5"/>
+          <p:cNvSpPr>
+            <a:spLocks noGrp="1"/>
+          </p:cNvSpPr>
+          <p:nvPr>
+            <p:ph type="ftr" sz="quarter" idx="4"/>
+          </p:nvPr>
+        </p:nvSpPr>
+        <p:spPr>
+          <a:xfrm>
+            <a:off x="0" y="8685213"/>
+            <a:ext cx="2971800" cy="458787"/>
+          </a:xfrm>
+          <a:prstGeom prst="rect">
+            <a:avLst/>
+          </a:prstGeom>
+        </p:spPr>
+        <p:txBody>
+          <a:bodyPr vert="horz" lIns="91440" tIns="45720" rIns="91440" bIns="45720" rtlCol="0" anchor="b"/>
+          <a:lstStyle>
+            <a:lvl1pPr algn="l">
+              <a:defRPr sz="1200"/>
+            </a:lvl1pPr>
+          </a:lstStyle>
+          <a:p>
+            <a:endParaRPr lang="en-US"/>
+          </a:p>
+        </p:txBody>
+      </p:sp>
+      <p:sp>
+        <p:nvSpPr>
+          <p:cNvPr id="7" name="Espaço Reservado para Número de Slide 6"/>
+          <p:cNvSpPr>
+            <a:spLocks noGrp="1"/>
+          </p:cNvSpPr>
+          <p:nvPr>
+            <p:ph type="sldNum" sz="quarter" idx="5"/>
+          </p:nvPr>
+        </p:nvSpPr>
+        <p:spPr>
+          <a:xfrm>
+            <a:off x="3884613" y="8685213"/>
+            <a:ext cx="2971800" cy="458787"/>
+          </a:xfrm>
+          <a:prstGeom prst="rect">
+            <a:avLst/>
+          </a:prstGeom>
+        </p:spPr>
+        <p:txBody>
+          <a:bodyPr vert="horz" lIns="91440" tIns="45720" rIns="91440" bIns="45720" rtlCol="0" anchor="b"/>
+          <a:lstStyle>
+            <a:lvl1pPr algn="r">
+              <a:defRPr sz="1200"/>
+            </a:lvl1pPr>
+          </a:lstStyle>
+          <a:p>
+            <a:fld id="{773D4B39-828C-43A4-9E28-B4846EAA4E17}" type="slidenum">
+              <a:rPr lang="en-US" smtClean="0"/>
+              <a:t>‹nº›</a:t>
+            </a:fld>
+            <a:endParaRPr lang="en-US"/>
+          </a:p>
+        </p:txBody>
+      </p:sp>
+    </p:spTree>
+    <p:extLst>
+      <p:ext uri="{BB962C8B-B14F-4D97-AF65-F5344CB8AC3E}">
+        <p14:creationId xmlns:p14="http://schemas.microsoft.com/office/powerpoint/2010/main" val="3202245767"/>
+      </p:ext>
+    </p:extLst>
+  </p:cSld>
+  <p:clrMap bg1="lt1" tx1="dk1" bg2="lt2" tx2="dk2" accent1="accent1" accent2="accent2" accent3="accent3" accent4="accent4" accent5="accent5" accent6="accent6" hlink="hlink" folHlink="folHlink"/>
+  <p:notesStyle>
+    <a:lvl1pPr marL="0" algn="l" defTabSz="914400" rtl="0" eaLnBrk="1" latinLnBrk="0" hangingPunct="1">
+      <a:defRPr sz="1200" kern="1200">
+        <a:solidFill>
+          <a:schemeClr val="tx1"/>
+        </a:solidFill>
+        <a:latin typeface="+mn-lt"/>
+        <a:ea typeface="+mn-ea"/>
+        <a:cs typeface="+mn-cs"/>
+      </a:defRPr>
+    </a:lvl1pPr>
+    <a:lvl2pPr marL="457200" algn="l" defTabSz="914400" rtl="0" eaLnBrk="1" latinLnBrk="0" hangingPunct="1">
+      <a:defRPr sz="1200" kern="1200">
+        <a:solidFill>
+          <a:schemeClr val="tx1"/>
+        </a:solidFill>
+        <a:latin typeface="+mn-lt"/>
+        <a:ea typeface="+mn-ea"/>
+        <a:cs typeface="+mn-cs"/>
+      </a:defRPr>
+    </a:lvl2pPr>
+    <a:lvl3pPr marL="914400" algn="l" defTabSz="914400" rtl="0" eaLnBrk="1" latinLnBrk="0" hangingPunct="1">
+      <a:defRPr sz="1200" kern="1200">
+        <a:solidFill>
+          <a:schemeClr val="tx1"/>
+        </a:solidFill>
+        <a:latin typeface="+mn-lt"/>
+        <a:ea typeface="+mn-ea"/>
+        <a:cs typeface="+mn-cs"/>
+      </a:defRPr>
+    </a:lvl3pPr>
+    <a:lvl4pPr marL="1371600" algn="l" defTabSz="914400" rtl="0" eaLnBrk="1" latinLnBrk="0" hangingPunct="1">
+      <a:defRPr sz="1200" kern="1200">
+        <a:solidFill>
+          <a:schemeClr val="tx1"/>
+        </a:solidFill>
+        <a:latin typeface="+mn-lt"/>
+        <a:ea typeface="+mn-ea"/>
+        <a:cs typeface="+mn-cs"/>
+      </a:defRPr>
+    </a:lvl4pPr>
+    <a:lvl5pPr marL="1828800" algn="l" defTabSz="914400" rtl="0" eaLnBrk="1" latinLnBrk="0" hangingPunct="1">
+      <a:defRPr sz="1200" kern="1200">
+        <a:solidFill>
+          <a:schemeClr val="tx1"/>
+        </a:solidFill>
+        <a:latin typeface="+mn-lt"/>
+        <a:ea typeface="+mn-ea"/>
+        <a:cs typeface="+mn-cs"/>
+      </a:defRPr>
+    </a:lvl5pPr>
+    <a:lvl6pPr marL="2286000" algn="l" defTabSz="914400" rtl="0" eaLnBrk="1" latinLnBrk="0" hangingPunct="1">
+      <a:defRPr sz="1200" kern="1200">
+        <a:solidFill>
+          <a:schemeClr val="tx1"/>
+        </a:solidFill>
+        <a:latin typeface="+mn-lt"/>
+        <a:ea typeface="+mn-ea"/>
+        <a:cs typeface="+mn-cs"/>
+      </a:defRPr>
+    </a:lvl6pPr>
+    <a:lvl7pPr marL="2743200" algn="l" defTabSz="914400" rtl="0" eaLnBrk="1" latinLnBrk="0" hangingPunct="1">
+      <a:defRPr sz="1200" kern="1200">
+        <a:solidFill>
+          <a:schemeClr val="tx1"/>
+        </a:solidFill>
+        <a:latin typeface="+mn-lt"/>
+        <a:ea typeface="+mn-ea"/>
+        <a:cs typeface="+mn-cs"/>
+      </a:defRPr>
+    </a:lvl7pPr>
+    <a:lvl8pPr marL="3200400" algn="l" defTabSz="914400" rtl="0" eaLnBrk="1" latinLnBrk="0" hangingPunct="1">
+      <a:defRPr sz="1200" kern="1200">
+        <a:solidFill>
+          <a:schemeClr val="tx1"/>
+        </a:solidFill>
+        <a:latin typeface="+mn-lt"/>
+        <a:ea typeface="+mn-ea"/>
+        <a:cs typeface="+mn-cs"/>
+      </a:defRPr>
+    </a:lvl8pPr>
+    <a:lvl9pPr marL="3657600" algn="l" defTabSz="914400" rtl="0" eaLnBrk="1" latinLnBrk="0" hangingPunct="1">
+      <a:defRPr sz="1200" kern="1200">
+        <a:solidFill>
+          <a:schemeClr val="tx1"/>
+        </a:solidFill>
+        <a:latin typeface="+mn-lt"/>
+        <a:ea typeface="+mn-ea"/>
+        <a:cs typeface="+mn-cs"/>
+      </a:defRPr>
+    </a:lvl9pPr>
+  </p:notesStyle>
+</p:notesMaster>
+</file>
+
 <file path=ppt/slideLayouts/slideLayout1.xml><?xml version="1.0" encoding="utf-8"?>
 <p:sldLayout xmlns:a="http://schemas.openxmlformats.org/drawingml/2006/main" xmlns:r="http://schemas.openxmlformats.org/officeDocument/2006/relationships" xmlns:p="http://schemas.openxmlformats.org/presentationml/2006/main" showMasterSp="0" type="title" preserve="1">
   <p:cSld name="Slide de título">
@@ -344,7 +711,7 @@
           <a:p>
             <a:fld id="{715CD462-00F3-4312-AF53-03FBFE4C9BB8}" type="datetimeFigureOut">
               <a:rPr lang="pt-BR" smtClean="0"/>
-              <a:t>08/09/2021</a:t>
+              <a:t>09/09/2021</a:t>
             </a:fld>
             <a:endParaRPr lang="pt-BR"/>
           </a:p>
@@ -1213,7 +1580,7 @@
           <a:p>
             <a:fld id="{715CD462-00F3-4312-AF53-03FBFE4C9BB8}" type="datetimeFigureOut">
               <a:rPr lang="pt-BR" smtClean="0"/>
-              <a:t>08/09/2021</a:t>
+              <a:t>09/09/2021</a:t>
             </a:fld>
             <a:endParaRPr lang="pt-BR"/>
           </a:p>
@@ -1388,7 +1755,7 @@
           <a:p>
             <a:fld id="{715CD462-00F3-4312-AF53-03FBFE4C9BB8}" type="datetimeFigureOut">
               <a:rPr lang="pt-BR" smtClean="0"/>
-              <a:t>08/09/2021</a:t>
+              <a:t>09/09/2021</a:t>
             </a:fld>
             <a:endParaRPr lang="pt-BR"/>
           </a:p>
@@ -1558,7 +1925,7 @@
           <a:p>
             <a:fld id="{715CD462-00F3-4312-AF53-03FBFE4C9BB8}" type="datetimeFigureOut">
               <a:rPr lang="pt-BR" smtClean="0"/>
-              <a:t>08/09/2021</a:t>
+              <a:t>09/09/2021</a:t>
             </a:fld>
             <a:endParaRPr lang="pt-BR"/>
           </a:p>
@@ -1768,7 +2135,7 @@
           <a:p>
             <a:fld id="{715CD462-00F3-4312-AF53-03FBFE4C9BB8}" type="datetimeFigureOut">
               <a:rPr lang="pt-BR" smtClean="0"/>
-              <a:t>08/09/2021</a:t>
+              <a:t>09/09/2021</a:t>
             </a:fld>
             <a:endParaRPr lang="pt-BR"/>
           </a:p>
@@ -2582,7 +2949,7 @@
           <a:p>
             <a:fld id="{715CD462-00F3-4312-AF53-03FBFE4C9BB8}" type="datetimeFigureOut">
               <a:rPr lang="pt-BR" smtClean="0"/>
-              <a:t>08/09/2021</a:t>
+              <a:t>09/09/2021</a:t>
             </a:fld>
             <a:endParaRPr lang="pt-BR"/>
           </a:p>
@@ -2818,7 +3185,7 @@
           <a:p>
             <a:fld id="{715CD462-00F3-4312-AF53-03FBFE4C9BB8}" type="datetimeFigureOut">
               <a:rPr lang="pt-BR" smtClean="0"/>
-              <a:t>08/09/2021</a:t>
+              <a:t>09/09/2021</a:t>
             </a:fld>
             <a:endParaRPr lang="pt-BR"/>
           </a:p>
@@ -3141,7 +3508,7 @@
           <a:p>
             <a:fld id="{715CD462-00F3-4312-AF53-03FBFE4C9BB8}" type="datetimeFigureOut">
               <a:rPr lang="pt-BR" smtClean="0"/>
-              <a:t>08/09/2021</a:t>
+              <a:t>09/09/2021</a:t>
             </a:fld>
             <a:endParaRPr lang="pt-BR"/>
           </a:p>
@@ -3231,7 +3598,7 @@
           <a:p>
             <a:fld id="{715CD462-00F3-4312-AF53-03FBFE4C9BB8}" type="datetimeFigureOut">
               <a:rPr lang="pt-BR" smtClean="0"/>
-              <a:t>08/09/2021</a:t>
+              <a:t>09/09/2021</a:t>
             </a:fld>
             <a:endParaRPr lang="pt-BR"/>
           </a:p>
@@ -3748,7 +4115,7 @@
           <a:p>
             <a:fld id="{715CD462-00F3-4312-AF53-03FBFE4C9BB8}" type="datetimeFigureOut">
               <a:rPr lang="pt-BR" smtClean="0"/>
-              <a:t>08/09/2021</a:t>
+              <a:t>09/09/2021</a:t>
             </a:fld>
             <a:endParaRPr lang="pt-BR"/>
           </a:p>
@@ -4259,7 +4626,7 @@
           <a:p>
             <a:fld id="{715CD462-00F3-4312-AF53-03FBFE4C9BB8}" type="datetimeFigureOut">
               <a:rPr lang="pt-BR" smtClean="0"/>
-              <a:t>08/09/2021</a:t>
+              <a:t>09/09/2021</a:t>
             </a:fld>
             <a:endParaRPr lang="pt-BR"/>
           </a:p>
@@ -4504,7 +4871,7 @@
           <a:p>
             <a:fld id="{715CD462-00F3-4312-AF53-03FBFE4C9BB8}" type="datetimeFigureOut">
               <a:rPr lang="pt-BR" smtClean="0"/>
-              <a:t>08/09/2021</a:t>
+              <a:t>09/09/2021</a:t>
             </a:fld>
             <a:endParaRPr lang="pt-BR"/>
           </a:p>
@@ -13373,8 +13740,8 @@
         </p:nvSpPr>
         <p:spPr>
           <a:xfrm>
-            <a:off x="3085095" y="4432637"/>
-            <a:ext cx="4839705" cy="1569660"/>
+            <a:off x="3085095" y="4450140"/>
+            <a:ext cx="5296905" cy="1569660"/>
           </a:xfrm>
           <a:prstGeom prst="rect">
             <a:avLst/>
@@ -13426,7 +13793,17 @@
               <a:buChar char="•"/>
             </a:pPr>
             <a:r>
-              <a:rPr lang="en-US" sz="2400" dirty="0"/>
+              <a:rPr lang="en-US" sz="2400" b="1" dirty="0"/>
+              <a:t>Align: Top</a:t>
+            </a:r>
+          </a:p>
+          <a:p>
+            <a:pPr marL="800100" lvl="1" indent="-342900">
+              <a:buFont typeface="Arial" panose="020B0604020202020204" pitchFamily="34" charset="0"/>
+              <a:buChar char="•"/>
+            </a:pPr>
+            <a:r>
+              <a:rPr lang="en-US" sz="2400" b="1" dirty="0"/>
               <a:t>Fill -&gt; Color: #FFFFBA06</a:t>
             </a:r>
           </a:p>
@@ -19371,6 +19748,264 @@
           <a:chExt cx="0" cy="0"/>
         </a:xfrm>
       </p:grpSpPr>
+      <p:sp>
+        <p:nvSpPr>
+          <p:cNvPr id="2" name="Título 1">
+            <a:extLst>
+              <a:ext uri="{FF2B5EF4-FFF2-40B4-BE49-F238E27FC236}">
+                <a16:creationId xmlns:a16="http://schemas.microsoft.com/office/drawing/2014/main" id="{4E6E0B11-3D8E-45E1-8EEE-F0FAF3EE93AE}"/>
+              </a:ext>
+            </a:extLst>
+          </p:cNvPr>
+          <p:cNvSpPr>
+            <a:spLocks noGrp="1"/>
+          </p:cNvSpPr>
+          <p:nvPr>
+            <p:ph type="title"/>
+          </p:nvPr>
+        </p:nvSpPr>
+        <p:spPr>
+          <a:xfrm>
+            <a:off x="457200" y="274638"/>
+            <a:ext cx="7467600" cy="1143000"/>
+          </a:xfrm>
+        </p:spPr>
+        <p:txBody>
+          <a:bodyPr/>
+          <a:lstStyle/>
+          <a:p>
+            <a:r>
+              <a:rPr lang="en-US" dirty="0" err="1"/>
+              <a:t>Montagem</a:t>
+            </a:r>
+            <a:r>
+              <a:rPr lang="en-US" dirty="0"/>
+              <a:t> do </a:t>
+            </a:r>
+            <a:r>
+              <a:rPr lang="en-US" dirty="0" err="1"/>
+              <a:t>Formulário</a:t>
+            </a:r>
+            <a:r>
+              <a:rPr lang="en-US" dirty="0"/>
+              <a:t> – </a:t>
+            </a:r>
+            <a:br>
+              <a:rPr lang="en-US" dirty="0"/>
+            </a:br>
+            <a:r>
+              <a:rPr lang="en-US" dirty="0"/>
+              <a:t>Unit </a:t>
+            </a:r>
+            <a:r>
+              <a:rPr lang="en-US" dirty="0" err="1"/>
+              <a:t>servicos</a:t>
+            </a:r>
+            <a:endParaRPr lang="pt-BR" dirty="0"/>
+          </a:p>
+        </p:txBody>
+      </p:sp>
+      <p:pic>
+        <p:nvPicPr>
+          <p:cNvPr id="3" name="Imagem 2" descr="Tela de computador&#10;&#10;Descrição gerada automaticamente">
+            <a:extLst>
+              <a:ext uri="{FF2B5EF4-FFF2-40B4-BE49-F238E27FC236}">
+                <a16:creationId xmlns:a16="http://schemas.microsoft.com/office/drawing/2014/main" id="{38D7C96F-2B10-4509-B3B2-89D846523492}"/>
+              </a:ext>
+            </a:extLst>
+          </p:cNvPr>
+          <p:cNvPicPr>
+            <a:picLocks noChangeAspect="1"/>
+          </p:cNvPicPr>
+          <p:nvPr/>
+        </p:nvPicPr>
+        <p:blipFill>
+          <a:blip r:embed="rId2">
+            <a:extLst>
+              <a:ext uri="{28A0092B-C50C-407E-A947-70E740481C1C}">
+                <a14:useLocalDpi xmlns:a14="http://schemas.microsoft.com/office/drawing/2010/main" val="0"/>
+              </a:ext>
+            </a:extLst>
+          </a:blip>
+          <a:stretch>
+            <a:fillRect/>
+          </a:stretch>
+        </p:blipFill>
+        <p:spPr>
+          <a:xfrm>
+            <a:off x="3753678" y="1490007"/>
+            <a:ext cx="4343400" cy="3422313"/>
+          </a:xfrm>
+          <a:prstGeom prst="rect">
+            <a:avLst/>
+          </a:prstGeom>
+        </p:spPr>
+      </p:pic>
+      <p:sp>
+        <p:nvSpPr>
+          <p:cNvPr id="4" name="CaixaDeTexto 3">
+            <a:extLst>
+              <a:ext uri="{FF2B5EF4-FFF2-40B4-BE49-F238E27FC236}">
+                <a16:creationId xmlns:a16="http://schemas.microsoft.com/office/drawing/2014/main" id="{98F4D3BB-5E70-4C47-B804-37F8EF660CD6}"/>
+              </a:ext>
+            </a:extLst>
+          </p:cNvPr>
+          <p:cNvSpPr txBox="1"/>
+          <p:nvPr/>
+        </p:nvSpPr>
+        <p:spPr>
+          <a:xfrm>
+            <a:off x="228600" y="2209800"/>
+            <a:ext cx="3505200" cy="1938992"/>
+          </a:xfrm>
+          <a:prstGeom prst="rect">
+            <a:avLst/>
+          </a:prstGeom>
+          <a:noFill/>
+        </p:spPr>
+        <p:txBody>
+          <a:bodyPr wrap="square" rtlCol="0">
+            <a:spAutoFit/>
+          </a:bodyPr>
+          <a:lstStyle/>
+          <a:p>
+            <a:pPr marL="342900" indent="-342900">
+              <a:buFont typeface="Arial" panose="020B0604020202020204" pitchFamily="34" charset="0"/>
+              <a:buChar char="•"/>
+            </a:pPr>
+            <a:r>
+              <a:rPr lang="en-US" sz="2400" dirty="0" err="1"/>
+              <a:t>Adicione</a:t>
+            </a:r>
+            <a:r>
+              <a:rPr lang="en-US" sz="2400" dirty="0"/>
+              <a:t> um novo </a:t>
+            </a:r>
+            <a:r>
+              <a:rPr lang="en-US" sz="2400" dirty="0" err="1"/>
+              <a:t>formulário</a:t>
+            </a:r>
+            <a:r>
+              <a:rPr lang="en-US" sz="2400" dirty="0"/>
+              <a:t> </a:t>
+            </a:r>
+            <a:r>
+              <a:rPr lang="en-US" sz="2400" dirty="0" err="1"/>
+              <a:t>ao</a:t>
+            </a:r>
+            <a:r>
+              <a:rPr lang="en-US" sz="2400" dirty="0"/>
+              <a:t> </a:t>
+            </a:r>
+            <a:r>
+              <a:rPr lang="en-US" sz="2400" dirty="0" err="1"/>
+              <a:t>projeto</a:t>
+            </a:r>
+            <a:r>
+              <a:rPr lang="en-US" sz="2400" dirty="0"/>
+              <a:t>, com o </a:t>
+            </a:r>
+            <a:r>
+              <a:rPr lang="en-US" sz="2400" dirty="0" err="1"/>
+              <a:t>nome</a:t>
+            </a:r>
+            <a:r>
+              <a:rPr lang="en-US" sz="2400" dirty="0"/>
+              <a:t> </a:t>
+            </a:r>
+            <a:r>
+              <a:rPr lang="en-US" sz="2400" b="1" dirty="0" err="1"/>
+              <a:t>frmServicosU</a:t>
+            </a:r>
+            <a:endParaRPr lang="en-US" sz="2400" b="1" dirty="0"/>
+          </a:p>
+          <a:p>
+            <a:pPr marL="342900" indent="-342900">
+              <a:buFont typeface="Arial" panose="020B0604020202020204" pitchFamily="34" charset="0"/>
+              <a:buChar char="•"/>
+            </a:pPr>
+            <a:endParaRPr lang="en-US" sz="2400" b="1" dirty="0"/>
+          </a:p>
+        </p:txBody>
+      </p:sp>
+      <p:sp>
+        <p:nvSpPr>
+          <p:cNvPr id="5" name="CaixaDeTexto 4">
+            <a:extLst>
+              <a:ext uri="{FF2B5EF4-FFF2-40B4-BE49-F238E27FC236}">
+                <a16:creationId xmlns:a16="http://schemas.microsoft.com/office/drawing/2014/main" id="{FEB8434A-ABC8-44B0-9B39-37596ED0211A}"/>
+              </a:ext>
+            </a:extLst>
+          </p:cNvPr>
+          <p:cNvSpPr txBox="1"/>
+          <p:nvPr/>
+        </p:nvSpPr>
+        <p:spPr>
+          <a:xfrm>
+            <a:off x="443948" y="4873485"/>
+            <a:ext cx="4509052" cy="1200329"/>
+          </a:xfrm>
+          <a:prstGeom prst="rect">
+            <a:avLst/>
+          </a:prstGeom>
+          <a:noFill/>
+        </p:spPr>
+        <p:txBody>
+          <a:bodyPr wrap="square" rtlCol="0">
+            <a:spAutoFit/>
+          </a:bodyPr>
+          <a:lstStyle/>
+          <a:p>
+            <a:pPr marL="342900" indent="-342900">
+              <a:buFont typeface="Arial" panose="020B0604020202020204" pitchFamily="34" charset="0"/>
+              <a:buChar char="•"/>
+            </a:pPr>
+            <a:r>
+              <a:rPr lang="en-US" sz="2400" dirty="0"/>
+              <a:t>Configure o </a:t>
+            </a:r>
+            <a:r>
+              <a:rPr lang="en-US" sz="2400" dirty="0" err="1"/>
+              <a:t>formulário</a:t>
+            </a:r>
+            <a:r>
+              <a:rPr lang="en-US" sz="2400" dirty="0"/>
+              <a:t> </a:t>
+            </a:r>
+            <a:r>
+              <a:rPr lang="en-US" sz="2400" dirty="0" err="1"/>
+              <a:t>como</a:t>
+            </a:r>
+            <a:r>
+              <a:rPr lang="en-US" sz="2400" dirty="0"/>
+              <a:t> </a:t>
+            </a:r>
+            <a:r>
+              <a:rPr lang="en-US" sz="2400" dirty="0" err="1"/>
+              <a:t>abaixo</a:t>
+            </a:r>
+            <a:r>
+              <a:rPr lang="en-US" sz="2400" dirty="0"/>
+              <a:t>:</a:t>
+            </a:r>
+          </a:p>
+          <a:p>
+            <a:pPr marL="800100" lvl="1" indent="-342900">
+              <a:buFont typeface="Arial" panose="020B0604020202020204" pitchFamily="34" charset="0"/>
+              <a:buChar char="•"/>
+            </a:pPr>
+            <a:r>
+              <a:rPr lang="en-US" sz="2400" b="1" dirty="0"/>
+              <a:t>Name: </a:t>
+            </a:r>
+            <a:r>
+              <a:rPr lang="en-US" sz="2400" b="1" dirty="0" err="1"/>
+              <a:t>frmServicos</a:t>
+            </a:r>
+            <a:endParaRPr lang="en-US" sz="2400" b="1" dirty="0"/>
+          </a:p>
+        </p:txBody>
+      </p:sp>
     </p:spTree>
     <p:extLst>
       <p:ext uri="{BB962C8B-B14F-4D97-AF65-F5344CB8AC3E}">
@@ -19755,6 +20390,2768 @@
 </p:sld>
 </file>
 
+<file path=ppt/slides/slide60.xml><?xml version="1.0" encoding="utf-8"?>
+<p:sld xmlns:a="http://schemas.openxmlformats.org/drawingml/2006/main" xmlns:r="http://schemas.openxmlformats.org/officeDocument/2006/relationships" xmlns:p="http://schemas.openxmlformats.org/presentationml/2006/main">
+  <p:cSld>
+    <p:spTree>
+      <p:nvGrpSpPr>
+        <p:cNvPr id="1" name=""/>
+        <p:cNvGrpSpPr/>
+        <p:nvPr/>
+      </p:nvGrpSpPr>
+      <p:grpSpPr>
+        <a:xfrm>
+          <a:off x="0" y="0"/>
+          <a:ext cx="0" cy="0"/>
+          <a:chOff x="0" y="0"/>
+          <a:chExt cx="0" cy="0"/>
+        </a:xfrm>
+      </p:grpSpPr>
+      <p:sp>
+        <p:nvSpPr>
+          <p:cNvPr id="4" name="Título 1">
+            <a:extLst>
+              <a:ext uri="{FF2B5EF4-FFF2-40B4-BE49-F238E27FC236}">
+                <a16:creationId xmlns:a16="http://schemas.microsoft.com/office/drawing/2014/main" id="{BDF1B097-9023-4312-8E09-9652AC39ED1D}"/>
+              </a:ext>
+            </a:extLst>
+          </p:cNvPr>
+          <p:cNvSpPr>
+            <a:spLocks noGrp="1"/>
+          </p:cNvSpPr>
+          <p:nvPr>
+            <p:ph type="title"/>
+          </p:nvPr>
+        </p:nvSpPr>
+        <p:spPr>
+          <a:xfrm>
+            <a:off x="457200" y="274638"/>
+            <a:ext cx="7467600" cy="1143000"/>
+          </a:xfrm>
+        </p:spPr>
+        <p:txBody>
+          <a:bodyPr/>
+          <a:lstStyle/>
+          <a:p>
+            <a:r>
+              <a:rPr lang="en-US" dirty="0" err="1"/>
+              <a:t>Montagem</a:t>
+            </a:r>
+            <a:r>
+              <a:rPr lang="en-US" dirty="0"/>
+              <a:t> do </a:t>
+            </a:r>
+            <a:r>
+              <a:rPr lang="en-US" dirty="0" err="1"/>
+              <a:t>Formulário</a:t>
+            </a:r>
+            <a:r>
+              <a:rPr lang="en-US" dirty="0"/>
+              <a:t> – </a:t>
+            </a:r>
+            <a:br>
+              <a:rPr lang="en-US" dirty="0"/>
+            </a:br>
+            <a:r>
+              <a:rPr lang="en-US" dirty="0"/>
+              <a:t>Unit </a:t>
+            </a:r>
+            <a:r>
+              <a:rPr lang="en-US" dirty="0" err="1"/>
+              <a:t>servicos</a:t>
+            </a:r>
+            <a:endParaRPr lang="pt-BR" dirty="0"/>
+          </a:p>
+        </p:txBody>
+      </p:sp>
+      <p:sp>
+        <p:nvSpPr>
+          <p:cNvPr id="5" name="CaixaDeTexto 4">
+            <a:extLst>
+              <a:ext uri="{FF2B5EF4-FFF2-40B4-BE49-F238E27FC236}">
+                <a16:creationId xmlns:a16="http://schemas.microsoft.com/office/drawing/2014/main" id="{96B1B5BF-DF6E-445F-84B9-ECF9ACB61CA3}"/>
+              </a:ext>
+            </a:extLst>
+          </p:cNvPr>
+          <p:cNvSpPr txBox="1"/>
+          <p:nvPr/>
+        </p:nvSpPr>
+        <p:spPr>
+          <a:xfrm>
+            <a:off x="533400" y="1619071"/>
+            <a:ext cx="7924800" cy="1200329"/>
+          </a:xfrm>
+          <a:prstGeom prst="rect">
+            <a:avLst/>
+          </a:prstGeom>
+          <a:noFill/>
+        </p:spPr>
+        <p:txBody>
+          <a:bodyPr wrap="square" rtlCol="0">
+            <a:spAutoFit/>
+          </a:bodyPr>
+          <a:lstStyle/>
+          <a:p>
+            <a:pPr marL="342900" indent="-342900">
+              <a:buFont typeface="Arial" panose="020B0604020202020204" pitchFamily="34" charset="0"/>
+              <a:buChar char="•"/>
+            </a:pPr>
+            <a:r>
+              <a:rPr lang="en-US" sz="2400" dirty="0" err="1"/>
+              <a:t>Nesse</a:t>
+            </a:r>
+            <a:r>
+              <a:rPr lang="en-US" sz="2400" dirty="0"/>
+              <a:t> </a:t>
+            </a:r>
+            <a:r>
+              <a:rPr lang="en-US" sz="2400" dirty="0" err="1"/>
+              <a:t>formulário</a:t>
+            </a:r>
+            <a:r>
+              <a:rPr lang="en-US" sz="2400" dirty="0"/>
+              <a:t> </a:t>
+            </a:r>
+            <a:r>
+              <a:rPr lang="en-US" sz="2400" dirty="0" err="1"/>
+              <a:t>faremos</a:t>
+            </a:r>
+            <a:r>
+              <a:rPr lang="en-US" sz="2400" dirty="0"/>
+              <a:t> a </a:t>
+            </a:r>
+            <a:r>
+              <a:rPr lang="en-US" sz="2400" dirty="0" err="1"/>
+              <a:t>mesma</a:t>
+            </a:r>
+            <a:r>
+              <a:rPr lang="en-US" sz="2400" dirty="0"/>
+              <a:t> </a:t>
+            </a:r>
+            <a:r>
+              <a:rPr lang="en-US" sz="2400" dirty="0" err="1"/>
+              <a:t>coisa</a:t>
+            </a:r>
+            <a:r>
+              <a:rPr lang="en-US" sz="2400" dirty="0"/>
+              <a:t> do anterior, </a:t>
+            </a:r>
+            <a:r>
+              <a:rPr lang="en-US" sz="2400" dirty="0" err="1"/>
+              <a:t>apenas</a:t>
+            </a:r>
+            <a:r>
+              <a:rPr lang="en-US" sz="2400" dirty="0"/>
+              <a:t> </a:t>
+            </a:r>
+            <a:r>
+              <a:rPr lang="en-US" sz="2400" dirty="0" err="1"/>
+              <a:t>mudaremos</a:t>
+            </a:r>
+            <a:r>
+              <a:rPr lang="en-US" sz="2400" dirty="0"/>
+              <a:t> </a:t>
+            </a:r>
+            <a:r>
+              <a:rPr lang="en-US" sz="2400" dirty="0" err="1"/>
+              <a:t>algumas</a:t>
+            </a:r>
+            <a:r>
+              <a:rPr lang="en-US" sz="2400" dirty="0"/>
+              <a:t> </a:t>
+            </a:r>
+            <a:r>
+              <a:rPr lang="en-US" sz="2400" dirty="0" err="1"/>
+              <a:t>propriedades</a:t>
+            </a:r>
+            <a:r>
+              <a:rPr lang="en-US" sz="2400" dirty="0"/>
+              <a:t> dos </a:t>
+            </a:r>
+            <a:r>
+              <a:rPr lang="en-US" sz="2400" dirty="0" err="1"/>
+              <a:t>componentes</a:t>
+            </a:r>
+            <a:r>
+              <a:rPr lang="en-US" sz="2400" dirty="0"/>
+              <a:t> e </a:t>
+            </a:r>
+            <a:r>
+              <a:rPr lang="en-US" sz="2400" dirty="0" err="1"/>
+              <a:t>já</a:t>
+            </a:r>
+            <a:r>
+              <a:rPr lang="en-US" sz="2400" dirty="0"/>
+              <a:t> </a:t>
+            </a:r>
+            <a:r>
+              <a:rPr lang="en-US" sz="2400" dirty="0" err="1"/>
+              <a:t>teremos</a:t>
+            </a:r>
+            <a:r>
+              <a:rPr lang="en-US" sz="2400" dirty="0"/>
+              <a:t> um </a:t>
+            </a:r>
+            <a:r>
+              <a:rPr lang="en-US" sz="2400" dirty="0" err="1"/>
+              <a:t>formulário</a:t>
+            </a:r>
+            <a:r>
+              <a:rPr lang="en-US" sz="2400" dirty="0"/>
+              <a:t> pronto.</a:t>
+            </a:r>
+          </a:p>
+        </p:txBody>
+      </p:sp>
+      <p:pic>
+        <p:nvPicPr>
+          <p:cNvPr id="7" name="Imagem 6" descr="Tela de computador com texto preto sobre fundo branco&#10;&#10;Descrição gerada automaticamente">
+            <a:extLst>
+              <a:ext uri="{FF2B5EF4-FFF2-40B4-BE49-F238E27FC236}">
+                <a16:creationId xmlns:a16="http://schemas.microsoft.com/office/drawing/2014/main" id="{2C6C3871-3BC4-4770-8B8A-868D93FD7FAF}"/>
+              </a:ext>
+            </a:extLst>
+          </p:cNvPr>
+          <p:cNvPicPr>
+            <a:picLocks noChangeAspect="1"/>
+          </p:cNvPicPr>
+          <p:nvPr/>
+        </p:nvPicPr>
+        <p:blipFill>
+          <a:blip r:embed="rId2">
+            <a:extLst>
+              <a:ext uri="{28A0092B-C50C-407E-A947-70E740481C1C}">
+                <a14:useLocalDpi xmlns:a14="http://schemas.microsoft.com/office/drawing/2010/main" val="0"/>
+              </a:ext>
+            </a:extLst>
+          </a:blip>
+          <a:stretch>
+            <a:fillRect/>
+          </a:stretch>
+        </p:blipFill>
+        <p:spPr>
+          <a:xfrm>
+            <a:off x="533400" y="3429000"/>
+            <a:ext cx="2524125" cy="2695575"/>
+          </a:xfrm>
+          <a:prstGeom prst="rect">
+            <a:avLst/>
+          </a:prstGeom>
+        </p:spPr>
+      </p:pic>
+      <p:sp>
+        <p:nvSpPr>
+          <p:cNvPr id="8" name="CaixaDeTexto 7">
+            <a:extLst>
+              <a:ext uri="{FF2B5EF4-FFF2-40B4-BE49-F238E27FC236}">
+                <a16:creationId xmlns:a16="http://schemas.microsoft.com/office/drawing/2014/main" id="{0ADFD5E1-FE3F-45E7-AC81-1BD0F44218F3}"/>
+              </a:ext>
+            </a:extLst>
+          </p:cNvPr>
+          <p:cNvSpPr txBox="1"/>
+          <p:nvPr/>
+        </p:nvSpPr>
+        <p:spPr>
+          <a:xfrm>
+            <a:off x="3286126" y="3812233"/>
+            <a:ext cx="4876800" cy="1938992"/>
+          </a:xfrm>
+          <a:prstGeom prst="rect">
+            <a:avLst/>
+          </a:prstGeom>
+          <a:noFill/>
+        </p:spPr>
+        <p:txBody>
+          <a:bodyPr wrap="square" rtlCol="0">
+            <a:spAutoFit/>
+          </a:bodyPr>
+          <a:lstStyle/>
+          <a:p>
+            <a:pPr marL="342900" indent="-342900">
+              <a:buFont typeface="Arial" panose="020B0604020202020204" pitchFamily="34" charset="0"/>
+              <a:buChar char="•"/>
+            </a:pPr>
+            <a:r>
+              <a:rPr lang="en-US" sz="2400" dirty="0" err="1"/>
+              <a:t>Copie</a:t>
+            </a:r>
+            <a:r>
+              <a:rPr lang="en-US" sz="2400" dirty="0"/>
+              <a:t> </a:t>
+            </a:r>
+            <a:r>
+              <a:rPr lang="en-US" sz="2400" dirty="0" err="1"/>
+              <a:t>todos</a:t>
+            </a:r>
+            <a:r>
+              <a:rPr lang="en-US" sz="2400" dirty="0"/>
+              <a:t> </a:t>
+            </a:r>
+            <a:r>
+              <a:rPr lang="en-US" sz="2400" dirty="0" err="1"/>
+              <a:t>os</a:t>
+            </a:r>
+            <a:r>
+              <a:rPr lang="en-US" sz="2400" dirty="0"/>
+              <a:t> </a:t>
+            </a:r>
+            <a:r>
+              <a:rPr lang="en-US" sz="2400" dirty="0" err="1"/>
+              <a:t>componentes</a:t>
+            </a:r>
+            <a:r>
+              <a:rPr lang="en-US" sz="2400" dirty="0"/>
+              <a:t> do </a:t>
+            </a:r>
+            <a:r>
+              <a:rPr lang="en-US" sz="2400" dirty="0" err="1"/>
+              <a:t>formulário</a:t>
+            </a:r>
+            <a:r>
+              <a:rPr lang="en-US" sz="2400" dirty="0"/>
+              <a:t> </a:t>
+            </a:r>
+            <a:r>
+              <a:rPr lang="en-US" sz="2400" dirty="0" err="1"/>
+              <a:t>descoberta</a:t>
+            </a:r>
+            <a:endParaRPr lang="en-US" sz="2400" dirty="0"/>
+          </a:p>
+          <a:p>
+            <a:pPr marL="342900" indent="-342900">
+              <a:buFont typeface="Arial" panose="020B0604020202020204" pitchFamily="34" charset="0"/>
+              <a:buChar char="•"/>
+            </a:pPr>
+            <a:endParaRPr lang="en-US" sz="2400" dirty="0"/>
+          </a:p>
+          <a:p>
+            <a:pPr marL="342900" indent="-342900">
+              <a:buFont typeface="Arial" panose="020B0604020202020204" pitchFamily="34" charset="0"/>
+              <a:buChar char="•"/>
+            </a:pPr>
+            <a:r>
+              <a:rPr lang="en-US" sz="2400" dirty="0"/>
+              <a:t>Cole </a:t>
+            </a:r>
+            <a:r>
+              <a:rPr lang="en-US" sz="2400" dirty="0" err="1"/>
+              <a:t>os</a:t>
+            </a:r>
+            <a:r>
+              <a:rPr lang="en-US" sz="2400" dirty="0"/>
+              <a:t> </a:t>
+            </a:r>
+            <a:r>
+              <a:rPr lang="en-US" sz="2400" dirty="0" err="1"/>
+              <a:t>componentes</a:t>
+            </a:r>
+            <a:r>
+              <a:rPr lang="en-US" sz="2400" dirty="0"/>
+              <a:t> no </a:t>
+            </a:r>
+            <a:r>
+              <a:rPr lang="en-US" sz="2400" dirty="0" err="1"/>
+              <a:t>formulário</a:t>
+            </a:r>
+            <a:r>
+              <a:rPr lang="en-US" sz="2400" dirty="0"/>
+              <a:t> que </a:t>
+            </a:r>
+            <a:r>
+              <a:rPr lang="en-US" sz="2400" dirty="0" err="1"/>
+              <a:t>criamos</a:t>
+            </a:r>
+            <a:endParaRPr lang="en-US" sz="2400" dirty="0"/>
+          </a:p>
+        </p:txBody>
+      </p:sp>
+    </p:spTree>
+    <p:extLst>
+      <p:ext uri="{BB962C8B-B14F-4D97-AF65-F5344CB8AC3E}">
+        <p14:creationId xmlns:p14="http://schemas.microsoft.com/office/powerpoint/2010/main" val="2017728186"/>
+      </p:ext>
+    </p:extLst>
+  </p:cSld>
+  <p:clrMapOvr>
+    <a:masterClrMapping/>
+  </p:clrMapOvr>
+</p:sld>
+</file>
+
+<file path=ppt/slides/slide61.xml><?xml version="1.0" encoding="utf-8"?>
+<p:sld xmlns:a="http://schemas.openxmlformats.org/drawingml/2006/main" xmlns:r="http://schemas.openxmlformats.org/officeDocument/2006/relationships" xmlns:p="http://schemas.openxmlformats.org/presentationml/2006/main">
+  <p:cSld>
+    <p:spTree>
+      <p:nvGrpSpPr>
+        <p:cNvPr id="1" name=""/>
+        <p:cNvGrpSpPr/>
+        <p:nvPr/>
+      </p:nvGrpSpPr>
+      <p:grpSpPr>
+        <a:xfrm>
+          <a:off x="0" y="0"/>
+          <a:ext cx="0" cy="0"/>
+          <a:chOff x="0" y="0"/>
+          <a:chExt cx="0" cy="0"/>
+        </a:xfrm>
+      </p:grpSpPr>
+      <p:sp>
+        <p:nvSpPr>
+          <p:cNvPr id="4" name="Título 1">
+            <a:extLst>
+              <a:ext uri="{FF2B5EF4-FFF2-40B4-BE49-F238E27FC236}">
+                <a16:creationId xmlns:a16="http://schemas.microsoft.com/office/drawing/2014/main" id="{2A4D829F-0FCD-47A0-BDED-82422AEBCE4A}"/>
+              </a:ext>
+            </a:extLst>
+          </p:cNvPr>
+          <p:cNvSpPr>
+            <a:spLocks noGrp="1"/>
+          </p:cNvSpPr>
+          <p:nvPr>
+            <p:ph type="title"/>
+          </p:nvPr>
+        </p:nvSpPr>
+        <p:spPr>
+          <a:xfrm>
+            <a:off x="457200" y="274638"/>
+            <a:ext cx="7467600" cy="1143000"/>
+          </a:xfrm>
+        </p:spPr>
+        <p:txBody>
+          <a:bodyPr/>
+          <a:lstStyle/>
+          <a:p>
+            <a:r>
+              <a:rPr lang="en-US" dirty="0" err="1"/>
+              <a:t>Montagem</a:t>
+            </a:r>
+            <a:r>
+              <a:rPr lang="en-US" dirty="0"/>
+              <a:t> do </a:t>
+            </a:r>
+            <a:r>
+              <a:rPr lang="en-US" dirty="0" err="1"/>
+              <a:t>Formulário</a:t>
+            </a:r>
+            <a:r>
+              <a:rPr lang="en-US" dirty="0"/>
+              <a:t> – </a:t>
+            </a:r>
+            <a:br>
+              <a:rPr lang="en-US" dirty="0"/>
+            </a:br>
+            <a:r>
+              <a:rPr lang="en-US" dirty="0"/>
+              <a:t>Unit </a:t>
+            </a:r>
+            <a:r>
+              <a:rPr lang="en-US" dirty="0" err="1"/>
+              <a:t>servicos</a:t>
+            </a:r>
+            <a:endParaRPr lang="pt-BR" dirty="0"/>
+          </a:p>
+        </p:txBody>
+      </p:sp>
+      <p:pic>
+        <p:nvPicPr>
+          <p:cNvPr id="6" name="Imagem 5">
+            <a:extLst>
+              <a:ext uri="{FF2B5EF4-FFF2-40B4-BE49-F238E27FC236}">
+                <a16:creationId xmlns:a16="http://schemas.microsoft.com/office/drawing/2014/main" id="{D5586AFF-F921-49A5-B36D-F4FA81645B70}"/>
+              </a:ext>
+            </a:extLst>
+          </p:cNvPr>
+          <p:cNvPicPr>
+            <a:picLocks noChangeAspect="1"/>
+          </p:cNvPicPr>
+          <p:nvPr/>
+        </p:nvPicPr>
+        <p:blipFill>
+          <a:blip r:embed="rId2"/>
+          <a:stretch>
+            <a:fillRect/>
+          </a:stretch>
+        </p:blipFill>
+        <p:spPr>
+          <a:xfrm>
+            <a:off x="609600" y="1621857"/>
+            <a:ext cx="5029200" cy="3864543"/>
+          </a:xfrm>
+          <a:prstGeom prst="rect">
+            <a:avLst/>
+          </a:prstGeom>
+        </p:spPr>
+      </p:pic>
+      <p:sp>
+        <p:nvSpPr>
+          <p:cNvPr id="7" name="CaixaDeTexto 6">
+            <a:extLst>
+              <a:ext uri="{FF2B5EF4-FFF2-40B4-BE49-F238E27FC236}">
+                <a16:creationId xmlns:a16="http://schemas.microsoft.com/office/drawing/2014/main" id="{4AC763B5-D2FA-4A9F-A42B-6842999986EA}"/>
+              </a:ext>
+            </a:extLst>
+          </p:cNvPr>
+          <p:cNvSpPr txBox="1"/>
+          <p:nvPr/>
+        </p:nvSpPr>
+        <p:spPr>
+          <a:xfrm>
+            <a:off x="533400" y="5657671"/>
+            <a:ext cx="7467600" cy="1200329"/>
+          </a:xfrm>
+          <a:prstGeom prst="rect">
+            <a:avLst/>
+          </a:prstGeom>
+          <a:noFill/>
+        </p:spPr>
+        <p:txBody>
+          <a:bodyPr wrap="square" rtlCol="0">
+            <a:spAutoFit/>
+          </a:bodyPr>
+          <a:lstStyle/>
+          <a:p>
+            <a:pPr marL="342900" indent="-342900">
+              <a:buFont typeface="Arial" panose="020B0604020202020204" pitchFamily="34" charset="0"/>
+              <a:buChar char="•"/>
+            </a:pPr>
+            <a:r>
+              <a:rPr lang="en-US" sz="2400" dirty="0" err="1"/>
+              <a:t>Teremos</a:t>
+            </a:r>
+            <a:r>
+              <a:rPr lang="en-US" sz="2400" dirty="0"/>
+              <a:t> </a:t>
+            </a:r>
+            <a:r>
+              <a:rPr lang="en-US" sz="2400" dirty="0" err="1"/>
+              <a:t>exatamente</a:t>
+            </a:r>
+            <a:r>
+              <a:rPr lang="en-US" sz="2400" dirty="0"/>
+              <a:t> o </a:t>
+            </a:r>
+            <a:r>
+              <a:rPr lang="en-US" sz="2400" dirty="0" err="1"/>
+              <a:t>mesmo</a:t>
+            </a:r>
+            <a:r>
+              <a:rPr lang="en-US" sz="2400" dirty="0"/>
+              <a:t> </a:t>
+            </a:r>
+            <a:r>
+              <a:rPr lang="en-US" sz="2400" dirty="0" err="1"/>
+              <a:t>conteúdo</a:t>
+            </a:r>
+            <a:r>
+              <a:rPr lang="en-US" sz="2400" dirty="0"/>
+              <a:t> do </a:t>
+            </a:r>
+            <a:r>
+              <a:rPr lang="en-US" sz="2400" dirty="0" err="1"/>
+              <a:t>formulário</a:t>
+            </a:r>
+            <a:r>
+              <a:rPr lang="en-US" sz="2400" dirty="0"/>
+              <a:t> </a:t>
+            </a:r>
+            <a:r>
+              <a:rPr lang="en-US" sz="2400" dirty="0" err="1"/>
+              <a:t>descoberta</a:t>
+            </a:r>
+            <a:r>
+              <a:rPr lang="en-US" sz="2400" dirty="0"/>
+              <a:t> no novo </a:t>
+            </a:r>
+            <a:r>
+              <a:rPr lang="en-US" sz="2400" dirty="0" err="1"/>
+              <a:t>formulário</a:t>
+            </a:r>
+            <a:r>
+              <a:rPr lang="en-US" sz="2400" dirty="0"/>
+              <a:t> </a:t>
+            </a:r>
+            <a:r>
+              <a:rPr lang="en-US" sz="2400" dirty="0" err="1"/>
+              <a:t>servicos</a:t>
+            </a:r>
+            <a:endParaRPr lang="en-US" sz="2400" dirty="0"/>
+          </a:p>
+        </p:txBody>
+      </p:sp>
+    </p:spTree>
+    <p:extLst>
+      <p:ext uri="{BB962C8B-B14F-4D97-AF65-F5344CB8AC3E}">
+        <p14:creationId xmlns:p14="http://schemas.microsoft.com/office/powerpoint/2010/main" val="2219194940"/>
+      </p:ext>
+    </p:extLst>
+  </p:cSld>
+  <p:clrMapOvr>
+    <a:masterClrMapping/>
+  </p:clrMapOvr>
+</p:sld>
+</file>
+
+<file path=ppt/slides/slide62.xml><?xml version="1.0" encoding="utf-8"?>
+<p:sld xmlns:a="http://schemas.openxmlformats.org/drawingml/2006/main" xmlns:r="http://schemas.openxmlformats.org/officeDocument/2006/relationships" xmlns:p="http://schemas.openxmlformats.org/presentationml/2006/main">
+  <p:cSld>
+    <p:spTree>
+      <p:nvGrpSpPr>
+        <p:cNvPr id="1" name=""/>
+        <p:cNvGrpSpPr/>
+        <p:nvPr/>
+      </p:nvGrpSpPr>
+      <p:grpSpPr>
+        <a:xfrm>
+          <a:off x="0" y="0"/>
+          <a:ext cx="0" cy="0"/>
+          <a:chOff x="0" y="0"/>
+          <a:chExt cx="0" cy="0"/>
+        </a:xfrm>
+      </p:grpSpPr>
+      <p:sp>
+        <p:nvSpPr>
+          <p:cNvPr id="4" name="Título 1">
+            <a:extLst>
+              <a:ext uri="{FF2B5EF4-FFF2-40B4-BE49-F238E27FC236}">
+                <a16:creationId xmlns:a16="http://schemas.microsoft.com/office/drawing/2014/main" id="{4EE7731A-38F0-47DC-815E-F7DE7BA4195F}"/>
+              </a:ext>
+            </a:extLst>
+          </p:cNvPr>
+          <p:cNvSpPr>
+            <a:spLocks noGrp="1"/>
+          </p:cNvSpPr>
+          <p:nvPr>
+            <p:ph type="title"/>
+          </p:nvPr>
+        </p:nvSpPr>
+        <p:spPr>
+          <a:xfrm>
+            <a:off x="457200" y="0"/>
+            <a:ext cx="7467600" cy="1143000"/>
+          </a:xfrm>
+        </p:spPr>
+        <p:txBody>
+          <a:bodyPr/>
+          <a:lstStyle/>
+          <a:p>
+            <a:r>
+              <a:rPr lang="en-US" dirty="0" err="1"/>
+              <a:t>Montagem</a:t>
+            </a:r>
+            <a:r>
+              <a:rPr lang="en-US" dirty="0"/>
+              <a:t> do </a:t>
+            </a:r>
+            <a:r>
+              <a:rPr lang="en-US" dirty="0" err="1"/>
+              <a:t>Formulário</a:t>
+            </a:r>
+            <a:r>
+              <a:rPr lang="en-US" dirty="0"/>
+              <a:t> – </a:t>
+            </a:r>
+            <a:br>
+              <a:rPr lang="en-US" dirty="0"/>
+            </a:br>
+            <a:r>
+              <a:rPr lang="en-US" dirty="0"/>
+              <a:t>Unit </a:t>
+            </a:r>
+            <a:r>
+              <a:rPr lang="en-US" dirty="0" err="1"/>
+              <a:t>servicos</a:t>
+            </a:r>
+            <a:endParaRPr lang="pt-BR" dirty="0"/>
+          </a:p>
+        </p:txBody>
+      </p:sp>
+      <p:sp>
+        <p:nvSpPr>
+          <p:cNvPr id="6" name="CaixaDeTexto 5">
+            <a:extLst>
+              <a:ext uri="{FF2B5EF4-FFF2-40B4-BE49-F238E27FC236}">
+                <a16:creationId xmlns:a16="http://schemas.microsoft.com/office/drawing/2014/main" id="{27813E97-A667-406E-9012-C938E78BC94F}"/>
+              </a:ext>
+            </a:extLst>
+          </p:cNvPr>
+          <p:cNvSpPr txBox="1"/>
+          <p:nvPr/>
+        </p:nvSpPr>
+        <p:spPr>
+          <a:xfrm>
+            <a:off x="609600" y="1219200"/>
+            <a:ext cx="7467599" cy="5632311"/>
+          </a:xfrm>
+          <a:prstGeom prst="rect">
+            <a:avLst/>
+          </a:prstGeom>
+          <a:noFill/>
+        </p:spPr>
+        <p:txBody>
+          <a:bodyPr wrap="square" rtlCol="0">
+            <a:spAutoFit/>
+          </a:bodyPr>
+          <a:lstStyle/>
+          <a:p>
+            <a:pPr marL="285750" indent="-285750">
+              <a:buFont typeface="Arial" panose="020B0604020202020204" pitchFamily="34" charset="0"/>
+              <a:buChar char="•"/>
+            </a:pPr>
+            <a:r>
+              <a:rPr lang="en-US" sz="2400" dirty="0" err="1"/>
+              <a:t>Altere</a:t>
+            </a:r>
+            <a:r>
+              <a:rPr lang="en-US" sz="2400" dirty="0"/>
+              <a:t> </a:t>
+            </a:r>
+            <a:r>
+              <a:rPr lang="en-US" sz="2400" dirty="0" err="1"/>
+              <a:t>os</a:t>
+            </a:r>
+            <a:r>
+              <a:rPr lang="en-US" sz="2400" dirty="0"/>
+              <a:t> </a:t>
+            </a:r>
+            <a:r>
+              <a:rPr lang="en-US" sz="2400" dirty="0" err="1"/>
+              <a:t>componentes</a:t>
+            </a:r>
+            <a:r>
+              <a:rPr lang="en-US" sz="2400" dirty="0"/>
+              <a:t> </a:t>
+            </a:r>
+            <a:r>
+              <a:rPr lang="en-US" sz="2400" dirty="0" err="1"/>
+              <a:t>como</a:t>
+            </a:r>
+            <a:r>
+              <a:rPr lang="en-US" sz="2400" dirty="0"/>
+              <a:t> a </a:t>
+            </a:r>
+            <a:r>
+              <a:rPr lang="en-US" sz="2400" dirty="0" err="1"/>
+              <a:t>seguir</a:t>
+            </a:r>
+            <a:r>
+              <a:rPr lang="en-US" sz="2400" dirty="0"/>
+              <a:t>:</a:t>
+            </a:r>
+          </a:p>
+          <a:p>
+            <a:pPr marL="285750" indent="-285750">
+              <a:buFont typeface="Arial" panose="020B0604020202020204" pitchFamily="34" charset="0"/>
+              <a:buChar char="•"/>
+            </a:pPr>
+            <a:endParaRPr lang="en-US" sz="2400" dirty="0"/>
+          </a:p>
+          <a:p>
+            <a:pPr marL="285750" indent="-285750">
+              <a:buFont typeface="Arial" panose="020B0604020202020204" pitchFamily="34" charset="0"/>
+              <a:buChar char="•"/>
+            </a:pPr>
+            <a:r>
+              <a:rPr lang="en-US" sz="2400" b="1" dirty="0"/>
+              <a:t>Label1</a:t>
+            </a:r>
+          </a:p>
+          <a:p>
+            <a:pPr marL="742950" lvl="1" indent="-285750">
+              <a:buFont typeface="Arial" panose="020B0604020202020204" pitchFamily="34" charset="0"/>
+              <a:buChar char="•"/>
+            </a:pPr>
+            <a:r>
+              <a:rPr lang="en-US" sz="2400" b="1" dirty="0"/>
+              <a:t>Text: </a:t>
+            </a:r>
+            <a:r>
+              <a:rPr lang="en-US" sz="2400" b="1" dirty="0" err="1"/>
+              <a:t>Serviços</a:t>
+            </a:r>
+            <a:endParaRPr lang="en-US" sz="2400" b="1" dirty="0"/>
+          </a:p>
+          <a:p>
+            <a:pPr marL="742950" lvl="1" indent="-285750">
+              <a:buFont typeface="Arial" panose="020B0604020202020204" pitchFamily="34" charset="0"/>
+              <a:buChar char="•"/>
+            </a:pPr>
+            <a:r>
+              <a:rPr lang="en-US" sz="2400" b="1" dirty="0" err="1"/>
+              <a:t>TextSetting</a:t>
+            </a:r>
+            <a:r>
+              <a:rPr lang="en-US" sz="2400" b="1" dirty="0"/>
+              <a:t> -&gt; </a:t>
+            </a:r>
+            <a:r>
+              <a:rPr lang="en-US" sz="2400" b="1" dirty="0" err="1"/>
+              <a:t>WordWrap</a:t>
+            </a:r>
+            <a:r>
+              <a:rPr lang="en-US" sz="2400" b="1" dirty="0"/>
+              <a:t>: False</a:t>
+            </a:r>
+          </a:p>
+          <a:p>
+            <a:pPr marL="285750" indent="-285750">
+              <a:buFont typeface="Arial" panose="020B0604020202020204" pitchFamily="34" charset="0"/>
+              <a:buChar char="•"/>
+            </a:pPr>
+            <a:endParaRPr lang="en-US" sz="2400" b="1" dirty="0"/>
+          </a:p>
+          <a:p>
+            <a:pPr marL="285750" indent="-285750">
+              <a:buFont typeface="Arial" panose="020B0604020202020204" pitchFamily="34" charset="0"/>
+              <a:buChar char="•"/>
+            </a:pPr>
+            <a:r>
+              <a:rPr lang="en-US" sz="2400" b="1" dirty="0" err="1"/>
+              <a:t>lstDispositivos</a:t>
+            </a:r>
+            <a:endParaRPr lang="en-US" sz="2400" b="1" dirty="0"/>
+          </a:p>
+          <a:p>
+            <a:pPr marL="742950" lvl="1" indent="-285750">
+              <a:buFont typeface="Arial" panose="020B0604020202020204" pitchFamily="34" charset="0"/>
+              <a:buChar char="•"/>
+            </a:pPr>
+            <a:r>
+              <a:rPr lang="en-US" sz="2400" b="1" dirty="0"/>
+              <a:t>Name: </a:t>
+            </a:r>
+            <a:r>
+              <a:rPr lang="en-US" sz="2400" b="1" dirty="0" err="1"/>
+              <a:t>lstServicos</a:t>
+            </a:r>
+            <a:endParaRPr lang="en-US" sz="2400" b="1" dirty="0"/>
+          </a:p>
+          <a:p>
+            <a:pPr marL="285750" indent="-285750">
+              <a:buFont typeface="Arial" panose="020B0604020202020204" pitchFamily="34" charset="0"/>
+              <a:buChar char="•"/>
+            </a:pPr>
+            <a:endParaRPr lang="en-US" sz="2400" b="1" dirty="0"/>
+          </a:p>
+          <a:p>
+            <a:pPr marL="285750" indent="-285750">
+              <a:buFont typeface="Arial" panose="020B0604020202020204" pitchFamily="34" charset="0"/>
+              <a:buChar char="•"/>
+            </a:pPr>
+            <a:r>
+              <a:rPr lang="en-US" sz="2400" b="1" dirty="0" err="1"/>
+              <a:t>btnVisivel</a:t>
+            </a:r>
+            <a:endParaRPr lang="en-US" sz="2400" b="1" dirty="0"/>
+          </a:p>
+          <a:p>
+            <a:pPr marL="742950" lvl="1" indent="-285750">
+              <a:buFont typeface="Arial" panose="020B0604020202020204" pitchFamily="34" charset="0"/>
+              <a:buChar char="•"/>
+            </a:pPr>
+            <a:r>
+              <a:rPr lang="en-US" sz="2400" b="1" dirty="0"/>
+              <a:t>Align: Center</a:t>
+            </a:r>
+          </a:p>
+          <a:p>
+            <a:pPr marL="742950" lvl="1" indent="-285750">
+              <a:buFont typeface="Arial" panose="020B0604020202020204" pitchFamily="34" charset="0"/>
+              <a:buChar char="•"/>
+            </a:pPr>
+            <a:r>
+              <a:rPr lang="en-US" sz="2400" b="1" dirty="0"/>
+              <a:t>Name: </a:t>
+            </a:r>
+            <a:r>
+              <a:rPr lang="en-US" sz="2400" b="1" dirty="0" err="1"/>
+              <a:t>btnConectar</a:t>
+            </a:r>
+            <a:endParaRPr lang="en-US" sz="2400" b="1" dirty="0"/>
+          </a:p>
+          <a:p>
+            <a:pPr marL="742950" lvl="1" indent="-285750">
+              <a:buFont typeface="Arial" panose="020B0604020202020204" pitchFamily="34" charset="0"/>
+              <a:buChar char="•"/>
+            </a:pPr>
+            <a:r>
+              <a:rPr lang="en-US" sz="2400" b="1" dirty="0"/>
+              <a:t>Text: </a:t>
+            </a:r>
+            <a:r>
+              <a:rPr lang="en-US" sz="2400" b="1" dirty="0" err="1"/>
+              <a:t>Conectar</a:t>
+            </a:r>
+            <a:endParaRPr lang="en-US" sz="2400" b="1" dirty="0"/>
+          </a:p>
+          <a:p>
+            <a:pPr marL="285750" indent="-285750">
+              <a:buFont typeface="Arial" panose="020B0604020202020204" pitchFamily="34" charset="0"/>
+              <a:buChar char="•"/>
+            </a:pPr>
+            <a:endParaRPr lang="en-US" sz="2400" b="1" dirty="0"/>
+          </a:p>
+          <a:p>
+            <a:pPr marL="285750" indent="-285750">
+              <a:buFont typeface="Arial" panose="020B0604020202020204" pitchFamily="34" charset="0"/>
+              <a:buChar char="•"/>
+            </a:pPr>
+            <a:r>
+              <a:rPr lang="en-US" sz="2400" dirty="0"/>
+              <a:t>Delete o </a:t>
+            </a:r>
+            <a:r>
+              <a:rPr lang="en-US" sz="2400" dirty="0" err="1"/>
+              <a:t>componente</a:t>
+            </a:r>
+            <a:r>
+              <a:rPr lang="en-US" sz="2400" b="1" dirty="0"/>
+              <a:t> </a:t>
+            </a:r>
+            <a:r>
+              <a:rPr lang="en-US" sz="2400" b="1" dirty="0" err="1"/>
+              <a:t>btnParear</a:t>
+            </a:r>
+            <a:endParaRPr lang="en-US" sz="2400" b="1" dirty="0"/>
+          </a:p>
+        </p:txBody>
+      </p:sp>
+    </p:spTree>
+    <p:extLst>
+      <p:ext uri="{BB962C8B-B14F-4D97-AF65-F5344CB8AC3E}">
+        <p14:creationId xmlns:p14="http://schemas.microsoft.com/office/powerpoint/2010/main" val="2984893916"/>
+      </p:ext>
+    </p:extLst>
+  </p:cSld>
+  <p:clrMapOvr>
+    <a:masterClrMapping/>
+  </p:clrMapOvr>
+</p:sld>
+</file>
+
+<file path=ppt/slides/slide63.xml><?xml version="1.0" encoding="utf-8"?>
+<p:sld xmlns:a="http://schemas.openxmlformats.org/drawingml/2006/main" xmlns:r="http://schemas.openxmlformats.org/officeDocument/2006/relationships" xmlns:p="http://schemas.openxmlformats.org/presentationml/2006/main">
+  <p:cSld>
+    <p:spTree>
+      <p:nvGrpSpPr>
+        <p:cNvPr id="1" name=""/>
+        <p:cNvGrpSpPr/>
+        <p:nvPr/>
+      </p:nvGrpSpPr>
+      <p:grpSpPr>
+        <a:xfrm>
+          <a:off x="0" y="0"/>
+          <a:ext cx="0" cy="0"/>
+          <a:chOff x="0" y="0"/>
+          <a:chExt cx="0" cy="0"/>
+        </a:xfrm>
+      </p:grpSpPr>
+      <p:sp>
+        <p:nvSpPr>
+          <p:cNvPr id="7" name="Título 1">
+            <a:extLst>
+              <a:ext uri="{FF2B5EF4-FFF2-40B4-BE49-F238E27FC236}">
+                <a16:creationId xmlns:a16="http://schemas.microsoft.com/office/drawing/2014/main" id="{A0F1CBEE-9F02-4F65-B882-695BC17EF8E6}"/>
+              </a:ext>
+            </a:extLst>
+          </p:cNvPr>
+          <p:cNvSpPr>
+            <a:spLocks noGrp="1"/>
+          </p:cNvSpPr>
+          <p:nvPr>
+            <p:ph type="title"/>
+          </p:nvPr>
+        </p:nvSpPr>
+        <p:spPr>
+          <a:xfrm>
+            <a:off x="457200" y="274638"/>
+            <a:ext cx="7467600" cy="1143000"/>
+          </a:xfrm>
+        </p:spPr>
+        <p:txBody>
+          <a:bodyPr/>
+          <a:lstStyle/>
+          <a:p>
+            <a:r>
+              <a:rPr lang="en-US" dirty="0" err="1"/>
+              <a:t>Montagem</a:t>
+            </a:r>
+            <a:r>
+              <a:rPr lang="en-US" dirty="0"/>
+              <a:t> do </a:t>
+            </a:r>
+            <a:r>
+              <a:rPr lang="en-US" dirty="0" err="1"/>
+              <a:t>Formulário</a:t>
+            </a:r>
+            <a:r>
+              <a:rPr lang="en-US" dirty="0"/>
+              <a:t> – </a:t>
+            </a:r>
+            <a:br>
+              <a:rPr lang="en-US" dirty="0"/>
+            </a:br>
+            <a:r>
+              <a:rPr lang="en-US" dirty="0"/>
+              <a:t>Unit </a:t>
+            </a:r>
+            <a:r>
+              <a:rPr lang="en-US" dirty="0" err="1"/>
+              <a:t>servicos</a:t>
+            </a:r>
+            <a:endParaRPr lang="pt-BR" dirty="0"/>
+          </a:p>
+        </p:txBody>
+      </p:sp>
+      <p:pic>
+        <p:nvPicPr>
+          <p:cNvPr id="9" name="Imagem 8">
+            <a:extLst>
+              <a:ext uri="{FF2B5EF4-FFF2-40B4-BE49-F238E27FC236}">
+                <a16:creationId xmlns:a16="http://schemas.microsoft.com/office/drawing/2014/main" id="{490D8CFB-9DCD-49A5-A431-E6FBB6476262}"/>
+              </a:ext>
+            </a:extLst>
+          </p:cNvPr>
+          <p:cNvPicPr>
+            <a:picLocks noChangeAspect="1"/>
+          </p:cNvPicPr>
+          <p:nvPr/>
+        </p:nvPicPr>
+        <p:blipFill>
+          <a:blip r:embed="rId2"/>
+          <a:stretch>
+            <a:fillRect/>
+          </a:stretch>
+        </p:blipFill>
+        <p:spPr>
+          <a:xfrm>
+            <a:off x="609600" y="1722299"/>
+            <a:ext cx="6343650" cy="4857750"/>
+          </a:xfrm>
+          <a:prstGeom prst="rect">
+            <a:avLst/>
+          </a:prstGeom>
+        </p:spPr>
+      </p:pic>
+    </p:spTree>
+    <p:extLst>
+      <p:ext uri="{BB962C8B-B14F-4D97-AF65-F5344CB8AC3E}">
+        <p14:creationId xmlns:p14="http://schemas.microsoft.com/office/powerpoint/2010/main" val="881914828"/>
+      </p:ext>
+    </p:extLst>
+  </p:cSld>
+  <p:clrMapOvr>
+    <a:masterClrMapping/>
+  </p:clrMapOvr>
+</p:sld>
+</file>
+
+<file path=ppt/slides/slide64.xml><?xml version="1.0" encoding="utf-8"?>
+<p:sld xmlns:a="http://schemas.openxmlformats.org/drawingml/2006/main" xmlns:r="http://schemas.openxmlformats.org/officeDocument/2006/relationships" xmlns:p="http://schemas.openxmlformats.org/presentationml/2006/main">
+  <p:cSld>
+    <p:spTree>
+      <p:nvGrpSpPr>
+        <p:cNvPr id="1" name=""/>
+        <p:cNvGrpSpPr/>
+        <p:nvPr/>
+      </p:nvGrpSpPr>
+      <p:grpSpPr>
+        <a:xfrm>
+          <a:off x="0" y="0"/>
+          <a:ext cx="0" cy="0"/>
+          <a:chOff x="0" y="0"/>
+          <a:chExt cx="0" cy="0"/>
+        </a:xfrm>
+      </p:grpSpPr>
+      <p:sp>
+        <p:nvSpPr>
+          <p:cNvPr id="4" name="Título 1">
+            <a:extLst>
+              <a:ext uri="{FF2B5EF4-FFF2-40B4-BE49-F238E27FC236}">
+                <a16:creationId xmlns:a16="http://schemas.microsoft.com/office/drawing/2014/main" id="{1712C7A6-B569-4C4B-8239-A07B898D2102}"/>
+              </a:ext>
+            </a:extLst>
+          </p:cNvPr>
+          <p:cNvSpPr>
+            <a:spLocks noGrp="1"/>
+          </p:cNvSpPr>
+          <p:nvPr>
+            <p:ph type="title"/>
+          </p:nvPr>
+        </p:nvSpPr>
+        <p:spPr>
+          <a:xfrm>
+            <a:off x="457200" y="274638"/>
+            <a:ext cx="7467600" cy="1143000"/>
+          </a:xfrm>
+        </p:spPr>
+        <p:txBody>
+          <a:bodyPr/>
+          <a:lstStyle/>
+          <a:p>
+            <a:r>
+              <a:rPr lang="en-US" dirty="0" err="1"/>
+              <a:t>Montagem</a:t>
+            </a:r>
+            <a:r>
+              <a:rPr lang="en-US" dirty="0"/>
+              <a:t> do </a:t>
+            </a:r>
+            <a:r>
+              <a:rPr lang="en-US" dirty="0" err="1"/>
+              <a:t>Formulário</a:t>
+            </a:r>
+            <a:r>
+              <a:rPr lang="en-US" dirty="0"/>
+              <a:t> – </a:t>
+            </a:r>
+            <a:br>
+              <a:rPr lang="en-US" dirty="0"/>
+            </a:br>
+            <a:r>
+              <a:rPr lang="en-US" dirty="0"/>
+              <a:t>Unit windows</a:t>
+            </a:r>
+            <a:endParaRPr lang="pt-BR" dirty="0"/>
+          </a:p>
+        </p:txBody>
+      </p:sp>
+      <p:pic>
+        <p:nvPicPr>
+          <p:cNvPr id="5" name="Imagem 4" descr="Tela de computador&#10;&#10;Descrição gerada automaticamente">
+            <a:extLst>
+              <a:ext uri="{FF2B5EF4-FFF2-40B4-BE49-F238E27FC236}">
+                <a16:creationId xmlns:a16="http://schemas.microsoft.com/office/drawing/2014/main" id="{07F0D631-4043-4760-8ADE-2B8F32642F97}"/>
+              </a:ext>
+            </a:extLst>
+          </p:cNvPr>
+          <p:cNvPicPr>
+            <a:picLocks noChangeAspect="1"/>
+          </p:cNvPicPr>
+          <p:nvPr/>
+        </p:nvPicPr>
+        <p:blipFill>
+          <a:blip r:embed="rId2">
+            <a:extLst>
+              <a:ext uri="{28A0092B-C50C-407E-A947-70E740481C1C}">
+                <a14:useLocalDpi xmlns:a14="http://schemas.microsoft.com/office/drawing/2010/main" val="0"/>
+              </a:ext>
+            </a:extLst>
+          </a:blip>
+          <a:stretch>
+            <a:fillRect/>
+          </a:stretch>
+        </p:blipFill>
+        <p:spPr>
+          <a:xfrm>
+            <a:off x="3753678" y="1490007"/>
+            <a:ext cx="4343400" cy="3422313"/>
+          </a:xfrm>
+          <a:prstGeom prst="rect">
+            <a:avLst/>
+          </a:prstGeom>
+        </p:spPr>
+      </p:pic>
+      <p:sp>
+        <p:nvSpPr>
+          <p:cNvPr id="6" name="CaixaDeTexto 5">
+            <a:extLst>
+              <a:ext uri="{FF2B5EF4-FFF2-40B4-BE49-F238E27FC236}">
+                <a16:creationId xmlns:a16="http://schemas.microsoft.com/office/drawing/2014/main" id="{345EA6C0-E49B-489C-ABD7-11521B99E2E7}"/>
+              </a:ext>
+            </a:extLst>
+          </p:cNvPr>
+          <p:cNvSpPr txBox="1"/>
+          <p:nvPr/>
+        </p:nvSpPr>
+        <p:spPr>
+          <a:xfrm>
+            <a:off x="228600" y="2209800"/>
+            <a:ext cx="3505200" cy="1938992"/>
+          </a:xfrm>
+          <a:prstGeom prst="rect">
+            <a:avLst/>
+          </a:prstGeom>
+          <a:noFill/>
+        </p:spPr>
+        <p:txBody>
+          <a:bodyPr wrap="square" rtlCol="0">
+            <a:spAutoFit/>
+          </a:bodyPr>
+          <a:lstStyle/>
+          <a:p>
+            <a:pPr marL="342900" indent="-342900">
+              <a:buFont typeface="Arial" panose="020B0604020202020204" pitchFamily="34" charset="0"/>
+              <a:buChar char="•"/>
+            </a:pPr>
+            <a:r>
+              <a:rPr lang="en-US" sz="2400" dirty="0" err="1"/>
+              <a:t>Adicione</a:t>
+            </a:r>
+            <a:r>
+              <a:rPr lang="en-US" sz="2400" dirty="0"/>
+              <a:t> um novo </a:t>
+            </a:r>
+            <a:r>
+              <a:rPr lang="en-US" sz="2400" dirty="0" err="1"/>
+              <a:t>formulário</a:t>
+            </a:r>
+            <a:r>
+              <a:rPr lang="en-US" sz="2400" dirty="0"/>
+              <a:t> </a:t>
+            </a:r>
+            <a:r>
+              <a:rPr lang="en-US" sz="2400" dirty="0" err="1"/>
+              <a:t>ao</a:t>
+            </a:r>
+            <a:r>
+              <a:rPr lang="en-US" sz="2400" dirty="0"/>
+              <a:t> </a:t>
+            </a:r>
+            <a:r>
+              <a:rPr lang="en-US" sz="2400" dirty="0" err="1"/>
+              <a:t>projeto</a:t>
+            </a:r>
+            <a:r>
+              <a:rPr lang="en-US" sz="2400" dirty="0"/>
+              <a:t>, com o </a:t>
+            </a:r>
+            <a:r>
+              <a:rPr lang="en-US" sz="2400" dirty="0" err="1"/>
+              <a:t>nome</a:t>
+            </a:r>
+            <a:r>
+              <a:rPr lang="en-US" sz="2400" dirty="0"/>
+              <a:t> </a:t>
+            </a:r>
+            <a:r>
+              <a:rPr lang="en-US" sz="2400" b="1" dirty="0" err="1"/>
+              <a:t>frmWindowsU</a:t>
+            </a:r>
+            <a:endParaRPr lang="en-US" sz="2400" b="1" dirty="0"/>
+          </a:p>
+          <a:p>
+            <a:pPr marL="342900" indent="-342900">
+              <a:buFont typeface="Arial" panose="020B0604020202020204" pitchFamily="34" charset="0"/>
+              <a:buChar char="•"/>
+            </a:pPr>
+            <a:endParaRPr lang="en-US" sz="2400" b="1" dirty="0"/>
+          </a:p>
+        </p:txBody>
+      </p:sp>
+      <p:sp>
+        <p:nvSpPr>
+          <p:cNvPr id="7" name="CaixaDeTexto 6">
+            <a:extLst>
+              <a:ext uri="{FF2B5EF4-FFF2-40B4-BE49-F238E27FC236}">
+                <a16:creationId xmlns:a16="http://schemas.microsoft.com/office/drawing/2014/main" id="{165F26E2-5D97-4B9F-8509-731B181558F8}"/>
+              </a:ext>
+            </a:extLst>
+          </p:cNvPr>
+          <p:cNvSpPr txBox="1"/>
+          <p:nvPr/>
+        </p:nvSpPr>
+        <p:spPr>
+          <a:xfrm>
+            <a:off x="443948" y="4873485"/>
+            <a:ext cx="4509052" cy="1200329"/>
+          </a:xfrm>
+          <a:prstGeom prst="rect">
+            <a:avLst/>
+          </a:prstGeom>
+          <a:noFill/>
+        </p:spPr>
+        <p:txBody>
+          <a:bodyPr wrap="square" rtlCol="0">
+            <a:spAutoFit/>
+          </a:bodyPr>
+          <a:lstStyle/>
+          <a:p>
+            <a:pPr marL="342900" indent="-342900">
+              <a:buFont typeface="Arial" panose="020B0604020202020204" pitchFamily="34" charset="0"/>
+              <a:buChar char="•"/>
+            </a:pPr>
+            <a:r>
+              <a:rPr lang="en-US" sz="2400" dirty="0"/>
+              <a:t>Configure o </a:t>
+            </a:r>
+            <a:r>
+              <a:rPr lang="en-US" sz="2400" dirty="0" err="1"/>
+              <a:t>formulário</a:t>
+            </a:r>
+            <a:r>
+              <a:rPr lang="en-US" sz="2400" dirty="0"/>
+              <a:t> </a:t>
+            </a:r>
+            <a:r>
+              <a:rPr lang="en-US" sz="2400" dirty="0" err="1"/>
+              <a:t>como</a:t>
+            </a:r>
+            <a:r>
+              <a:rPr lang="en-US" sz="2400" dirty="0"/>
+              <a:t> </a:t>
+            </a:r>
+            <a:r>
+              <a:rPr lang="en-US" sz="2400" dirty="0" err="1"/>
+              <a:t>abaixo</a:t>
+            </a:r>
+            <a:r>
+              <a:rPr lang="en-US" sz="2400" dirty="0"/>
+              <a:t>:</a:t>
+            </a:r>
+          </a:p>
+          <a:p>
+            <a:pPr marL="800100" lvl="1" indent="-342900">
+              <a:buFont typeface="Arial" panose="020B0604020202020204" pitchFamily="34" charset="0"/>
+              <a:buChar char="•"/>
+            </a:pPr>
+            <a:r>
+              <a:rPr lang="en-US" sz="2400" b="1" dirty="0"/>
+              <a:t>Name: </a:t>
+            </a:r>
+            <a:r>
+              <a:rPr lang="en-US" sz="2400" b="1" dirty="0" err="1"/>
+              <a:t>frmWindows</a:t>
+            </a:r>
+            <a:endParaRPr lang="en-US" sz="2400" b="1" dirty="0"/>
+          </a:p>
+        </p:txBody>
+      </p:sp>
+    </p:spTree>
+    <p:extLst>
+      <p:ext uri="{BB962C8B-B14F-4D97-AF65-F5344CB8AC3E}">
+        <p14:creationId xmlns:p14="http://schemas.microsoft.com/office/powerpoint/2010/main" val="222342042"/>
+      </p:ext>
+    </p:extLst>
+  </p:cSld>
+  <p:clrMapOvr>
+    <a:masterClrMapping/>
+  </p:clrMapOvr>
+</p:sld>
+</file>
+
+<file path=ppt/slides/slide65.xml><?xml version="1.0" encoding="utf-8"?>
+<p:sld xmlns:a="http://schemas.openxmlformats.org/drawingml/2006/main" xmlns:r="http://schemas.openxmlformats.org/officeDocument/2006/relationships" xmlns:p="http://schemas.openxmlformats.org/presentationml/2006/main">
+  <p:cSld>
+    <p:spTree>
+      <p:nvGrpSpPr>
+        <p:cNvPr id="1" name=""/>
+        <p:cNvGrpSpPr/>
+        <p:nvPr/>
+      </p:nvGrpSpPr>
+      <p:grpSpPr>
+        <a:xfrm>
+          <a:off x="0" y="0"/>
+          <a:ext cx="0" cy="0"/>
+          <a:chOff x="0" y="0"/>
+          <a:chExt cx="0" cy="0"/>
+        </a:xfrm>
+      </p:grpSpPr>
+      <p:sp>
+        <p:nvSpPr>
+          <p:cNvPr id="4" name="Título 1">
+            <a:extLst>
+              <a:ext uri="{FF2B5EF4-FFF2-40B4-BE49-F238E27FC236}">
+                <a16:creationId xmlns:a16="http://schemas.microsoft.com/office/drawing/2014/main" id="{E62B5203-F0A4-405A-A7C3-7E0AD2EFB695}"/>
+              </a:ext>
+            </a:extLst>
+          </p:cNvPr>
+          <p:cNvSpPr>
+            <a:spLocks noGrp="1"/>
+          </p:cNvSpPr>
+          <p:nvPr>
+            <p:ph type="title"/>
+          </p:nvPr>
+        </p:nvSpPr>
+        <p:spPr>
+          <a:xfrm>
+            <a:off x="457200" y="274638"/>
+            <a:ext cx="7467600" cy="1143000"/>
+          </a:xfrm>
+        </p:spPr>
+        <p:txBody>
+          <a:bodyPr/>
+          <a:lstStyle/>
+          <a:p>
+            <a:r>
+              <a:rPr lang="en-US" dirty="0" err="1"/>
+              <a:t>Montagem</a:t>
+            </a:r>
+            <a:r>
+              <a:rPr lang="en-US" dirty="0"/>
+              <a:t> do </a:t>
+            </a:r>
+            <a:r>
+              <a:rPr lang="en-US" dirty="0" err="1"/>
+              <a:t>Formulário</a:t>
+            </a:r>
+            <a:r>
+              <a:rPr lang="en-US" dirty="0"/>
+              <a:t> – </a:t>
+            </a:r>
+            <a:br>
+              <a:rPr lang="en-US" dirty="0"/>
+            </a:br>
+            <a:r>
+              <a:rPr lang="en-US" dirty="0"/>
+              <a:t>Unit windows</a:t>
+            </a:r>
+            <a:endParaRPr lang="pt-BR" dirty="0"/>
+          </a:p>
+        </p:txBody>
+      </p:sp>
+      <p:pic>
+        <p:nvPicPr>
+          <p:cNvPr id="9" name="Imagem 8">
+            <a:extLst>
+              <a:ext uri="{FF2B5EF4-FFF2-40B4-BE49-F238E27FC236}">
+                <a16:creationId xmlns:a16="http://schemas.microsoft.com/office/drawing/2014/main" id="{817F6AB9-4AC0-4D89-B883-31EC81EFA54F}"/>
+              </a:ext>
+            </a:extLst>
+          </p:cNvPr>
+          <p:cNvPicPr>
+            <a:picLocks noChangeAspect="1"/>
+          </p:cNvPicPr>
+          <p:nvPr/>
+        </p:nvPicPr>
+        <p:blipFill>
+          <a:blip r:embed="rId2"/>
+          <a:stretch>
+            <a:fillRect/>
+          </a:stretch>
+        </p:blipFill>
+        <p:spPr>
+          <a:xfrm>
+            <a:off x="5303768" y="1600200"/>
+            <a:ext cx="2657475" cy="2628900"/>
+          </a:xfrm>
+          <a:prstGeom prst="rect">
+            <a:avLst/>
+          </a:prstGeom>
+        </p:spPr>
+      </p:pic>
+      <p:sp>
+        <p:nvSpPr>
+          <p:cNvPr id="10" name="CaixaDeTexto 9">
+            <a:extLst>
+              <a:ext uri="{FF2B5EF4-FFF2-40B4-BE49-F238E27FC236}">
+                <a16:creationId xmlns:a16="http://schemas.microsoft.com/office/drawing/2014/main" id="{88FB83AC-B718-429D-BAB0-91A89B11B3C9}"/>
+              </a:ext>
+            </a:extLst>
+          </p:cNvPr>
+          <p:cNvSpPr txBox="1"/>
+          <p:nvPr/>
+        </p:nvSpPr>
+        <p:spPr>
+          <a:xfrm>
+            <a:off x="368191" y="2286000"/>
+            <a:ext cx="4657725" cy="830997"/>
+          </a:xfrm>
+          <a:prstGeom prst="rect">
+            <a:avLst/>
+          </a:prstGeom>
+          <a:noFill/>
+        </p:spPr>
+        <p:txBody>
+          <a:bodyPr wrap="square" rtlCol="0">
+            <a:spAutoFit/>
+          </a:bodyPr>
+          <a:lstStyle/>
+          <a:p>
+            <a:pPr marL="342900" indent="-342900">
+              <a:buFont typeface="Arial" panose="020B0604020202020204" pitchFamily="34" charset="0"/>
+              <a:buChar char="•"/>
+            </a:pPr>
+            <a:r>
+              <a:rPr lang="en-US" sz="2400" dirty="0" err="1"/>
+              <a:t>Adicione</a:t>
+            </a:r>
+            <a:r>
+              <a:rPr lang="en-US" sz="2400" dirty="0"/>
+              <a:t> da aba </a:t>
+            </a:r>
+            <a:r>
+              <a:rPr lang="en-US" sz="2400" b="1" dirty="0"/>
+              <a:t>Standard </a:t>
+            </a:r>
+            <a:r>
+              <a:rPr lang="en-US" sz="2400" dirty="0"/>
+              <a:t>um </a:t>
+            </a:r>
+            <a:r>
+              <a:rPr lang="en-US" sz="2400" dirty="0" err="1"/>
+              <a:t>componente</a:t>
+            </a:r>
+            <a:r>
+              <a:rPr lang="en-US" sz="2400" dirty="0"/>
+              <a:t> </a:t>
+            </a:r>
+            <a:r>
+              <a:rPr lang="en-US" sz="2400" b="1" dirty="0" err="1"/>
+              <a:t>TRectangle</a:t>
+            </a:r>
+            <a:endParaRPr lang="en-US" sz="2400" dirty="0"/>
+          </a:p>
+        </p:txBody>
+      </p:sp>
+      <p:sp>
+        <p:nvSpPr>
+          <p:cNvPr id="11" name="CaixaDeTexto 10">
+            <a:extLst>
+              <a:ext uri="{FF2B5EF4-FFF2-40B4-BE49-F238E27FC236}">
+                <a16:creationId xmlns:a16="http://schemas.microsoft.com/office/drawing/2014/main" id="{41AA927E-EBBA-4902-8114-E1D060621F7B}"/>
+              </a:ext>
+            </a:extLst>
+          </p:cNvPr>
+          <p:cNvSpPr txBox="1"/>
+          <p:nvPr/>
+        </p:nvSpPr>
+        <p:spPr>
+          <a:xfrm>
+            <a:off x="3085095" y="4432637"/>
+            <a:ext cx="5091496" cy="1569660"/>
+          </a:xfrm>
+          <a:prstGeom prst="rect">
+            <a:avLst/>
+          </a:prstGeom>
+          <a:noFill/>
+        </p:spPr>
+        <p:txBody>
+          <a:bodyPr wrap="square" rtlCol="0">
+            <a:spAutoFit/>
+          </a:bodyPr>
+          <a:lstStyle/>
+          <a:p>
+            <a:pPr marL="342900" indent="-342900">
+              <a:buFont typeface="Arial" panose="020B0604020202020204" pitchFamily="34" charset="0"/>
+              <a:buChar char="•"/>
+            </a:pPr>
+            <a:r>
+              <a:rPr lang="en-US" sz="2400" dirty="0"/>
+              <a:t>Configure o </a:t>
+            </a:r>
+            <a:r>
+              <a:rPr lang="en-US" sz="2400" dirty="0" err="1"/>
+              <a:t>componente</a:t>
+            </a:r>
+            <a:r>
+              <a:rPr lang="en-US" sz="2400" dirty="0"/>
+              <a:t> </a:t>
+            </a:r>
+            <a:r>
+              <a:rPr lang="en-US" sz="2400" b="1" dirty="0"/>
+              <a:t>Rectangle1</a:t>
+            </a:r>
+            <a:r>
+              <a:rPr lang="en-US" sz="2400" dirty="0"/>
+              <a:t> da </a:t>
+            </a:r>
+            <a:r>
+              <a:rPr lang="en-US" sz="2400" dirty="0" err="1"/>
+              <a:t>seguinte</a:t>
+            </a:r>
+            <a:r>
+              <a:rPr lang="en-US" sz="2400" dirty="0"/>
+              <a:t> forma:</a:t>
+            </a:r>
+          </a:p>
+          <a:p>
+            <a:pPr marL="800100" lvl="1" indent="-342900">
+              <a:buFont typeface="Arial" panose="020B0604020202020204" pitchFamily="34" charset="0"/>
+              <a:buChar char="•"/>
+            </a:pPr>
+            <a:r>
+              <a:rPr lang="en-US" sz="2400" b="1" dirty="0"/>
+              <a:t>Align: Top</a:t>
+            </a:r>
+          </a:p>
+          <a:p>
+            <a:pPr marL="800100" lvl="1" indent="-342900">
+              <a:buFont typeface="Arial" panose="020B0604020202020204" pitchFamily="34" charset="0"/>
+              <a:buChar char="•"/>
+            </a:pPr>
+            <a:r>
+              <a:rPr lang="en-US" sz="2400" b="1" dirty="0"/>
+              <a:t>Fill -&gt; Color: #FFFFBA06</a:t>
+            </a:r>
+          </a:p>
+        </p:txBody>
+      </p:sp>
+      <p:pic>
+        <p:nvPicPr>
+          <p:cNvPr id="12" name="Imagem 11">
+            <a:extLst>
+              <a:ext uri="{FF2B5EF4-FFF2-40B4-BE49-F238E27FC236}">
+                <a16:creationId xmlns:a16="http://schemas.microsoft.com/office/drawing/2014/main" id="{636495A9-6457-49BF-888B-71CF38F777F6}"/>
+              </a:ext>
+            </a:extLst>
+          </p:cNvPr>
+          <p:cNvPicPr>
+            <a:picLocks noChangeAspect="1"/>
+          </p:cNvPicPr>
+          <p:nvPr/>
+        </p:nvPicPr>
+        <p:blipFill>
+          <a:blip r:embed="rId3"/>
+          <a:stretch>
+            <a:fillRect/>
+          </a:stretch>
+        </p:blipFill>
+        <p:spPr>
+          <a:xfrm>
+            <a:off x="384756" y="4414760"/>
+            <a:ext cx="2553706" cy="1933575"/>
+          </a:xfrm>
+          <a:prstGeom prst="rect">
+            <a:avLst/>
+          </a:prstGeom>
+        </p:spPr>
+      </p:pic>
+    </p:spTree>
+    <p:extLst>
+      <p:ext uri="{BB962C8B-B14F-4D97-AF65-F5344CB8AC3E}">
+        <p14:creationId xmlns:p14="http://schemas.microsoft.com/office/powerpoint/2010/main" val="3493078198"/>
+      </p:ext>
+    </p:extLst>
+  </p:cSld>
+  <p:clrMapOvr>
+    <a:masterClrMapping/>
+  </p:clrMapOvr>
+</p:sld>
+</file>
+
+<file path=ppt/slides/slide66.xml><?xml version="1.0" encoding="utf-8"?>
+<p:sld xmlns:a="http://schemas.openxmlformats.org/drawingml/2006/main" xmlns:r="http://schemas.openxmlformats.org/officeDocument/2006/relationships" xmlns:p="http://schemas.openxmlformats.org/presentationml/2006/main">
+  <p:cSld>
+    <p:spTree>
+      <p:nvGrpSpPr>
+        <p:cNvPr id="1" name=""/>
+        <p:cNvGrpSpPr/>
+        <p:nvPr/>
+      </p:nvGrpSpPr>
+      <p:grpSpPr>
+        <a:xfrm>
+          <a:off x="0" y="0"/>
+          <a:ext cx="0" cy="0"/>
+          <a:chOff x="0" y="0"/>
+          <a:chExt cx="0" cy="0"/>
+        </a:xfrm>
+      </p:grpSpPr>
+      <p:pic>
+        <p:nvPicPr>
+          <p:cNvPr id="4" name="Imagem 3">
+            <a:extLst>
+              <a:ext uri="{FF2B5EF4-FFF2-40B4-BE49-F238E27FC236}">
+                <a16:creationId xmlns:a16="http://schemas.microsoft.com/office/drawing/2014/main" id="{C7440193-073D-456D-AA25-614604C29A5C}"/>
+              </a:ext>
+            </a:extLst>
+          </p:cNvPr>
+          <p:cNvPicPr>
+            <a:picLocks noChangeAspect="1"/>
+          </p:cNvPicPr>
+          <p:nvPr/>
+        </p:nvPicPr>
+        <p:blipFill>
+          <a:blip r:embed="rId2"/>
+          <a:stretch>
+            <a:fillRect/>
+          </a:stretch>
+        </p:blipFill>
+        <p:spPr>
+          <a:xfrm>
+            <a:off x="5895975" y="1676400"/>
+            <a:ext cx="2638425" cy="2590800"/>
+          </a:xfrm>
+          <a:prstGeom prst="rect">
+            <a:avLst/>
+          </a:prstGeom>
+        </p:spPr>
+      </p:pic>
+      <p:sp>
+        <p:nvSpPr>
+          <p:cNvPr id="5" name="CaixaDeTexto 4">
+            <a:extLst>
+              <a:ext uri="{FF2B5EF4-FFF2-40B4-BE49-F238E27FC236}">
+                <a16:creationId xmlns:a16="http://schemas.microsoft.com/office/drawing/2014/main" id="{D4F3A2FB-9D41-4EB1-AF3C-7A74FBCB0E97}"/>
+              </a:ext>
+            </a:extLst>
+          </p:cNvPr>
+          <p:cNvSpPr txBox="1"/>
+          <p:nvPr/>
+        </p:nvSpPr>
+        <p:spPr>
+          <a:xfrm>
+            <a:off x="504826" y="1676400"/>
+            <a:ext cx="5486400" cy="1200329"/>
+          </a:xfrm>
+          <a:prstGeom prst="rect">
+            <a:avLst/>
+          </a:prstGeom>
+          <a:noFill/>
+        </p:spPr>
+        <p:txBody>
+          <a:bodyPr wrap="square" rtlCol="0">
+            <a:spAutoFit/>
+          </a:bodyPr>
+          <a:lstStyle/>
+          <a:p>
+            <a:pPr marL="342900" indent="-342900">
+              <a:buFont typeface="Arial" panose="020B0604020202020204" pitchFamily="34" charset="0"/>
+              <a:buChar char="•"/>
+            </a:pPr>
+            <a:r>
+              <a:rPr lang="en-US" sz="2400" dirty="0"/>
+              <a:t>Da aba </a:t>
+            </a:r>
+            <a:r>
+              <a:rPr lang="en-US" sz="2400" b="1" dirty="0"/>
+              <a:t>Standard</a:t>
+            </a:r>
+            <a:r>
+              <a:rPr lang="en-US" sz="2400" dirty="0"/>
+              <a:t> </a:t>
+            </a:r>
+            <a:r>
+              <a:rPr lang="en-US" sz="2400" dirty="0" err="1"/>
+              <a:t>adicione</a:t>
+            </a:r>
+            <a:r>
+              <a:rPr lang="en-US" sz="2400" dirty="0"/>
+              <a:t> </a:t>
+            </a:r>
+            <a:r>
+              <a:rPr lang="en-US" sz="2400" dirty="0" err="1"/>
+              <a:t>dois</a:t>
+            </a:r>
+            <a:r>
+              <a:rPr lang="en-US" sz="2400" dirty="0"/>
+              <a:t> </a:t>
+            </a:r>
+            <a:r>
+              <a:rPr lang="en-US" sz="2400" dirty="0" err="1"/>
+              <a:t>componentes</a:t>
+            </a:r>
+            <a:r>
+              <a:rPr lang="en-US" sz="2400" dirty="0"/>
+              <a:t> </a:t>
+            </a:r>
+            <a:r>
+              <a:rPr lang="en-US" sz="2400" b="1" dirty="0" err="1"/>
+              <a:t>TButton</a:t>
+            </a:r>
+            <a:r>
+              <a:rPr lang="en-US" sz="2400" b="1" dirty="0"/>
+              <a:t> </a:t>
+            </a:r>
+            <a:r>
+              <a:rPr lang="en-US" sz="2400" dirty="0"/>
+              <a:t>e um </a:t>
+            </a:r>
+            <a:r>
+              <a:rPr lang="en-US" sz="2400" dirty="0" err="1"/>
+              <a:t>componente</a:t>
+            </a:r>
+            <a:r>
+              <a:rPr lang="en-US" sz="2400" dirty="0"/>
+              <a:t> </a:t>
+            </a:r>
+            <a:r>
+              <a:rPr lang="en-US" sz="2400" b="1" dirty="0" err="1"/>
+              <a:t>TLabel</a:t>
+            </a:r>
+            <a:r>
+              <a:rPr lang="en-US" sz="2400" b="1" dirty="0"/>
+              <a:t> </a:t>
+            </a:r>
+            <a:r>
+              <a:rPr lang="en-US" sz="2400" dirty="0" err="1"/>
+              <a:t>ao</a:t>
+            </a:r>
+            <a:r>
+              <a:rPr lang="en-US" sz="2400" dirty="0"/>
+              <a:t> </a:t>
+            </a:r>
+            <a:r>
+              <a:rPr lang="en-US" sz="2400" dirty="0" err="1"/>
+              <a:t>formulário</a:t>
+            </a:r>
+            <a:r>
+              <a:rPr lang="en-US" sz="2400" b="1" dirty="0"/>
+              <a:t> </a:t>
+            </a:r>
+          </a:p>
+        </p:txBody>
+      </p:sp>
+      <p:pic>
+        <p:nvPicPr>
+          <p:cNvPr id="6" name="Imagem 5" descr="Tela de computador com texto preto sobre fundo branco&#10;&#10;Descrição gerada automaticamente">
+            <a:extLst>
+              <a:ext uri="{FF2B5EF4-FFF2-40B4-BE49-F238E27FC236}">
+                <a16:creationId xmlns:a16="http://schemas.microsoft.com/office/drawing/2014/main" id="{D589DED7-6844-4DE9-B378-CC9563521923}"/>
+              </a:ext>
+            </a:extLst>
+          </p:cNvPr>
+          <p:cNvPicPr>
+            <a:picLocks noChangeAspect="1"/>
+          </p:cNvPicPr>
+          <p:nvPr/>
+        </p:nvPicPr>
+        <p:blipFill>
+          <a:blip r:embed="rId3">
+            <a:extLst>
+              <a:ext uri="{28A0092B-C50C-407E-A947-70E740481C1C}">
+                <a14:useLocalDpi xmlns:a14="http://schemas.microsoft.com/office/drawing/2010/main" val="0"/>
+              </a:ext>
+            </a:extLst>
+          </a:blip>
+          <a:stretch>
+            <a:fillRect/>
+          </a:stretch>
+        </p:blipFill>
+        <p:spPr>
+          <a:xfrm>
+            <a:off x="609600" y="3657600"/>
+            <a:ext cx="2495550" cy="2733675"/>
+          </a:xfrm>
+          <a:prstGeom prst="rect">
+            <a:avLst/>
+          </a:prstGeom>
+        </p:spPr>
+      </p:pic>
+      <p:sp>
+        <p:nvSpPr>
+          <p:cNvPr id="7" name="CaixaDeTexto 6">
+            <a:extLst>
+              <a:ext uri="{FF2B5EF4-FFF2-40B4-BE49-F238E27FC236}">
+                <a16:creationId xmlns:a16="http://schemas.microsoft.com/office/drawing/2014/main" id="{DFA55B0F-D067-445E-8DCE-34E2F0874F3D}"/>
+              </a:ext>
+            </a:extLst>
+          </p:cNvPr>
+          <p:cNvSpPr txBox="1"/>
+          <p:nvPr/>
+        </p:nvSpPr>
+        <p:spPr>
+          <a:xfrm>
+            <a:off x="3429000" y="4724400"/>
+            <a:ext cx="5105400" cy="1569660"/>
+          </a:xfrm>
+          <a:prstGeom prst="rect">
+            <a:avLst/>
+          </a:prstGeom>
+          <a:noFill/>
+        </p:spPr>
+        <p:txBody>
+          <a:bodyPr wrap="square" rtlCol="0">
+            <a:spAutoFit/>
+          </a:bodyPr>
+          <a:lstStyle/>
+          <a:p>
+            <a:pPr marL="285750" indent="-285750" algn="ctr">
+              <a:buFont typeface="Arial" panose="020B0604020202020204" pitchFamily="34" charset="0"/>
+              <a:buChar char="•"/>
+            </a:pPr>
+            <a:r>
+              <a:rPr lang="en-US" sz="2400" dirty="0" err="1"/>
+              <a:t>Mova</a:t>
+            </a:r>
+            <a:r>
+              <a:rPr lang="en-US" sz="2400" dirty="0"/>
+              <a:t> </a:t>
+            </a:r>
+            <a:r>
+              <a:rPr lang="en-US" sz="2400" dirty="0" err="1"/>
+              <a:t>esses</a:t>
+            </a:r>
+            <a:r>
+              <a:rPr lang="en-US" sz="2400" dirty="0"/>
+              <a:t> 3 </a:t>
+            </a:r>
+            <a:r>
+              <a:rPr lang="en-US" sz="2400" dirty="0" err="1"/>
+              <a:t>componentes</a:t>
+            </a:r>
+            <a:r>
+              <a:rPr lang="en-US" sz="2400" dirty="0"/>
+              <a:t> para dentro do </a:t>
+            </a:r>
+            <a:r>
+              <a:rPr lang="en-US" sz="2400" dirty="0" err="1"/>
+              <a:t>componente</a:t>
+            </a:r>
+            <a:r>
+              <a:rPr lang="en-US" sz="2400" dirty="0"/>
+              <a:t> </a:t>
+            </a:r>
+            <a:r>
+              <a:rPr lang="en-US" sz="2400" b="1" dirty="0"/>
+              <a:t>Rectangle1</a:t>
+            </a:r>
+            <a:r>
+              <a:rPr lang="en-US" sz="2400" dirty="0"/>
+              <a:t> </a:t>
+            </a:r>
+            <a:r>
+              <a:rPr lang="en-US" sz="2400" dirty="0" err="1"/>
+              <a:t>usando</a:t>
+            </a:r>
+            <a:r>
+              <a:rPr lang="en-US" sz="2400" dirty="0"/>
+              <a:t> a </a:t>
+            </a:r>
+            <a:r>
+              <a:rPr lang="en-US" sz="2400" dirty="0" err="1"/>
+              <a:t>janela</a:t>
+            </a:r>
+            <a:r>
+              <a:rPr lang="en-US" sz="2400" dirty="0"/>
+              <a:t> </a:t>
+            </a:r>
+            <a:r>
+              <a:rPr lang="en-US" sz="2400" b="1" dirty="0"/>
+              <a:t>Structure</a:t>
+            </a:r>
+            <a:r>
+              <a:rPr lang="en-US" sz="2400" dirty="0"/>
+              <a:t> </a:t>
+            </a:r>
+          </a:p>
+        </p:txBody>
+      </p:sp>
+      <p:sp>
+        <p:nvSpPr>
+          <p:cNvPr id="8" name="Título 1">
+            <a:extLst>
+              <a:ext uri="{FF2B5EF4-FFF2-40B4-BE49-F238E27FC236}">
+                <a16:creationId xmlns:a16="http://schemas.microsoft.com/office/drawing/2014/main" id="{FD710C62-1F60-466C-811D-D9E7375FE418}"/>
+              </a:ext>
+            </a:extLst>
+          </p:cNvPr>
+          <p:cNvSpPr>
+            <a:spLocks noGrp="1"/>
+          </p:cNvSpPr>
+          <p:nvPr>
+            <p:ph type="title"/>
+          </p:nvPr>
+        </p:nvSpPr>
+        <p:spPr>
+          <a:xfrm>
+            <a:off x="457200" y="274638"/>
+            <a:ext cx="7467600" cy="1143000"/>
+          </a:xfrm>
+        </p:spPr>
+        <p:txBody>
+          <a:bodyPr/>
+          <a:lstStyle/>
+          <a:p>
+            <a:r>
+              <a:rPr lang="en-US" dirty="0" err="1"/>
+              <a:t>Montagem</a:t>
+            </a:r>
+            <a:r>
+              <a:rPr lang="en-US" dirty="0"/>
+              <a:t> do </a:t>
+            </a:r>
+            <a:r>
+              <a:rPr lang="en-US" dirty="0" err="1"/>
+              <a:t>Formulário</a:t>
+            </a:r>
+            <a:r>
+              <a:rPr lang="en-US" dirty="0"/>
+              <a:t> – </a:t>
+            </a:r>
+            <a:br>
+              <a:rPr lang="en-US" dirty="0"/>
+            </a:br>
+            <a:r>
+              <a:rPr lang="en-US" dirty="0"/>
+              <a:t>Unit windows</a:t>
+            </a:r>
+            <a:endParaRPr lang="pt-BR" dirty="0"/>
+          </a:p>
+        </p:txBody>
+      </p:sp>
+    </p:spTree>
+    <p:extLst>
+      <p:ext uri="{BB962C8B-B14F-4D97-AF65-F5344CB8AC3E}">
+        <p14:creationId xmlns:p14="http://schemas.microsoft.com/office/powerpoint/2010/main" val="3634093842"/>
+      </p:ext>
+    </p:extLst>
+  </p:cSld>
+  <p:clrMapOvr>
+    <a:masterClrMapping/>
+  </p:clrMapOvr>
+</p:sld>
+</file>
+
+<file path=ppt/slides/slide67.xml><?xml version="1.0" encoding="utf-8"?>
+<p:sld xmlns:a="http://schemas.openxmlformats.org/drawingml/2006/main" xmlns:r="http://schemas.openxmlformats.org/officeDocument/2006/relationships" xmlns:p="http://schemas.openxmlformats.org/presentationml/2006/main">
+  <p:cSld>
+    <p:spTree>
+      <p:nvGrpSpPr>
+        <p:cNvPr id="1" name=""/>
+        <p:cNvGrpSpPr/>
+        <p:nvPr/>
+      </p:nvGrpSpPr>
+      <p:grpSpPr>
+        <a:xfrm>
+          <a:off x="0" y="0"/>
+          <a:ext cx="0" cy="0"/>
+          <a:chOff x="0" y="0"/>
+          <a:chExt cx="0" cy="0"/>
+        </a:xfrm>
+      </p:grpSpPr>
+      <p:sp>
+        <p:nvSpPr>
+          <p:cNvPr id="6" name="CaixaDeTexto 5">
+            <a:extLst>
+              <a:ext uri="{FF2B5EF4-FFF2-40B4-BE49-F238E27FC236}">
+                <a16:creationId xmlns:a16="http://schemas.microsoft.com/office/drawing/2014/main" id="{060113CE-B7E6-4585-A5F5-43B3C1E8F3C8}"/>
+              </a:ext>
+            </a:extLst>
+          </p:cNvPr>
+          <p:cNvSpPr txBox="1"/>
+          <p:nvPr/>
+        </p:nvSpPr>
+        <p:spPr>
+          <a:xfrm>
+            <a:off x="457200" y="1567162"/>
+            <a:ext cx="7760458" cy="1200329"/>
+          </a:xfrm>
+          <a:prstGeom prst="rect">
+            <a:avLst/>
+          </a:prstGeom>
+          <a:noFill/>
+        </p:spPr>
+        <p:txBody>
+          <a:bodyPr wrap="none" rtlCol="0">
+            <a:spAutoFit/>
+          </a:bodyPr>
+          <a:lstStyle/>
+          <a:p>
+            <a:pPr marL="285750" indent="-285750">
+              <a:buFont typeface="Arial" panose="020B0604020202020204" pitchFamily="34" charset="0"/>
+              <a:buChar char="•"/>
+            </a:pPr>
+            <a:r>
+              <a:rPr lang="en-US" sz="2400" dirty="0"/>
+              <a:t>Configure o </a:t>
+            </a:r>
+            <a:r>
+              <a:rPr lang="en-US" sz="2400" dirty="0" err="1"/>
+              <a:t>componente</a:t>
+            </a:r>
+            <a:r>
+              <a:rPr lang="en-US" sz="2400" dirty="0"/>
+              <a:t> </a:t>
+            </a:r>
+            <a:r>
+              <a:rPr lang="en-US" sz="2400" b="1" dirty="0"/>
+              <a:t>Button1 </a:t>
+            </a:r>
+            <a:r>
+              <a:rPr lang="en-US" sz="2400" dirty="0" err="1"/>
+              <a:t>conforme</a:t>
+            </a:r>
+            <a:r>
+              <a:rPr lang="en-US" sz="2400" dirty="0"/>
+              <a:t> </a:t>
+            </a:r>
+            <a:r>
+              <a:rPr lang="en-US" sz="2400" dirty="0" err="1"/>
+              <a:t>abaixo</a:t>
+            </a:r>
+            <a:r>
+              <a:rPr lang="en-US" sz="2400" dirty="0"/>
+              <a:t>:</a:t>
+            </a:r>
+          </a:p>
+          <a:p>
+            <a:pPr marL="742950" lvl="1" indent="-285750">
+              <a:buFont typeface="Arial" panose="020B0604020202020204" pitchFamily="34" charset="0"/>
+              <a:buChar char="•"/>
+            </a:pPr>
+            <a:r>
+              <a:rPr lang="en-US" sz="2400" b="1" dirty="0"/>
+              <a:t>Align: Left</a:t>
+            </a:r>
+          </a:p>
+          <a:p>
+            <a:pPr marL="742950" lvl="1" indent="-285750">
+              <a:buFont typeface="Arial" panose="020B0604020202020204" pitchFamily="34" charset="0"/>
+              <a:buChar char="•"/>
+            </a:pPr>
+            <a:r>
+              <a:rPr lang="en-US" sz="2400" b="1" dirty="0" err="1"/>
+              <a:t>StyleLookup</a:t>
+            </a:r>
+            <a:r>
+              <a:rPr lang="en-US" sz="2400" b="1" dirty="0"/>
+              <a:t>: </a:t>
+            </a:r>
+            <a:r>
+              <a:rPr lang="en-US" sz="2400" b="1" dirty="0" err="1"/>
+              <a:t>priortoolbutton</a:t>
+            </a:r>
+            <a:endParaRPr lang="en-US" sz="2400" b="1" dirty="0"/>
+          </a:p>
+        </p:txBody>
+      </p:sp>
+      <p:sp>
+        <p:nvSpPr>
+          <p:cNvPr id="7" name="CaixaDeTexto 6">
+            <a:extLst>
+              <a:ext uri="{FF2B5EF4-FFF2-40B4-BE49-F238E27FC236}">
+                <a16:creationId xmlns:a16="http://schemas.microsoft.com/office/drawing/2014/main" id="{B34A127B-F58C-47CF-A39F-EA200EC92E5A}"/>
+              </a:ext>
+            </a:extLst>
+          </p:cNvPr>
+          <p:cNvSpPr txBox="1"/>
+          <p:nvPr/>
+        </p:nvSpPr>
+        <p:spPr>
+          <a:xfrm>
+            <a:off x="420757" y="3048000"/>
+            <a:ext cx="7760458" cy="1200329"/>
+          </a:xfrm>
+          <a:prstGeom prst="rect">
+            <a:avLst/>
+          </a:prstGeom>
+          <a:noFill/>
+        </p:spPr>
+        <p:txBody>
+          <a:bodyPr wrap="none" rtlCol="0">
+            <a:spAutoFit/>
+          </a:bodyPr>
+          <a:lstStyle/>
+          <a:p>
+            <a:pPr marL="285750" indent="-285750">
+              <a:buFont typeface="Arial" panose="020B0604020202020204" pitchFamily="34" charset="0"/>
+              <a:buChar char="•"/>
+            </a:pPr>
+            <a:r>
+              <a:rPr lang="en-US" sz="2400" dirty="0"/>
+              <a:t>Configure o </a:t>
+            </a:r>
+            <a:r>
+              <a:rPr lang="en-US" sz="2400" dirty="0" err="1"/>
+              <a:t>componente</a:t>
+            </a:r>
+            <a:r>
+              <a:rPr lang="en-US" sz="2400" dirty="0"/>
+              <a:t> </a:t>
+            </a:r>
+            <a:r>
+              <a:rPr lang="en-US" sz="2400" b="1" dirty="0"/>
+              <a:t>Button2 </a:t>
+            </a:r>
+            <a:r>
+              <a:rPr lang="en-US" sz="2400" dirty="0" err="1"/>
+              <a:t>conforme</a:t>
+            </a:r>
+            <a:r>
+              <a:rPr lang="en-US" sz="2400" dirty="0"/>
+              <a:t> </a:t>
+            </a:r>
+            <a:r>
+              <a:rPr lang="en-US" sz="2400" dirty="0" err="1"/>
+              <a:t>abaixo</a:t>
+            </a:r>
+            <a:r>
+              <a:rPr lang="en-US" sz="2400" dirty="0"/>
+              <a:t>:</a:t>
+            </a:r>
+          </a:p>
+          <a:p>
+            <a:pPr marL="742950" lvl="1" indent="-285750">
+              <a:buFont typeface="Arial" panose="020B0604020202020204" pitchFamily="34" charset="0"/>
+              <a:buChar char="•"/>
+            </a:pPr>
+            <a:r>
+              <a:rPr lang="en-US" sz="2400" b="1" dirty="0"/>
+              <a:t>Align: Right</a:t>
+            </a:r>
+          </a:p>
+          <a:p>
+            <a:pPr marL="742950" lvl="1" indent="-285750">
+              <a:buFont typeface="Arial" panose="020B0604020202020204" pitchFamily="34" charset="0"/>
+              <a:buChar char="•"/>
+            </a:pPr>
+            <a:r>
+              <a:rPr lang="en-US" sz="2400" b="1" dirty="0" err="1"/>
+              <a:t>StyleLookup</a:t>
+            </a:r>
+            <a:r>
+              <a:rPr lang="en-US" sz="2400" b="1" dirty="0"/>
+              <a:t>: </a:t>
+            </a:r>
+            <a:r>
+              <a:rPr lang="en-US" sz="2400" b="1" dirty="0" err="1"/>
+              <a:t>playtoolbutton</a:t>
+            </a:r>
+            <a:endParaRPr lang="en-US" sz="2400" b="1" dirty="0"/>
+          </a:p>
+        </p:txBody>
+      </p:sp>
+      <p:sp>
+        <p:nvSpPr>
+          <p:cNvPr id="8" name="CaixaDeTexto 7">
+            <a:extLst>
+              <a:ext uri="{FF2B5EF4-FFF2-40B4-BE49-F238E27FC236}">
+                <a16:creationId xmlns:a16="http://schemas.microsoft.com/office/drawing/2014/main" id="{5762CEC5-1380-45BF-B7AB-D320884DD9F9}"/>
+              </a:ext>
+            </a:extLst>
+          </p:cNvPr>
+          <p:cNvSpPr txBox="1"/>
+          <p:nvPr/>
+        </p:nvSpPr>
+        <p:spPr>
+          <a:xfrm>
+            <a:off x="609600" y="4495800"/>
+            <a:ext cx="7542449" cy="2677656"/>
+          </a:xfrm>
+          <a:prstGeom prst="rect">
+            <a:avLst/>
+          </a:prstGeom>
+          <a:noFill/>
+        </p:spPr>
+        <p:txBody>
+          <a:bodyPr wrap="none" rtlCol="0">
+            <a:spAutoFit/>
+          </a:bodyPr>
+          <a:lstStyle/>
+          <a:p>
+            <a:pPr marL="285750" indent="-285750">
+              <a:buFont typeface="Arial" panose="020B0604020202020204" pitchFamily="34" charset="0"/>
+              <a:buChar char="•"/>
+            </a:pPr>
+            <a:r>
+              <a:rPr lang="en-US" sz="2400" dirty="0"/>
+              <a:t>Configure o </a:t>
+            </a:r>
+            <a:r>
+              <a:rPr lang="en-US" sz="2400" dirty="0" err="1"/>
+              <a:t>componente</a:t>
+            </a:r>
+            <a:r>
+              <a:rPr lang="en-US" sz="2400" dirty="0"/>
+              <a:t> </a:t>
+            </a:r>
+            <a:r>
+              <a:rPr lang="en-US" sz="2400" b="1" dirty="0"/>
+              <a:t>Label1 </a:t>
+            </a:r>
+            <a:r>
+              <a:rPr lang="en-US" sz="2400" dirty="0" err="1"/>
+              <a:t>conforme</a:t>
+            </a:r>
+            <a:r>
+              <a:rPr lang="en-US" sz="2400" dirty="0"/>
+              <a:t> </a:t>
+            </a:r>
+            <a:r>
+              <a:rPr lang="en-US" sz="2400" dirty="0" err="1"/>
+              <a:t>abaixo</a:t>
+            </a:r>
+            <a:r>
+              <a:rPr lang="en-US" sz="2400" dirty="0"/>
+              <a:t>:</a:t>
+            </a:r>
+          </a:p>
+          <a:p>
+            <a:pPr marL="742950" lvl="1" indent="-285750">
+              <a:buFont typeface="Arial" panose="020B0604020202020204" pitchFamily="34" charset="0"/>
+              <a:buChar char="•"/>
+            </a:pPr>
+            <a:r>
+              <a:rPr lang="en-US" sz="2400" b="1" dirty="0"/>
+              <a:t>Align: Center</a:t>
+            </a:r>
+          </a:p>
+          <a:p>
+            <a:pPr marL="742950" lvl="1" indent="-285750">
+              <a:buFont typeface="Arial" panose="020B0604020202020204" pitchFamily="34" charset="0"/>
+              <a:buChar char="•"/>
+            </a:pPr>
+            <a:r>
+              <a:rPr lang="en-US" sz="2400" b="1" dirty="0" err="1"/>
+              <a:t>AutoSize</a:t>
+            </a:r>
+            <a:r>
+              <a:rPr lang="en-US" sz="2400" b="1" dirty="0"/>
+              <a:t>: True</a:t>
+            </a:r>
+          </a:p>
+          <a:p>
+            <a:pPr marL="742950" lvl="1" indent="-285750">
+              <a:buFont typeface="Arial" panose="020B0604020202020204" pitchFamily="34" charset="0"/>
+              <a:buChar char="•"/>
+            </a:pPr>
+            <a:r>
+              <a:rPr lang="en-US" sz="2400" b="1" dirty="0"/>
+              <a:t>Text: </a:t>
+            </a:r>
+            <a:r>
+              <a:rPr lang="en-US" sz="2400" b="1" dirty="0" err="1"/>
+              <a:t>Controlador</a:t>
+            </a:r>
+            <a:r>
+              <a:rPr lang="en-US" sz="2400" b="1" dirty="0"/>
+              <a:t> Windows</a:t>
+            </a:r>
+          </a:p>
+          <a:p>
+            <a:pPr marL="742950" lvl="1" indent="-285750">
+              <a:buFont typeface="Arial" panose="020B0604020202020204" pitchFamily="34" charset="0"/>
+              <a:buChar char="•"/>
+            </a:pPr>
+            <a:r>
+              <a:rPr lang="en-US" sz="2400" b="1" dirty="0" err="1"/>
+              <a:t>TextSettings</a:t>
+            </a:r>
+            <a:r>
+              <a:rPr lang="en-US" sz="2400" b="1" dirty="0"/>
+              <a:t> -&gt; Font -&gt; Size: 20</a:t>
+            </a:r>
+          </a:p>
+          <a:p>
+            <a:pPr marL="742950" lvl="1" indent="-285750">
+              <a:buFont typeface="Arial" panose="020B0604020202020204" pitchFamily="34" charset="0"/>
+              <a:buChar char="•"/>
+            </a:pPr>
+            <a:r>
+              <a:rPr lang="en-US" sz="2400" b="1" dirty="0" err="1"/>
+              <a:t>TextSetting</a:t>
+            </a:r>
+            <a:r>
+              <a:rPr lang="en-US" sz="2400" b="1" dirty="0"/>
+              <a:t> -&gt; </a:t>
+            </a:r>
+            <a:r>
+              <a:rPr lang="en-US" sz="2400" b="1" dirty="0" err="1"/>
+              <a:t>WordWrap</a:t>
+            </a:r>
+            <a:r>
+              <a:rPr lang="en-US" sz="2400" b="1" dirty="0"/>
+              <a:t>: False</a:t>
+            </a:r>
+          </a:p>
+          <a:p>
+            <a:pPr marL="742950" lvl="1" indent="-285750">
+              <a:buFont typeface="Arial" panose="020B0604020202020204" pitchFamily="34" charset="0"/>
+              <a:buChar char="•"/>
+            </a:pPr>
+            <a:endParaRPr lang="en-US" sz="2400" b="1" dirty="0"/>
+          </a:p>
+        </p:txBody>
+      </p:sp>
+      <p:sp>
+        <p:nvSpPr>
+          <p:cNvPr id="9" name="Título 1">
+            <a:extLst>
+              <a:ext uri="{FF2B5EF4-FFF2-40B4-BE49-F238E27FC236}">
+                <a16:creationId xmlns:a16="http://schemas.microsoft.com/office/drawing/2014/main" id="{E1FB402C-7563-430F-BAD6-7D082B3197D2}"/>
+              </a:ext>
+            </a:extLst>
+          </p:cNvPr>
+          <p:cNvSpPr>
+            <a:spLocks noGrp="1"/>
+          </p:cNvSpPr>
+          <p:nvPr>
+            <p:ph type="title"/>
+          </p:nvPr>
+        </p:nvSpPr>
+        <p:spPr>
+          <a:xfrm>
+            <a:off x="457200" y="274638"/>
+            <a:ext cx="7467600" cy="1143000"/>
+          </a:xfrm>
+        </p:spPr>
+        <p:txBody>
+          <a:bodyPr/>
+          <a:lstStyle/>
+          <a:p>
+            <a:r>
+              <a:rPr lang="en-US" dirty="0" err="1"/>
+              <a:t>Montagem</a:t>
+            </a:r>
+            <a:r>
+              <a:rPr lang="en-US" dirty="0"/>
+              <a:t> do </a:t>
+            </a:r>
+            <a:r>
+              <a:rPr lang="en-US" dirty="0" err="1"/>
+              <a:t>Formulário</a:t>
+            </a:r>
+            <a:r>
+              <a:rPr lang="en-US" dirty="0"/>
+              <a:t> – </a:t>
+            </a:r>
+            <a:br>
+              <a:rPr lang="en-US" dirty="0"/>
+            </a:br>
+            <a:r>
+              <a:rPr lang="en-US" dirty="0"/>
+              <a:t>Unit windows</a:t>
+            </a:r>
+            <a:endParaRPr lang="pt-BR" dirty="0"/>
+          </a:p>
+        </p:txBody>
+      </p:sp>
+    </p:spTree>
+    <p:extLst>
+      <p:ext uri="{BB962C8B-B14F-4D97-AF65-F5344CB8AC3E}">
+        <p14:creationId xmlns:p14="http://schemas.microsoft.com/office/powerpoint/2010/main" val="771215191"/>
+      </p:ext>
+    </p:extLst>
+  </p:cSld>
+  <p:clrMapOvr>
+    <a:masterClrMapping/>
+  </p:clrMapOvr>
+</p:sld>
+</file>
+
+<file path=ppt/slides/slide68.xml><?xml version="1.0" encoding="utf-8"?>
+<p:sld xmlns:a="http://schemas.openxmlformats.org/drawingml/2006/main" xmlns:r="http://schemas.openxmlformats.org/officeDocument/2006/relationships" xmlns:p="http://schemas.openxmlformats.org/presentationml/2006/main">
+  <p:cSld>
+    <p:spTree>
+      <p:nvGrpSpPr>
+        <p:cNvPr id="1" name=""/>
+        <p:cNvGrpSpPr/>
+        <p:nvPr/>
+      </p:nvGrpSpPr>
+      <p:grpSpPr>
+        <a:xfrm>
+          <a:off x="0" y="0"/>
+          <a:ext cx="0" cy="0"/>
+          <a:chOff x="0" y="0"/>
+          <a:chExt cx="0" cy="0"/>
+        </a:xfrm>
+      </p:grpSpPr>
+      <p:sp>
+        <p:nvSpPr>
+          <p:cNvPr id="4" name="Título 1">
+            <a:extLst>
+              <a:ext uri="{FF2B5EF4-FFF2-40B4-BE49-F238E27FC236}">
+                <a16:creationId xmlns:a16="http://schemas.microsoft.com/office/drawing/2014/main" id="{E0EDC875-2E4B-4DDC-9AB1-186D1C95F3F3}"/>
+              </a:ext>
+            </a:extLst>
+          </p:cNvPr>
+          <p:cNvSpPr>
+            <a:spLocks noGrp="1"/>
+          </p:cNvSpPr>
+          <p:nvPr>
+            <p:ph type="title"/>
+          </p:nvPr>
+        </p:nvSpPr>
+        <p:spPr>
+          <a:xfrm>
+            <a:off x="457200" y="274638"/>
+            <a:ext cx="7467600" cy="1143000"/>
+          </a:xfrm>
+        </p:spPr>
+        <p:txBody>
+          <a:bodyPr/>
+          <a:lstStyle/>
+          <a:p>
+            <a:r>
+              <a:rPr lang="en-US" dirty="0" err="1"/>
+              <a:t>Montagem</a:t>
+            </a:r>
+            <a:r>
+              <a:rPr lang="en-US" dirty="0"/>
+              <a:t> do </a:t>
+            </a:r>
+            <a:r>
+              <a:rPr lang="en-US" dirty="0" err="1"/>
+              <a:t>Formulário</a:t>
+            </a:r>
+            <a:r>
+              <a:rPr lang="en-US" dirty="0"/>
+              <a:t> – </a:t>
+            </a:r>
+            <a:br>
+              <a:rPr lang="en-US" dirty="0"/>
+            </a:br>
+            <a:r>
+              <a:rPr lang="en-US" dirty="0"/>
+              <a:t>Unit windows</a:t>
+            </a:r>
+            <a:endParaRPr lang="pt-BR" dirty="0"/>
+          </a:p>
+        </p:txBody>
+      </p:sp>
+      <p:pic>
+        <p:nvPicPr>
+          <p:cNvPr id="6" name="Imagem 5">
+            <a:extLst>
+              <a:ext uri="{FF2B5EF4-FFF2-40B4-BE49-F238E27FC236}">
+                <a16:creationId xmlns:a16="http://schemas.microsoft.com/office/drawing/2014/main" id="{1DCF82AE-F813-48C4-8C6C-380B5ABBC8B6}"/>
+              </a:ext>
+            </a:extLst>
+          </p:cNvPr>
+          <p:cNvPicPr>
+            <a:picLocks noChangeAspect="1"/>
+          </p:cNvPicPr>
+          <p:nvPr/>
+        </p:nvPicPr>
+        <p:blipFill>
+          <a:blip r:embed="rId2"/>
+          <a:stretch>
+            <a:fillRect/>
+          </a:stretch>
+        </p:blipFill>
+        <p:spPr>
+          <a:xfrm>
+            <a:off x="609600" y="1600200"/>
+            <a:ext cx="6296025" cy="4752975"/>
+          </a:xfrm>
+          <a:prstGeom prst="rect">
+            <a:avLst/>
+          </a:prstGeom>
+        </p:spPr>
+      </p:pic>
+    </p:spTree>
+    <p:extLst>
+      <p:ext uri="{BB962C8B-B14F-4D97-AF65-F5344CB8AC3E}">
+        <p14:creationId xmlns:p14="http://schemas.microsoft.com/office/powerpoint/2010/main" val="1159048196"/>
+      </p:ext>
+    </p:extLst>
+  </p:cSld>
+  <p:clrMapOvr>
+    <a:masterClrMapping/>
+  </p:clrMapOvr>
+</p:sld>
+</file>
+
+<file path=ppt/slides/slide69.xml><?xml version="1.0" encoding="utf-8"?>
+<p:sld xmlns:a="http://schemas.openxmlformats.org/drawingml/2006/main" xmlns:r="http://schemas.openxmlformats.org/officeDocument/2006/relationships" xmlns:p="http://schemas.openxmlformats.org/presentationml/2006/main">
+  <p:cSld>
+    <p:spTree>
+      <p:nvGrpSpPr>
+        <p:cNvPr id="1" name=""/>
+        <p:cNvGrpSpPr/>
+        <p:nvPr/>
+      </p:nvGrpSpPr>
+      <p:grpSpPr>
+        <a:xfrm>
+          <a:off x="0" y="0"/>
+          <a:ext cx="0" cy="0"/>
+          <a:chOff x="0" y="0"/>
+          <a:chExt cx="0" cy="0"/>
+        </a:xfrm>
+      </p:grpSpPr>
+      <p:sp>
+        <p:nvSpPr>
+          <p:cNvPr id="5" name="Título 1">
+            <a:extLst>
+              <a:ext uri="{FF2B5EF4-FFF2-40B4-BE49-F238E27FC236}">
+                <a16:creationId xmlns:a16="http://schemas.microsoft.com/office/drawing/2014/main" id="{EE0C3CA3-6A2D-448A-B978-4CEF1D514BDC}"/>
+              </a:ext>
+            </a:extLst>
+          </p:cNvPr>
+          <p:cNvSpPr>
+            <a:spLocks noGrp="1"/>
+          </p:cNvSpPr>
+          <p:nvPr>
+            <p:ph type="title"/>
+          </p:nvPr>
+        </p:nvSpPr>
+        <p:spPr>
+          <a:xfrm>
+            <a:off x="457200" y="274638"/>
+            <a:ext cx="7467600" cy="1143000"/>
+          </a:xfrm>
+        </p:spPr>
+        <p:txBody>
+          <a:bodyPr/>
+          <a:lstStyle/>
+          <a:p>
+            <a:r>
+              <a:rPr lang="en-US" dirty="0" err="1"/>
+              <a:t>Montagem</a:t>
+            </a:r>
+            <a:r>
+              <a:rPr lang="en-US" dirty="0"/>
+              <a:t> do </a:t>
+            </a:r>
+            <a:r>
+              <a:rPr lang="en-US" dirty="0" err="1"/>
+              <a:t>Formulário</a:t>
+            </a:r>
+            <a:r>
+              <a:rPr lang="en-US" dirty="0"/>
+              <a:t> – </a:t>
+            </a:r>
+            <a:br>
+              <a:rPr lang="en-US" dirty="0"/>
+            </a:br>
+            <a:r>
+              <a:rPr lang="en-US" dirty="0"/>
+              <a:t>Unit windows</a:t>
+            </a:r>
+            <a:endParaRPr lang="pt-BR" dirty="0"/>
+          </a:p>
+        </p:txBody>
+      </p:sp>
+      <p:pic>
+        <p:nvPicPr>
+          <p:cNvPr id="7" name="Imagem 6">
+            <a:extLst>
+              <a:ext uri="{FF2B5EF4-FFF2-40B4-BE49-F238E27FC236}">
+                <a16:creationId xmlns:a16="http://schemas.microsoft.com/office/drawing/2014/main" id="{F50578A3-6FAE-4293-AA73-58B229C50009}"/>
+              </a:ext>
+            </a:extLst>
+          </p:cNvPr>
+          <p:cNvPicPr>
+            <a:picLocks noChangeAspect="1"/>
+          </p:cNvPicPr>
+          <p:nvPr/>
+        </p:nvPicPr>
+        <p:blipFill>
+          <a:blip r:embed="rId2"/>
+          <a:stretch>
+            <a:fillRect/>
+          </a:stretch>
+        </p:blipFill>
+        <p:spPr>
+          <a:xfrm>
+            <a:off x="609600" y="4581869"/>
+            <a:ext cx="6334125" cy="1657350"/>
+          </a:xfrm>
+          <a:prstGeom prst="rect">
+            <a:avLst/>
+          </a:prstGeom>
+        </p:spPr>
+      </p:pic>
+      <p:sp>
+        <p:nvSpPr>
+          <p:cNvPr id="8" name="CaixaDeTexto 7">
+            <a:extLst>
+              <a:ext uri="{FF2B5EF4-FFF2-40B4-BE49-F238E27FC236}">
+                <a16:creationId xmlns:a16="http://schemas.microsoft.com/office/drawing/2014/main" id="{B478E4F0-8817-4C4D-AFCF-1645AEE62128}"/>
+              </a:ext>
+            </a:extLst>
+          </p:cNvPr>
+          <p:cNvSpPr txBox="1"/>
+          <p:nvPr/>
+        </p:nvSpPr>
+        <p:spPr>
+          <a:xfrm>
+            <a:off x="457200" y="1783533"/>
+            <a:ext cx="4953000" cy="1200329"/>
+          </a:xfrm>
+          <a:prstGeom prst="rect">
+            <a:avLst/>
+          </a:prstGeom>
+          <a:noFill/>
+        </p:spPr>
+        <p:txBody>
+          <a:bodyPr wrap="square" rtlCol="0">
+            <a:spAutoFit/>
+          </a:bodyPr>
+          <a:lstStyle/>
+          <a:p>
+            <a:pPr marL="342900" indent="-342900">
+              <a:buFont typeface="Arial" panose="020B0604020202020204" pitchFamily="34" charset="0"/>
+              <a:buChar char="•"/>
+            </a:pPr>
+            <a:r>
+              <a:rPr lang="en-US" sz="2400" dirty="0" err="1"/>
+              <a:t>Adicione</a:t>
+            </a:r>
+            <a:r>
+              <a:rPr lang="en-US" sz="2400" dirty="0"/>
+              <a:t> um </a:t>
+            </a:r>
+            <a:r>
+              <a:rPr lang="en-US" sz="2400" dirty="0" err="1"/>
+              <a:t>componente</a:t>
+            </a:r>
+            <a:r>
+              <a:rPr lang="en-US" sz="2400" dirty="0"/>
+              <a:t> </a:t>
+            </a:r>
+            <a:r>
+              <a:rPr lang="en-US" sz="2400" b="1" dirty="0" err="1"/>
+              <a:t>TLayout</a:t>
+            </a:r>
+            <a:r>
+              <a:rPr lang="en-US" sz="2400" b="1" dirty="0"/>
+              <a:t> </a:t>
+            </a:r>
+            <a:r>
+              <a:rPr lang="en-US" sz="2400" dirty="0"/>
+              <a:t>da aba </a:t>
+            </a:r>
+            <a:r>
+              <a:rPr lang="en-US" sz="2400" b="1" dirty="0"/>
+              <a:t>Layouts </a:t>
+            </a:r>
+            <a:r>
+              <a:rPr lang="en-US" sz="2400" dirty="0" err="1"/>
+              <a:t>ao</a:t>
+            </a:r>
+            <a:r>
+              <a:rPr lang="en-US" sz="2400" dirty="0"/>
+              <a:t> </a:t>
+            </a:r>
+            <a:r>
+              <a:rPr lang="en-US" sz="2400" dirty="0" err="1"/>
+              <a:t>formulário</a:t>
+            </a:r>
+            <a:r>
+              <a:rPr lang="en-US" sz="2400" b="1" dirty="0"/>
+              <a:t> </a:t>
+            </a:r>
+            <a:r>
+              <a:rPr lang="en-US" sz="2400" dirty="0"/>
+              <a:t> </a:t>
+            </a:r>
+          </a:p>
+        </p:txBody>
+      </p:sp>
+      <p:pic>
+        <p:nvPicPr>
+          <p:cNvPr id="10" name="Imagem 9">
+            <a:extLst>
+              <a:ext uri="{FF2B5EF4-FFF2-40B4-BE49-F238E27FC236}">
+                <a16:creationId xmlns:a16="http://schemas.microsoft.com/office/drawing/2014/main" id="{4C3734D7-62CE-43D7-8C7E-BB0C80C7EE1D}"/>
+              </a:ext>
+            </a:extLst>
+          </p:cNvPr>
+          <p:cNvPicPr>
+            <a:picLocks noChangeAspect="1"/>
+          </p:cNvPicPr>
+          <p:nvPr/>
+        </p:nvPicPr>
+        <p:blipFill>
+          <a:blip r:embed="rId3"/>
+          <a:stretch>
+            <a:fillRect/>
+          </a:stretch>
+        </p:blipFill>
+        <p:spPr>
+          <a:xfrm>
+            <a:off x="5715000" y="1447456"/>
+            <a:ext cx="2628900" cy="2657475"/>
+          </a:xfrm>
+          <a:prstGeom prst="rect">
+            <a:avLst/>
+          </a:prstGeom>
+        </p:spPr>
+      </p:pic>
+    </p:spTree>
+    <p:extLst>
+      <p:ext uri="{BB962C8B-B14F-4D97-AF65-F5344CB8AC3E}">
+        <p14:creationId xmlns:p14="http://schemas.microsoft.com/office/powerpoint/2010/main" val="3625174971"/>
+      </p:ext>
+    </p:extLst>
+  </p:cSld>
+  <p:clrMapOvr>
+    <a:masterClrMapping/>
+  </p:clrMapOvr>
+</p:sld>
+</file>
+
 <file path=ppt/slides/slide7.xml><?xml version="1.0" encoding="utf-8"?>
 <p:sld xmlns:a="http://schemas.openxmlformats.org/drawingml/2006/main" xmlns:r="http://schemas.openxmlformats.org/officeDocument/2006/relationships" xmlns:p="http://schemas.openxmlformats.org/presentationml/2006/main">
   <p:cSld>
@@ -19863,6 +23260,692 @@
     <p:extLst>
       <p:ext uri="{BB962C8B-B14F-4D97-AF65-F5344CB8AC3E}">
         <p14:creationId xmlns:p14="http://schemas.microsoft.com/office/powerpoint/2010/main" val="2561017566"/>
+      </p:ext>
+    </p:extLst>
+  </p:cSld>
+  <p:clrMapOvr>
+    <a:masterClrMapping/>
+  </p:clrMapOvr>
+</p:sld>
+</file>
+
+<file path=ppt/slides/slide70.xml><?xml version="1.0" encoding="utf-8"?>
+<p:sld xmlns:a="http://schemas.openxmlformats.org/drawingml/2006/main" xmlns:r="http://schemas.openxmlformats.org/officeDocument/2006/relationships" xmlns:p="http://schemas.openxmlformats.org/presentationml/2006/main">
+  <p:cSld>
+    <p:spTree>
+      <p:nvGrpSpPr>
+        <p:cNvPr id="1" name=""/>
+        <p:cNvGrpSpPr/>
+        <p:nvPr/>
+      </p:nvGrpSpPr>
+      <p:grpSpPr>
+        <a:xfrm>
+          <a:off x="0" y="0"/>
+          <a:ext cx="0" cy="0"/>
+          <a:chOff x="0" y="0"/>
+          <a:chExt cx="0" cy="0"/>
+        </a:xfrm>
+      </p:grpSpPr>
+      <p:sp>
+        <p:nvSpPr>
+          <p:cNvPr id="4" name="Título 1">
+            <a:extLst>
+              <a:ext uri="{FF2B5EF4-FFF2-40B4-BE49-F238E27FC236}">
+                <a16:creationId xmlns:a16="http://schemas.microsoft.com/office/drawing/2014/main" id="{41911951-B490-47A7-91F7-E34E03A4E291}"/>
+              </a:ext>
+            </a:extLst>
+          </p:cNvPr>
+          <p:cNvSpPr>
+            <a:spLocks noGrp="1"/>
+          </p:cNvSpPr>
+          <p:nvPr>
+            <p:ph type="title"/>
+          </p:nvPr>
+        </p:nvSpPr>
+        <p:spPr>
+          <a:xfrm>
+            <a:off x="457200" y="274638"/>
+            <a:ext cx="7467600" cy="1143000"/>
+          </a:xfrm>
+        </p:spPr>
+        <p:txBody>
+          <a:bodyPr/>
+          <a:lstStyle/>
+          <a:p>
+            <a:r>
+              <a:rPr lang="en-US" dirty="0" err="1"/>
+              <a:t>Montagem</a:t>
+            </a:r>
+            <a:r>
+              <a:rPr lang="en-US" dirty="0"/>
+              <a:t> do </a:t>
+            </a:r>
+            <a:r>
+              <a:rPr lang="en-US" dirty="0" err="1"/>
+              <a:t>Formulário</a:t>
+            </a:r>
+            <a:r>
+              <a:rPr lang="en-US" dirty="0"/>
+              <a:t> – </a:t>
+            </a:r>
+            <a:br>
+              <a:rPr lang="en-US" dirty="0"/>
+            </a:br>
+            <a:r>
+              <a:rPr lang="en-US" dirty="0"/>
+              <a:t>Unit windows</a:t>
+            </a:r>
+            <a:endParaRPr lang="pt-BR" dirty="0"/>
+          </a:p>
+        </p:txBody>
+      </p:sp>
+      <p:pic>
+        <p:nvPicPr>
+          <p:cNvPr id="6" name="Imagem 5">
+            <a:extLst>
+              <a:ext uri="{FF2B5EF4-FFF2-40B4-BE49-F238E27FC236}">
+                <a16:creationId xmlns:a16="http://schemas.microsoft.com/office/drawing/2014/main" id="{44CD6A9F-A8B6-46FC-883C-4F50D73E8995}"/>
+              </a:ext>
+            </a:extLst>
+          </p:cNvPr>
+          <p:cNvPicPr>
+            <a:picLocks noChangeAspect="1"/>
+          </p:cNvPicPr>
+          <p:nvPr/>
+        </p:nvPicPr>
+        <p:blipFill>
+          <a:blip r:embed="rId2"/>
+          <a:stretch>
+            <a:fillRect/>
+          </a:stretch>
+        </p:blipFill>
+        <p:spPr>
+          <a:xfrm>
+            <a:off x="5638800" y="1371600"/>
+            <a:ext cx="2638425" cy="2657475"/>
+          </a:xfrm>
+          <a:prstGeom prst="rect">
+            <a:avLst/>
+          </a:prstGeom>
+        </p:spPr>
+      </p:pic>
+      <p:sp>
+        <p:nvSpPr>
+          <p:cNvPr id="7" name="CaixaDeTexto 6">
+            <a:extLst>
+              <a:ext uri="{FF2B5EF4-FFF2-40B4-BE49-F238E27FC236}">
+                <a16:creationId xmlns:a16="http://schemas.microsoft.com/office/drawing/2014/main" id="{6B2E68D3-55A7-438D-940B-5AB3770FDA19}"/>
+              </a:ext>
+            </a:extLst>
+          </p:cNvPr>
+          <p:cNvSpPr txBox="1"/>
+          <p:nvPr/>
+        </p:nvSpPr>
+        <p:spPr>
+          <a:xfrm>
+            <a:off x="609600" y="2133600"/>
+            <a:ext cx="4953000" cy="1200329"/>
+          </a:xfrm>
+          <a:prstGeom prst="rect">
+            <a:avLst/>
+          </a:prstGeom>
+          <a:noFill/>
+        </p:spPr>
+        <p:txBody>
+          <a:bodyPr wrap="square" rtlCol="0">
+            <a:spAutoFit/>
+          </a:bodyPr>
+          <a:lstStyle/>
+          <a:p>
+            <a:pPr marL="342900" indent="-342900">
+              <a:buFont typeface="Arial" panose="020B0604020202020204" pitchFamily="34" charset="0"/>
+              <a:buChar char="•"/>
+            </a:pPr>
+            <a:r>
+              <a:rPr lang="en-US" sz="2400" dirty="0" err="1"/>
+              <a:t>Adicione</a:t>
+            </a:r>
+            <a:r>
+              <a:rPr lang="en-US" sz="2400" dirty="0"/>
+              <a:t> um </a:t>
+            </a:r>
+            <a:r>
+              <a:rPr lang="en-US" sz="2400" dirty="0" err="1"/>
+              <a:t>componente</a:t>
+            </a:r>
+            <a:r>
+              <a:rPr lang="en-US" sz="2400" dirty="0"/>
+              <a:t> </a:t>
+            </a:r>
+            <a:r>
+              <a:rPr lang="en-US" sz="2400" b="1" dirty="0" err="1"/>
+              <a:t>TComboBox</a:t>
+            </a:r>
+            <a:r>
+              <a:rPr lang="en-US" sz="2400" dirty="0"/>
+              <a:t> e um </a:t>
+            </a:r>
+            <a:r>
+              <a:rPr lang="en-US" sz="2400" b="1" dirty="0" err="1"/>
+              <a:t>TLabel</a:t>
+            </a:r>
+            <a:r>
+              <a:rPr lang="en-US" sz="2400" dirty="0"/>
+              <a:t> da aba </a:t>
+            </a:r>
+            <a:r>
+              <a:rPr lang="en-US" sz="2400" b="1" dirty="0"/>
+              <a:t>Standard </a:t>
+            </a:r>
+            <a:r>
+              <a:rPr lang="en-US" sz="2400" dirty="0" err="1"/>
+              <a:t>ao</a:t>
+            </a:r>
+            <a:r>
+              <a:rPr lang="en-US" sz="2400" dirty="0"/>
+              <a:t> </a:t>
+            </a:r>
+            <a:r>
+              <a:rPr lang="en-US" sz="2400" b="1" dirty="0"/>
+              <a:t>Layout1</a:t>
+            </a:r>
+            <a:r>
+              <a:rPr lang="en-US" sz="2400" dirty="0"/>
+              <a:t>  </a:t>
+            </a:r>
+          </a:p>
+        </p:txBody>
+      </p:sp>
+      <p:pic>
+        <p:nvPicPr>
+          <p:cNvPr id="12" name="Imagem 11">
+            <a:extLst>
+              <a:ext uri="{FF2B5EF4-FFF2-40B4-BE49-F238E27FC236}">
+                <a16:creationId xmlns:a16="http://schemas.microsoft.com/office/drawing/2014/main" id="{5D1C8FB8-785D-4ACD-9D8D-DC7B0E32CBEF}"/>
+              </a:ext>
+            </a:extLst>
+          </p:cNvPr>
+          <p:cNvPicPr>
+            <a:picLocks noChangeAspect="1"/>
+          </p:cNvPicPr>
+          <p:nvPr/>
+        </p:nvPicPr>
+        <p:blipFill>
+          <a:blip r:embed="rId3"/>
+          <a:stretch>
+            <a:fillRect/>
+          </a:stretch>
+        </p:blipFill>
+        <p:spPr>
+          <a:xfrm>
+            <a:off x="347662" y="4259097"/>
+            <a:ext cx="7686675" cy="2324265"/>
+          </a:xfrm>
+          <a:prstGeom prst="rect">
+            <a:avLst/>
+          </a:prstGeom>
+        </p:spPr>
+      </p:pic>
+    </p:spTree>
+    <p:extLst>
+      <p:ext uri="{BB962C8B-B14F-4D97-AF65-F5344CB8AC3E}">
+        <p14:creationId xmlns:p14="http://schemas.microsoft.com/office/powerpoint/2010/main" val="3670472475"/>
+      </p:ext>
+    </p:extLst>
+  </p:cSld>
+  <p:clrMapOvr>
+    <a:masterClrMapping/>
+  </p:clrMapOvr>
+</p:sld>
+</file>
+
+<file path=ppt/slides/slide71.xml><?xml version="1.0" encoding="utf-8"?>
+<p:sld xmlns:a="http://schemas.openxmlformats.org/drawingml/2006/main" xmlns:r="http://schemas.openxmlformats.org/officeDocument/2006/relationships" xmlns:p="http://schemas.openxmlformats.org/presentationml/2006/main">
+  <p:cSld>
+    <p:spTree>
+      <p:nvGrpSpPr>
+        <p:cNvPr id="1" name=""/>
+        <p:cNvGrpSpPr/>
+        <p:nvPr/>
+      </p:nvGrpSpPr>
+      <p:grpSpPr>
+        <a:xfrm>
+          <a:off x="0" y="0"/>
+          <a:ext cx="0" cy="0"/>
+          <a:chOff x="0" y="0"/>
+          <a:chExt cx="0" cy="0"/>
+        </a:xfrm>
+      </p:grpSpPr>
+      <p:sp>
+        <p:nvSpPr>
+          <p:cNvPr id="4" name="Título 1">
+            <a:extLst>
+              <a:ext uri="{FF2B5EF4-FFF2-40B4-BE49-F238E27FC236}">
+                <a16:creationId xmlns:a16="http://schemas.microsoft.com/office/drawing/2014/main" id="{1FACFA1E-6FC7-4A7E-8E9E-D742E81A4994}"/>
+              </a:ext>
+            </a:extLst>
+          </p:cNvPr>
+          <p:cNvSpPr>
+            <a:spLocks noGrp="1"/>
+          </p:cNvSpPr>
+          <p:nvPr>
+            <p:ph type="title"/>
+          </p:nvPr>
+        </p:nvSpPr>
+        <p:spPr>
+          <a:xfrm>
+            <a:off x="457200" y="274638"/>
+            <a:ext cx="7467600" cy="1143000"/>
+          </a:xfrm>
+        </p:spPr>
+        <p:txBody>
+          <a:bodyPr/>
+          <a:lstStyle/>
+          <a:p>
+            <a:r>
+              <a:rPr lang="en-US" dirty="0" err="1"/>
+              <a:t>Montagem</a:t>
+            </a:r>
+            <a:r>
+              <a:rPr lang="en-US" dirty="0"/>
+              <a:t> do </a:t>
+            </a:r>
+            <a:r>
+              <a:rPr lang="en-US" dirty="0" err="1"/>
+              <a:t>Formulário</a:t>
+            </a:r>
+            <a:r>
+              <a:rPr lang="en-US" dirty="0"/>
+              <a:t> – </a:t>
+            </a:r>
+            <a:br>
+              <a:rPr lang="en-US" dirty="0"/>
+            </a:br>
+            <a:r>
+              <a:rPr lang="en-US" dirty="0"/>
+              <a:t>Unit windows</a:t>
+            </a:r>
+            <a:endParaRPr lang="pt-BR" dirty="0"/>
+          </a:p>
+        </p:txBody>
+      </p:sp>
+      <p:sp>
+        <p:nvSpPr>
+          <p:cNvPr id="5" name="CaixaDeTexto 4">
+            <a:extLst>
+              <a:ext uri="{FF2B5EF4-FFF2-40B4-BE49-F238E27FC236}">
+                <a16:creationId xmlns:a16="http://schemas.microsoft.com/office/drawing/2014/main" id="{DB2B0F9F-7EF2-4B45-B429-D5FB65A49BBA}"/>
+              </a:ext>
+            </a:extLst>
+          </p:cNvPr>
+          <p:cNvSpPr txBox="1"/>
+          <p:nvPr/>
+        </p:nvSpPr>
+        <p:spPr>
+          <a:xfrm>
+            <a:off x="609600" y="1905000"/>
+            <a:ext cx="6976590" cy="4524315"/>
+          </a:xfrm>
+          <a:prstGeom prst="rect">
+            <a:avLst/>
+          </a:prstGeom>
+          <a:noFill/>
+        </p:spPr>
+        <p:txBody>
+          <a:bodyPr wrap="none" rtlCol="0">
+            <a:spAutoFit/>
+          </a:bodyPr>
+          <a:lstStyle/>
+          <a:p>
+            <a:pPr marL="342900" indent="-342900">
+              <a:buFont typeface="Arial" panose="020B0604020202020204" pitchFamily="34" charset="0"/>
+              <a:buChar char="•"/>
+            </a:pPr>
+            <a:r>
+              <a:rPr lang="en-US" sz="2400" dirty="0"/>
+              <a:t>Configure </a:t>
+            </a:r>
+            <a:r>
+              <a:rPr lang="en-US" sz="2400" dirty="0" err="1"/>
+              <a:t>os</a:t>
+            </a:r>
+            <a:r>
+              <a:rPr lang="en-US" sz="2400" dirty="0"/>
+              <a:t> </a:t>
+            </a:r>
+            <a:r>
+              <a:rPr lang="en-US" sz="2400" dirty="0" err="1"/>
+              <a:t>componentes</a:t>
+            </a:r>
+            <a:r>
+              <a:rPr lang="en-US" sz="2400" dirty="0"/>
+              <a:t> da </a:t>
+            </a:r>
+            <a:r>
+              <a:rPr lang="en-US" sz="2400" dirty="0" err="1"/>
+              <a:t>seguinte</a:t>
+            </a:r>
+            <a:r>
+              <a:rPr lang="en-US" sz="2400" dirty="0"/>
+              <a:t> forma:</a:t>
+            </a:r>
+          </a:p>
+          <a:p>
+            <a:pPr marL="342900" indent="-342900">
+              <a:buFont typeface="Arial" panose="020B0604020202020204" pitchFamily="34" charset="0"/>
+              <a:buChar char="•"/>
+            </a:pPr>
+            <a:endParaRPr lang="en-US" sz="2400" dirty="0"/>
+          </a:p>
+          <a:p>
+            <a:pPr marL="342900" indent="-342900">
+              <a:buFont typeface="Arial" panose="020B0604020202020204" pitchFamily="34" charset="0"/>
+              <a:buChar char="•"/>
+            </a:pPr>
+            <a:r>
+              <a:rPr lang="en-US" sz="2400" b="1" dirty="0"/>
+              <a:t>Label2</a:t>
+            </a:r>
+          </a:p>
+          <a:p>
+            <a:pPr marL="800100" lvl="1" indent="-342900">
+              <a:buFont typeface="Arial" panose="020B0604020202020204" pitchFamily="34" charset="0"/>
+              <a:buChar char="•"/>
+            </a:pPr>
+            <a:r>
+              <a:rPr lang="en-US" sz="2400" b="1" dirty="0"/>
+              <a:t>Align: Left</a:t>
+            </a:r>
+          </a:p>
+          <a:p>
+            <a:pPr marL="800100" lvl="1" indent="-342900">
+              <a:buFont typeface="Arial" panose="020B0604020202020204" pitchFamily="34" charset="0"/>
+              <a:buChar char="•"/>
+            </a:pPr>
+            <a:r>
+              <a:rPr lang="en-US" sz="2400" b="1" dirty="0"/>
+              <a:t>Text: “</a:t>
+            </a:r>
+            <a:r>
+              <a:rPr lang="en-US" sz="2400" b="1" dirty="0" err="1"/>
+              <a:t>Dispositivos</a:t>
+            </a:r>
+            <a:r>
+              <a:rPr lang="en-US" sz="2400" b="1" dirty="0"/>
+              <a:t>:” (Sem </a:t>
+            </a:r>
+            <a:r>
+              <a:rPr lang="en-US" sz="2400" b="1" dirty="0" err="1"/>
+              <a:t>aspas</a:t>
+            </a:r>
+            <a:r>
+              <a:rPr lang="en-US" sz="2400" b="1" dirty="0"/>
+              <a:t>)</a:t>
+            </a:r>
+          </a:p>
+          <a:p>
+            <a:endParaRPr lang="en-US" sz="2400" b="1" dirty="0"/>
+          </a:p>
+          <a:p>
+            <a:pPr marL="342900" indent="-342900">
+              <a:buFont typeface="Arial" panose="020B0604020202020204" pitchFamily="34" charset="0"/>
+              <a:buChar char="•"/>
+            </a:pPr>
+            <a:r>
+              <a:rPr lang="en-US" sz="2400" b="1" dirty="0"/>
+              <a:t>ComboBox1</a:t>
+            </a:r>
+          </a:p>
+          <a:p>
+            <a:pPr marL="800100" lvl="1" indent="-342900">
+              <a:buFont typeface="Arial" panose="020B0604020202020204" pitchFamily="34" charset="0"/>
+              <a:buChar char="•"/>
+            </a:pPr>
+            <a:r>
+              <a:rPr lang="en-US" sz="2400" b="1" dirty="0"/>
+              <a:t>Align: Client</a:t>
+            </a:r>
+          </a:p>
+          <a:p>
+            <a:pPr marL="800100" lvl="1" indent="-342900">
+              <a:buFont typeface="Arial" panose="020B0604020202020204" pitchFamily="34" charset="0"/>
+              <a:buChar char="•"/>
+            </a:pPr>
+            <a:r>
+              <a:rPr lang="en-US" sz="2400" b="1" dirty="0"/>
+              <a:t>Margins -&gt; Right: 5</a:t>
+            </a:r>
+          </a:p>
+          <a:p>
+            <a:pPr marL="800100" lvl="1" indent="-342900">
+              <a:buFont typeface="Arial" panose="020B0604020202020204" pitchFamily="34" charset="0"/>
+              <a:buChar char="•"/>
+            </a:pPr>
+            <a:r>
+              <a:rPr lang="en-US" sz="2400" b="1" dirty="0"/>
+              <a:t>Margins -&gt; Top: 10</a:t>
+            </a:r>
+          </a:p>
+          <a:p>
+            <a:pPr marL="800100" lvl="1" indent="-342900">
+              <a:buFont typeface="Arial" panose="020B0604020202020204" pitchFamily="34" charset="0"/>
+              <a:buChar char="•"/>
+            </a:pPr>
+            <a:r>
+              <a:rPr lang="en-US" sz="2400" b="1" dirty="0"/>
+              <a:t>Name: </a:t>
+            </a:r>
+            <a:r>
+              <a:rPr lang="en-US" sz="2400" b="1" dirty="0" err="1"/>
+              <a:t>cbDispositivo</a:t>
+            </a:r>
+            <a:endParaRPr lang="en-US" sz="2400" b="1" dirty="0"/>
+          </a:p>
+          <a:p>
+            <a:endParaRPr lang="en-US" sz="2400" b="1" dirty="0"/>
+          </a:p>
+        </p:txBody>
+      </p:sp>
+    </p:spTree>
+    <p:extLst>
+      <p:ext uri="{BB962C8B-B14F-4D97-AF65-F5344CB8AC3E}">
+        <p14:creationId xmlns:p14="http://schemas.microsoft.com/office/powerpoint/2010/main" val="677619355"/>
+      </p:ext>
+    </p:extLst>
+  </p:cSld>
+  <p:clrMapOvr>
+    <a:masterClrMapping/>
+  </p:clrMapOvr>
+</p:sld>
+</file>
+
+<file path=ppt/slides/slide72.xml><?xml version="1.0" encoding="utf-8"?>
+<p:sld xmlns:a="http://schemas.openxmlformats.org/drawingml/2006/main" xmlns:r="http://schemas.openxmlformats.org/officeDocument/2006/relationships" xmlns:p="http://schemas.openxmlformats.org/presentationml/2006/main">
+  <p:cSld>
+    <p:spTree>
+      <p:nvGrpSpPr>
+        <p:cNvPr id="1" name=""/>
+        <p:cNvGrpSpPr/>
+        <p:nvPr/>
+      </p:nvGrpSpPr>
+      <p:grpSpPr>
+        <a:xfrm>
+          <a:off x="0" y="0"/>
+          <a:ext cx="0" cy="0"/>
+          <a:chOff x="0" y="0"/>
+          <a:chExt cx="0" cy="0"/>
+        </a:xfrm>
+      </p:grpSpPr>
+      <p:sp>
+        <p:nvSpPr>
+          <p:cNvPr id="4" name="Título 1">
+            <a:extLst>
+              <a:ext uri="{FF2B5EF4-FFF2-40B4-BE49-F238E27FC236}">
+                <a16:creationId xmlns:a16="http://schemas.microsoft.com/office/drawing/2014/main" id="{770C36E6-716D-4202-85B8-51729A1427EC}"/>
+              </a:ext>
+            </a:extLst>
+          </p:cNvPr>
+          <p:cNvSpPr>
+            <a:spLocks noGrp="1"/>
+          </p:cNvSpPr>
+          <p:nvPr>
+            <p:ph type="title"/>
+          </p:nvPr>
+        </p:nvSpPr>
+        <p:spPr>
+          <a:xfrm>
+            <a:off x="457200" y="274638"/>
+            <a:ext cx="7467600" cy="1143000"/>
+          </a:xfrm>
+        </p:spPr>
+        <p:txBody>
+          <a:bodyPr/>
+          <a:lstStyle/>
+          <a:p>
+            <a:r>
+              <a:rPr lang="en-US" dirty="0" err="1"/>
+              <a:t>Montagem</a:t>
+            </a:r>
+            <a:r>
+              <a:rPr lang="en-US" dirty="0"/>
+              <a:t> do </a:t>
+            </a:r>
+            <a:r>
+              <a:rPr lang="en-US" dirty="0" err="1"/>
+              <a:t>Formulário</a:t>
+            </a:r>
+            <a:r>
+              <a:rPr lang="en-US" dirty="0"/>
+              <a:t> – </a:t>
+            </a:r>
+            <a:br>
+              <a:rPr lang="en-US" dirty="0"/>
+            </a:br>
+            <a:r>
+              <a:rPr lang="en-US" dirty="0"/>
+              <a:t>Unit windows</a:t>
+            </a:r>
+            <a:endParaRPr lang="pt-BR" dirty="0"/>
+          </a:p>
+        </p:txBody>
+      </p:sp>
+      <p:pic>
+        <p:nvPicPr>
+          <p:cNvPr id="6" name="Imagem 5">
+            <a:extLst>
+              <a:ext uri="{FF2B5EF4-FFF2-40B4-BE49-F238E27FC236}">
+                <a16:creationId xmlns:a16="http://schemas.microsoft.com/office/drawing/2014/main" id="{BA8A1530-2F47-4CD2-A12C-E42166E7B8DC}"/>
+              </a:ext>
+            </a:extLst>
+          </p:cNvPr>
+          <p:cNvPicPr>
+            <a:picLocks noChangeAspect="1"/>
+          </p:cNvPicPr>
+          <p:nvPr/>
+        </p:nvPicPr>
+        <p:blipFill>
+          <a:blip r:embed="rId2"/>
+          <a:stretch>
+            <a:fillRect/>
+          </a:stretch>
+        </p:blipFill>
+        <p:spPr>
+          <a:xfrm>
+            <a:off x="609600" y="1524000"/>
+            <a:ext cx="6305550" cy="4829175"/>
+          </a:xfrm>
+          <a:prstGeom prst="rect">
+            <a:avLst/>
+          </a:prstGeom>
+        </p:spPr>
+      </p:pic>
+    </p:spTree>
+    <p:extLst>
+      <p:ext uri="{BB962C8B-B14F-4D97-AF65-F5344CB8AC3E}">
+        <p14:creationId xmlns:p14="http://schemas.microsoft.com/office/powerpoint/2010/main" val="1654089179"/>
+      </p:ext>
+    </p:extLst>
+  </p:cSld>
+  <p:clrMapOvr>
+    <a:masterClrMapping/>
+  </p:clrMapOvr>
+</p:sld>
+</file>
+
+<file path=ppt/slides/slide73.xml><?xml version="1.0" encoding="utf-8"?>
+<p:sld xmlns:a="http://schemas.openxmlformats.org/drawingml/2006/main" xmlns:r="http://schemas.openxmlformats.org/officeDocument/2006/relationships" xmlns:p="http://schemas.openxmlformats.org/presentationml/2006/main">
+  <p:cSld>
+    <p:spTree>
+      <p:nvGrpSpPr>
+        <p:cNvPr id="1" name=""/>
+        <p:cNvGrpSpPr/>
+        <p:nvPr/>
+      </p:nvGrpSpPr>
+      <p:grpSpPr>
+        <a:xfrm>
+          <a:off x="0" y="0"/>
+          <a:ext cx="0" cy="0"/>
+          <a:chOff x="0" y="0"/>
+          <a:chExt cx="0" cy="0"/>
+        </a:xfrm>
+      </p:grpSpPr>
+      <p:sp>
+        <p:nvSpPr>
+          <p:cNvPr id="4" name="Título 1">
+            <a:extLst>
+              <a:ext uri="{FF2B5EF4-FFF2-40B4-BE49-F238E27FC236}">
+                <a16:creationId xmlns:a16="http://schemas.microsoft.com/office/drawing/2014/main" id="{D0C1B143-BF1D-4514-8CCA-74C76040D4DD}"/>
+              </a:ext>
+            </a:extLst>
+          </p:cNvPr>
+          <p:cNvSpPr>
+            <a:spLocks noGrp="1"/>
+          </p:cNvSpPr>
+          <p:nvPr>
+            <p:ph type="title"/>
+          </p:nvPr>
+        </p:nvSpPr>
+        <p:spPr>
+          <a:xfrm>
+            <a:off x="457200" y="274638"/>
+            <a:ext cx="7467600" cy="1143000"/>
+          </a:xfrm>
+        </p:spPr>
+        <p:txBody>
+          <a:bodyPr/>
+          <a:lstStyle/>
+          <a:p>
+            <a:r>
+              <a:rPr lang="en-US" dirty="0" err="1"/>
+              <a:t>Montagem</a:t>
+            </a:r>
+            <a:r>
+              <a:rPr lang="en-US" dirty="0"/>
+              <a:t> do </a:t>
+            </a:r>
+            <a:r>
+              <a:rPr lang="en-US" dirty="0" err="1"/>
+              <a:t>Formulário</a:t>
+            </a:r>
+            <a:r>
+              <a:rPr lang="en-US" dirty="0"/>
+              <a:t> – </a:t>
+            </a:r>
+            <a:br>
+              <a:rPr lang="en-US" dirty="0"/>
+            </a:br>
+            <a:r>
+              <a:rPr lang="en-US" dirty="0"/>
+              <a:t>Unit windows</a:t>
+            </a:r>
+            <a:endParaRPr lang="pt-BR" dirty="0"/>
+          </a:p>
+        </p:txBody>
+      </p:sp>
+    </p:spTree>
+    <p:extLst>
+      <p:ext uri="{BB962C8B-B14F-4D97-AF65-F5344CB8AC3E}">
+        <p14:creationId xmlns:p14="http://schemas.microsoft.com/office/powerpoint/2010/main" val="2093345739"/>
       </p:ext>
     </p:extLst>
   </p:cSld>
@@ -20591,4 +24674,299 @@
     </a:ext>
   </a:extLst>
 </a:theme>
+</file>
+
+<file path=ppt/theme/theme2.xml><?xml version="1.0" encoding="utf-8"?>
+<a:theme xmlns:a="http://schemas.openxmlformats.org/drawingml/2006/main" name="Tema do Office">
+  <a:themeElements>
+    <a:clrScheme name="Office">
+      <a:dk1>
+        <a:sysClr val="windowText" lastClr="000000"/>
+      </a:dk1>
+      <a:lt1>
+        <a:sysClr val="window" lastClr="FFFFFF"/>
+      </a:lt1>
+      <a:dk2>
+        <a:srgbClr val="44546A"/>
+      </a:dk2>
+      <a:lt2>
+        <a:srgbClr val="E7E6E6"/>
+      </a:lt2>
+      <a:accent1>
+        <a:srgbClr val="4472C4"/>
+      </a:accent1>
+      <a:accent2>
+        <a:srgbClr val="ED7D31"/>
+      </a:accent2>
+      <a:accent3>
+        <a:srgbClr val="A5A5A5"/>
+      </a:accent3>
+      <a:accent4>
+        <a:srgbClr val="FFC000"/>
+      </a:accent4>
+      <a:accent5>
+        <a:srgbClr val="5B9BD5"/>
+      </a:accent5>
+      <a:accent6>
+        <a:srgbClr val="70AD47"/>
+      </a:accent6>
+      <a:hlink>
+        <a:srgbClr val="0563C1"/>
+      </a:hlink>
+      <a:folHlink>
+        <a:srgbClr val="954F72"/>
+      </a:folHlink>
+    </a:clrScheme>
+    <a:fontScheme name="Office">
+      <a:majorFont>
+        <a:latin typeface="Calibri Light" panose="020F0302020204030204"/>
+        <a:ea typeface=""/>
+        <a:cs typeface=""/>
+        <a:font script="Jpan" typeface="游ゴシック Light"/>
+        <a:font script="Hang" typeface="맑은 고딕"/>
+        <a:font script="Hans" typeface="等线 Light"/>
+        <a:font script="Hant" typeface="新細明體"/>
+        <a:font script="Arab" typeface="Times New Roman"/>
+        <a:font script="Hebr" typeface="Times New Roman"/>
+        <a:font script="Thai" typeface="Angsana New"/>
+        <a:font script="Ethi" typeface="Nyala"/>
+        <a:font script="Beng" typeface="Vrinda"/>
+        <a:font script="Gujr" typeface="Shruti"/>
+        <a:font script="Khmr" typeface="MoolBoran"/>
+        <a:font script="Knda" typeface="Tunga"/>
+        <a:font script="Guru" typeface="Raavi"/>
+        <a:font script="Cans" typeface="Euphemia"/>
+        <a:font script="Cher" typeface="Plantagenet Cherokee"/>
+        <a:font script="Yiii" typeface="Microsoft Yi Baiti"/>
+        <a:font script="Tibt" typeface="Microsoft Himalaya"/>
+        <a:font script="Thaa" typeface="MV Boli"/>
+        <a:font script="Deva" typeface="Mangal"/>
+        <a:font script="Telu" typeface="Gautami"/>
+        <a:font script="Taml" typeface="Latha"/>
+        <a:font script="Syrc" typeface="Estrangelo Edessa"/>
+        <a:font script="Orya" typeface="Kalinga"/>
+        <a:font script="Mlym" typeface="Kartika"/>
+        <a:font script="Laoo" typeface="DokChampa"/>
+        <a:font script="Sinh" typeface="Iskoola Pota"/>
+        <a:font script="Mong" typeface="Mongolian Baiti"/>
+        <a:font script="Viet" typeface="Times New Roman"/>
+        <a:font script="Uigh" typeface="Microsoft Uighur"/>
+        <a:font script="Geor" typeface="Sylfaen"/>
+        <a:font script="Armn" typeface="Arial"/>
+        <a:font script="Bugi" typeface="Leelawadee UI"/>
+        <a:font script="Bopo" typeface="Microsoft JhengHei"/>
+        <a:font script="Java" typeface="Javanese Text"/>
+        <a:font script="Lisu" typeface="Segoe UI"/>
+        <a:font script="Mymr" typeface="Myanmar Text"/>
+        <a:font script="Nkoo" typeface="Ebrima"/>
+        <a:font script="Olck" typeface="Nirmala UI"/>
+        <a:font script="Osma" typeface="Ebrima"/>
+        <a:font script="Phag" typeface="Phagspa"/>
+        <a:font script="Syrn" typeface="Estrangelo Edessa"/>
+        <a:font script="Syrj" typeface="Estrangelo Edessa"/>
+        <a:font script="Syre" typeface="Estrangelo Edessa"/>
+        <a:font script="Sora" typeface="Nirmala UI"/>
+        <a:font script="Tale" typeface="Microsoft Tai Le"/>
+        <a:font script="Talu" typeface="Microsoft New Tai Lue"/>
+        <a:font script="Tfng" typeface="Ebrima"/>
+      </a:majorFont>
+      <a:minorFont>
+        <a:latin typeface="Calibri" panose="020F0502020204030204"/>
+        <a:ea typeface=""/>
+        <a:cs typeface=""/>
+        <a:font script="Jpan" typeface="游ゴシック"/>
+        <a:font script="Hang" typeface="맑은 고딕"/>
+        <a:font script="Hans" typeface="等线"/>
+        <a:font script="Hant" typeface="新細明體"/>
+        <a:font script="Arab" typeface="Arial"/>
+        <a:font script="Hebr" typeface="Arial"/>
+        <a:font script="Thai" typeface="Cordia New"/>
+        <a:font script="Ethi" typeface="Nyala"/>
+        <a:font script="Beng" typeface="Vrinda"/>
+        <a:font script="Gujr" typeface="Shruti"/>
+        <a:font script="Khmr" typeface="DaunPenh"/>
+        <a:font script="Knda" typeface="Tunga"/>
+        <a:font script="Guru" typeface="Raavi"/>
+        <a:font script="Cans" typeface="Euphemia"/>
+        <a:font script="Cher" typeface="Plantagenet Cherokee"/>
+        <a:font script="Yiii" typeface="Microsoft Yi Baiti"/>
+        <a:font script="Tibt" typeface="Microsoft Himalaya"/>
+        <a:font script="Thaa" typeface="MV Boli"/>
+        <a:font script="Deva" typeface="Mangal"/>
+        <a:font script="Telu" typeface="Gautami"/>
+        <a:font script="Taml" typeface="Latha"/>
+        <a:font script="Syrc" typeface="Estrangelo Edessa"/>
+        <a:font script="Orya" typeface="Kalinga"/>
+        <a:font script="Mlym" typeface="Kartika"/>
+        <a:font script="Laoo" typeface="DokChampa"/>
+        <a:font script="Sinh" typeface="Iskoola Pota"/>
+        <a:font script="Mong" typeface="Mongolian Baiti"/>
+        <a:font script="Viet" typeface="Arial"/>
+        <a:font script="Uigh" typeface="Microsoft Uighur"/>
+        <a:font script="Geor" typeface="Sylfaen"/>
+        <a:font script="Armn" typeface="Arial"/>
+        <a:font script="Bugi" typeface="Leelawadee UI"/>
+        <a:font script="Bopo" typeface="Microsoft JhengHei"/>
+        <a:font script="Java" typeface="Javanese Text"/>
+        <a:font script="Lisu" typeface="Segoe UI"/>
+        <a:font script="Mymr" typeface="Myanmar Text"/>
+        <a:font script="Nkoo" typeface="Ebrima"/>
+        <a:font script="Olck" typeface="Nirmala UI"/>
+        <a:font script="Osma" typeface="Ebrima"/>
+        <a:font script="Phag" typeface="Phagspa"/>
+        <a:font script="Syrn" typeface="Estrangelo Edessa"/>
+        <a:font script="Syrj" typeface="Estrangelo Edessa"/>
+        <a:font script="Syre" typeface="Estrangelo Edessa"/>
+        <a:font script="Sora" typeface="Nirmala UI"/>
+        <a:font script="Tale" typeface="Microsoft Tai Le"/>
+        <a:font script="Talu" typeface="Microsoft New Tai Lue"/>
+        <a:font script="Tfng" typeface="Ebrima"/>
+      </a:minorFont>
+    </a:fontScheme>
+    <a:fmtScheme name="Office">
+      <a:fillStyleLst>
+        <a:solidFill>
+          <a:schemeClr val="phClr"/>
+        </a:solidFill>
+        <a:gradFill rotWithShape="1">
+          <a:gsLst>
+            <a:gs pos="0">
+              <a:schemeClr val="phClr">
+                <a:lumMod val="110000"/>
+                <a:satMod val="105000"/>
+                <a:tint val="67000"/>
+              </a:schemeClr>
+            </a:gs>
+            <a:gs pos="50000">
+              <a:schemeClr val="phClr">
+                <a:lumMod val="105000"/>
+                <a:satMod val="103000"/>
+                <a:tint val="73000"/>
+              </a:schemeClr>
+            </a:gs>
+            <a:gs pos="100000">
+              <a:schemeClr val="phClr">
+                <a:lumMod val="105000"/>
+                <a:satMod val="109000"/>
+                <a:tint val="81000"/>
+              </a:schemeClr>
+            </a:gs>
+          </a:gsLst>
+          <a:lin ang="5400000" scaled="0"/>
+        </a:gradFill>
+        <a:gradFill rotWithShape="1">
+          <a:gsLst>
+            <a:gs pos="0">
+              <a:schemeClr val="phClr">
+                <a:satMod val="103000"/>
+                <a:lumMod val="102000"/>
+                <a:tint val="94000"/>
+              </a:schemeClr>
+            </a:gs>
+            <a:gs pos="50000">
+              <a:schemeClr val="phClr">
+                <a:satMod val="110000"/>
+                <a:lumMod val="100000"/>
+                <a:shade val="100000"/>
+              </a:schemeClr>
+            </a:gs>
+            <a:gs pos="100000">
+              <a:schemeClr val="phClr">
+                <a:lumMod val="99000"/>
+                <a:satMod val="120000"/>
+                <a:shade val="78000"/>
+              </a:schemeClr>
+            </a:gs>
+          </a:gsLst>
+          <a:lin ang="5400000" scaled="0"/>
+        </a:gradFill>
+      </a:fillStyleLst>
+      <a:lnStyleLst>
+        <a:ln w="6350" cap="flat" cmpd="sng" algn="ctr">
+          <a:solidFill>
+            <a:schemeClr val="phClr"/>
+          </a:solidFill>
+          <a:prstDash val="solid"/>
+          <a:miter lim="800000"/>
+        </a:ln>
+        <a:ln w="12700" cap="flat" cmpd="sng" algn="ctr">
+          <a:solidFill>
+            <a:schemeClr val="phClr"/>
+          </a:solidFill>
+          <a:prstDash val="solid"/>
+          <a:miter lim="800000"/>
+        </a:ln>
+        <a:ln w="19050" cap="flat" cmpd="sng" algn="ctr">
+          <a:solidFill>
+            <a:schemeClr val="phClr"/>
+          </a:solidFill>
+          <a:prstDash val="solid"/>
+          <a:miter lim="800000"/>
+        </a:ln>
+      </a:lnStyleLst>
+      <a:effectStyleLst>
+        <a:effectStyle>
+          <a:effectLst/>
+        </a:effectStyle>
+        <a:effectStyle>
+          <a:effectLst/>
+        </a:effectStyle>
+        <a:effectStyle>
+          <a:effectLst>
+            <a:outerShdw blurRad="57150" dist="19050" dir="5400000" algn="ctr" rotWithShape="0">
+              <a:srgbClr val="000000">
+                <a:alpha val="63000"/>
+              </a:srgbClr>
+            </a:outerShdw>
+          </a:effectLst>
+        </a:effectStyle>
+      </a:effectStyleLst>
+      <a:bgFillStyleLst>
+        <a:solidFill>
+          <a:schemeClr val="phClr"/>
+        </a:solidFill>
+        <a:solidFill>
+          <a:schemeClr val="phClr">
+            <a:tint val="95000"/>
+            <a:satMod val="170000"/>
+          </a:schemeClr>
+        </a:solidFill>
+        <a:gradFill rotWithShape="1">
+          <a:gsLst>
+            <a:gs pos="0">
+              <a:schemeClr val="phClr">
+                <a:tint val="93000"/>
+                <a:satMod val="150000"/>
+                <a:shade val="98000"/>
+                <a:lumMod val="102000"/>
+              </a:schemeClr>
+            </a:gs>
+            <a:gs pos="50000">
+              <a:schemeClr val="phClr">
+                <a:tint val="98000"/>
+                <a:satMod val="130000"/>
+                <a:shade val="90000"/>
+                <a:lumMod val="103000"/>
+              </a:schemeClr>
+            </a:gs>
+            <a:gs pos="100000">
+              <a:schemeClr val="phClr">
+                <a:shade val="63000"/>
+                <a:satMod val="120000"/>
+              </a:schemeClr>
+            </a:gs>
+          </a:gsLst>
+          <a:lin ang="5400000" scaled="0"/>
+        </a:gradFill>
+      </a:bgFillStyleLst>
+    </a:fmtScheme>
+  </a:themeElements>
+  <a:objectDefaults/>
+  <a:extraClrSchemeLst/>
+  <a:extLst>
+    <a:ext uri="{05A4C25C-085E-4340-85A3-A5531E510DB2}">
+      <thm15:themeFamily xmlns:thm15="http://schemas.microsoft.com/office/thememl/2012/main" name="Office Theme" id="{62F939B6-93AF-4DB8-9C6B-D6C7DFDC589F}" vid="{4A3C46E8-61CC-4603-A589-7422A47A8E4A}"/>
+    </a:ext>
+  </a:extLst>
+</a:theme>
 </file>
</xml_diff>

<commit_message>
frmWindows done, PowerPoint with HOW TO until programming tutorials done
</commit_message>
<xml_diff>
--- a/Stuff/Conexão Bluetooth usando Delphi.pptx
+++ b/Stuff/Conexão Bluetooth usando Delphi.pptx
@@ -5,7 +5,7 @@
     <p:sldMasterId id="2147483696" r:id="rId1"/>
   </p:sldMasterIdLst>
   <p:notesMasterIdLst>
-    <p:notesMasterId r:id="rId75"/>
+    <p:notesMasterId r:id="rId83"/>
   </p:notesMasterIdLst>
   <p:sldIdLst>
     <p:sldId id="256" r:id="rId2"/>
@@ -81,6 +81,14 @@
     <p:sldId id="327" r:id="rId72"/>
     <p:sldId id="328" r:id="rId73"/>
     <p:sldId id="329" r:id="rId74"/>
+    <p:sldId id="330" r:id="rId75"/>
+    <p:sldId id="331" r:id="rId76"/>
+    <p:sldId id="332" r:id="rId77"/>
+    <p:sldId id="333" r:id="rId78"/>
+    <p:sldId id="334" r:id="rId79"/>
+    <p:sldId id="335" r:id="rId80"/>
+    <p:sldId id="336" r:id="rId81"/>
+    <p:sldId id="337" r:id="rId82"/>
   </p:sldIdLst>
   <p:sldSz cx="9144000" cy="6858000" type="screen4x3"/>
   <p:notesSz cx="6858000" cy="9144000"/>
@@ -7512,8 +7520,8 @@
         </p:nvSpPr>
         <p:spPr>
           <a:xfrm>
-            <a:off x="533400" y="2209800"/>
-            <a:ext cx="4572000" cy="1200329"/>
+            <a:off x="533399" y="2209800"/>
+            <a:ext cx="4733925" cy="1200329"/>
           </a:xfrm>
           <a:prstGeom prst="rect">
             <a:avLst/>
@@ -7544,14 +7552,6 @@
             </a:r>
             <a:r>
               <a:rPr lang="en-US" sz="2400" dirty="0"/>
-              <a:t> da aba </a:t>
-            </a:r>
-            <a:r>
-              <a:rPr lang="en-US" sz="2400" b="1" dirty="0"/>
-              <a:t>System</a:t>
-            </a:r>
-            <a:r>
-              <a:rPr lang="en-US" sz="2400" dirty="0"/>
               <a:t> um </a:t>
             </a:r>
             <a:r>
@@ -7565,6 +7565,22 @@
             <a:r>
               <a:rPr lang="en-US" sz="2400" b="1" dirty="0" err="1"/>
               <a:t>TBluetooth</a:t>
+            </a:r>
+            <a:r>
+              <a:rPr lang="en-US" sz="2400" b="1" dirty="0"/>
+              <a:t> </a:t>
+            </a:r>
+            <a:r>
+              <a:rPr lang="en-US" sz="2400" dirty="0"/>
+              <a:t>da aba </a:t>
+            </a:r>
+            <a:r>
+              <a:rPr lang="en-US" sz="2400" b="1" dirty="0"/>
+              <a:t>System</a:t>
+            </a:r>
+            <a:r>
+              <a:rPr lang="en-US" sz="2400" dirty="0"/>
+              <a:t> </a:t>
             </a:r>
             <a:endParaRPr lang="en-US" sz="2400" b="1" dirty="0"/>
           </a:p>
@@ -7667,12 +7683,8 @@
               <a:buChar char="•"/>
             </a:pPr>
             <a:r>
-              <a:rPr lang="en-US" sz="2400" dirty="0"/>
-              <a:t>Enabled: True</a:t>
-            </a:r>
-            <a:r>
-              <a:rPr lang="en-US" sz="2400" b="1" dirty="0"/>
-              <a:t> </a:t>
+              <a:rPr lang="en-US" sz="2400" b="1" dirty="0"/>
+              <a:t>Enabled: True </a:t>
             </a:r>
           </a:p>
         </p:txBody>
@@ -8817,27 +8829,27 @@
             </a:r>
             <a:r>
               <a:rPr lang="en-US" sz="2400" dirty="0" err="1"/>
+              <a:t>siga</a:t>
+            </a:r>
+            <a:r>
+              <a:rPr lang="en-US" sz="2400" dirty="0"/>
+              <a:t> o </a:t>
+            </a:r>
+            <a:r>
+              <a:rPr lang="en-US" sz="2400" dirty="0" err="1"/>
+              <a:t>exemplo</a:t>
+            </a:r>
+            <a:r>
+              <a:rPr lang="en-US" sz="2400" dirty="0"/>
+              <a:t> </a:t>
+            </a:r>
+            <a:r>
+              <a:rPr lang="en-US" sz="2400" dirty="0" err="1"/>
               <a:t>abaixo</a:t>
             </a:r>
             <a:r>
               <a:rPr lang="en-US" sz="2400" dirty="0"/>
-              <a:t> um gif </a:t>
-            </a:r>
-            <a:r>
-              <a:rPr lang="en-US" sz="2400" dirty="0" err="1"/>
-              <a:t>mostrando</a:t>
-            </a:r>
-            <a:r>
-              <a:rPr lang="en-US" sz="2400" dirty="0"/>
-              <a:t> </a:t>
-            </a:r>
-            <a:r>
-              <a:rPr lang="en-US" sz="2400" dirty="0" err="1"/>
-              <a:t>como</a:t>
-            </a:r>
-            <a:r>
-              <a:rPr lang="en-US" sz="2400" dirty="0"/>
-              <a:t> </a:t>
+              <a:t> para </a:t>
             </a:r>
             <a:r>
               <a:rPr lang="en-US" sz="2400" dirty="0" err="1"/>
@@ -9479,7 +9491,7 @@
         <p:spPr>
           <a:xfrm>
             <a:off x="3085095" y="4432637"/>
-            <a:ext cx="4839705" cy="1569660"/>
+            <a:ext cx="4992105" cy="1569660"/>
           </a:xfrm>
           <a:prstGeom prst="rect">
             <a:avLst/>
@@ -9531,7 +9543,7 @@
               <a:buChar char="•"/>
             </a:pPr>
             <a:r>
-              <a:rPr lang="en-US" sz="2400" dirty="0"/>
+              <a:rPr lang="en-US" sz="2400" b="1" dirty="0"/>
               <a:t>Fill -&gt; Color: #FFFFBA06</a:t>
             </a:r>
           </a:p>
@@ -10286,20 +10298,6 @@
               <a:buChar char="•"/>
             </a:pPr>
             <a:r>
-              <a:rPr lang="en-US" sz="2400" b="1" dirty="0" err="1"/>
-              <a:t>AutoSize</a:t>
-            </a:r>
-            <a:r>
-              <a:rPr lang="en-US" sz="2400" b="1" dirty="0"/>
-              <a:t>: True</a:t>
-            </a:r>
-          </a:p>
-          <a:p>
-            <a:pPr marL="742950" lvl="1" indent="-285750">
-              <a:buFont typeface="Arial" panose="020B0604020202020204" pitchFamily="34" charset="0"/>
-              <a:buChar char="•"/>
-            </a:pPr>
-            <a:r>
               <a:rPr lang="en-US" sz="2400" b="1" dirty="0"/>
               <a:t>Text: </a:t>
             </a:r>
@@ -10310,6 +10308,28 @@
             <a:r>
               <a:rPr lang="en-US" sz="2400" b="1" dirty="0"/>
               <a:t> – Chat</a:t>
+            </a:r>
+          </a:p>
+          <a:p>
+            <a:pPr marL="742950" lvl="1" indent="-285750">
+              <a:buFont typeface="Arial" panose="020B0604020202020204" pitchFamily="34" charset="0"/>
+              <a:buChar char="•"/>
+            </a:pPr>
+            <a:r>
+              <a:rPr lang="en-US" sz="2400" b="1" dirty="0" err="1"/>
+              <a:t>TextSetting</a:t>
+            </a:r>
+            <a:r>
+              <a:rPr lang="en-US" sz="2400" b="1" dirty="0"/>
+              <a:t> -&gt; </a:t>
+            </a:r>
+            <a:r>
+              <a:rPr lang="en-US" sz="2400" b="1" dirty="0" err="1"/>
+              <a:t>WordWrap</a:t>
+            </a:r>
+            <a:r>
+              <a:rPr lang="en-US" sz="2400" b="1" dirty="0"/>
+              <a:t>: False</a:t>
             </a:r>
           </a:p>
           <a:p>
@@ -10621,7 +10641,7 @@
         </p:nvSpPr>
         <p:spPr>
           <a:xfrm>
-            <a:off x="457200" y="4838054"/>
+            <a:off x="381000" y="4838054"/>
             <a:ext cx="4724400" cy="1569660"/>
           </a:xfrm>
           <a:prstGeom prst="rect">
@@ -11049,7 +11069,7 @@
         </p:blipFill>
         <p:spPr>
           <a:xfrm>
-            <a:off x="5638800" y="3383756"/>
+            <a:off x="5638800" y="3505200"/>
             <a:ext cx="2856222" cy="2166938"/>
           </a:xfrm>
           <a:prstGeom prst="rect">
@@ -11523,7 +11543,7 @@
         <p:spPr>
           <a:xfrm>
             <a:off x="457200" y="4560153"/>
-            <a:ext cx="4800600" cy="1938992"/>
+            <a:ext cx="4953000" cy="1938992"/>
           </a:xfrm>
           <a:prstGeom prst="rect">
             <a:avLst/>
@@ -11586,7 +11606,7 @@
             </a:pPr>
             <a:r>
               <a:rPr lang="en-US" sz="2400" b="1" dirty="0"/>
-              <a:t>Fill: #FFFFBA06</a:t>
+              <a:t>Fill -&gt; Color: #FFFFBA06</a:t>
             </a:r>
           </a:p>
           <a:p>
@@ -14683,20 +14703,6 @@
               <a:buChar char="•"/>
             </a:pPr>
             <a:r>
-              <a:rPr lang="en-US" sz="2400" b="1" dirty="0" err="1"/>
-              <a:t>AutoSize</a:t>
-            </a:r>
-            <a:r>
-              <a:rPr lang="en-US" sz="2400" b="1" dirty="0"/>
-              <a:t>: True</a:t>
-            </a:r>
-          </a:p>
-          <a:p>
-            <a:pPr marL="742950" lvl="1" indent="-285750">
-              <a:buFont typeface="Arial" panose="020B0604020202020204" pitchFamily="34" charset="0"/>
-              <a:buChar char="•"/>
-            </a:pPr>
-            <a:r>
               <a:rPr lang="en-US" sz="2400" b="1" dirty="0"/>
               <a:t>Text: </a:t>
             </a:r>
@@ -14713,6 +14719,28 @@
               <a:t>Dispositivos</a:t>
             </a:r>
             <a:endParaRPr lang="en-US" sz="2400" b="1" dirty="0"/>
+          </a:p>
+          <a:p>
+            <a:pPr marL="742950" lvl="1" indent="-285750">
+              <a:buFont typeface="Arial" panose="020B0604020202020204" pitchFamily="34" charset="0"/>
+              <a:buChar char="•"/>
+            </a:pPr>
+            <a:r>
+              <a:rPr lang="en-US" sz="2400" b="1" dirty="0" err="1"/>
+              <a:t>TextSettings</a:t>
+            </a:r>
+            <a:r>
+              <a:rPr lang="en-US" sz="2400" b="1" dirty="0"/>
+              <a:t> -&gt; </a:t>
+            </a:r>
+            <a:r>
+              <a:rPr lang="en-US" sz="2400" b="1" dirty="0" err="1"/>
+              <a:t>WordWrap</a:t>
+            </a:r>
+            <a:r>
+              <a:rPr lang="en-US" sz="2400" b="1" dirty="0"/>
+              <a:t>: False</a:t>
+            </a:r>
           </a:p>
           <a:p>
             <a:pPr marL="742950" lvl="1" indent="-285750">
@@ -15279,8 +15307,8 @@
         </p:nvSpPr>
         <p:spPr>
           <a:xfrm>
-            <a:off x="493643" y="2057400"/>
-            <a:ext cx="7924800" cy="3046988"/>
+            <a:off x="493642" y="1905000"/>
+            <a:ext cx="8040757" cy="3046988"/>
           </a:xfrm>
           <a:prstGeom prst="rect">
             <a:avLst/>
@@ -15452,7 +15480,19 @@
             </a:r>
             <a:r>
               <a:rPr lang="en-US" sz="2400" dirty="0"/>
-              <a:t> principal </a:t>
+              <a:t> principal dentro de um </a:t>
+            </a:r>
+            <a:r>
+              <a:rPr lang="en-US" sz="2400" dirty="0" err="1"/>
+              <a:t>bloco</a:t>
+            </a:r>
+            <a:r>
+              <a:rPr lang="en-US" sz="2400" dirty="0"/>
+              <a:t> </a:t>
+            </a:r>
+            <a:r>
+              <a:rPr lang="en-US" sz="2400" b="1" dirty="0"/>
+              <a:t>uses </a:t>
             </a:r>
             <a:r>
               <a:rPr lang="en-US" sz="2400" dirty="0" err="1"/>
@@ -15461,22 +15501,6 @@
             <a:r>
               <a:rPr lang="en-US" sz="2400" dirty="0"/>
               <a:t> de </a:t>
-            </a:r>
-            <a:r>
-              <a:rPr lang="en-US" sz="2400" dirty="0" err="1"/>
-              <a:t>uma</a:t>
-            </a:r>
-            <a:r>
-              <a:rPr lang="en-US" sz="2400" dirty="0"/>
-              <a:t> clausula </a:t>
-            </a:r>
-            <a:r>
-              <a:rPr lang="en-US" sz="2400" b="1" dirty="0"/>
-              <a:t>uses </a:t>
-            </a:r>
-            <a:r>
-              <a:rPr lang="en-US" sz="2400" dirty="0"/>
-              <a:t>no </a:t>
             </a:r>
             <a:r>
               <a:rPr lang="en-US" sz="2400" b="1" dirty="0"/>
@@ -15536,7 +15560,7 @@
         </p:blipFill>
         <p:spPr>
           <a:xfrm>
-            <a:off x="1066800" y="5374818"/>
+            <a:off x="1066800" y="5222418"/>
             <a:ext cx="4067782" cy="1208544"/>
           </a:xfrm>
           <a:prstGeom prst="rect">
@@ -15657,7 +15681,7 @@
         </p:blipFill>
         <p:spPr>
           <a:xfrm>
-            <a:off x="609600" y="1752600"/>
+            <a:off x="609600" y="2362200"/>
             <a:ext cx="2505075" cy="2705100"/>
           </a:xfrm>
           <a:prstGeom prst="rect">
@@ -15679,7 +15703,7 @@
         </p:nvSpPr>
         <p:spPr>
           <a:xfrm>
-            <a:off x="3124200" y="1753612"/>
+            <a:off x="3124200" y="2363212"/>
             <a:ext cx="5576015" cy="3046988"/>
           </a:xfrm>
           <a:prstGeom prst="rect">
@@ -17051,12 +17075,140 @@
           </a:p>
         </p:txBody>
       </p:sp>
+      <p:sp>
+        <p:nvSpPr>
+          <p:cNvPr id="10" name="CaixaDeTexto 9">
+            <a:extLst>
+              <a:ext uri="{FF2B5EF4-FFF2-40B4-BE49-F238E27FC236}">
+                <a16:creationId xmlns:a16="http://schemas.microsoft.com/office/drawing/2014/main" id="{74EB8851-E68A-4098-93E4-16C3AAB53A2D}"/>
+              </a:ext>
+            </a:extLst>
+          </p:cNvPr>
+          <p:cNvSpPr txBox="1"/>
+          <p:nvPr/>
+        </p:nvSpPr>
+        <p:spPr>
+          <a:xfrm>
+            <a:off x="3086101" y="4577103"/>
+            <a:ext cx="5257799" cy="1938992"/>
+          </a:xfrm>
+          <a:prstGeom prst="rect">
+            <a:avLst/>
+          </a:prstGeom>
+          <a:noFill/>
+        </p:spPr>
+        <p:txBody>
+          <a:bodyPr wrap="square" rtlCol="0">
+            <a:spAutoFit/>
+          </a:bodyPr>
+          <a:lstStyle/>
+          <a:p>
+            <a:pPr marL="342900" indent="-342900">
+              <a:buFont typeface="Arial" panose="020B0604020202020204" pitchFamily="34" charset="0"/>
+              <a:buChar char="•"/>
+            </a:pPr>
+            <a:r>
+              <a:rPr lang="en-US" sz="2400" dirty="0"/>
+              <a:t>Na </a:t>
+            </a:r>
+            <a:r>
+              <a:rPr lang="en-US" sz="2400" dirty="0" err="1"/>
+              <a:t>janela</a:t>
+            </a:r>
+            <a:r>
+              <a:rPr lang="en-US" sz="2400" dirty="0"/>
+              <a:t> </a:t>
+            </a:r>
+            <a:r>
+              <a:rPr lang="en-US" sz="2400" b="1" dirty="0"/>
+              <a:t>Structure </a:t>
+            </a:r>
+            <a:r>
+              <a:rPr lang="en-US" sz="2400" dirty="0"/>
+              <a:t>clique </a:t>
+            </a:r>
+            <a:r>
+              <a:rPr lang="en-US" sz="2400" dirty="0" err="1"/>
+              <a:t>em</a:t>
+            </a:r>
+            <a:r>
+              <a:rPr lang="en-US" sz="2400" dirty="0"/>
+              <a:t> ambos </a:t>
+            </a:r>
+            <a:r>
+              <a:rPr lang="en-US" sz="2400" dirty="0" err="1"/>
+              <a:t>os</a:t>
+            </a:r>
+            <a:r>
+              <a:rPr lang="en-US" sz="2400" dirty="0"/>
+              <a:t> </a:t>
+            </a:r>
+            <a:r>
+              <a:rPr lang="en-US" sz="2400" dirty="0" err="1"/>
+              <a:t>componentes</a:t>
+            </a:r>
+            <a:r>
+              <a:rPr lang="en-US" sz="2400" dirty="0"/>
+              <a:t> </a:t>
+            </a:r>
+            <a:r>
+              <a:rPr lang="en-US" sz="2400" dirty="0" err="1"/>
+              <a:t>novos</a:t>
+            </a:r>
+            <a:r>
+              <a:rPr lang="en-US" sz="2400" dirty="0"/>
+              <a:t> e </a:t>
+            </a:r>
+            <a:r>
+              <a:rPr lang="en-US" sz="2400" dirty="0" err="1"/>
+              <a:t>os</a:t>
+            </a:r>
+            <a:r>
+              <a:rPr lang="en-US" sz="2400" dirty="0"/>
+              <a:t> </a:t>
+            </a:r>
+            <a:r>
+              <a:rPr lang="en-US" sz="2400" dirty="0" err="1"/>
+              <a:t>arraste</a:t>
+            </a:r>
+            <a:r>
+              <a:rPr lang="en-US" sz="2400" dirty="0"/>
+              <a:t> para dentro do </a:t>
+            </a:r>
+            <a:r>
+              <a:rPr lang="en-US" sz="2400" dirty="0" err="1"/>
+              <a:t>componente</a:t>
+            </a:r>
+            <a:r>
+              <a:rPr lang="en-US" sz="2400" dirty="0"/>
+              <a:t> </a:t>
+            </a:r>
+            <a:r>
+              <a:rPr lang="en-US" sz="2400" b="1" dirty="0"/>
+              <a:t>Rectangle1 </a:t>
+            </a:r>
+            <a:r>
+              <a:rPr lang="en-US" sz="2400" dirty="0" err="1"/>
+              <a:t>criado</a:t>
+            </a:r>
+            <a:r>
+              <a:rPr lang="en-US" sz="2400" dirty="0"/>
+              <a:t> </a:t>
+            </a:r>
+            <a:r>
+              <a:rPr lang="en-US" sz="2400" dirty="0" err="1"/>
+              <a:t>anteriormente</a:t>
+            </a:r>
+            <a:endParaRPr lang="en-US" sz="2400" b="1" dirty="0"/>
+          </a:p>
+        </p:txBody>
+      </p:sp>
       <p:pic>
         <p:nvPicPr>
-          <p:cNvPr id="9" name="Imagem 8">
+          <p:cNvPr id="3" name="Imagem 2" descr="Tela de computador com texto preto sobre fundo branco&#10;&#10;Descrição gerada automaticamente">
             <a:extLst>
               <a:ext uri="{FF2B5EF4-FFF2-40B4-BE49-F238E27FC236}">
-                <a16:creationId xmlns:a16="http://schemas.microsoft.com/office/drawing/2014/main" id="{06A4CCCD-601F-459E-9FE4-22BCC03119EF}"/>
+                <a16:creationId xmlns:a16="http://schemas.microsoft.com/office/drawing/2014/main" id="{163E57DF-A6AF-4C54-BE05-C46356E7EEF1}"/>
               </a:ext>
             </a:extLst>
           </p:cNvPr>
@@ -17066,149 +17218,27 @@
           <p:nvPr/>
         </p:nvPicPr>
         <p:blipFill>
-          <a:blip r:embed="rId3"/>
+          <a:blip r:embed="rId3">
+            <a:extLst>
+              <a:ext uri="{28A0092B-C50C-407E-A947-70E740481C1C}">
+                <a14:useLocalDpi xmlns:a14="http://schemas.microsoft.com/office/drawing/2010/main" val="0"/>
+              </a:ext>
+            </a:extLst>
+          </a:blip>
           <a:stretch>
             <a:fillRect/>
           </a:stretch>
         </p:blipFill>
         <p:spPr>
           <a:xfrm>
-            <a:off x="533401" y="3830045"/>
-            <a:ext cx="2533650" cy="2686050"/>
+            <a:off x="533401" y="3950971"/>
+            <a:ext cx="2524125" cy="2571750"/>
           </a:xfrm>
           <a:prstGeom prst="rect">
             <a:avLst/>
           </a:prstGeom>
         </p:spPr>
       </p:pic>
-      <p:sp>
-        <p:nvSpPr>
-          <p:cNvPr id="10" name="CaixaDeTexto 9">
-            <a:extLst>
-              <a:ext uri="{FF2B5EF4-FFF2-40B4-BE49-F238E27FC236}">
-                <a16:creationId xmlns:a16="http://schemas.microsoft.com/office/drawing/2014/main" id="{74EB8851-E68A-4098-93E4-16C3AAB53A2D}"/>
-              </a:ext>
-            </a:extLst>
-          </p:cNvPr>
-          <p:cNvSpPr txBox="1"/>
-          <p:nvPr/>
-        </p:nvSpPr>
-        <p:spPr>
-          <a:xfrm>
-            <a:off x="3086101" y="4577103"/>
-            <a:ext cx="5257799" cy="1938992"/>
-          </a:xfrm>
-          <a:prstGeom prst="rect">
-            <a:avLst/>
-          </a:prstGeom>
-          <a:noFill/>
-        </p:spPr>
-        <p:txBody>
-          <a:bodyPr wrap="square" rtlCol="0">
-            <a:spAutoFit/>
-          </a:bodyPr>
-          <a:lstStyle/>
-          <a:p>
-            <a:pPr marL="342900" indent="-342900">
-              <a:buFont typeface="Arial" panose="020B0604020202020204" pitchFamily="34" charset="0"/>
-              <a:buChar char="•"/>
-            </a:pPr>
-            <a:r>
-              <a:rPr lang="en-US" sz="2400" dirty="0"/>
-              <a:t>Na </a:t>
-            </a:r>
-            <a:r>
-              <a:rPr lang="en-US" sz="2400" dirty="0" err="1"/>
-              <a:t>janela</a:t>
-            </a:r>
-            <a:r>
-              <a:rPr lang="en-US" sz="2400" dirty="0"/>
-              <a:t> </a:t>
-            </a:r>
-            <a:r>
-              <a:rPr lang="en-US" sz="2400" b="1" dirty="0"/>
-              <a:t>Structure </a:t>
-            </a:r>
-            <a:r>
-              <a:rPr lang="en-US" sz="2400" dirty="0"/>
-              <a:t>clique </a:t>
-            </a:r>
-            <a:r>
-              <a:rPr lang="en-US" sz="2400" dirty="0" err="1"/>
-              <a:t>em</a:t>
-            </a:r>
-            <a:r>
-              <a:rPr lang="en-US" sz="2400" dirty="0"/>
-              <a:t> ambos </a:t>
-            </a:r>
-            <a:r>
-              <a:rPr lang="en-US" sz="2400" dirty="0" err="1"/>
-              <a:t>os</a:t>
-            </a:r>
-            <a:r>
-              <a:rPr lang="en-US" sz="2400" dirty="0"/>
-              <a:t> </a:t>
-            </a:r>
-            <a:r>
-              <a:rPr lang="en-US" sz="2400" dirty="0" err="1"/>
-              <a:t>componentes</a:t>
-            </a:r>
-            <a:r>
-              <a:rPr lang="en-US" sz="2400" dirty="0"/>
-              <a:t> </a:t>
-            </a:r>
-            <a:r>
-              <a:rPr lang="en-US" sz="2400" dirty="0" err="1"/>
-              <a:t>novos</a:t>
-            </a:r>
-            <a:r>
-              <a:rPr lang="en-US" sz="2400" dirty="0"/>
-              <a:t> e </a:t>
-            </a:r>
-            <a:r>
-              <a:rPr lang="en-US" sz="2400" dirty="0" err="1"/>
-              <a:t>os</a:t>
-            </a:r>
-            <a:r>
-              <a:rPr lang="en-US" sz="2400" dirty="0"/>
-              <a:t> </a:t>
-            </a:r>
-            <a:r>
-              <a:rPr lang="en-US" sz="2400" dirty="0" err="1"/>
-              <a:t>arraste</a:t>
-            </a:r>
-            <a:r>
-              <a:rPr lang="en-US" sz="2400" dirty="0"/>
-              <a:t> para dentro do </a:t>
-            </a:r>
-            <a:r>
-              <a:rPr lang="en-US" sz="2400" dirty="0" err="1"/>
-              <a:t>componente</a:t>
-            </a:r>
-            <a:r>
-              <a:rPr lang="en-US" sz="2400" dirty="0"/>
-              <a:t> </a:t>
-            </a:r>
-            <a:r>
-              <a:rPr lang="en-US" sz="2400" b="1" dirty="0"/>
-              <a:t>Rectangle1 </a:t>
-            </a:r>
-            <a:r>
-              <a:rPr lang="en-US" sz="2400" dirty="0" err="1"/>
-              <a:t>criado</a:t>
-            </a:r>
-            <a:r>
-              <a:rPr lang="en-US" sz="2400" dirty="0"/>
-              <a:t> </a:t>
-            </a:r>
-            <a:r>
-              <a:rPr lang="en-US" sz="2400" dirty="0" err="1"/>
-              <a:t>anteriormente</a:t>
-            </a:r>
-            <a:endParaRPr lang="en-US" sz="2400" b="1" dirty="0"/>
-          </a:p>
-        </p:txBody>
-      </p:sp>
     </p:spTree>
     <p:extLst>
       <p:ext uri="{BB962C8B-B14F-4D97-AF65-F5344CB8AC3E}">
@@ -20233,11 +20263,19 @@
             </a:pPr>
             <a:r>
               <a:rPr lang="en-US" sz="2400" b="1" dirty="0" err="1"/>
-              <a:t>AutoSize</a:t>
-            </a:r>
-            <a:r>
-              <a:rPr lang="en-US" sz="2400" b="1" dirty="0"/>
-              <a:t>: True</a:t>
+              <a:t>TextSettings</a:t>
+            </a:r>
+            <a:r>
+              <a:rPr lang="en-US" sz="2400" b="1" dirty="0"/>
+              <a:t> -&gt; </a:t>
+            </a:r>
+            <a:r>
+              <a:rPr lang="en-US" sz="2400" b="1" dirty="0" err="1"/>
+              <a:t>WordWrap</a:t>
+            </a:r>
+            <a:r>
+              <a:rPr lang="en-US" sz="2400" b="1" dirty="0"/>
+              <a:t>: False</a:t>
             </a:r>
           </a:p>
           <a:p>
@@ -23668,7 +23706,7 @@
             </a:r>
             <a:r>
               <a:rPr lang="en-US" sz="2400" b="1" dirty="0" err="1"/>
-              <a:t>Dispositivos</a:t>
+              <a:t>Dispositivo</a:t>
             </a:r>
             <a:r>
               <a:rPr lang="en-US" sz="2400" b="1" dirty="0"/>
@@ -23942,10 +23980,1879 @@
           </a:p>
         </p:txBody>
       </p:sp>
+      <p:pic>
+        <p:nvPicPr>
+          <p:cNvPr id="3" name="Imagem 2">
+            <a:extLst>
+              <a:ext uri="{FF2B5EF4-FFF2-40B4-BE49-F238E27FC236}">
+                <a16:creationId xmlns:a16="http://schemas.microsoft.com/office/drawing/2014/main" id="{758CC022-D29E-4333-9E32-5F6B114E5BB0}"/>
+              </a:ext>
+            </a:extLst>
+          </p:cNvPr>
+          <p:cNvPicPr>
+            <a:picLocks noChangeAspect="1"/>
+          </p:cNvPicPr>
+          <p:nvPr/>
+        </p:nvPicPr>
+        <p:blipFill>
+          <a:blip r:embed="rId2"/>
+          <a:stretch>
+            <a:fillRect/>
+          </a:stretch>
+        </p:blipFill>
+        <p:spPr>
+          <a:xfrm>
+            <a:off x="457200" y="1752600"/>
+            <a:ext cx="2628900" cy="2647950"/>
+          </a:xfrm>
+          <a:prstGeom prst="rect">
+            <a:avLst/>
+          </a:prstGeom>
+        </p:spPr>
+      </p:pic>
+      <p:sp>
+        <p:nvSpPr>
+          <p:cNvPr id="5" name="CaixaDeTexto 4">
+            <a:extLst>
+              <a:ext uri="{FF2B5EF4-FFF2-40B4-BE49-F238E27FC236}">
+                <a16:creationId xmlns:a16="http://schemas.microsoft.com/office/drawing/2014/main" id="{32F1B864-B9E6-444D-AB30-7B033E4A54E9}"/>
+              </a:ext>
+            </a:extLst>
+          </p:cNvPr>
+          <p:cNvSpPr txBox="1"/>
+          <p:nvPr/>
+        </p:nvSpPr>
+        <p:spPr>
+          <a:xfrm>
+            <a:off x="3200400" y="2152471"/>
+            <a:ext cx="5257800" cy="1200329"/>
+          </a:xfrm>
+          <a:prstGeom prst="rect">
+            <a:avLst/>
+          </a:prstGeom>
+          <a:noFill/>
+        </p:spPr>
+        <p:txBody>
+          <a:bodyPr wrap="square" rtlCol="0">
+            <a:spAutoFit/>
+          </a:bodyPr>
+          <a:lstStyle/>
+          <a:p>
+            <a:pPr marL="342900" indent="-342900">
+              <a:buFont typeface="Arial" panose="020B0604020202020204" pitchFamily="34" charset="0"/>
+              <a:buChar char="•"/>
+            </a:pPr>
+            <a:r>
+              <a:rPr lang="en-US" sz="2400" dirty="0" err="1"/>
+              <a:t>Adicione</a:t>
+            </a:r>
+            <a:r>
+              <a:rPr lang="en-US" sz="2400" dirty="0"/>
+              <a:t> da aba </a:t>
+            </a:r>
+            <a:r>
+              <a:rPr lang="en-US" sz="2400" b="1" dirty="0"/>
+              <a:t>Standard </a:t>
+            </a:r>
+            <a:r>
+              <a:rPr lang="en-US" sz="2400" dirty="0"/>
+              <a:t>um </a:t>
+            </a:r>
+            <a:r>
+              <a:rPr lang="en-US" sz="2400" dirty="0" err="1"/>
+              <a:t>componente</a:t>
+            </a:r>
+            <a:r>
+              <a:rPr lang="en-US" sz="2400" b="1" dirty="0"/>
+              <a:t> </a:t>
+            </a:r>
+            <a:r>
+              <a:rPr lang="en-US" sz="2400" b="1" dirty="0" err="1"/>
+              <a:t>TMemo</a:t>
+            </a:r>
+            <a:r>
+              <a:rPr lang="en-US" sz="2400" dirty="0"/>
+              <a:t> </a:t>
+            </a:r>
+            <a:r>
+              <a:rPr lang="en-US" sz="2400" dirty="0" err="1"/>
+              <a:t>ao</a:t>
+            </a:r>
+            <a:r>
+              <a:rPr lang="en-US" sz="2400" dirty="0"/>
+              <a:t> </a:t>
+            </a:r>
+            <a:r>
+              <a:rPr lang="en-US" sz="2400" dirty="0" err="1"/>
+              <a:t>formulário</a:t>
+            </a:r>
+            <a:endParaRPr lang="en-US" sz="2400" dirty="0"/>
+          </a:p>
+        </p:txBody>
+      </p:sp>
+      <p:sp>
+        <p:nvSpPr>
+          <p:cNvPr id="6" name="CaixaDeTexto 5">
+            <a:extLst>
+              <a:ext uri="{FF2B5EF4-FFF2-40B4-BE49-F238E27FC236}">
+                <a16:creationId xmlns:a16="http://schemas.microsoft.com/office/drawing/2014/main" id="{93354009-FE83-40E0-B229-BA732CF87C46}"/>
+              </a:ext>
+            </a:extLst>
+          </p:cNvPr>
+          <p:cNvSpPr txBox="1"/>
+          <p:nvPr/>
+        </p:nvSpPr>
+        <p:spPr>
+          <a:xfrm>
+            <a:off x="457200" y="4953000"/>
+            <a:ext cx="5943600" cy="1569660"/>
+          </a:xfrm>
+          <a:prstGeom prst="rect">
+            <a:avLst/>
+          </a:prstGeom>
+          <a:noFill/>
+        </p:spPr>
+        <p:txBody>
+          <a:bodyPr wrap="square" rtlCol="0">
+            <a:spAutoFit/>
+          </a:bodyPr>
+          <a:lstStyle/>
+          <a:p>
+            <a:pPr marL="342900" indent="-342900">
+              <a:buFont typeface="Arial" panose="020B0604020202020204" pitchFamily="34" charset="0"/>
+              <a:buChar char="•"/>
+            </a:pPr>
+            <a:r>
+              <a:rPr lang="en-US" sz="2400" dirty="0"/>
+              <a:t>Configure as </a:t>
+            </a:r>
+            <a:r>
+              <a:rPr lang="en-US" sz="2400" dirty="0" err="1"/>
+              <a:t>propriedades</a:t>
+            </a:r>
+            <a:r>
+              <a:rPr lang="en-US" sz="2400" dirty="0"/>
+              <a:t> do </a:t>
+            </a:r>
+            <a:r>
+              <a:rPr lang="en-US" sz="2400" b="1" dirty="0"/>
+              <a:t>Memo1</a:t>
+            </a:r>
+            <a:r>
+              <a:rPr lang="en-US" sz="2400" dirty="0"/>
+              <a:t>:</a:t>
+            </a:r>
+          </a:p>
+          <a:p>
+            <a:pPr marL="800100" lvl="1" indent="-342900">
+              <a:buFont typeface="Arial" panose="020B0604020202020204" pitchFamily="34" charset="0"/>
+              <a:buChar char="•"/>
+            </a:pPr>
+            <a:r>
+              <a:rPr lang="en-US" sz="2400" b="1" dirty="0"/>
+              <a:t>Align: Top</a:t>
+            </a:r>
+          </a:p>
+          <a:p>
+            <a:pPr marL="800100" lvl="1" indent="-342900">
+              <a:buFont typeface="Arial" panose="020B0604020202020204" pitchFamily="34" charset="0"/>
+              <a:buChar char="•"/>
+            </a:pPr>
+            <a:r>
+              <a:rPr lang="en-US" sz="2400" b="1" dirty="0"/>
+              <a:t>Name: </a:t>
+            </a:r>
+            <a:r>
+              <a:rPr lang="en-US" sz="2400" b="1" dirty="0" err="1"/>
+              <a:t>memHistorico</a:t>
+            </a:r>
+            <a:endParaRPr lang="en-US" sz="2400" b="1" dirty="0"/>
+          </a:p>
+          <a:p>
+            <a:pPr marL="800100" lvl="1" indent="-342900">
+              <a:buFont typeface="Arial" panose="020B0604020202020204" pitchFamily="34" charset="0"/>
+              <a:buChar char="•"/>
+            </a:pPr>
+            <a:r>
+              <a:rPr lang="en-US" sz="2400" b="1" dirty="0"/>
+              <a:t>Height: 150</a:t>
+            </a:r>
+          </a:p>
+        </p:txBody>
+      </p:sp>
     </p:spTree>
     <p:extLst>
       <p:ext uri="{BB962C8B-B14F-4D97-AF65-F5344CB8AC3E}">
         <p14:creationId xmlns:p14="http://schemas.microsoft.com/office/powerpoint/2010/main" val="2093345739"/>
+      </p:ext>
+    </p:extLst>
+  </p:cSld>
+  <p:clrMapOvr>
+    <a:masterClrMapping/>
+  </p:clrMapOvr>
+</p:sld>
+</file>
+
+<file path=ppt/slides/slide74.xml><?xml version="1.0" encoding="utf-8"?>
+<p:sld xmlns:a="http://schemas.openxmlformats.org/drawingml/2006/main" xmlns:r="http://schemas.openxmlformats.org/officeDocument/2006/relationships" xmlns:p="http://schemas.openxmlformats.org/presentationml/2006/main">
+  <p:cSld>
+    <p:spTree>
+      <p:nvGrpSpPr>
+        <p:cNvPr id="1" name=""/>
+        <p:cNvGrpSpPr/>
+        <p:nvPr/>
+      </p:nvGrpSpPr>
+      <p:grpSpPr>
+        <a:xfrm>
+          <a:off x="0" y="0"/>
+          <a:ext cx="0" cy="0"/>
+          <a:chOff x="0" y="0"/>
+          <a:chExt cx="0" cy="0"/>
+        </a:xfrm>
+      </p:grpSpPr>
+      <p:sp>
+        <p:nvSpPr>
+          <p:cNvPr id="4" name="Título 1">
+            <a:extLst>
+              <a:ext uri="{FF2B5EF4-FFF2-40B4-BE49-F238E27FC236}">
+                <a16:creationId xmlns:a16="http://schemas.microsoft.com/office/drawing/2014/main" id="{AE2C30E8-AA4E-4270-9ACB-CC41C8E17BCC}"/>
+              </a:ext>
+            </a:extLst>
+          </p:cNvPr>
+          <p:cNvSpPr>
+            <a:spLocks noGrp="1"/>
+          </p:cNvSpPr>
+          <p:nvPr>
+            <p:ph type="title"/>
+          </p:nvPr>
+        </p:nvSpPr>
+        <p:spPr>
+          <a:xfrm>
+            <a:off x="457200" y="274638"/>
+            <a:ext cx="7467600" cy="1143000"/>
+          </a:xfrm>
+        </p:spPr>
+        <p:txBody>
+          <a:bodyPr/>
+          <a:lstStyle/>
+          <a:p>
+            <a:r>
+              <a:rPr lang="en-US" dirty="0" err="1"/>
+              <a:t>Montagem</a:t>
+            </a:r>
+            <a:r>
+              <a:rPr lang="en-US" dirty="0"/>
+              <a:t> do </a:t>
+            </a:r>
+            <a:r>
+              <a:rPr lang="en-US" dirty="0" err="1"/>
+              <a:t>Formulário</a:t>
+            </a:r>
+            <a:r>
+              <a:rPr lang="en-US" dirty="0"/>
+              <a:t> – </a:t>
+            </a:r>
+            <a:br>
+              <a:rPr lang="en-US" dirty="0"/>
+            </a:br>
+            <a:r>
+              <a:rPr lang="en-US" dirty="0"/>
+              <a:t>Unit windows</a:t>
+            </a:r>
+            <a:endParaRPr lang="pt-BR" dirty="0"/>
+          </a:p>
+        </p:txBody>
+      </p:sp>
+      <p:pic>
+        <p:nvPicPr>
+          <p:cNvPr id="6" name="Imagem 5">
+            <a:extLst>
+              <a:ext uri="{FF2B5EF4-FFF2-40B4-BE49-F238E27FC236}">
+                <a16:creationId xmlns:a16="http://schemas.microsoft.com/office/drawing/2014/main" id="{F4334BBA-21A0-4925-B9B9-030BCCB9D4E9}"/>
+              </a:ext>
+            </a:extLst>
+          </p:cNvPr>
+          <p:cNvPicPr>
+            <a:picLocks noChangeAspect="1"/>
+          </p:cNvPicPr>
+          <p:nvPr/>
+        </p:nvPicPr>
+        <p:blipFill>
+          <a:blip r:embed="rId2"/>
+          <a:stretch>
+            <a:fillRect/>
+          </a:stretch>
+        </p:blipFill>
+        <p:spPr>
+          <a:xfrm>
+            <a:off x="533400" y="1507090"/>
+            <a:ext cx="6334125" cy="4810125"/>
+          </a:xfrm>
+          <a:prstGeom prst="rect">
+            <a:avLst/>
+          </a:prstGeom>
+        </p:spPr>
+      </p:pic>
+    </p:spTree>
+    <p:extLst>
+      <p:ext uri="{BB962C8B-B14F-4D97-AF65-F5344CB8AC3E}">
+        <p14:creationId xmlns:p14="http://schemas.microsoft.com/office/powerpoint/2010/main" val="184589772"/>
+      </p:ext>
+    </p:extLst>
+  </p:cSld>
+  <p:clrMapOvr>
+    <a:masterClrMapping/>
+  </p:clrMapOvr>
+</p:sld>
+</file>
+
+<file path=ppt/slides/slide75.xml><?xml version="1.0" encoding="utf-8"?>
+<p:sld xmlns:a="http://schemas.openxmlformats.org/drawingml/2006/main" xmlns:r="http://schemas.openxmlformats.org/officeDocument/2006/relationships" xmlns:p="http://schemas.openxmlformats.org/presentationml/2006/main">
+  <p:cSld>
+    <p:spTree>
+      <p:nvGrpSpPr>
+        <p:cNvPr id="1" name=""/>
+        <p:cNvGrpSpPr/>
+        <p:nvPr/>
+      </p:nvGrpSpPr>
+      <p:grpSpPr>
+        <a:xfrm>
+          <a:off x="0" y="0"/>
+          <a:ext cx="0" cy="0"/>
+          <a:chOff x="0" y="0"/>
+          <a:chExt cx="0" cy="0"/>
+        </a:xfrm>
+      </p:grpSpPr>
+      <p:sp>
+        <p:nvSpPr>
+          <p:cNvPr id="4" name="Título 1">
+            <a:extLst>
+              <a:ext uri="{FF2B5EF4-FFF2-40B4-BE49-F238E27FC236}">
+                <a16:creationId xmlns:a16="http://schemas.microsoft.com/office/drawing/2014/main" id="{353758F8-FB10-4CAE-99F8-7074D511B614}"/>
+              </a:ext>
+            </a:extLst>
+          </p:cNvPr>
+          <p:cNvSpPr>
+            <a:spLocks noGrp="1"/>
+          </p:cNvSpPr>
+          <p:nvPr>
+            <p:ph type="title"/>
+          </p:nvPr>
+        </p:nvSpPr>
+        <p:spPr>
+          <a:xfrm>
+            <a:off x="457200" y="274638"/>
+            <a:ext cx="7467600" cy="1143000"/>
+          </a:xfrm>
+        </p:spPr>
+        <p:txBody>
+          <a:bodyPr/>
+          <a:lstStyle/>
+          <a:p>
+            <a:r>
+              <a:rPr lang="en-US" dirty="0" err="1"/>
+              <a:t>Montagem</a:t>
+            </a:r>
+            <a:r>
+              <a:rPr lang="en-US" dirty="0"/>
+              <a:t> do </a:t>
+            </a:r>
+            <a:r>
+              <a:rPr lang="en-US" dirty="0" err="1"/>
+              <a:t>Formulário</a:t>
+            </a:r>
+            <a:r>
+              <a:rPr lang="en-US" dirty="0"/>
+              <a:t> – </a:t>
+            </a:r>
+            <a:br>
+              <a:rPr lang="en-US" dirty="0"/>
+            </a:br>
+            <a:r>
+              <a:rPr lang="en-US" dirty="0"/>
+              <a:t>Unit windows</a:t>
+            </a:r>
+            <a:endParaRPr lang="pt-BR" dirty="0"/>
+          </a:p>
+        </p:txBody>
+      </p:sp>
+      <p:sp>
+        <p:nvSpPr>
+          <p:cNvPr id="7" name="CaixaDeTexto 6">
+            <a:extLst>
+              <a:ext uri="{FF2B5EF4-FFF2-40B4-BE49-F238E27FC236}">
+                <a16:creationId xmlns:a16="http://schemas.microsoft.com/office/drawing/2014/main" id="{4596BE4B-233B-428F-91CD-BCEE95B774C2}"/>
+              </a:ext>
+            </a:extLst>
+          </p:cNvPr>
+          <p:cNvSpPr txBox="1"/>
+          <p:nvPr/>
+        </p:nvSpPr>
+        <p:spPr>
+          <a:xfrm>
+            <a:off x="3200400" y="1676400"/>
+            <a:ext cx="5410200" cy="3046988"/>
+          </a:xfrm>
+          <a:prstGeom prst="rect">
+            <a:avLst/>
+          </a:prstGeom>
+          <a:noFill/>
+        </p:spPr>
+        <p:txBody>
+          <a:bodyPr wrap="square" rtlCol="0">
+            <a:spAutoFit/>
+          </a:bodyPr>
+          <a:lstStyle/>
+          <a:p>
+            <a:pPr marL="342900" indent="-342900">
+              <a:buFont typeface="Arial" panose="020B0604020202020204" pitchFamily="34" charset="0"/>
+              <a:buChar char="•"/>
+            </a:pPr>
+            <a:r>
+              <a:rPr lang="en-US" sz="2400" dirty="0" err="1"/>
+              <a:t>Adicione</a:t>
+            </a:r>
+            <a:r>
+              <a:rPr lang="en-US" sz="2400" dirty="0"/>
+              <a:t> da aba </a:t>
+            </a:r>
+            <a:r>
+              <a:rPr lang="en-US" sz="2400" b="1" dirty="0"/>
+              <a:t>Layouts </a:t>
+            </a:r>
+            <a:r>
+              <a:rPr lang="en-US" sz="2400" dirty="0"/>
+              <a:t>um </a:t>
+            </a:r>
+            <a:r>
+              <a:rPr lang="en-US" sz="2400" dirty="0" err="1"/>
+              <a:t>componente</a:t>
+            </a:r>
+            <a:r>
+              <a:rPr lang="en-US" sz="2400" dirty="0"/>
+              <a:t> </a:t>
+            </a:r>
+            <a:r>
+              <a:rPr lang="en-US" sz="2400" b="1" dirty="0" err="1"/>
+              <a:t>TGridPanelLayout</a:t>
+            </a:r>
+            <a:r>
+              <a:rPr lang="en-US" sz="2400" b="1" dirty="0"/>
+              <a:t> </a:t>
+            </a:r>
+            <a:r>
+              <a:rPr lang="en-US" sz="2400" dirty="0" err="1"/>
+              <a:t>ao</a:t>
+            </a:r>
+            <a:r>
+              <a:rPr lang="en-US" sz="2400" dirty="0"/>
+              <a:t> </a:t>
+            </a:r>
+            <a:r>
+              <a:rPr lang="en-US" sz="2400" dirty="0" err="1"/>
+              <a:t>formulário</a:t>
+            </a:r>
+            <a:endParaRPr lang="en-US" sz="2400" dirty="0"/>
+          </a:p>
+          <a:p>
+            <a:pPr marL="342900" indent="-342900">
+              <a:buFont typeface="Arial" panose="020B0604020202020204" pitchFamily="34" charset="0"/>
+              <a:buChar char="•"/>
+            </a:pPr>
+            <a:endParaRPr lang="en-US" sz="2400" dirty="0"/>
+          </a:p>
+          <a:p>
+            <a:pPr marL="342900" indent="-342900">
+              <a:buFont typeface="Arial" panose="020B0604020202020204" pitchFamily="34" charset="0"/>
+              <a:buChar char="•"/>
+            </a:pPr>
+            <a:r>
+              <a:rPr lang="en-US" sz="2400" dirty="0"/>
+              <a:t>Configure o </a:t>
+            </a:r>
+            <a:r>
+              <a:rPr lang="en-US" sz="2400" b="1" dirty="0"/>
+              <a:t>GridPanelLayout1 </a:t>
+            </a:r>
+            <a:r>
+              <a:rPr lang="en-US" sz="2400" dirty="0" err="1"/>
+              <a:t>como</a:t>
+            </a:r>
+            <a:r>
+              <a:rPr lang="en-US" sz="2400" dirty="0"/>
+              <a:t> a </a:t>
+            </a:r>
+            <a:r>
+              <a:rPr lang="en-US" sz="2400" dirty="0" err="1"/>
+              <a:t>seguir</a:t>
+            </a:r>
+            <a:r>
+              <a:rPr lang="en-US" sz="2400" dirty="0"/>
+              <a:t>:</a:t>
+            </a:r>
+          </a:p>
+          <a:p>
+            <a:pPr marL="800100" lvl="1" indent="-342900">
+              <a:buFont typeface="Arial" panose="020B0604020202020204" pitchFamily="34" charset="0"/>
+              <a:buChar char="•"/>
+            </a:pPr>
+            <a:r>
+              <a:rPr lang="en-US" sz="2400" b="1" dirty="0"/>
+              <a:t>Align: Client</a:t>
+            </a:r>
+          </a:p>
+          <a:p>
+            <a:pPr marL="342900" indent="-342900">
+              <a:buFont typeface="Arial" panose="020B0604020202020204" pitchFamily="34" charset="0"/>
+              <a:buChar char="•"/>
+            </a:pPr>
+            <a:endParaRPr lang="en-US" sz="2400" b="1" dirty="0"/>
+          </a:p>
+        </p:txBody>
+      </p:sp>
+      <p:pic>
+        <p:nvPicPr>
+          <p:cNvPr id="9" name="Imagem 8">
+            <a:extLst>
+              <a:ext uri="{FF2B5EF4-FFF2-40B4-BE49-F238E27FC236}">
+                <a16:creationId xmlns:a16="http://schemas.microsoft.com/office/drawing/2014/main" id="{FD457A35-D8BA-4F3A-82A6-8C44314B803C}"/>
+              </a:ext>
+            </a:extLst>
+          </p:cNvPr>
+          <p:cNvPicPr>
+            <a:picLocks noChangeAspect="1"/>
+          </p:cNvPicPr>
+          <p:nvPr/>
+        </p:nvPicPr>
+        <p:blipFill>
+          <a:blip r:embed="rId2"/>
+          <a:stretch>
+            <a:fillRect/>
+          </a:stretch>
+        </p:blipFill>
+        <p:spPr>
+          <a:xfrm>
+            <a:off x="457200" y="1709916"/>
+            <a:ext cx="2628900" cy="2638425"/>
+          </a:xfrm>
+          <a:prstGeom prst="rect">
+            <a:avLst/>
+          </a:prstGeom>
+        </p:spPr>
+      </p:pic>
+      <p:pic>
+        <p:nvPicPr>
+          <p:cNvPr id="12" name="Imagem 11">
+            <a:extLst>
+              <a:ext uri="{FF2B5EF4-FFF2-40B4-BE49-F238E27FC236}">
+                <a16:creationId xmlns:a16="http://schemas.microsoft.com/office/drawing/2014/main" id="{B1D1AB3A-CC5E-4DF5-B084-97F40BCA5D33}"/>
+              </a:ext>
+            </a:extLst>
+          </p:cNvPr>
+          <p:cNvPicPr>
+            <a:picLocks noChangeAspect="1"/>
+          </p:cNvPicPr>
+          <p:nvPr/>
+        </p:nvPicPr>
+        <p:blipFill>
+          <a:blip r:embed="rId3"/>
+          <a:stretch>
+            <a:fillRect/>
+          </a:stretch>
+        </p:blipFill>
+        <p:spPr>
+          <a:xfrm>
+            <a:off x="2977269" y="4664098"/>
+            <a:ext cx="4947531" cy="1859974"/>
+          </a:xfrm>
+          <a:prstGeom prst="rect">
+            <a:avLst/>
+          </a:prstGeom>
+        </p:spPr>
+      </p:pic>
+    </p:spTree>
+    <p:extLst>
+      <p:ext uri="{BB962C8B-B14F-4D97-AF65-F5344CB8AC3E}">
+        <p14:creationId xmlns:p14="http://schemas.microsoft.com/office/powerpoint/2010/main" val="1649171331"/>
+      </p:ext>
+    </p:extLst>
+  </p:cSld>
+  <p:clrMapOvr>
+    <a:masterClrMapping/>
+  </p:clrMapOvr>
+</p:sld>
+</file>
+
+<file path=ppt/slides/slide76.xml><?xml version="1.0" encoding="utf-8"?>
+<p:sld xmlns:a="http://schemas.openxmlformats.org/drawingml/2006/main" xmlns:r="http://schemas.openxmlformats.org/officeDocument/2006/relationships" xmlns:p="http://schemas.openxmlformats.org/presentationml/2006/main">
+  <p:cSld>
+    <p:spTree>
+      <p:nvGrpSpPr>
+        <p:cNvPr id="1" name=""/>
+        <p:cNvGrpSpPr/>
+        <p:nvPr/>
+      </p:nvGrpSpPr>
+      <p:grpSpPr>
+        <a:xfrm>
+          <a:off x="0" y="0"/>
+          <a:ext cx="0" cy="0"/>
+          <a:chOff x="0" y="0"/>
+          <a:chExt cx="0" cy="0"/>
+        </a:xfrm>
+      </p:grpSpPr>
+      <p:sp>
+        <p:nvSpPr>
+          <p:cNvPr id="4" name="Título 1">
+            <a:extLst>
+              <a:ext uri="{FF2B5EF4-FFF2-40B4-BE49-F238E27FC236}">
+                <a16:creationId xmlns:a16="http://schemas.microsoft.com/office/drawing/2014/main" id="{B23956B2-52B2-4CDF-BAA2-809D42C5F504}"/>
+              </a:ext>
+            </a:extLst>
+          </p:cNvPr>
+          <p:cNvSpPr>
+            <a:spLocks noGrp="1"/>
+          </p:cNvSpPr>
+          <p:nvPr>
+            <p:ph type="title"/>
+          </p:nvPr>
+        </p:nvSpPr>
+        <p:spPr>
+          <a:xfrm>
+            <a:off x="457200" y="274638"/>
+            <a:ext cx="7467600" cy="1143000"/>
+          </a:xfrm>
+        </p:spPr>
+        <p:txBody>
+          <a:bodyPr/>
+          <a:lstStyle/>
+          <a:p>
+            <a:r>
+              <a:rPr lang="en-US" dirty="0" err="1"/>
+              <a:t>Montagem</a:t>
+            </a:r>
+            <a:r>
+              <a:rPr lang="en-US" dirty="0"/>
+              <a:t> do </a:t>
+            </a:r>
+            <a:r>
+              <a:rPr lang="en-US" dirty="0" err="1"/>
+              <a:t>Formulário</a:t>
+            </a:r>
+            <a:r>
+              <a:rPr lang="en-US" dirty="0"/>
+              <a:t> – </a:t>
+            </a:r>
+            <a:br>
+              <a:rPr lang="en-US" dirty="0"/>
+            </a:br>
+            <a:r>
+              <a:rPr lang="en-US" dirty="0"/>
+              <a:t>Unit windows</a:t>
+            </a:r>
+            <a:endParaRPr lang="pt-BR" dirty="0"/>
+          </a:p>
+        </p:txBody>
+      </p:sp>
+      <p:pic>
+        <p:nvPicPr>
+          <p:cNvPr id="6" name="Imagem 5">
+            <a:extLst>
+              <a:ext uri="{FF2B5EF4-FFF2-40B4-BE49-F238E27FC236}">
+                <a16:creationId xmlns:a16="http://schemas.microsoft.com/office/drawing/2014/main" id="{09792E67-AFB4-4CB6-8EBD-FFFB4F31F4C3}"/>
+              </a:ext>
+            </a:extLst>
+          </p:cNvPr>
+          <p:cNvPicPr>
+            <a:picLocks noChangeAspect="1"/>
+          </p:cNvPicPr>
+          <p:nvPr/>
+        </p:nvPicPr>
+        <p:blipFill>
+          <a:blip r:embed="rId2"/>
+          <a:stretch>
+            <a:fillRect/>
+          </a:stretch>
+        </p:blipFill>
+        <p:spPr>
+          <a:xfrm>
+            <a:off x="381000" y="2566452"/>
+            <a:ext cx="2638425" cy="2638425"/>
+          </a:xfrm>
+          <a:prstGeom prst="rect">
+            <a:avLst/>
+          </a:prstGeom>
+        </p:spPr>
+      </p:pic>
+      <p:sp>
+        <p:nvSpPr>
+          <p:cNvPr id="7" name="CaixaDeTexto 6">
+            <a:extLst>
+              <a:ext uri="{FF2B5EF4-FFF2-40B4-BE49-F238E27FC236}">
+                <a16:creationId xmlns:a16="http://schemas.microsoft.com/office/drawing/2014/main" id="{DF7381ED-F68E-400C-891B-5F35867F2899}"/>
+              </a:ext>
+            </a:extLst>
+          </p:cNvPr>
+          <p:cNvSpPr txBox="1"/>
+          <p:nvPr/>
+        </p:nvSpPr>
+        <p:spPr>
+          <a:xfrm>
+            <a:off x="3124200" y="2286000"/>
+            <a:ext cx="5638800" cy="3785652"/>
+          </a:xfrm>
+          <a:prstGeom prst="rect">
+            <a:avLst/>
+          </a:prstGeom>
+          <a:noFill/>
+        </p:spPr>
+        <p:txBody>
+          <a:bodyPr wrap="square" rtlCol="0">
+            <a:spAutoFit/>
+          </a:bodyPr>
+          <a:lstStyle/>
+          <a:p>
+            <a:pPr marL="342900" indent="-342900">
+              <a:buFont typeface="Arial" panose="020B0604020202020204" pitchFamily="34" charset="0"/>
+              <a:buChar char="•"/>
+            </a:pPr>
+            <a:r>
+              <a:rPr lang="en-US" sz="2400" dirty="0" err="1"/>
+              <a:t>Adicione</a:t>
+            </a:r>
+            <a:r>
+              <a:rPr lang="en-US" sz="2400" dirty="0"/>
+              <a:t> 4 </a:t>
+            </a:r>
+            <a:r>
+              <a:rPr lang="en-US" sz="2400" dirty="0" err="1"/>
+              <a:t>componentes</a:t>
+            </a:r>
+            <a:r>
+              <a:rPr lang="en-US" sz="2400" dirty="0"/>
+              <a:t> </a:t>
+            </a:r>
+            <a:r>
+              <a:rPr lang="en-US" sz="2400" b="1" dirty="0" err="1"/>
+              <a:t>TButton</a:t>
+            </a:r>
+            <a:r>
+              <a:rPr lang="en-US" sz="2400" b="1" dirty="0"/>
+              <a:t> </a:t>
+            </a:r>
+            <a:r>
+              <a:rPr lang="en-US" sz="2400" dirty="0" err="1"/>
+              <a:t>ao</a:t>
+            </a:r>
+            <a:r>
+              <a:rPr lang="en-US" sz="2400" dirty="0"/>
+              <a:t> </a:t>
+            </a:r>
+            <a:r>
+              <a:rPr lang="en-US" sz="2400" b="1" dirty="0"/>
+              <a:t>GridPanelLayout1 </a:t>
+            </a:r>
+            <a:r>
+              <a:rPr lang="en-US" sz="2400" dirty="0"/>
+              <a:t>e configure </a:t>
+            </a:r>
+            <a:r>
+              <a:rPr lang="en-US" sz="2400" dirty="0" err="1"/>
+              <a:t>todos</a:t>
+            </a:r>
+            <a:r>
+              <a:rPr lang="en-US" sz="2400" dirty="0"/>
+              <a:t> com as </a:t>
+            </a:r>
+            <a:r>
+              <a:rPr lang="en-US" sz="2400" dirty="0" err="1"/>
+              <a:t>propriedades</a:t>
+            </a:r>
+            <a:r>
+              <a:rPr lang="en-US" sz="2400" dirty="0"/>
+              <a:t> a </a:t>
+            </a:r>
+            <a:r>
+              <a:rPr lang="en-US" sz="2400" dirty="0" err="1"/>
+              <a:t>seguir</a:t>
+            </a:r>
+            <a:r>
+              <a:rPr lang="en-US" sz="2400" dirty="0"/>
+              <a:t>:</a:t>
+            </a:r>
+          </a:p>
+          <a:p>
+            <a:pPr marL="342900" indent="-342900">
+              <a:buFont typeface="Arial" panose="020B0604020202020204" pitchFamily="34" charset="0"/>
+              <a:buChar char="•"/>
+            </a:pPr>
+            <a:endParaRPr lang="en-US" sz="2400" b="1" dirty="0"/>
+          </a:p>
+          <a:p>
+            <a:pPr marL="342900" indent="-342900">
+              <a:buFont typeface="Arial" panose="020B0604020202020204" pitchFamily="34" charset="0"/>
+              <a:buChar char="•"/>
+            </a:pPr>
+            <a:r>
+              <a:rPr lang="en-US" sz="2400" b="1" dirty="0"/>
+              <a:t>Align: Client</a:t>
+            </a:r>
+          </a:p>
+          <a:p>
+            <a:pPr marL="342900" indent="-342900">
+              <a:buFont typeface="Arial" panose="020B0604020202020204" pitchFamily="34" charset="0"/>
+              <a:buChar char="•"/>
+            </a:pPr>
+            <a:r>
+              <a:rPr lang="en-US" sz="2400" b="1" dirty="0"/>
+              <a:t>Margins -&gt; Top: 5</a:t>
+            </a:r>
+          </a:p>
+          <a:p>
+            <a:pPr marL="342900" indent="-342900">
+              <a:buFont typeface="Arial" panose="020B0604020202020204" pitchFamily="34" charset="0"/>
+              <a:buChar char="•"/>
+            </a:pPr>
+            <a:r>
+              <a:rPr lang="en-US" sz="2400" b="1" dirty="0"/>
+              <a:t>Margins -&gt; Right: 5</a:t>
+            </a:r>
+          </a:p>
+          <a:p>
+            <a:pPr marL="342900" indent="-342900">
+              <a:buFont typeface="Arial" panose="020B0604020202020204" pitchFamily="34" charset="0"/>
+              <a:buChar char="•"/>
+            </a:pPr>
+            <a:r>
+              <a:rPr lang="en-US" sz="2400" b="1" dirty="0"/>
+              <a:t>Margins -&gt; Left:5</a:t>
+            </a:r>
+          </a:p>
+          <a:p>
+            <a:pPr marL="342900" indent="-342900">
+              <a:buFont typeface="Arial" panose="020B0604020202020204" pitchFamily="34" charset="0"/>
+              <a:buChar char="•"/>
+            </a:pPr>
+            <a:r>
+              <a:rPr lang="en-US" sz="2400" b="1" dirty="0"/>
+              <a:t>Margins -&gt; Bottom:5</a:t>
+            </a:r>
+          </a:p>
+          <a:p>
+            <a:pPr marL="342900" indent="-342900">
+              <a:buFont typeface="Arial" panose="020B0604020202020204" pitchFamily="34" charset="0"/>
+              <a:buChar char="•"/>
+            </a:pPr>
+            <a:endParaRPr lang="en-US" sz="2400" b="1" dirty="0"/>
+          </a:p>
+        </p:txBody>
+      </p:sp>
+    </p:spTree>
+    <p:extLst>
+      <p:ext uri="{BB962C8B-B14F-4D97-AF65-F5344CB8AC3E}">
+        <p14:creationId xmlns:p14="http://schemas.microsoft.com/office/powerpoint/2010/main" val="73137677"/>
+      </p:ext>
+    </p:extLst>
+  </p:cSld>
+  <p:clrMapOvr>
+    <a:masterClrMapping/>
+  </p:clrMapOvr>
+</p:sld>
+</file>
+
+<file path=ppt/slides/slide77.xml><?xml version="1.0" encoding="utf-8"?>
+<p:sld xmlns:a="http://schemas.openxmlformats.org/drawingml/2006/main" xmlns:r="http://schemas.openxmlformats.org/officeDocument/2006/relationships" xmlns:p="http://schemas.openxmlformats.org/presentationml/2006/main">
+  <p:cSld>
+    <p:spTree>
+      <p:nvGrpSpPr>
+        <p:cNvPr id="1" name=""/>
+        <p:cNvGrpSpPr/>
+        <p:nvPr/>
+      </p:nvGrpSpPr>
+      <p:grpSpPr>
+        <a:xfrm>
+          <a:off x="0" y="0"/>
+          <a:ext cx="0" cy="0"/>
+          <a:chOff x="0" y="0"/>
+          <a:chExt cx="0" cy="0"/>
+        </a:xfrm>
+      </p:grpSpPr>
+      <p:sp>
+        <p:nvSpPr>
+          <p:cNvPr id="4" name="Título 1">
+            <a:extLst>
+              <a:ext uri="{FF2B5EF4-FFF2-40B4-BE49-F238E27FC236}">
+                <a16:creationId xmlns:a16="http://schemas.microsoft.com/office/drawing/2014/main" id="{73A7A6CA-72E5-40D5-B0F5-7FFDDA5498DB}"/>
+              </a:ext>
+            </a:extLst>
+          </p:cNvPr>
+          <p:cNvSpPr>
+            <a:spLocks noGrp="1"/>
+          </p:cNvSpPr>
+          <p:nvPr>
+            <p:ph type="title"/>
+          </p:nvPr>
+        </p:nvSpPr>
+        <p:spPr>
+          <a:xfrm>
+            <a:off x="457200" y="274638"/>
+            <a:ext cx="7467600" cy="1143000"/>
+          </a:xfrm>
+        </p:spPr>
+        <p:txBody>
+          <a:bodyPr/>
+          <a:lstStyle/>
+          <a:p>
+            <a:r>
+              <a:rPr lang="en-US" dirty="0" err="1"/>
+              <a:t>Montagem</a:t>
+            </a:r>
+            <a:r>
+              <a:rPr lang="en-US" dirty="0"/>
+              <a:t> do </a:t>
+            </a:r>
+            <a:r>
+              <a:rPr lang="en-US" dirty="0" err="1"/>
+              <a:t>Formulário</a:t>
+            </a:r>
+            <a:r>
+              <a:rPr lang="en-US" dirty="0"/>
+              <a:t> – </a:t>
+            </a:r>
+            <a:br>
+              <a:rPr lang="en-US" dirty="0"/>
+            </a:br>
+            <a:r>
+              <a:rPr lang="en-US" dirty="0"/>
+              <a:t>Unit windows</a:t>
+            </a:r>
+            <a:endParaRPr lang="pt-BR" dirty="0"/>
+          </a:p>
+        </p:txBody>
+      </p:sp>
+      <p:sp>
+        <p:nvSpPr>
+          <p:cNvPr id="5" name="CaixaDeTexto 4">
+            <a:extLst>
+              <a:ext uri="{FF2B5EF4-FFF2-40B4-BE49-F238E27FC236}">
+                <a16:creationId xmlns:a16="http://schemas.microsoft.com/office/drawing/2014/main" id="{0529254A-1D45-4B30-B450-EA632179256F}"/>
+              </a:ext>
+            </a:extLst>
+          </p:cNvPr>
+          <p:cNvSpPr txBox="1"/>
+          <p:nvPr/>
+        </p:nvSpPr>
+        <p:spPr>
+          <a:xfrm>
+            <a:off x="457200" y="1524000"/>
+            <a:ext cx="7467600" cy="2800767"/>
+          </a:xfrm>
+          <a:prstGeom prst="rect">
+            <a:avLst/>
+          </a:prstGeom>
+          <a:noFill/>
+        </p:spPr>
+        <p:txBody>
+          <a:bodyPr wrap="square" rtlCol="0">
+            <a:spAutoFit/>
+          </a:bodyPr>
+          <a:lstStyle/>
+          <a:p>
+            <a:pPr marL="342900" indent="-342900">
+              <a:buFont typeface="Arial" panose="020B0604020202020204" pitchFamily="34" charset="0"/>
+              <a:buChar char="•"/>
+            </a:pPr>
+            <a:r>
+              <a:rPr lang="en-US" sz="2200" b="1" dirty="0"/>
+              <a:t>Button3</a:t>
+            </a:r>
+          </a:p>
+          <a:p>
+            <a:pPr marL="800100" lvl="1" indent="-342900">
+              <a:buFont typeface="Arial" panose="020B0604020202020204" pitchFamily="34" charset="0"/>
+              <a:buChar char="•"/>
+            </a:pPr>
+            <a:r>
+              <a:rPr lang="en-US" sz="2200" b="1" dirty="0"/>
+              <a:t>Name: </a:t>
+            </a:r>
+            <a:r>
+              <a:rPr lang="en-US" sz="2200" b="1" dirty="0" err="1"/>
+              <a:t>btnNavegar</a:t>
+            </a:r>
+            <a:endParaRPr lang="en-US" sz="2200" b="1" dirty="0"/>
+          </a:p>
+          <a:p>
+            <a:pPr marL="800100" lvl="1" indent="-342900">
+              <a:buFont typeface="Arial" panose="020B0604020202020204" pitchFamily="34" charset="0"/>
+              <a:buChar char="•"/>
+            </a:pPr>
+            <a:r>
+              <a:rPr lang="en-US" sz="2200" b="1" dirty="0"/>
+              <a:t>Text: </a:t>
+            </a:r>
+            <a:r>
+              <a:rPr lang="en-US" sz="2200" b="1" dirty="0" err="1"/>
+              <a:t>Navegar</a:t>
+            </a:r>
+            <a:endParaRPr lang="en-US" sz="2200" b="1" dirty="0"/>
+          </a:p>
+          <a:p>
+            <a:endParaRPr lang="en-US" sz="2200" b="1" dirty="0"/>
+          </a:p>
+          <a:p>
+            <a:pPr marL="342900" indent="-342900">
+              <a:buFont typeface="Arial" panose="020B0604020202020204" pitchFamily="34" charset="0"/>
+              <a:buChar char="•"/>
+            </a:pPr>
+            <a:r>
+              <a:rPr lang="en-US" sz="2200" b="1" dirty="0"/>
+              <a:t>Button4</a:t>
+            </a:r>
+          </a:p>
+          <a:p>
+            <a:pPr marL="800100" lvl="1" indent="-342900">
+              <a:buFont typeface="Arial" panose="020B0604020202020204" pitchFamily="34" charset="0"/>
+              <a:buChar char="•"/>
+            </a:pPr>
+            <a:r>
+              <a:rPr lang="en-US" sz="2200" b="1" dirty="0"/>
+              <a:t>Name: </a:t>
+            </a:r>
+            <a:r>
+              <a:rPr lang="en-US" sz="2200" b="1" dirty="0" err="1"/>
+              <a:t>btnMonitor</a:t>
+            </a:r>
+            <a:endParaRPr lang="en-US" sz="2200" b="1" dirty="0"/>
+          </a:p>
+          <a:p>
+            <a:pPr marL="800100" lvl="1" indent="-342900">
+              <a:buFont typeface="Arial" panose="020B0604020202020204" pitchFamily="34" charset="0"/>
+              <a:buChar char="•"/>
+            </a:pPr>
+            <a:r>
+              <a:rPr lang="en-US" sz="2200" b="1" dirty="0"/>
+              <a:t>Text: Monitor Off</a:t>
+            </a:r>
+          </a:p>
+          <a:p>
+            <a:pPr marL="342900" indent="-342900">
+              <a:buFont typeface="Arial" panose="020B0604020202020204" pitchFamily="34" charset="0"/>
+              <a:buChar char="•"/>
+            </a:pPr>
+            <a:endParaRPr lang="en-US" sz="2200" b="1" dirty="0"/>
+          </a:p>
+        </p:txBody>
+      </p:sp>
+      <p:sp>
+        <p:nvSpPr>
+          <p:cNvPr id="8" name="CaixaDeTexto 7">
+            <a:extLst>
+              <a:ext uri="{FF2B5EF4-FFF2-40B4-BE49-F238E27FC236}">
+                <a16:creationId xmlns:a16="http://schemas.microsoft.com/office/drawing/2014/main" id="{CCE0D245-1BE7-429C-9B2E-D7030BE0BA5A}"/>
+              </a:ext>
+            </a:extLst>
+          </p:cNvPr>
+          <p:cNvSpPr txBox="1"/>
+          <p:nvPr/>
+        </p:nvSpPr>
+        <p:spPr>
+          <a:xfrm>
+            <a:off x="4419600" y="1524000"/>
+            <a:ext cx="4286751" cy="2739211"/>
+          </a:xfrm>
+          <a:prstGeom prst="rect">
+            <a:avLst/>
+          </a:prstGeom>
+          <a:noFill/>
+        </p:spPr>
+        <p:txBody>
+          <a:bodyPr wrap="none" rtlCol="0">
+            <a:spAutoFit/>
+          </a:bodyPr>
+          <a:lstStyle/>
+          <a:p>
+            <a:pPr marL="342900" indent="-342900">
+              <a:buFont typeface="Arial" panose="020B0604020202020204" pitchFamily="34" charset="0"/>
+              <a:buChar char="•"/>
+            </a:pPr>
+            <a:r>
+              <a:rPr lang="en-US" sz="2200" b="1" dirty="0"/>
+              <a:t>Button5</a:t>
+            </a:r>
+          </a:p>
+          <a:p>
+            <a:pPr marL="800100" lvl="1" indent="-342900">
+              <a:buFont typeface="Arial" panose="020B0604020202020204" pitchFamily="34" charset="0"/>
+              <a:buChar char="•"/>
+            </a:pPr>
+            <a:r>
+              <a:rPr lang="en-US" sz="2200" b="1" dirty="0"/>
+              <a:t>Name: </a:t>
+            </a:r>
+            <a:r>
+              <a:rPr lang="en-US" sz="2200" b="1" dirty="0" err="1"/>
+              <a:t>btnCalculadora</a:t>
+            </a:r>
+            <a:endParaRPr lang="en-US" sz="2200" b="1" dirty="0"/>
+          </a:p>
+          <a:p>
+            <a:pPr marL="800100" lvl="1" indent="-342900">
+              <a:buFont typeface="Arial" panose="020B0604020202020204" pitchFamily="34" charset="0"/>
+              <a:buChar char="•"/>
+            </a:pPr>
+            <a:r>
+              <a:rPr lang="en-US" sz="2200" b="1" dirty="0"/>
+              <a:t>Text: </a:t>
+            </a:r>
+            <a:r>
+              <a:rPr lang="en-US" sz="2200" b="1" dirty="0" err="1"/>
+              <a:t>Calculadora</a:t>
+            </a:r>
+            <a:endParaRPr lang="en-US" sz="2200" b="1" dirty="0"/>
+          </a:p>
+          <a:p>
+            <a:pPr marL="800100" lvl="1" indent="-342900">
+              <a:buFont typeface="Arial" panose="020B0604020202020204" pitchFamily="34" charset="0"/>
+              <a:buChar char="•"/>
+            </a:pPr>
+            <a:endParaRPr lang="en-US" sz="2200" b="1" dirty="0"/>
+          </a:p>
+          <a:p>
+            <a:pPr marL="342900" indent="-342900">
+              <a:buFont typeface="Arial" panose="020B0604020202020204" pitchFamily="34" charset="0"/>
+              <a:buChar char="•"/>
+            </a:pPr>
+            <a:r>
+              <a:rPr lang="en-US" sz="2200" b="1" dirty="0"/>
+              <a:t>Button6</a:t>
+            </a:r>
+          </a:p>
+          <a:p>
+            <a:pPr marL="800100" lvl="1" indent="-342900">
+              <a:buFont typeface="Arial" panose="020B0604020202020204" pitchFamily="34" charset="0"/>
+              <a:buChar char="•"/>
+            </a:pPr>
+            <a:r>
+              <a:rPr lang="en-US" sz="2200" b="1" dirty="0"/>
+              <a:t>Name: </a:t>
+            </a:r>
+            <a:r>
+              <a:rPr lang="en-US" sz="2200" b="1" dirty="0" err="1"/>
+              <a:t>btnPC</a:t>
+            </a:r>
+            <a:endParaRPr lang="en-US" sz="2200" b="1" dirty="0"/>
+          </a:p>
+          <a:p>
+            <a:pPr marL="800100" lvl="1" indent="-342900">
+              <a:buFont typeface="Arial" panose="020B0604020202020204" pitchFamily="34" charset="0"/>
+              <a:buChar char="•"/>
+            </a:pPr>
+            <a:r>
+              <a:rPr lang="en-US" sz="2200" b="1" dirty="0"/>
+              <a:t>Text: </a:t>
+            </a:r>
+            <a:r>
+              <a:rPr lang="en-US" sz="2200" b="1" dirty="0" err="1"/>
+              <a:t>Desligar</a:t>
+            </a:r>
+            <a:r>
+              <a:rPr lang="en-US" sz="2200" b="1" dirty="0"/>
+              <a:t> PC</a:t>
+            </a:r>
+          </a:p>
+          <a:p>
+            <a:endParaRPr lang="en-US" dirty="0"/>
+          </a:p>
+        </p:txBody>
+      </p:sp>
+      <p:pic>
+        <p:nvPicPr>
+          <p:cNvPr id="10" name="Imagem 9">
+            <a:extLst>
+              <a:ext uri="{FF2B5EF4-FFF2-40B4-BE49-F238E27FC236}">
+                <a16:creationId xmlns:a16="http://schemas.microsoft.com/office/drawing/2014/main" id="{55ACCC95-C7E9-400E-9115-9A138086CF30}"/>
+              </a:ext>
+            </a:extLst>
+          </p:cNvPr>
+          <p:cNvPicPr>
+            <a:picLocks noChangeAspect="1"/>
+          </p:cNvPicPr>
+          <p:nvPr/>
+        </p:nvPicPr>
+        <p:blipFill>
+          <a:blip r:embed="rId2"/>
+          <a:stretch>
+            <a:fillRect/>
+          </a:stretch>
+        </p:blipFill>
+        <p:spPr>
+          <a:xfrm>
+            <a:off x="1423987" y="4299433"/>
+            <a:ext cx="6296025" cy="2333625"/>
+          </a:xfrm>
+          <a:prstGeom prst="rect">
+            <a:avLst/>
+          </a:prstGeom>
+        </p:spPr>
+      </p:pic>
+    </p:spTree>
+    <p:extLst>
+      <p:ext uri="{BB962C8B-B14F-4D97-AF65-F5344CB8AC3E}">
+        <p14:creationId xmlns:p14="http://schemas.microsoft.com/office/powerpoint/2010/main" val="3479690139"/>
+      </p:ext>
+    </p:extLst>
+  </p:cSld>
+  <p:clrMapOvr>
+    <a:masterClrMapping/>
+  </p:clrMapOvr>
+</p:sld>
+</file>
+
+<file path=ppt/slides/slide78.xml><?xml version="1.0" encoding="utf-8"?>
+<p:sld xmlns:a="http://schemas.openxmlformats.org/drawingml/2006/main" xmlns:r="http://schemas.openxmlformats.org/officeDocument/2006/relationships" xmlns:p="http://schemas.openxmlformats.org/presentationml/2006/main">
+  <p:cSld>
+    <p:spTree>
+      <p:nvGrpSpPr>
+        <p:cNvPr id="1" name=""/>
+        <p:cNvGrpSpPr/>
+        <p:nvPr/>
+      </p:nvGrpSpPr>
+      <p:grpSpPr>
+        <a:xfrm>
+          <a:off x="0" y="0"/>
+          <a:ext cx="0" cy="0"/>
+          <a:chOff x="0" y="0"/>
+          <a:chExt cx="0" cy="0"/>
+        </a:xfrm>
+      </p:grpSpPr>
+      <p:sp>
+        <p:nvSpPr>
+          <p:cNvPr id="4" name="Título 1">
+            <a:extLst>
+              <a:ext uri="{FF2B5EF4-FFF2-40B4-BE49-F238E27FC236}">
+                <a16:creationId xmlns:a16="http://schemas.microsoft.com/office/drawing/2014/main" id="{18538446-11C4-484A-8294-F68FD1263661}"/>
+              </a:ext>
+            </a:extLst>
+          </p:cNvPr>
+          <p:cNvSpPr>
+            <a:spLocks noGrp="1"/>
+          </p:cNvSpPr>
+          <p:nvPr>
+            <p:ph type="title"/>
+          </p:nvPr>
+        </p:nvSpPr>
+        <p:spPr>
+          <a:xfrm>
+            <a:off x="457200" y="274638"/>
+            <a:ext cx="7467600" cy="1143000"/>
+          </a:xfrm>
+        </p:spPr>
+        <p:txBody>
+          <a:bodyPr/>
+          <a:lstStyle/>
+          <a:p>
+            <a:r>
+              <a:rPr lang="en-US" dirty="0" err="1"/>
+              <a:t>Montagem</a:t>
+            </a:r>
+            <a:r>
+              <a:rPr lang="en-US" dirty="0"/>
+              <a:t> do </a:t>
+            </a:r>
+            <a:r>
+              <a:rPr lang="en-US" dirty="0" err="1"/>
+              <a:t>Formulário</a:t>
+            </a:r>
+            <a:r>
+              <a:rPr lang="en-US" dirty="0"/>
+              <a:t> – </a:t>
+            </a:r>
+            <a:br>
+              <a:rPr lang="en-US" dirty="0"/>
+            </a:br>
+            <a:r>
+              <a:rPr lang="en-US" dirty="0"/>
+              <a:t>Unit windows</a:t>
+            </a:r>
+            <a:endParaRPr lang="pt-BR" dirty="0"/>
+          </a:p>
+        </p:txBody>
+      </p:sp>
+      <p:sp>
+        <p:nvSpPr>
+          <p:cNvPr id="5" name="CaixaDeTexto 4">
+            <a:extLst>
+              <a:ext uri="{FF2B5EF4-FFF2-40B4-BE49-F238E27FC236}">
+                <a16:creationId xmlns:a16="http://schemas.microsoft.com/office/drawing/2014/main" id="{B9073181-C76F-4A8A-AFBD-19B34188CAD1}"/>
+              </a:ext>
+            </a:extLst>
+          </p:cNvPr>
+          <p:cNvSpPr txBox="1"/>
+          <p:nvPr/>
+        </p:nvSpPr>
+        <p:spPr>
+          <a:xfrm>
+            <a:off x="609600" y="1905000"/>
+            <a:ext cx="7848600" cy="2677656"/>
+          </a:xfrm>
+          <a:prstGeom prst="rect">
+            <a:avLst/>
+          </a:prstGeom>
+          <a:noFill/>
+        </p:spPr>
+        <p:txBody>
+          <a:bodyPr wrap="square" rtlCol="0">
+            <a:spAutoFit/>
+          </a:bodyPr>
+          <a:lstStyle/>
+          <a:p>
+            <a:pPr marL="342900" indent="-342900">
+              <a:buFont typeface="Arial" panose="020B0604020202020204" pitchFamily="34" charset="0"/>
+              <a:buChar char="•"/>
+            </a:pPr>
+            <a:r>
+              <a:rPr lang="en-US" sz="2400" dirty="0" err="1"/>
+              <a:t>Nesse</a:t>
+            </a:r>
+            <a:r>
+              <a:rPr lang="en-US" sz="2400" dirty="0"/>
+              <a:t> </a:t>
+            </a:r>
+            <a:r>
+              <a:rPr lang="en-US" sz="2400" dirty="0" err="1"/>
+              <a:t>formulário</a:t>
+            </a:r>
+            <a:r>
+              <a:rPr lang="en-US" sz="2400" dirty="0"/>
+              <a:t> </a:t>
+            </a:r>
+            <a:r>
+              <a:rPr lang="en-US" sz="2400" dirty="0" err="1"/>
+              <a:t>também</a:t>
+            </a:r>
+            <a:r>
+              <a:rPr lang="en-US" sz="2400" dirty="0"/>
+              <a:t> </a:t>
+            </a:r>
+            <a:r>
+              <a:rPr lang="en-US" sz="2400" dirty="0" err="1"/>
+              <a:t>precisaremos</a:t>
+            </a:r>
+            <a:r>
+              <a:rPr lang="en-US" sz="2400" dirty="0"/>
+              <a:t> de </a:t>
+            </a:r>
+            <a:r>
+              <a:rPr lang="en-US" sz="2400" dirty="0" err="1"/>
+              <a:t>acesso</a:t>
+            </a:r>
+            <a:r>
+              <a:rPr lang="en-US" sz="2400" dirty="0"/>
+              <a:t> </a:t>
+            </a:r>
+            <a:r>
+              <a:rPr lang="en-US" sz="2400" dirty="0" err="1"/>
+              <a:t>ao</a:t>
+            </a:r>
+            <a:r>
+              <a:rPr lang="en-US" sz="2400" dirty="0"/>
+              <a:t> </a:t>
+            </a:r>
+            <a:r>
+              <a:rPr lang="en-US" sz="2400" b="1" dirty="0" err="1"/>
+              <a:t>ImageList</a:t>
+            </a:r>
+            <a:r>
+              <a:rPr lang="en-US" sz="2400" b="1" dirty="0"/>
+              <a:t> </a:t>
+            </a:r>
+            <a:r>
+              <a:rPr lang="en-US" sz="2400" dirty="0"/>
+              <a:t>do </a:t>
+            </a:r>
+            <a:r>
+              <a:rPr lang="en-US" sz="2400" dirty="0" err="1"/>
+              <a:t>formulário</a:t>
+            </a:r>
+            <a:r>
+              <a:rPr lang="en-US" sz="2400" dirty="0"/>
+              <a:t> principal, para </a:t>
+            </a:r>
+            <a:r>
+              <a:rPr lang="en-US" sz="2400" dirty="0" err="1"/>
+              <a:t>isso</a:t>
+            </a:r>
+            <a:r>
+              <a:rPr lang="en-US" sz="2400" dirty="0"/>
+              <a:t> </a:t>
+            </a:r>
+            <a:r>
+              <a:rPr lang="en-US" sz="2400" dirty="0" err="1"/>
+              <a:t>precisamos</a:t>
+            </a:r>
+            <a:r>
+              <a:rPr lang="en-US" sz="2400" dirty="0"/>
+              <a:t> declarer o </a:t>
+            </a:r>
+            <a:r>
+              <a:rPr lang="en-US" sz="2400" dirty="0" err="1"/>
+              <a:t>formulário</a:t>
+            </a:r>
+            <a:r>
+              <a:rPr lang="en-US" sz="2400" dirty="0"/>
+              <a:t> </a:t>
+            </a:r>
+            <a:r>
+              <a:rPr lang="en-US" sz="2400" dirty="0" err="1"/>
+              <a:t>como</a:t>
+            </a:r>
+            <a:r>
+              <a:rPr lang="en-US" sz="2400" dirty="0"/>
+              <a:t> </a:t>
+            </a:r>
+            <a:r>
+              <a:rPr lang="en-US" sz="2400" dirty="0" err="1"/>
+              <a:t>utilizavel</a:t>
+            </a:r>
+            <a:endParaRPr lang="en-US" sz="2400" dirty="0"/>
+          </a:p>
+          <a:p>
+            <a:pPr marL="342900" indent="-342900">
+              <a:buFont typeface="Arial" panose="020B0604020202020204" pitchFamily="34" charset="0"/>
+              <a:buChar char="•"/>
+            </a:pPr>
+            <a:endParaRPr lang="en-US" sz="2400" dirty="0"/>
+          </a:p>
+          <a:p>
+            <a:pPr marL="342900" indent="-342900">
+              <a:buFont typeface="Arial" panose="020B0604020202020204" pitchFamily="34" charset="0"/>
+              <a:buChar char="•"/>
+            </a:pPr>
+            <a:r>
+              <a:rPr lang="en-US" sz="2400" dirty="0"/>
+              <a:t>Para </a:t>
+            </a:r>
+            <a:r>
+              <a:rPr lang="en-US" sz="2400" dirty="0" err="1"/>
+              <a:t>isso</a:t>
+            </a:r>
+            <a:r>
+              <a:rPr lang="en-US" sz="2400" dirty="0"/>
+              <a:t> declare um </a:t>
+            </a:r>
+            <a:r>
+              <a:rPr lang="en-US" sz="2400" dirty="0" err="1"/>
+              <a:t>bloco</a:t>
+            </a:r>
+            <a:r>
+              <a:rPr lang="en-US" sz="2400" dirty="0"/>
+              <a:t> </a:t>
+            </a:r>
+            <a:r>
+              <a:rPr lang="en-US" sz="2400" b="1" dirty="0"/>
+              <a:t>uses</a:t>
+            </a:r>
+            <a:r>
+              <a:rPr lang="en-US" sz="2400" dirty="0"/>
+              <a:t> </a:t>
+            </a:r>
+            <a:r>
+              <a:rPr lang="en-US" sz="2400" dirty="0" err="1"/>
+              <a:t>abaixo</a:t>
+            </a:r>
+            <a:r>
+              <a:rPr lang="en-US" sz="2400" dirty="0"/>
+              <a:t> do </a:t>
+            </a:r>
+            <a:r>
+              <a:rPr lang="en-US" sz="2400" dirty="0" err="1"/>
+              <a:t>inicio</a:t>
+            </a:r>
+            <a:r>
+              <a:rPr lang="en-US" sz="2400" dirty="0"/>
+              <a:t> do </a:t>
+            </a:r>
+            <a:r>
+              <a:rPr lang="en-US" sz="2400" b="1" dirty="0"/>
+              <a:t>implementation </a:t>
+            </a:r>
+            <a:r>
+              <a:rPr lang="en-US" sz="2400" dirty="0"/>
+              <a:t>e </a:t>
+            </a:r>
+            <a:r>
+              <a:rPr lang="en-US" sz="2400" dirty="0" err="1"/>
+              <a:t>então</a:t>
+            </a:r>
+            <a:r>
+              <a:rPr lang="en-US" sz="2400" dirty="0"/>
+              <a:t> declare a unit principal do </a:t>
+            </a:r>
+            <a:r>
+              <a:rPr lang="en-US" sz="2400" dirty="0" err="1"/>
+              <a:t>projeto</a:t>
+            </a:r>
+            <a:r>
+              <a:rPr lang="en-US" sz="2400" dirty="0"/>
+              <a:t>, no </a:t>
+            </a:r>
+            <a:r>
+              <a:rPr lang="en-US" sz="2400" dirty="0" err="1"/>
+              <a:t>caso</a:t>
+            </a:r>
+            <a:r>
+              <a:rPr lang="en-US" sz="2400" dirty="0"/>
+              <a:t> </a:t>
+            </a:r>
+            <a:r>
+              <a:rPr lang="en-US" sz="2400" b="1" dirty="0" err="1"/>
+              <a:t>frmPrincipalU</a:t>
+            </a:r>
+            <a:endParaRPr lang="en-US" sz="2400" b="1" dirty="0"/>
+          </a:p>
+        </p:txBody>
+      </p:sp>
+      <p:pic>
+        <p:nvPicPr>
+          <p:cNvPr id="7" name="Imagem 6">
+            <a:extLst>
+              <a:ext uri="{FF2B5EF4-FFF2-40B4-BE49-F238E27FC236}">
+                <a16:creationId xmlns:a16="http://schemas.microsoft.com/office/drawing/2014/main" id="{6B4118A7-7BBE-497E-90A4-EDC368FDF4E6}"/>
+              </a:ext>
+            </a:extLst>
+          </p:cNvPr>
+          <p:cNvPicPr>
+            <a:picLocks noChangeAspect="1"/>
+          </p:cNvPicPr>
+          <p:nvPr/>
+        </p:nvPicPr>
+        <p:blipFill>
+          <a:blip r:embed="rId2"/>
+          <a:stretch>
+            <a:fillRect/>
+          </a:stretch>
+        </p:blipFill>
+        <p:spPr>
+          <a:xfrm>
+            <a:off x="914400" y="5181600"/>
+            <a:ext cx="3935156" cy="890588"/>
+          </a:xfrm>
+          <a:prstGeom prst="rect">
+            <a:avLst/>
+          </a:prstGeom>
+        </p:spPr>
+      </p:pic>
+    </p:spTree>
+    <p:extLst>
+      <p:ext uri="{BB962C8B-B14F-4D97-AF65-F5344CB8AC3E}">
+        <p14:creationId xmlns:p14="http://schemas.microsoft.com/office/powerpoint/2010/main" val="1609411027"/>
+      </p:ext>
+    </p:extLst>
+  </p:cSld>
+  <p:clrMapOvr>
+    <a:masterClrMapping/>
+  </p:clrMapOvr>
+</p:sld>
+</file>
+
+<file path=ppt/slides/slide79.xml><?xml version="1.0" encoding="utf-8"?>
+<p:sld xmlns:a="http://schemas.openxmlformats.org/drawingml/2006/main" xmlns:r="http://schemas.openxmlformats.org/officeDocument/2006/relationships" xmlns:p="http://schemas.openxmlformats.org/presentationml/2006/main">
+  <p:cSld>
+    <p:spTree>
+      <p:nvGrpSpPr>
+        <p:cNvPr id="1" name=""/>
+        <p:cNvGrpSpPr/>
+        <p:nvPr/>
+      </p:nvGrpSpPr>
+      <p:grpSpPr>
+        <a:xfrm>
+          <a:off x="0" y="0"/>
+          <a:ext cx="0" cy="0"/>
+          <a:chOff x="0" y="0"/>
+          <a:chExt cx="0" cy="0"/>
+        </a:xfrm>
+      </p:grpSpPr>
+      <p:sp>
+        <p:nvSpPr>
+          <p:cNvPr id="4" name="Título 1">
+            <a:extLst>
+              <a:ext uri="{FF2B5EF4-FFF2-40B4-BE49-F238E27FC236}">
+                <a16:creationId xmlns:a16="http://schemas.microsoft.com/office/drawing/2014/main" id="{EDD8A83D-F86B-4D8E-8809-7EFDB13AB661}"/>
+              </a:ext>
+            </a:extLst>
+          </p:cNvPr>
+          <p:cNvSpPr>
+            <a:spLocks noGrp="1"/>
+          </p:cNvSpPr>
+          <p:nvPr>
+            <p:ph type="title"/>
+          </p:nvPr>
+        </p:nvSpPr>
+        <p:spPr>
+          <a:xfrm>
+            <a:off x="457200" y="274638"/>
+            <a:ext cx="7467600" cy="1143000"/>
+          </a:xfrm>
+        </p:spPr>
+        <p:txBody>
+          <a:bodyPr/>
+          <a:lstStyle/>
+          <a:p>
+            <a:r>
+              <a:rPr lang="en-US" dirty="0" err="1"/>
+              <a:t>Montagem</a:t>
+            </a:r>
+            <a:r>
+              <a:rPr lang="en-US" dirty="0"/>
+              <a:t> do </a:t>
+            </a:r>
+            <a:r>
+              <a:rPr lang="en-US" dirty="0" err="1"/>
+              <a:t>Formulário</a:t>
+            </a:r>
+            <a:r>
+              <a:rPr lang="en-US" dirty="0"/>
+              <a:t> – </a:t>
+            </a:r>
+            <a:br>
+              <a:rPr lang="en-US" dirty="0"/>
+            </a:br>
+            <a:r>
+              <a:rPr lang="en-US" dirty="0"/>
+              <a:t>Unit windows</a:t>
+            </a:r>
+            <a:endParaRPr lang="pt-BR" dirty="0"/>
+          </a:p>
+        </p:txBody>
+      </p:sp>
+      <p:sp>
+        <p:nvSpPr>
+          <p:cNvPr id="5" name="CaixaDeTexto 4">
+            <a:extLst>
+              <a:ext uri="{FF2B5EF4-FFF2-40B4-BE49-F238E27FC236}">
+                <a16:creationId xmlns:a16="http://schemas.microsoft.com/office/drawing/2014/main" id="{320FF376-F5B9-4743-956F-2738F3DB1CE9}"/>
+              </a:ext>
+            </a:extLst>
+          </p:cNvPr>
+          <p:cNvSpPr txBox="1"/>
+          <p:nvPr/>
+        </p:nvSpPr>
+        <p:spPr>
+          <a:xfrm>
+            <a:off x="533400" y="1676400"/>
+            <a:ext cx="7924800" cy="2308324"/>
+          </a:xfrm>
+          <a:prstGeom prst="rect">
+            <a:avLst/>
+          </a:prstGeom>
+          <a:noFill/>
+        </p:spPr>
+        <p:txBody>
+          <a:bodyPr wrap="square" rtlCol="0">
+            <a:spAutoFit/>
+          </a:bodyPr>
+          <a:lstStyle/>
+          <a:p>
+            <a:pPr marL="342900" indent="-342900">
+              <a:buFont typeface="Arial" panose="020B0604020202020204" pitchFamily="34" charset="0"/>
+              <a:buChar char="•"/>
+            </a:pPr>
+            <a:r>
+              <a:rPr lang="en-US" sz="2400" dirty="0"/>
+              <a:t>Com </a:t>
+            </a:r>
+            <a:r>
+              <a:rPr lang="en-US" sz="2400" dirty="0" err="1"/>
+              <a:t>isso</a:t>
+            </a:r>
+            <a:r>
+              <a:rPr lang="en-US" sz="2400" dirty="0"/>
+              <a:t> </a:t>
+            </a:r>
+            <a:r>
+              <a:rPr lang="en-US" sz="2400" dirty="0" err="1"/>
+              <a:t>podemos</a:t>
+            </a:r>
+            <a:r>
+              <a:rPr lang="en-US" sz="2400" dirty="0"/>
+              <a:t> </a:t>
+            </a:r>
+            <a:r>
+              <a:rPr lang="en-US" sz="2400" dirty="0" err="1"/>
+              <a:t>acessar</a:t>
+            </a:r>
+            <a:r>
+              <a:rPr lang="en-US" sz="2400" dirty="0"/>
+              <a:t> </a:t>
+            </a:r>
+            <a:r>
+              <a:rPr lang="en-US" sz="2400" dirty="0" err="1"/>
+              <a:t>os</a:t>
+            </a:r>
+            <a:r>
+              <a:rPr lang="en-US" sz="2400" dirty="0"/>
+              <a:t> </a:t>
+            </a:r>
+            <a:r>
+              <a:rPr lang="en-US" sz="2400" dirty="0" err="1"/>
+              <a:t>icones</a:t>
+            </a:r>
+            <a:r>
+              <a:rPr lang="en-US" sz="2400" dirty="0"/>
+              <a:t> para </a:t>
+            </a:r>
+            <a:r>
+              <a:rPr lang="en-US" sz="2400" dirty="0" err="1"/>
+              <a:t>customizar</a:t>
+            </a:r>
+            <a:r>
+              <a:rPr lang="en-US" sz="2400" dirty="0"/>
+              <a:t> </a:t>
+            </a:r>
+            <a:r>
+              <a:rPr lang="en-US" sz="2400" dirty="0" err="1"/>
+              <a:t>os</a:t>
+            </a:r>
+            <a:r>
+              <a:rPr lang="en-US" sz="2400" dirty="0"/>
+              <a:t> </a:t>
+            </a:r>
+            <a:r>
+              <a:rPr lang="en-US" sz="2400" dirty="0" err="1"/>
+              <a:t>botões</a:t>
+            </a:r>
+            <a:r>
+              <a:rPr lang="en-US" sz="2400" dirty="0"/>
+              <a:t> dentro do </a:t>
+            </a:r>
+            <a:r>
+              <a:rPr lang="en-US" sz="2400" dirty="0" err="1"/>
+              <a:t>componente</a:t>
+            </a:r>
+            <a:r>
+              <a:rPr lang="en-US" sz="2400" dirty="0"/>
+              <a:t> </a:t>
+            </a:r>
+            <a:r>
+              <a:rPr lang="en-US" sz="2400" b="1" dirty="0"/>
+              <a:t>GridPanelLayout1</a:t>
+            </a:r>
+          </a:p>
+          <a:p>
+            <a:pPr marL="342900" indent="-342900">
+              <a:buFont typeface="Arial" panose="020B0604020202020204" pitchFamily="34" charset="0"/>
+              <a:buChar char="•"/>
+            </a:pPr>
+            <a:endParaRPr lang="en-US" sz="2400" b="1" dirty="0"/>
+          </a:p>
+          <a:p>
+            <a:pPr marL="342900" indent="-342900">
+              <a:buFont typeface="Arial" panose="020B0604020202020204" pitchFamily="34" charset="0"/>
+              <a:buChar char="•"/>
+            </a:pPr>
+            <a:r>
+              <a:rPr lang="en-US" sz="2400" dirty="0"/>
+              <a:t> Agora dentro de </a:t>
+            </a:r>
+            <a:r>
+              <a:rPr lang="en-US" sz="2400" dirty="0" err="1"/>
+              <a:t>todos</a:t>
+            </a:r>
+            <a:r>
+              <a:rPr lang="en-US" sz="2400" dirty="0"/>
+              <a:t> </a:t>
+            </a:r>
+            <a:r>
+              <a:rPr lang="en-US" sz="2400" dirty="0" err="1"/>
+              <a:t>os</a:t>
+            </a:r>
+            <a:r>
+              <a:rPr lang="en-US" sz="2400" dirty="0"/>
+              <a:t> </a:t>
+            </a:r>
+            <a:r>
+              <a:rPr lang="en-US" sz="2400" dirty="0" err="1"/>
+              <a:t>botões</a:t>
+            </a:r>
+            <a:r>
+              <a:rPr lang="en-US" sz="2400" dirty="0"/>
+              <a:t> </a:t>
+            </a:r>
+            <a:r>
+              <a:rPr lang="en-US" sz="2400" dirty="0" err="1"/>
+              <a:t>defina</a:t>
+            </a:r>
+            <a:r>
+              <a:rPr lang="en-US" sz="2400" dirty="0"/>
+              <a:t> a </a:t>
+            </a:r>
+            <a:r>
+              <a:rPr lang="en-US" sz="2400" dirty="0" err="1"/>
+              <a:t>proprieade</a:t>
+            </a:r>
+            <a:r>
+              <a:rPr lang="en-US" sz="2400" dirty="0"/>
+              <a:t> </a:t>
+            </a:r>
+            <a:r>
+              <a:rPr lang="en-US" sz="2400" b="1" dirty="0"/>
+              <a:t>Images </a:t>
+            </a:r>
+            <a:r>
+              <a:rPr lang="en-US" sz="2400" dirty="0" err="1"/>
+              <a:t>como</a:t>
+            </a:r>
+            <a:r>
+              <a:rPr lang="en-US" sz="2400" dirty="0"/>
+              <a:t> </a:t>
+            </a:r>
+            <a:r>
+              <a:rPr lang="en-US" sz="2400" b="1" dirty="0"/>
+              <a:t>frmPrincipal.ImageList1</a:t>
+            </a:r>
+          </a:p>
+        </p:txBody>
+      </p:sp>
+      <p:pic>
+        <p:nvPicPr>
+          <p:cNvPr id="7" name="Imagem 6" descr="Interface gráfica do usuário, Texto, Aplicativo&#10;&#10;Descrição gerada automaticamente">
+            <a:extLst>
+              <a:ext uri="{FF2B5EF4-FFF2-40B4-BE49-F238E27FC236}">
+                <a16:creationId xmlns:a16="http://schemas.microsoft.com/office/drawing/2014/main" id="{72620180-CE21-49AC-B34B-B3B4639D6A9A}"/>
+              </a:ext>
+            </a:extLst>
+          </p:cNvPr>
+          <p:cNvPicPr>
+            <a:picLocks noChangeAspect="1"/>
+          </p:cNvPicPr>
+          <p:nvPr/>
+        </p:nvPicPr>
+        <p:blipFill>
+          <a:blip r:embed="rId2">
+            <a:extLst>
+              <a:ext uri="{28A0092B-C50C-407E-A947-70E740481C1C}">
+                <a14:useLocalDpi xmlns:a14="http://schemas.microsoft.com/office/drawing/2010/main" val="0"/>
+              </a:ext>
+            </a:extLst>
+          </a:blip>
+          <a:stretch>
+            <a:fillRect/>
+          </a:stretch>
+        </p:blipFill>
+        <p:spPr>
+          <a:xfrm>
+            <a:off x="3581400" y="4114800"/>
+            <a:ext cx="2524125" cy="2571750"/>
+          </a:xfrm>
+          <a:prstGeom prst="rect">
+            <a:avLst/>
+          </a:prstGeom>
+        </p:spPr>
+      </p:pic>
+    </p:spTree>
+    <p:extLst>
+      <p:ext uri="{BB962C8B-B14F-4D97-AF65-F5344CB8AC3E}">
+        <p14:creationId xmlns:p14="http://schemas.microsoft.com/office/powerpoint/2010/main" val="3024881961"/>
       </p:ext>
     </p:extLst>
   </p:cSld>
@@ -24244,6 +26151,448 @@
     <p:extLst>
       <p:ext uri="{BB962C8B-B14F-4D97-AF65-F5344CB8AC3E}">
         <p14:creationId xmlns:p14="http://schemas.microsoft.com/office/powerpoint/2010/main" val="2042620320"/>
+      </p:ext>
+    </p:extLst>
+  </p:cSld>
+  <p:clrMapOvr>
+    <a:masterClrMapping/>
+  </p:clrMapOvr>
+</p:sld>
+</file>
+
+<file path=ppt/slides/slide80.xml><?xml version="1.0" encoding="utf-8"?>
+<p:sld xmlns:a="http://schemas.openxmlformats.org/drawingml/2006/main" xmlns:r="http://schemas.openxmlformats.org/officeDocument/2006/relationships" xmlns:p="http://schemas.openxmlformats.org/presentationml/2006/main">
+  <p:cSld>
+    <p:spTree>
+      <p:nvGrpSpPr>
+        <p:cNvPr id="1" name=""/>
+        <p:cNvGrpSpPr/>
+        <p:nvPr/>
+      </p:nvGrpSpPr>
+      <p:grpSpPr>
+        <a:xfrm>
+          <a:off x="0" y="0"/>
+          <a:ext cx="0" cy="0"/>
+          <a:chOff x="0" y="0"/>
+          <a:chExt cx="0" cy="0"/>
+        </a:xfrm>
+      </p:grpSpPr>
+      <p:sp>
+        <p:nvSpPr>
+          <p:cNvPr id="4" name="Título 1">
+            <a:extLst>
+              <a:ext uri="{FF2B5EF4-FFF2-40B4-BE49-F238E27FC236}">
+                <a16:creationId xmlns:a16="http://schemas.microsoft.com/office/drawing/2014/main" id="{6F292448-FA31-4B53-ADFB-18AA4E465AD6}"/>
+              </a:ext>
+            </a:extLst>
+          </p:cNvPr>
+          <p:cNvSpPr>
+            <a:spLocks noGrp="1"/>
+          </p:cNvSpPr>
+          <p:nvPr>
+            <p:ph type="title"/>
+          </p:nvPr>
+        </p:nvSpPr>
+        <p:spPr>
+          <a:xfrm>
+            <a:off x="457200" y="274638"/>
+            <a:ext cx="7467600" cy="1143000"/>
+          </a:xfrm>
+        </p:spPr>
+        <p:txBody>
+          <a:bodyPr/>
+          <a:lstStyle/>
+          <a:p>
+            <a:r>
+              <a:rPr lang="en-US" dirty="0" err="1"/>
+              <a:t>Montagem</a:t>
+            </a:r>
+            <a:r>
+              <a:rPr lang="en-US" dirty="0"/>
+              <a:t> do </a:t>
+            </a:r>
+            <a:r>
+              <a:rPr lang="en-US" dirty="0" err="1"/>
+              <a:t>Formulário</a:t>
+            </a:r>
+            <a:r>
+              <a:rPr lang="en-US" dirty="0"/>
+              <a:t> – </a:t>
+            </a:r>
+            <a:br>
+              <a:rPr lang="en-US" dirty="0"/>
+            </a:br>
+            <a:r>
+              <a:rPr lang="en-US" dirty="0"/>
+              <a:t>Unit windows</a:t>
+            </a:r>
+            <a:endParaRPr lang="pt-BR" dirty="0"/>
+          </a:p>
+        </p:txBody>
+      </p:sp>
+      <p:sp>
+        <p:nvSpPr>
+          <p:cNvPr id="5" name="CaixaDeTexto 4">
+            <a:extLst>
+              <a:ext uri="{FF2B5EF4-FFF2-40B4-BE49-F238E27FC236}">
+                <a16:creationId xmlns:a16="http://schemas.microsoft.com/office/drawing/2014/main" id="{1B569CC1-6210-414D-ADBF-93453531B0E0}"/>
+              </a:ext>
+            </a:extLst>
+          </p:cNvPr>
+          <p:cNvSpPr txBox="1"/>
+          <p:nvPr/>
+        </p:nvSpPr>
+        <p:spPr>
+          <a:xfrm>
+            <a:off x="609600" y="1600200"/>
+            <a:ext cx="8153399" cy="5262979"/>
+          </a:xfrm>
+          <a:prstGeom prst="rect">
+            <a:avLst/>
+          </a:prstGeom>
+          <a:noFill/>
+        </p:spPr>
+        <p:txBody>
+          <a:bodyPr wrap="square" rtlCol="0">
+            <a:spAutoFit/>
+          </a:bodyPr>
+          <a:lstStyle/>
+          <a:p>
+            <a:pPr marL="285750" indent="-285750">
+              <a:buFont typeface="Arial" panose="020B0604020202020204" pitchFamily="34" charset="0"/>
+              <a:buChar char="•"/>
+            </a:pPr>
+            <a:r>
+              <a:rPr lang="en-US" sz="2400" dirty="0" err="1"/>
+              <a:t>Precisamos</a:t>
+            </a:r>
+            <a:r>
+              <a:rPr lang="en-US" sz="2400" dirty="0"/>
+              <a:t> </a:t>
+            </a:r>
+            <a:r>
+              <a:rPr lang="en-US" sz="2400" dirty="0" err="1"/>
+              <a:t>então</a:t>
+            </a:r>
+            <a:r>
+              <a:rPr lang="en-US" sz="2400" dirty="0"/>
+              <a:t> </a:t>
+            </a:r>
+            <a:r>
+              <a:rPr lang="en-US" sz="2400" dirty="0" err="1"/>
+              <a:t>definir</a:t>
+            </a:r>
+            <a:r>
+              <a:rPr lang="en-US" sz="2400" dirty="0"/>
+              <a:t> qual </a:t>
+            </a:r>
+            <a:r>
+              <a:rPr lang="en-US" sz="2400" dirty="0" err="1"/>
+              <a:t>icone</a:t>
+            </a:r>
+            <a:r>
+              <a:rPr lang="en-US" sz="2400" dirty="0"/>
+              <a:t> do </a:t>
+            </a:r>
+            <a:r>
+              <a:rPr lang="en-US" sz="2400" dirty="0" err="1"/>
+              <a:t>ImageList</a:t>
+            </a:r>
+            <a:r>
+              <a:rPr lang="en-US" sz="2400" dirty="0"/>
+              <a:t> </a:t>
+            </a:r>
+            <a:r>
+              <a:rPr lang="en-US" sz="2400" dirty="0" err="1"/>
+              <a:t>será</a:t>
+            </a:r>
+            <a:r>
+              <a:rPr lang="en-US" sz="2400" dirty="0"/>
+              <a:t> </a:t>
+            </a:r>
+            <a:r>
+              <a:rPr lang="en-US" sz="2400" dirty="0" err="1"/>
+              <a:t>usada</a:t>
+            </a:r>
+            <a:r>
+              <a:rPr lang="en-US" sz="2400" dirty="0"/>
+              <a:t> </a:t>
+            </a:r>
+            <a:r>
+              <a:rPr lang="en-US" sz="2400" dirty="0" err="1"/>
+              <a:t>em</a:t>
+            </a:r>
+            <a:r>
+              <a:rPr lang="en-US" sz="2400" dirty="0"/>
+              <a:t> </a:t>
+            </a:r>
+            <a:r>
+              <a:rPr lang="en-US" sz="2400" dirty="0" err="1"/>
+              <a:t>cada</a:t>
+            </a:r>
+            <a:r>
+              <a:rPr lang="en-US" sz="2400" dirty="0"/>
+              <a:t> </a:t>
+            </a:r>
+            <a:r>
+              <a:rPr lang="en-US" sz="2400" dirty="0" err="1"/>
+              <a:t>botão</a:t>
+            </a:r>
+            <a:endParaRPr lang="en-US" sz="2400" dirty="0"/>
+          </a:p>
+          <a:p>
+            <a:pPr marL="285750" indent="-285750">
+              <a:buFont typeface="Arial" panose="020B0604020202020204" pitchFamily="34" charset="0"/>
+              <a:buChar char="•"/>
+            </a:pPr>
+            <a:endParaRPr lang="en-US" sz="2400" dirty="0"/>
+          </a:p>
+          <a:p>
+            <a:pPr marL="285750" indent="-285750">
+              <a:buFont typeface="Arial" panose="020B0604020202020204" pitchFamily="34" charset="0"/>
+              <a:buChar char="•"/>
+            </a:pPr>
+            <a:r>
+              <a:rPr lang="en-US" sz="2400" b="1" dirty="0" err="1"/>
+              <a:t>btnNavegar</a:t>
+            </a:r>
+            <a:endParaRPr lang="en-US" sz="2400" b="1" dirty="0"/>
+          </a:p>
+          <a:p>
+            <a:pPr marL="742950" lvl="1" indent="-285750">
+              <a:buFont typeface="Arial" panose="020B0604020202020204" pitchFamily="34" charset="0"/>
+              <a:buChar char="•"/>
+            </a:pPr>
+            <a:r>
+              <a:rPr lang="en-US" sz="2400" b="1" dirty="0"/>
+              <a:t>ImageIndex:3</a:t>
+            </a:r>
+          </a:p>
+          <a:p>
+            <a:endParaRPr lang="en-US" sz="2400" b="1" dirty="0"/>
+          </a:p>
+          <a:p>
+            <a:pPr marL="342900" indent="-342900">
+              <a:buFont typeface="Arial" panose="020B0604020202020204" pitchFamily="34" charset="0"/>
+              <a:buChar char="•"/>
+            </a:pPr>
+            <a:r>
+              <a:rPr lang="en-US" sz="2400" b="1" dirty="0" err="1"/>
+              <a:t>btnMonitor</a:t>
+            </a:r>
+            <a:endParaRPr lang="en-US" sz="2400" b="1" dirty="0"/>
+          </a:p>
+          <a:p>
+            <a:pPr marL="800100" lvl="1" indent="-342900">
+              <a:buFont typeface="Arial" panose="020B0604020202020204" pitchFamily="34" charset="0"/>
+              <a:buChar char="•"/>
+            </a:pPr>
+            <a:r>
+              <a:rPr lang="en-US" sz="2400" b="1" dirty="0"/>
+              <a:t>ImageIndex:2</a:t>
+            </a:r>
+          </a:p>
+          <a:p>
+            <a:endParaRPr lang="en-US" sz="2400" b="1" dirty="0"/>
+          </a:p>
+          <a:p>
+            <a:pPr marL="342900" indent="-342900">
+              <a:buFont typeface="Arial" panose="020B0604020202020204" pitchFamily="34" charset="0"/>
+              <a:buChar char="•"/>
+            </a:pPr>
+            <a:r>
+              <a:rPr lang="en-US" sz="2400" b="1" dirty="0" err="1"/>
+              <a:t>btnCalculadora</a:t>
+            </a:r>
+            <a:endParaRPr lang="en-US" sz="2400" b="1" dirty="0"/>
+          </a:p>
+          <a:p>
+            <a:pPr marL="800100" lvl="1" indent="-342900">
+              <a:buFont typeface="Arial" panose="020B0604020202020204" pitchFamily="34" charset="0"/>
+              <a:buChar char="•"/>
+            </a:pPr>
+            <a:r>
+              <a:rPr lang="en-US" sz="2400" b="1" dirty="0"/>
+              <a:t>ImageIndex:4</a:t>
+            </a:r>
+          </a:p>
+          <a:p>
+            <a:pPr marL="342900" indent="-342900">
+              <a:buFont typeface="Arial" panose="020B0604020202020204" pitchFamily="34" charset="0"/>
+              <a:buChar char="•"/>
+            </a:pPr>
+            <a:endParaRPr lang="en-US" sz="2400" b="1" dirty="0"/>
+          </a:p>
+          <a:p>
+            <a:pPr marL="342900" indent="-342900">
+              <a:buFont typeface="Arial" panose="020B0604020202020204" pitchFamily="34" charset="0"/>
+              <a:buChar char="•"/>
+            </a:pPr>
+            <a:r>
+              <a:rPr lang="en-US" sz="2400" b="1" dirty="0" err="1"/>
+              <a:t>btnPC</a:t>
+            </a:r>
+            <a:endParaRPr lang="en-US" sz="2400" b="1" dirty="0"/>
+          </a:p>
+          <a:p>
+            <a:pPr marL="800100" lvl="1" indent="-342900">
+              <a:buFont typeface="Arial" panose="020B0604020202020204" pitchFamily="34" charset="0"/>
+              <a:buChar char="•"/>
+            </a:pPr>
+            <a:r>
+              <a:rPr lang="en-US" sz="2400" b="1" dirty="0"/>
+              <a:t>ImageIndex:0</a:t>
+            </a:r>
+          </a:p>
+        </p:txBody>
+      </p:sp>
+      <p:pic>
+        <p:nvPicPr>
+          <p:cNvPr id="7" name="Imagem 6">
+            <a:extLst>
+              <a:ext uri="{FF2B5EF4-FFF2-40B4-BE49-F238E27FC236}">
+                <a16:creationId xmlns:a16="http://schemas.microsoft.com/office/drawing/2014/main" id="{2C6D62A2-002B-4D5B-8470-514505A45543}"/>
+              </a:ext>
+            </a:extLst>
+          </p:cNvPr>
+          <p:cNvPicPr>
+            <a:picLocks noChangeAspect="1"/>
+          </p:cNvPicPr>
+          <p:nvPr/>
+        </p:nvPicPr>
+        <p:blipFill>
+          <a:blip r:embed="rId2"/>
+          <a:stretch>
+            <a:fillRect/>
+          </a:stretch>
+        </p:blipFill>
+        <p:spPr>
+          <a:xfrm>
+            <a:off x="3923633" y="3429000"/>
+            <a:ext cx="4620706" cy="1652171"/>
+          </a:xfrm>
+          <a:prstGeom prst="rect">
+            <a:avLst/>
+          </a:prstGeom>
+        </p:spPr>
+      </p:pic>
+    </p:spTree>
+    <p:extLst>
+      <p:ext uri="{BB962C8B-B14F-4D97-AF65-F5344CB8AC3E}">
+        <p14:creationId xmlns:p14="http://schemas.microsoft.com/office/powerpoint/2010/main" val="3488361431"/>
+      </p:ext>
+    </p:extLst>
+  </p:cSld>
+  <p:clrMapOvr>
+    <a:masterClrMapping/>
+  </p:clrMapOvr>
+</p:sld>
+</file>
+
+<file path=ppt/slides/slide81.xml><?xml version="1.0" encoding="utf-8"?>
+<p:sld xmlns:a="http://schemas.openxmlformats.org/drawingml/2006/main" xmlns:r="http://schemas.openxmlformats.org/officeDocument/2006/relationships" xmlns:p="http://schemas.openxmlformats.org/presentationml/2006/main">
+  <p:cSld>
+    <p:spTree>
+      <p:nvGrpSpPr>
+        <p:cNvPr id="1" name=""/>
+        <p:cNvGrpSpPr/>
+        <p:nvPr/>
+      </p:nvGrpSpPr>
+      <p:grpSpPr>
+        <a:xfrm>
+          <a:off x="0" y="0"/>
+          <a:ext cx="0" cy="0"/>
+          <a:chOff x="0" y="0"/>
+          <a:chExt cx="0" cy="0"/>
+        </a:xfrm>
+      </p:grpSpPr>
+      <p:sp>
+        <p:nvSpPr>
+          <p:cNvPr id="4" name="Título 1">
+            <a:extLst>
+              <a:ext uri="{FF2B5EF4-FFF2-40B4-BE49-F238E27FC236}">
+                <a16:creationId xmlns:a16="http://schemas.microsoft.com/office/drawing/2014/main" id="{6726AA0A-E4BC-4EEF-985D-492D44C9EE6B}"/>
+              </a:ext>
+            </a:extLst>
+          </p:cNvPr>
+          <p:cNvSpPr>
+            <a:spLocks noGrp="1"/>
+          </p:cNvSpPr>
+          <p:nvPr>
+            <p:ph type="title"/>
+          </p:nvPr>
+        </p:nvSpPr>
+        <p:spPr>
+          <a:xfrm>
+            <a:off x="457200" y="274638"/>
+            <a:ext cx="7467600" cy="1143000"/>
+          </a:xfrm>
+        </p:spPr>
+        <p:txBody>
+          <a:bodyPr/>
+          <a:lstStyle/>
+          <a:p>
+            <a:r>
+              <a:rPr lang="en-US" dirty="0" err="1"/>
+              <a:t>Montagem</a:t>
+            </a:r>
+            <a:r>
+              <a:rPr lang="en-US" dirty="0"/>
+              <a:t> do </a:t>
+            </a:r>
+            <a:r>
+              <a:rPr lang="en-US" dirty="0" err="1"/>
+              <a:t>Formulário</a:t>
+            </a:r>
+            <a:r>
+              <a:rPr lang="en-US" dirty="0"/>
+              <a:t> – </a:t>
+            </a:r>
+            <a:br>
+              <a:rPr lang="en-US" dirty="0"/>
+            </a:br>
+            <a:r>
+              <a:rPr lang="en-US" dirty="0"/>
+              <a:t>Unit windows</a:t>
+            </a:r>
+            <a:endParaRPr lang="pt-BR" dirty="0"/>
+          </a:p>
+        </p:txBody>
+      </p:sp>
+      <p:pic>
+        <p:nvPicPr>
+          <p:cNvPr id="6" name="Imagem 5">
+            <a:extLst>
+              <a:ext uri="{FF2B5EF4-FFF2-40B4-BE49-F238E27FC236}">
+                <a16:creationId xmlns:a16="http://schemas.microsoft.com/office/drawing/2014/main" id="{E9580C01-CBB5-4DF2-BFC9-9529C486ED8F}"/>
+              </a:ext>
+            </a:extLst>
+          </p:cNvPr>
+          <p:cNvPicPr>
+            <a:picLocks noChangeAspect="1"/>
+          </p:cNvPicPr>
+          <p:nvPr/>
+        </p:nvPicPr>
+        <p:blipFill>
+          <a:blip r:embed="rId2"/>
+          <a:stretch>
+            <a:fillRect/>
+          </a:stretch>
+        </p:blipFill>
+        <p:spPr>
+          <a:xfrm>
+            <a:off x="609600" y="1754187"/>
+            <a:ext cx="6619875" cy="4829175"/>
+          </a:xfrm>
+          <a:prstGeom prst="rect">
+            <a:avLst/>
+          </a:prstGeom>
+        </p:spPr>
+      </p:pic>
+    </p:spTree>
+    <p:extLst>
+      <p:ext uri="{BB962C8B-B14F-4D97-AF65-F5344CB8AC3E}">
+        <p14:creationId xmlns:p14="http://schemas.microsoft.com/office/powerpoint/2010/main" val="2250683891"/>
       </p:ext>
     </p:extLst>
   </p:cSld>

</xml_diff>

<commit_message>
Started Chat Form Programming
</commit_message>
<xml_diff>
--- a/Stuff/Conexão Bluetooth usando Delphi.pptx
+++ b/Stuff/Conexão Bluetooth usando Delphi.pptx
@@ -5,7 +5,7 @@
     <p:sldMasterId id="2147483696" r:id="rId1"/>
   </p:sldMasterIdLst>
   <p:notesMasterIdLst>
-    <p:notesMasterId r:id="rId107"/>
+    <p:notesMasterId r:id="rId117"/>
   </p:notesMasterIdLst>
   <p:sldIdLst>
     <p:sldId id="256" r:id="rId2"/>
@@ -113,6 +113,16 @@
     <p:sldId id="359" r:id="rId104"/>
     <p:sldId id="360" r:id="rId105"/>
     <p:sldId id="361" r:id="rId106"/>
+    <p:sldId id="362" r:id="rId107"/>
+    <p:sldId id="364" r:id="rId108"/>
+    <p:sldId id="363" r:id="rId109"/>
+    <p:sldId id="365" r:id="rId110"/>
+    <p:sldId id="366" r:id="rId111"/>
+    <p:sldId id="367" r:id="rId112"/>
+    <p:sldId id="368" r:id="rId113"/>
+    <p:sldId id="369" r:id="rId114"/>
+    <p:sldId id="370" r:id="rId115"/>
+    <p:sldId id="371" r:id="rId116"/>
   </p:sldIdLst>
   <p:sldSz cx="9144000" cy="6858000" type="screen4x3"/>
   <p:notesSz cx="6858000" cy="9144000"/>
@@ -338,7 +348,7 @@
           <a:p>
             <a:fld id="{05C14C5D-2598-4DBB-BB00-F688C4C61F1C}" type="datetimeFigureOut">
               <a:rPr lang="en-US" smtClean="0"/>
-              <a:t>9/18/2021</a:t>
+              <a:t>9/19/2021</a:t>
             </a:fld>
             <a:endParaRPr lang="en-US"/>
           </a:p>
@@ -743,7 +753,7 @@
           <a:p>
             <a:fld id="{715CD462-00F3-4312-AF53-03FBFE4C9BB8}" type="datetimeFigureOut">
               <a:rPr lang="pt-BR" smtClean="0"/>
-              <a:t>18/09/2021</a:t>
+              <a:t>19/09/2021</a:t>
             </a:fld>
             <a:endParaRPr lang="pt-BR"/>
           </a:p>
@@ -1612,7 +1622,7 @@
           <a:p>
             <a:fld id="{715CD462-00F3-4312-AF53-03FBFE4C9BB8}" type="datetimeFigureOut">
               <a:rPr lang="pt-BR" smtClean="0"/>
-              <a:t>18/09/2021</a:t>
+              <a:t>19/09/2021</a:t>
             </a:fld>
             <a:endParaRPr lang="pt-BR"/>
           </a:p>
@@ -1787,7 +1797,7 @@
           <a:p>
             <a:fld id="{715CD462-00F3-4312-AF53-03FBFE4C9BB8}" type="datetimeFigureOut">
               <a:rPr lang="pt-BR" smtClean="0"/>
-              <a:t>18/09/2021</a:t>
+              <a:t>19/09/2021</a:t>
             </a:fld>
             <a:endParaRPr lang="pt-BR"/>
           </a:p>
@@ -1957,7 +1967,7 @@
           <a:p>
             <a:fld id="{715CD462-00F3-4312-AF53-03FBFE4C9BB8}" type="datetimeFigureOut">
               <a:rPr lang="pt-BR" smtClean="0"/>
-              <a:t>18/09/2021</a:t>
+              <a:t>19/09/2021</a:t>
             </a:fld>
             <a:endParaRPr lang="pt-BR"/>
           </a:p>
@@ -2167,7 +2177,7 @@
           <a:p>
             <a:fld id="{715CD462-00F3-4312-AF53-03FBFE4C9BB8}" type="datetimeFigureOut">
               <a:rPr lang="pt-BR" smtClean="0"/>
-              <a:t>18/09/2021</a:t>
+              <a:t>19/09/2021</a:t>
             </a:fld>
             <a:endParaRPr lang="pt-BR"/>
           </a:p>
@@ -2981,7 +2991,7 @@
           <a:p>
             <a:fld id="{715CD462-00F3-4312-AF53-03FBFE4C9BB8}" type="datetimeFigureOut">
               <a:rPr lang="pt-BR" smtClean="0"/>
-              <a:t>18/09/2021</a:t>
+              <a:t>19/09/2021</a:t>
             </a:fld>
             <a:endParaRPr lang="pt-BR"/>
           </a:p>
@@ -3217,7 +3227,7 @@
           <a:p>
             <a:fld id="{715CD462-00F3-4312-AF53-03FBFE4C9BB8}" type="datetimeFigureOut">
               <a:rPr lang="pt-BR" smtClean="0"/>
-              <a:t>18/09/2021</a:t>
+              <a:t>19/09/2021</a:t>
             </a:fld>
             <a:endParaRPr lang="pt-BR"/>
           </a:p>
@@ -3540,7 +3550,7 @@
           <a:p>
             <a:fld id="{715CD462-00F3-4312-AF53-03FBFE4C9BB8}" type="datetimeFigureOut">
               <a:rPr lang="pt-BR" smtClean="0"/>
-              <a:t>18/09/2021</a:t>
+              <a:t>19/09/2021</a:t>
             </a:fld>
             <a:endParaRPr lang="pt-BR"/>
           </a:p>
@@ -3630,7 +3640,7 @@
           <a:p>
             <a:fld id="{715CD462-00F3-4312-AF53-03FBFE4C9BB8}" type="datetimeFigureOut">
               <a:rPr lang="pt-BR" smtClean="0"/>
-              <a:t>18/09/2021</a:t>
+              <a:t>19/09/2021</a:t>
             </a:fld>
             <a:endParaRPr lang="pt-BR"/>
           </a:p>
@@ -4147,7 +4157,7 @@
           <a:p>
             <a:fld id="{715CD462-00F3-4312-AF53-03FBFE4C9BB8}" type="datetimeFigureOut">
               <a:rPr lang="pt-BR" smtClean="0"/>
-              <a:t>18/09/2021</a:t>
+              <a:t>19/09/2021</a:t>
             </a:fld>
             <a:endParaRPr lang="pt-BR"/>
           </a:p>
@@ -4658,7 +4668,7 @@
           <a:p>
             <a:fld id="{715CD462-00F3-4312-AF53-03FBFE4C9BB8}" type="datetimeFigureOut">
               <a:rPr lang="pt-BR" smtClean="0"/>
-              <a:t>18/09/2021</a:t>
+              <a:t>19/09/2021</a:t>
             </a:fld>
             <a:endParaRPr lang="pt-BR"/>
           </a:p>
@@ -4903,7 +4913,7 @@
           <a:p>
             <a:fld id="{715CD462-00F3-4312-AF53-03FBFE4C9BB8}" type="datetimeFigureOut">
               <a:rPr lang="pt-BR" smtClean="0"/>
-              <a:t>18/09/2021</a:t>
+              <a:t>19/09/2021</a:t>
             </a:fld>
             <a:endParaRPr lang="pt-BR"/>
           </a:p>
@@ -7300,10 +7310,1069 @@
           </a:p>
         </p:txBody>
       </p:sp>
+      <p:pic>
+        <p:nvPicPr>
+          <p:cNvPr id="6" name="Imagem 5">
+            <a:extLst>
+              <a:ext uri="{FF2B5EF4-FFF2-40B4-BE49-F238E27FC236}">
+                <a16:creationId xmlns:a16="http://schemas.microsoft.com/office/drawing/2014/main" id="{3C7F0F82-1475-4825-BE5B-1887682020F7}"/>
+              </a:ext>
+            </a:extLst>
+          </p:cNvPr>
+          <p:cNvPicPr>
+            <a:picLocks noChangeAspect="1"/>
+          </p:cNvPicPr>
+          <p:nvPr/>
+        </p:nvPicPr>
+        <p:blipFill>
+          <a:blip r:embed="rId2"/>
+          <a:stretch>
+            <a:fillRect/>
+          </a:stretch>
+        </p:blipFill>
+        <p:spPr>
+          <a:xfrm>
+            <a:off x="685800" y="1427634"/>
+            <a:ext cx="5867400" cy="5221077"/>
+          </a:xfrm>
+          <a:prstGeom prst="rect">
+            <a:avLst/>
+          </a:prstGeom>
+        </p:spPr>
+      </p:pic>
     </p:spTree>
     <p:extLst>
       <p:ext uri="{BB962C8B-B14F-4D97-AF65-F5344CB8AC3E}">
         <p14:creationId xmlns:p14="http://schemas.microsoft.com/office/powerpoint/2010/main" val="2258158288"/>
+      </p:ext>
+    </p:extLst>
+  </p:cSld>
+  <p:clrMapOvr>
+    <a:masterClrMapping/>
+  </p:clrMapOvr>
+</p:sld>
+</file>
+
+<file path=ppt/slides/slide106.xml><?xml version="1.0" encoding="utf-8"?>
+<p:sld xmlns:a="http://schemas.openxmlformats.org/drawingml/2006/main" xmlns:r="http://schemas.openxmlformats.org/officeDocument/2006/relationships" xmlns:p="http://schemas.openxmlformats.org/presentationml/2006/main">
+  <p:cSld>
+    <p:spTree>
+      <p:nvGrpSpPr>
+        <p:cNvPr id="1" name=""/>
+        <p:cNvGrpSpPr/>
+        <p:nvPr/>
+      </p:nvGrpSpPr>
+      <p:grpSpPr>
+        <a:xfrm>
+          <a:off x="0" y="0"/>
+          <a:ext cx="0" cy="0"/>
+          <a:chOff x="0" y="0"/>
+          <a:chExt cx="0" cy="0"/>
+        </a:xfrm>
+      </p:grpSpPr>
+      <p:sp>
+        <p:nvSpPr>
+          <p:cNvPr id="4" name="Título 1">
+            <a:extLst>
+              <a:ext uri="{FF2B5EF4-FFF2-40B4-BE49-F238E27FC236}">
+                <a16:creationId xmlns:a16="http://schemas.microsoft.com/office/drawing/2014/main" id="{C8618CFB-E90E-4425-AE76-DE02B9251ED3}"/>
+              </a:ext>
+            </a:extLst>
+          </p:cNvPr>
+          <p:cNvSpPr>
+            <a:spLocks noGrp="1"/>
+          </p:cNvSpPr>
+          <p:nvPr>
+            <p:ph type="title"/>
+          </p:nvPr>
+        </p:nvSpPr>
+        <p:spPr>
+          <a:xfrm>
+            <a:off x="533399" y="284634"/>
+            <a:ext cx="7467600" cy="1143000"/>
+          </a:xfrm>
+        </p:spPr>
+        <p:txBody>
+          <a:bodyPr/>
+          <a:lstStyle/>
+          <a:p>
+            <a:r>
+              <a:rPr lang="en-US" dirty="0" err="1"/>
+              <a:t>Programação</a:t>
+            </a:r>
+            <a:r>
+              <a:rPr lang="en-US" dirty="0"/>
+              <a:t> do </a:t>
+            </a:r>
+            <a:r>
+              <a:rPr lang="en-US" dirty="0" err="1"/>
+              <a:t>Formulário</a:t>
+            </a:r>
+            <a:r>
+              <a:rPr lang="en-US" dirty="0"/>
+              <a:t> – </a:t>
+            </a:r>
+            <a:br>
+              <a:rPr lang="en-US" dirty="0"/>
+            </a:br>
+            <a:r>
+              <a:rPr lang="en-US" dirty="0"/>
+              <a:t>Unit </a:t>
+            </a:r>
+            <a:r>
+              <a:rPr lang="en-US" dirty="0" err="1"/>
+              <a:t>servicos</a:t>
+            </a:r>
+            <a:endParaRPr lang="pt-BR" dirty="0"/>
+          </a:p>
+        </p:txBody>
+      </p:sp>
+      <p:pic>
+        <p:nvPicPr>
+          <p:cNvPr id="6" name="Imagem 5">
+            <a:extLst>
+              <a:ext uri="{FF2B5EF4-FFF2-40B4-BE49-F238E27FC236}">
+                <a16:creationId xmlns:a16="http://schemas.microsoft.com/office/drawing/2014/main" id="{D01E025F-A212-48B6-B2A3-6DA01073D160}"/>
+              </a:ext>
+            </a:extLst>
+          </p:cNvPr>
+          <p:cNvPicPr>
+            <a:picLocks noChangeAspect="1"/>
+          </p:cNvPicPr>
+          <p:nvPr/>
+        </p:nvPicPr>
+        <p:blipFill>
+          <a:blip r:embed="rId2"/>
+          <a:stretch>
+            <a:fillRect/>
+          </a:stretch>
+        </p:blipFill>
+        <p:spPr>
+          <a:xfrm>
+            <a:off x="685800" y="1752600"/>
+            <a:ext cx="5182374" cy="2209800"/>
+          </a:xfrm>
+          <a:prstGeom prst="rect">
+            <a:avLst/>
+          </a:prstGeom>
+        </p:spPr>
+      </p:pic>
+      <p:sp>
+        <p:nvSpPr>
+          <p:cNvPr id="7" name="CaixaDeTexto 6">
+            <a:extLst>
+              <a:ext uri="{FF2B5EF4-FFF2-40B4-BE49-F238E27FC236}">
+                <a16:creationId xmlns:a16="http://schemas.microsoft.com/office/drawing/2014/main" id="{950815C3-3971-4205-B88F-6DA074E59800}"/>
+              </a:ext>
+            </a:extLst>
+          </p:cNvPr>
+          <p:cNvSpPr txBox="1"/>
+          <p:nvPr/>
+        </p:nvSpPr>
+        <p:spPr>
+          <a:xfrm>
+            <a:off x="609600" y="4495800"/>
+            <a:ext cx="8001000" cy="1200329"/>
+          </a:xfrm>
+          <a:prstGeom prst="rect">
+            <a:avLst/>
+          </a:prstGeom>
+          <a:noFill/>
+        </p:spPr>
+        <p:txBody>
+          <a:bodyPr wrap="square" rtlCol="0">
+            <a:spAutoFit/>
+          </a:bodyPr>
+          <a:lstStyle/>
+          <a:p>
+            <a:pPr marL="342900" indent="-342900">
+              <a:buFont typeface="Arial" panose="020B0604020202020204" pitchFamily="34" charset="0"/>
+              <a:buChar char="•"/>
+            </a:pPr>
+            <a:r>
+              <a:rPr lang="en-US" sz="2400" dirty="0" err="1"/>
+              <a:t>Todo</a:t>
+            </a:r>
+            <a:r>
+              <a:rPr lang="en-US" sz="2400" dirty="0"/>
+              <a:t> o </a:t>
+            </a:r>
+            <a:r>
+              <a:rPr lang="en-US" sz="2400" dirty="0" err="1"/>
+              <a:t>código</a:t>
+            </a:r>
+            <a:r>
+              <a:rPr lang="en-US" sz="2400" dirty="0"/>
+              <a:t> </a:t>
+            </a:r>
+            <a:r>
+              <a:rPr lang="en-US" sz="2400" dirty="0" err="1"/>
+              <a:t>deve</a:t>
+            </a:r>
+            <a:r>
+              <a:rPr lang="en-US" sz="2400" dirty="0"/>
+              <a:t> ser </a:t>
+            </a:r>
+            <a:r>
+              <a:rPr lang="en-US" sz="2400" dirty="0" err="1"/>
+              <a:t>colocado</a:t>
+            </a:r>
+            <a:r>
+              <a:rPr lang="en-US" sz="2400" dirty="0"/>
+              <a:t> </a:t>
+            </a:r>
+            <a:r>
+              <a:rPr lang="en-US" sz="2400" dirty="0" err="1"/>
+              <a:t>na</a:t>
+            </a:r>
+            <a:r>
+              <a:rPr lang="en-US" sz="2400" dirty="0"/>
+              <a:t> </a:t>
+            </a:r>
+            <a:r>
+              <a:rPr lang="en-US" sz="2400" dirty="0" err="1"/>
+              <a:t>ordem</a:t>
+            </a:r>
+            <a:r>
+              <a:rPr lang="en-US" sz="2400" dirty="0"/>
+              <a:t> </a:t>
+            </a:r>
+            <a:r>
+              <a:rPr lang="en-US" sz="2400" dirty="0" err="1"/>
+              <a:t>em</a:t>
+            </a:r>
+            <a:r>
+              <a:rPr lang="en-US" sz="2400" dirty="0"/>
+              <a:t> que </a:t>
+            </a:r>
+            <a:r>
+              <a:rPr lang="en-US" sz="2400" dirty="0" err="1"/>
+              <a:t>foi</a:t>
+            </a:r>
+            <a:r>
+              <a:rPr lang="en-US" sz="2400" dirty="0"/>
+              <a:t> </a:t>
+            </a:r>
+            <a:r>
+              <a:rPr lang="en-US" sz="2400" dirty="0" err="1"/>
+              <a:t>apresentado</a:t>
+            </a:r>
+            <a:r>
+              <a:rPr lang="en-US" sz="2400" dirty="0"/>
+              <a:t>, dropdown, a </a:t>
+            </a:r>
+            <a:r>
+              <a:rPr lang="en-US" sz="2400" dirty="0" err="1"/>
+              <a:t>função</a:t>
+            </a:r>
+            <a:r>
+              <a:rPr lang="en-US" sz="2400" dirty="0"/>
+              <a:t> de </a:t>
+            </a:r>
+            <a:r>
+              <a:rPr lang="en-US" sz="2400" dirty="0" err="1"/>
+              <a:t>listar</a:t>
+            </a:r>
+            <a:r>
+              <a:rPr lang="en-US" sz="2400" dirty="0"/>
+              <a:t> </a:t>
+            </a:r>
+            <a:r>
+              <a:rPr lang="en-US" sz="2400" dirty="0" err="1"/>
+              <a:t>os</a:t>
+            </a:r>
+            <a:r>
+              <a:rPr lang="en-US" sz="2400" dirty="0"/>
+              <a:t> </a:t>
+            </a:r>
+            <a:r>
+              <a:rPr lang="en-US" sz="2400" dirty="0" err="1"/>
+              <a:t>serviços</a:t>
+            </a:r>
+            <a:r>
+              <a:rPr lang="en-US" sz="2400" dirty="0"/>
+              <a:t> </a:t>
+            </a:r>
+            <a:r>
+              <a:rPr lang="en-US" sz="2400" dirty="0" err="1"/>
+              <a:t>então</a:t>
+            </a:r>
+            <a:r>
+              <a:rPr lang="en-US" sz="2400" dirty="0"/>
+              <a:t> </a:t>
+            </a:r>
+            <a:r>
+              <a:rPr lang="en-US" sz="2400" dirty="0" err="1"/>
+              <a:t>estará</a:t>
+            </a:r>
+            <a:r>
+              <a:rPr lang="en-US" sz="2400" dirty="0"/>
+              <a:t> </a:t>
+            </a:r>
+            <a:r>
+              <a:rPr lang="en-US" sz="2400" dirty="0" err="1"/>
+              <a:t>pronta</a:t>
+            </a:r>
+            <a:endParaRPr lang="en-US" sz="2400" dirty="0"/>
+          </a:p>
+        </p:txBody>
+      </p:sp>
+    </p:spTree>
+    <p:extLst>
+      <p:ext uri="{BB962C8B-B14F-4D97-AF65-F5344CB8AC3E}">
+        <p14:creationId xmlns:p14="http://schemas.microsoft.com/office/powerpoint/2010/main" val="2784281173"/>
+      </p:ext>
+    </p:extLst>
+  </p:cSld>
+  <p:clrMapOvr>
+    <a:masterClrMapping/>
+  </p:clrMapOvr>
+</p:sld>
+</file>
+
+<file path=ppt/slides/slide107.xml><?xml version="1.0" encoding="utf-8"?>
+<p:sld xmlns:a="http://schemas.openxmlformats.org/drawingml/2006/main" xmlns:r="http://schemas.openxmlformats.org/officeDocument/2006/relationships" xmlns:p="http://schemas.openxmlformats.org/presentationml/2006/main">
+  <p:cSld>
+    <p:spTree>
+      <p:nvGrpSpPr>
+        <p:cNvPr id="1" name=""/>
+        <p:cNvGrpSpPr/>
+        <p:nvPr/>
+      </p:nvGrpSpPr>
+      <p:grpSpPr>
+        <a:xfrm>
+          <a:off x="0" y="0"/>
+          <a:ext cx="0" cy="0"/>
+          <a:chOff x="0" y="0"/>
+          <a:chExt cx="0" cy="0"/>
+        </a:xfrm>
+      </p:grpSpPr>
+      <p:sp>
+        <p:nvSpPr>
+          <p:cNvPr id="4" name="CaixaDeTexto 3">
+            <a:extLst>
+              <a:ext uri="{FF2B5EF4-FFF2-40B4-BE49-F238E27FC236}">
+                <a16:creationId xmlns:a16="http://schemas.microsoft.com/office/drawing/2014/main" id="{8A2A1D0D-C9D7-4401-BDC9-3FE9E3304E47}"/>
+              </a:ext>
+            </a:extLst>
+          </p:cNvPr>
+          <p:cNvSpPr txBox="1"/>
+          <p:nvPr/>
+        </p:nvSpPr>
+        <p:spPr>
+          <a:xfrm>
+            <a:off x="609600" y="1981200"/>
+            <a:ext cx="7924800" cy="830997"/>
+          </a:xfrm>
+          <a:prstGeom prst="rect">
+            <a:avLst/>
+          </a:prstGeom>
+          <a:noFill/>
+        </p:spPr>
+        <p:txBody>
+          <a:bodyPr wrap="square" rtlCol="0">
+            <a:spAutoFit/>
+          </a:bodyPr>
+          <a:lstStyle/>
+          <a:p>
+            <a:pPr marL="342900" indent="-342900">
+              <a:buFont typeface="Arial" panose="020B0604020202020204" pitchFamily="34" charset="0"/>
+              <a:buChar char="•"/>
+            </a:pPr>
+            <a:r>
+              <a:rPr lang="en-US" sz="2400" dirty="0"/>
+              <a:t>Na </a:t>
+            </a:r>
+            <a:r>
+              <a:rPr lang="en-US" sz="2400" dirty="0" err="1"/>
+              <a:t>função</a:t>
+            </a:r>
+            <a:r>
+              <a:rPr lang="en-US" sz="2400" dirty="0"/>
+              <a:t> </a:t>
+            </a:r>
+            <a:r>
+              <a:rPr lang="en-US" sz="2400" b="1" dirty="0" err="1"/>
+              <a:t>OnClick</a:t>
+            </a:r>
+            <a:r>
+              <a:rPr lang="en-US" sz="2400" dirty="0"/>
+              <a:t> do </a:t>
+            </a:r>
+            <a:r>
+              <a:rPr lang="en-US" sz="2400" b="1" dirty="0"/>
+              <a:t>Button1</a:t>
+            </a:r>
+            <a:r>
+              <a:rPr lang="en-US" sz="2400" dirty="0"/>
+              <a:t> </a:t>
+            </a:r>
+            <a:r>
+              <a:rPr lang="en-US" sz="2400" dirty="0" err="1"/>
+              <a:t>iremos</a:t>
+            </a:r>
+            <a:r>
+              <a:rPr lang="en-US" sz="2400" dirty="0"/>
+              <a:t> </a:t>
+            </a:r>
+            <a:r>
+              <a:rPr lang="en-US" sz="2400" dirty="0" err="1"/>
+              <a:t>apenas</a:t>
+            </a:r>
+            <a:r>
+              <a:rPr lang="en-US" sz="2400" dirty="0"/>
+              <a:t> </a:t>
+            </a:r>
+            <a:r>
+              <a:rPr lang="en-US" sz="2400" dirty="0" err="1"/>
+              <a:t>fechar</a:t>
+            </a:r>
+            <a:r>
+              <a:rPr lang="en-US" sz="2400" dirty="0"/>
+              <a:t> o </a:t>
+            </a:r>
+            <a:r>
+              <a:rPr lang="en-US" sz="2400" dirty="0" err="1"/>
+              <a:t>formulário</a:t>
+            </a:r>
+            <a:r>
+              <a:rPr lang="en-US" sz="2400" dirty="0"/>
+              <a:t>, para </a:t>
+            </a:r>
+            <a:r>
+              <a:rPr lang="en-US" sz="2400" dirty="0" err="1"/>
+              <a:t>isso</a:t>
+            </a:r>
+            <a:r>
+              <a:rPr lang="en-US" sz="2400" dirty="0"/>
+              <a:t> </a:t>
+            </a:r>
+            <a:r>
+              <a:rPr lang="en-US" sz="2400" dirty="0" err="1"/>
+              <a:t>chame</a:t>
+            </a:r>
+            <a:r>
+              <a:rPr lang="en-US" sz="2400" dirty="0"/>
+              <a:t> a </a:t>
+            </a:r>
+            <a:r>
+              <a:rPr lang="en-US" sz="2400" dirty="0" err="1"/>
+              <a:t>função</a:t>
+            </a:r>
+            <a:r>
+              <a:rPr lang="en-US" sz="2400" dirty="0"/>
+              <a:t> </a:t>
+            </a:r>
+            <a:r>
+              <a:rPr lang="en-US" sz="2400" b="1" dirty="0"/>
+              <a:t>Close </a:t>
+            </a:r>
+          </a:p>
+        </p:txBody>
+      </p:sp>
+      <p:pic>
+        <p:nvPicPr>
+          <p:cNvPr id="5" name="Imagem 4">
+            <a:extLst>
+              <a:ext uri="{FF2B5EF4-FFF2-40B4-BE49-F238E27FC236}">
+                <a16:creationId xmlns:a16="http://schemas.microsoft.com/office/drawing/2014/main" id="{0D980BAF-591C-4762-BE15-B7BD4CFAFF44}"/>
+              </a:ext>
+            </a:extLst>
+          </p:cNvPr>
+          <p:cNvPicPr>
+            <a:picLocks noChangeAspect="1"/>
+          </p:cNvPicPr>
+          <p:nvPr/>
+        </p:nvPicPr>
+        <p:blipFill>
+          <a:blip r:embed="rId2"/>
+          <a:stretch>
+            <a:fillRect/>
+          </a:stretch>
+        </p:blipFill>
+        <p:spPr>
+          <a:xfrm>
+            <a:off x="990600" y="3241311"/>
+            <a:ext cx="5556517" cy="830997"/>
+          </a:xfrm>
+          <a:prstGeom prst="rect">
+            <a:avLst/>
+          </a:prstGeom>
+        </p:spPr>
+      </p:pic>
+      <p:sp>
+        <p:nvSpPr>
+          <p:cNvPr id="6" name="Título 1">
+            <a:extLst>
+              <a:ext uri="{FF2B5EF4-FFF2-40B4-BE49-F238E27FC236}">
+                <a16:creationId xmlns:a16="http://schemas.microsoft.com/office/drawing/2014/main" id="{3C39A41F-596D-49E4-ABC1-91E90E2414CA}"/>
+              </a:ext>
+            </a:extLst>
+          </p:cNvPr>
+          <p:cNvSpPr>
+            <a:spLocks noGrp="1"/>
+          </p:cNvSpPr>
+          <p:nvPr>
+            <p:ph type="title"/>
+          </p:nvPr>
+        </p:nvSpPr>
+        <p:spPr>
+          <a:xfrm>
+            <a:off x="533399" y="284634"/>
+            <a:ext cx="7467600" cy="1143000"/>
+          </a:xfrm>
+        </p:spPr>
+        <p:txBody>
+          <a:bodyPr/>
+          <a:lstStyle/>
+          <a:p>
+            <a:r>
+              <a:rPr lang="en-US" dirty="0" err="1"/>
+              <a:t>Programação</a:t>
+            </a:r>
+            <a:r>
+              <a:rPr lang="en-US" dirty="0"/>
+              <a:t> do </a:t>
+            </a:r>
+            <a:r>
+              <a:rPr lang="en-US" dirty="0" err="1"/>
+              <a:t>Formulário</a:t>
+            </a:r>
+            <a:r>
+              <a:rPr lang="en-US" dirty="0"/>
+              <a:t> – </a:t>
+            </a:r>
+            <a:br>
+              <a:rPr lang="en-US" dirty="0"/>
+            </a:br>
+            <a:r>
+              <a:rPr lang="en-US" dirty="0"/>
+              <a:t>Unit </a:t>
+            </a:r>
+            <a:r>
+              <a:rPr lang="en-US" dirty="0" err="1"/>
+              <a:t>servicos</a:t>
+            </a:r>
+            <a:endParaRPr lang="pt-BR" dirty="0"/>
+          </a:p>
+        </p:txBody>
+      </p:sp>
+    </p:spTree>
+    <p:extLst>
+      <p:ext uri="{BB962C8B-B14F-4D97-AF65-F5344CB8AC3E}">
+        <p14:creationId xmlns:p14="http://schemas.microsoft.com/office/powerpoint/2010/main" val="1987184777"/>
+      </p:ext>
+    </p:extLst>
+  </p:cSld>
+  <p:clrMapOvr>
+    <a:masterClrMapping/>
+  </p:clrMapOvr>
+</p:sld>
+</file>
+
+<file path=ppt/slides/slide108.xml><?xml version="1.0" encoding="utf-8"?>
+<p:sld xmlns:a="http://schemas.openxmlformats.org/drawingml/2006/main" xmlns:r="http://schemas.openxmlformats.org/officeDocument/2006/relationships" xmlns:p="http://schemas.openxmlformats.org/presentationml/2006/main">
+  <p:cSld>
+    <p:spTree>
+      <p:nvGrpSpPr>
+        <p:cNvPr id="1" name=""/>
+        <p:cNvGrpSpPr/>
+        <p:nvPr/>
+      </p:nvGrpSpPr>
+      <p:grpSpPr>
+        <a:xfrm>
+          <a:off x="0" y="0"/>
+          <a:ext cx="0" cy="0"/>
+          <a:chOff x="0" y="0"/>
+          <a:chExt cx="0" cy="0"/>
+        </a:xfrm>
+      </p:grpSpPr>
+      <p:sp>
+        <p:nvSpPr>
+          <p:cNvPr id="4" name="Título 1">
+            <a:extLst>
+              <a:ext uri="{FF2B5EF4-FFF2-40B4-BE49-F238E27FC236}">
+                <a16:creationId xmlns:a16="http://schemas.microsoft.com/office/drawing/2014/main" id="{42D61DFB-1C22-46AB-B833-A371B2B83CDC}"/>
+              </a:ext>
+            </a:extLst>
+          </p:cNvPr>
+          <p:cNvSpPr>
+            <a:spLocks noGrp="1"/>
+          </p:cNvSpPr>
+          <p:nvPr>
+            <p:ph type="title"/>
+          </p:nvPr>
+        </p:nvSpPr>
+        <p:spPr>
+          <a:xfrm>
+            <a:off x="533399" y="284634"/>
+            <a:ext cx="7467600" cy="1143000"/>
+          </a:xfrm>
+        </p:spPr>
+        <p:txBody>
+          <a:bodyPr/>
+          <a:lstStyle/>
+          <a:p>
+            <a:r>
+              <a:rPr lang="en-US" dirty="0" err="1"/>
+              <a:t>Programação</a:t>
+            </a:r>
+            <a:r>
+              <a:rPr lang="en-US" dirty="0"/>
+              <a:t> do </a:t>
+            </a:r>
+            <a:r>
+              <a:rPr lang="en-US" dirty="0" err="1"/>
+              <a:t>Formulário</a:t>
+            </a:r>
+            <a:r>
+              <a:rPr lang="en-US" dirty="0"/>
+              <a:t> – </a:t>
+            </a:r>
+            <a:br>
+              <a:rPr lang="en-US" dirty="0"/>
+            </a:br>
+            <a:r>
+              <a:rPr lang="en-US" dirty="0"/>
+              <a:t>Unit chat</a:t>
+            </a:r>
+            <a:endParaRPr lang="pt-BR" dirty="0"/>
+          </a:p>
+        </p:txBody>
+      </p:sp>
+      <p:sp>
+        <p:nvSpPr>
+          <p:cNvPr id="5" name="CaixaDeTexto 4">
+            <a:extLst>
+              <a:ext uri="{FF2B5EF4-FFF2-40B4-BE49-F238E27FC236}">
+                <a16:creationId xmlns:a16="http://schemas.microsoft.com/office/drawing/2014/main" id="{9EE8BBA3-76F3-4965-859D-161AC737463F}"/>
+              </a:ext>
+            </a:extLst>
+          </p:cNvPr>
+          <p:cNvSpPr txBox="1"/>
+          <p:nvPr/>
+        </p:nvSpPr>
+        <p:spPr>
+          <a:xfrm>
+            <a:off x="609600" y="1828800"/>
+            <a:ext cx="7924800" cy="2308324"/>
+          </a:xfrm>
+          <a:prstGeom prst="rect">
+            <a:avLst/>
+          </a:prstGeom>
+          <a:noFill/>
+        </p:spPr>
+        <p:txBody>
+          <a:bodyPr wrap="square" rtlCol="0">
+            <a:spAutoFit/>
+          </a:bodyPr>
+          <a:lstStyle/>
+          <a:p>
+            <a:pPr marL="342900" indent="-342900">
+              <a:buFont typeface="Arial" panose="020B0604020202020204" pitchFamily="34" charset="0"/>
+              <a:buChar char="•"/>
+            </a:pPr>
+            <a:r>
+              <a:rPr lang="en-US" sz="2400" dirty="0"/>
+              <a:t>No </a:t>
+            </a:r>
+            <a:r>
+              <a:rPr lang="en-US" sz="2400" dirty="0" err="1"/>
+              <a:t>formulário</a:t>
+            </a:r>
+            <a:r>
+              <a:rPr lang="en-US" sz="2400" dirty="0"/>
+              <a:t> </a:t>
+            </a:r>
+            <a:r>
+              <a:rPr lang="en-US" sz="2400" dirty="0" err="1"/>
+              <a:t>faremos</a:t>
+            </a:r>
+            <a:r>
+              <a:rPr lang="en-US" sz="2400" dirty="0"/>
+              <a:t> a </a:t>
+            </a:r>
+            <a:r>
+              <a:rPr lang="en-US" sz="2400" dirty="0" err="1"/>
+              <a:t>comunicação</a:t>
+            </a:r>
+            <a:r>
+              <a:rPr lang="en-US" sz="2400" dirty="0"/>
+              <a:t> entre devices para envoi de dados, para </a:t>
+            </a:r>
+            <a:r>
+              <a:rPr lang="en-US" sz="2400" dirty="0" err="1"/>
+              <a:t>isso</a:t>
+            </a:r>
+            <a:r>
+              <a:rPr lang="en-US" sz="2400" dirty="0"/>
+              <a:t> </a:t>
+            </a:r>
+            <a:r>
+              <a:rPr lang="en-US" sz="2400" dirty="0" err="1"/>
+              <a:t>precisaremos</a:t>
+            </a:r>
+            <a:r>
+              <a:rPr lang="en-US" sz="2400" dirty="0"/>
+              <a:t> usar  classes que </a:t>
+            </a:r>
+            <a:r>
+              <a:rPr lang="en-US" sz="2400" dirty="0" err="1"/>
+              <a:t>estão</a:t>
+            </a:r>
+            <a:r>
+              <a:rPr lang="en-US" sz="2400" dirty="0"/>
+              <a:t> </a:t>
+            </a:r>
+            <a:r>
+              <a:rPr lang="en-US" sz="2400" dirty="0" err="1"/>
+              <a:t>na</a:t>
+            </a:r>
+            <a:r>
+              <a:rPr lang="en-US" sz="2400" dirty="0"/>
+              <a:t> unit </a:t>
+            </a:r>
+            <a:r>
+              <a:rPr lang="en-US" sz="2400" b="1" dirty="0" err="1"/>
+              <a:t>System.Bluetooth</a:t>
+            </a:r>
+            <a:endParaRPr lang="en-US" sz="2400" dirty="0"/>
+          </a:p>
+          <a:p>
+            <a:pPr marL="342900" indent="-342900">
+              <a:buFont typeface="Arial" panose="020B0604020202020204" pitchFamily="34" charset="0"/>
+              <a:buChar char="•"/>
+            </a:pPr>
+            <a:endParaRPr lang="en-US" sz="2400" b="1" dirty="0"/>
+          </a:p>
+          <a:p>
+            <a:pPr marL="342900" indent="-342900">
+              <a:buFont typeface="Arial" panose="020B0604020202020204" pitchFamily="34" charset="0"/>
+              <a:buChar char="•"/>
+            </a:pPr>
+            <a:r>
+              <a:rPr lang="en-US" sz="2400" dirty="0"/>
+              <a:t>Declare a unit </a:t>
+            </a:r>
+            <a:r>
+              <a:rPr lang="en-US" sz="2400" dirty="0" err="1"/>
+              <a:t>abaixo</a:t>
+            </a:r>
+            <a:r>
+              <a:rPr lang="en-US" sz="2400" dirty="0"/>
+              <a:t> da clausula </a:t>
+            </a:r>
+            <a:r>
+              <a:rPr lang="en-US" sz="2400" b="1" dirty="0"/>
+              <a:t>uses </a:t>
+            </a:r>
+            <a:r>
+              <a:rPr lang="en-US" sz="2400" dirty="0"/>
+              <a:t>do </a:t>
+            </a:r>
+            <a:r>
+              <a:rPr lang="en-US" sz="2400" dirty="0" err="1"/>
+              <a:t>código</a:t>
+            </a:r>
+            <a:r>
+              <a:rPr lang="en-US" sz="2400" dirty="0"/>
+              <a:t> do </a:t>
+            </a:r>
+            <a:r>
+              <a:rPr lang="en-US" sz="2400" dirty="0" err="1"/>
+              <a:t>formulário</a:t>
+            </a:r>
+            <a:r>
+              <a:rPr lang="en-US" sz="2400" dirty="0"/>
+              <a:t>:</a:t>
+            </a:r>
+            <a:endParaRPr lang="en-US" sz="2400" b="1" dirty="0"/>
+          </a:p>
+        </p:txBody>
+      </p:sp>
+      <p:pic>
+        <p:nvPicPr>
+          <p:cNvPr id="6" name="Imagem 5">
+            <a:extLst>
+              <a:ext uri="{FF2B5EF4-FFF2-40B4-BE49-F238E27FC236}">
+                <a16:creationId xmlns:a16="http://schemas.microsoft.com/office/drawing/2014/main" id="{2A35856C-5EAA-49E4-8F8F-F6E5E9EACFD3}"/>
+              </a:ext>
+            </a:extLst>
+          </p:cNvPr>
+          <p:cNvPicPr>
+            <a:picLocks noChangeAspect="1"/>
+          </p:cNvPicPr>
+          <p:nvPr/>
+        </p:nvPicPr>
+        <p:blipFill>
+          <a:blip r:embed="rId2"/>
+          <a:stretch>
+            <a:fillRect/>
+          </a:stretch>
+        </p:blipFill>
+        <p:spPr>
+          <a:xfrm>
+            <a:off x="1066800" y="4852419"/>
+            <a:ext cx="2766086" cy="359232"/>
+          </a:xfrm>
+          <a:prstGeom prst="rect">
+            <a:avLst/>
+          </a:prstGeom>
+        </p:spPr>
+      </p:pic>
+    </p:spTree>
+    <p:extLst>
+      <p:ext uri="{BB962C8B-B14F-4D97-AF65-F5344CB8AC3E}">
+        <p14:creationId xmlns:p14="http://schemas.microsoft.com/office/powerpoint/2010/main" val="3494265184"/>
+      </p:ext>
+    </p:extLst>
+  </p:cSld>
+  <p:clrMapOvr>
+    <a:masterClrMapping/>
+  </p:clrMapOvr>
+</p:sld>
+</file>
+
+<file path=ppt/slides/slide109.xml><?xml version="1.0" encoding="utf-8"?>
+<p:sld xmlns:a="http://schemas.openxmlformats.org/drawingml/2006/main" xmlns:r="http://schemas.openxmlformats.org/officeDocument/2006/relationships" xmlns:p="http://schemas.openxmlformats.org/presentationml/2006/main">
+  <p:cSld>
+    <p:spTree>
+      <p:nvGrpSpPr>
+        <p:cNvPr id="1" name=""/>
+        <p:cNvGrpSpPr/>
+        <p:nvPr/>
+      </p:nvGrpSpPr>
+      <p:grpSpPr>
+        <a:xfrm>
+          <a:off x="0" y="0"/>
+          <a:ext cx="0" cy="0"/>
+          <a:chOff x="0" y="0"/>
+          <a:chExt cx="0" cy="0"/>
+        </a:xfrm>
+      </p:grpSpPr>
+      <p:sp>
+        <p:nvSpPr>
+          <p:cNvPr id="4" name="Título 1">
+            <a:extLst>
+              <a:ext uri="{FF2B5EF4-FFF2-40B4-BE49-F238E27FC236}">
+                <a16:creationId xmlns:a16="http://schemas.microsoft.com/office/drawing/2014/main" id="{34C3F3FF-930D-473C-A0BB-EA832082FE31}"/>
+              </a:ext>
+            </a:extLst>
+          </p:cNvPr>
+          <p:cNvSpPr>
+            <a:spLocks noGrp="1"/>
+          </p:cNvSpPr>
+          <p:nvPr>
+            <p:ph type="title"/>
+          </p:nvPr>
+        </p:nvSpPr>
+        <p:spPr>
+          <a:xfrm>
+            <a:off x="533399" y="284634"/>
+            <a:ext cx="7467600" cy="1143000"/>
+          </a:xfrm>
+        </p:spPr>
+        <p:txBody>
+          <a:bodyPr/>
+          <a:lstStyle/>
+          <a:p>
+            <a:r>
+              <a:rPr lang="en-US" dirty="0" err="1"/>
+              <a:t>Programação</a:t>
+            </a:r>
+            <a:r>
+              <a:rPr lang="en-US" dirty="0"/>
+              <a:t> do </a:t>
+            </a:r>
+            <a:r>
+              <a:rPr lang="en-US" dirty="0" err="1"/>
+              <a:t>Formulário</a:t>
+            </a:r>
+            <a:r>
+              <a:rPr lang="en-US" dirty="0"/>
+              <a:t> – </a:t>
+            </a:r>
+            <a:br>
+              <a:rPr lang="en-US" dirty="0"/>
+            </a:br>
+            <a:r>
+              <a:rPr lang="en-US" dirty="0"/>
+              <a:t>Unit chat</a:t>
+            </a:r>
+            <a:endParaRPr lang="pt-BR" dirty="0"/>
+          </a:p>
+        </p:txBody>
+      </p:sp>
+      <p:pic>
+        <p:nvPicPr>
+          <p:cNvPr id="6" name="Imagem 5">
+            <a:extLst>
+              <a:ext uri="{FF2B5EF4-FFF2-40B4-BE49-F238E27FC236}">
+                <a16:creationId xmlns:a16="http://schemas.microsoft.com/office/drawing/2014/main" id="{F6608342-CA92-45E8-BB62-5096AE717EA0}"/>
+              </a:ext>
+            </a:extLst>
+          </p:cNvPr>
+          <p:cNvPicPr>
+            <a:picLocks noChangeAspect="1"/>
+          </p:cNvPicPr>
+          <p:nvPr/>
+        </p:nvPicPr>
+        <p:blipFill>
+          <a:blip r:embed="rId2"/>
+          <a:stretch>
+            <a:fillRect/>
+          </a:stretch>
+        </p:blipFill>
+        <p:spPr>
+          <a:xfrm>
+            <a:off x="762000" y="3200400"/>
+            <a:ext cx="4758765" cy="3200400"/>
+          </a:xfrm>
+          <a:prstGeom prst="rect">
+            <a:avLst/>
+          </a:prstGeom>
+        </p:spPr>
+      </p:pic>
+      <p:sp>
+        <p:nvSpPr>
+          <p:cNvPr id="7" name="CaixaDeTexto 6">
+            <a:extLst>
+              <a:ext uri="{FF2B5EF4-FFF2-40B4-BE49-F238E27FC236}">
+                <a16:creationId xmlns:a16="http://schemas.microsoft.com/office/drawing/2014/main" id="{F2ECCC1E-1CFA-4F52-BE06-8C9A1EE39D04}"/>
+              </a:ext>
+            </a:extLst>
+          </p:cNvPr>
+          <p:cNvSpPr txBox="1"/>
+          <p:nvPr/>
+        </p:nvSpPr>
+        <p:spPr>
+          <a:xfrm>
+            <a:off x="609600" y="1676400"/>
+            <a:ext cx="8001000" cy="1200329"/>
+          </a:xfrm>
+          <a:prstGeom prst="rect">
+            <a:avLst/>
+          </a:prstGeom>
+          <a:noFill/>
+        </p:spPr>
+        <p:txBody>
+          <a:bodyPr wrap="square" rtlCol="0">
+            <a:spAutoFit/>
+          </a:bodyPr>
+          <a:lstStyle/>
+          <a:p>
+            <a:pPr marL="342900" indent="-342900">
+              <a:buFont typeface="Arial" panose="020B0604020202020204" pitchFamily="34" charset="0"/>
+              <a:buChar char="•"/>
+            </a:pPr>
+            <a:r>
+              <a:rPr lang="en-US" sz="2400" dirty="0" err="1"/>
+              <a:t>Após</a:t>
+            </a:r>
+            <a:r>
+              <a:rPr lang="en-US" sz="2400" dirty="0"/>
+              <a:t> a clausula </a:t>
+            </a:r>
+            <a:r>
+              <a:rPr lang="en-US" sz="2400" b="1" dirty="0"/>
+              <a:t>type </a:t>
+            </a:r>
+            <a:r>
+              <a:rPr lang="en-US" sz="2400" dirty="0"/>
+              <a:t>da unit </a:t>
+            </a:r>
+            <a:r>
+              <a:rPr lang="en-US" sz="2400" b="1" dirty="0" err="1"/>
+              <a:t>frmChatU</a:t>
+            </a:r>
+            <a:r>
+              <a:rPr lang="en-US" sz="2400" b="1" dirty="0"/>
+              <a:t> </a:t>
+            </a:r>
+            <a:r>
+              <a:rPr lang="en-US" sz="2400" dirty="0"/>
+              <a:t>declare </a:t>
+            </a:r>
+            <a:r>
+              <a:rPr lang="en-US" sz="2400" dirty="0" err="1"/>
+              <a:t>uma</a:t>
+            </a:r>
+            <a:r>
+              <a:rPr lang="en-US" sz="2400" dirty="0"/>
+              <a:t> nova </a:t>
+            </a:r>
+            <a:r>
+              <a:rPr lang="en-US" sz="2400" dirty="0" err="1"/>
+              <a:t>classe</a:t>
+            </a:r>
+            <a:r>
+              <a:rPr lang="en-US" sz="2400" dirty="0"/>
+              <a:t> </a:t>
+            </a:r>
+            <a:r>
+              <a:rPr lang="en-US" sz="2400" dirty="0" err="1"/>
+              <a:t>herdada</a:t>
+            </a:r>
+            <a:r>
+              <a:rPr lang="en-US" sz="2400" dirty="0"/>
+              <a:t> de </a:t>
+            </a:r>
+            <a:r>
+              <a:rPr lang="en-US" sz="2400" b="1" dirty="0" err="1"/>
+              <a:t>TThread</a:t>
+            </a:r>
+            <a:r>
+              <a:rPr lang="en-US" sz="2400" b="1" dirty="0"/>
+              <a:t> </a:t>
+            </a:r>
+            <a:r>
+              <a:rPr lang="en-US" sz="2400" dirty="0"/>
+              <a:t>e declare </a:t>
+            </a:r>
+            <a:r>
+              <a:rPr lang="en-US" sz="2400" dirty="0" err="1"/>
+              <a:t>todos</a:t>
+            </a:r>
+            <a:r>
+              <a:rPr lang="en-US" sz="2400" dirty="0"/>
+              <a:t> </a:t>
+            </a:r>
+            <a:r>
+              <a:rPr lang="en-US" sz="2400" dirty="0" err="1"/>
+              <a:t>os</a:t>
+            </a:r>
+            <a:r>
+              <a:rPr lang="en-US" sz="2400" dirty="0"/>
+              <a:t> </a:t>
+            </a:r>
+            <a:r>
+              <a:rPr lang="en-US" sz="2400" dirty="0" err="1"/>
+              <a:t>métodos</a:t>
+            </a:r>
+            <a:r>
+              <a:rPr lang="en-US" sz="2400" dirty="0"/>
+              <a:t> e </a:t>
+            </a:r>
+            <a:r>
+              <a:rPr lang="en-US" sz="2400" dirty="0" err="1"/>
+              <a:t>propriedades</a:t>
+            </a:r>
+            <a:r>
+              <a:rPr lang="en-US" sz="2400" dirty="0"/>
+              <a:t> </a:t>
+            </a:r>
+            <a:r>
+              <a:rPr lang="en-US" sz="2400" dirty="0" err="1"/>
+              <a:t>abaixo</a:t>
+            </a:r>
+            <a:endParaRPr lang="en-US" sz="2400" b="1" dirty="0"/>
+          </a:p>
+        </p:txBody>
+      </p:sp>
+    </p:spTree>
+    <p:extLst>
+      <p:ext uri="{BB962C8B-B14F-4D97-AF65-F5344CB8AC3E}">
+        <p14:creationId xmlns:p14="http://schemas.microsoft.com/office/powerpoint/2010/main" val="1664815501"/>
       </p:ext>
     </p:extLst>
   </p:cSld>
@@ -7607,6 +8676,1325 @@
     <p:extLst>
       <p:ext uri="{BB962C8B-B14F-4D97-AF65-F5344CB8AC3E}">
         <p14:creationId xmlns:p14="http://schemas.microsoft.com/office/powerpoint/2010/main" val="1568279875"/>
+      </p:ext>
+    </p:extLst>
+  </p:cSld>
+  <p:clrMapOvr>
+    <a:masterClrMapping/>
+  </p:clrMapOvr>
+</p:sld>
+</file>
+
+<file path=ppt/slides/slide110.xml><?xml version="1.0" encoding="utf-8"?>
+<p:sld xmlns:a="http://schemas.openxmlformats.org/drawingml/2006/main" xmlns:r="http://schemas.openxmlformats.org/officeDocument/2006/relationships" xmlns:p="http://schemas.openxmlformats.org/presentationml/2006/main">
+  <p:cSld>
+    <p:spTree>
+      <p:nvGrpSpPr>
+        <p:cNvPr id="1" name=""/>
+        <p:cNvGrpSpPr/>
+        <p:nvPr/>
+      </p:nvGrpSpPr>
+      <p:grpSpPr>
+        <a:xfrm>
+          <a:off x="0" y="0"/>
+          <a:ext cx="0" cy="0"/>
+          <a:chOff x="0" y="0"/>
+          <a:chExt cx="0" cy="0"/>
+        </a:xfrm>
+      </p:grpSpPr>
+      <p:sp>
+        <p:nvSpPr>
+          <p:cNvPr id="4" name="Título 1">
+            <a:extLst>
+              <a:ext uri="{FF2B5EF4-FFF2-40B4-BE49-F238E27FC236}">
+                <a16:creationId xmlns:a16="http://schemas.microsoft.com/office/drawing/2014/main" id="{75D1D44C-81E3-47BF-8EBC-EFA77448AAD9}"/>
+              </a:ext>
+            </a:extLst>
+          </p:cNvPr>
+          <p:cNvSpPr>
+            <a:spLocks noGrp="1"/>
+          </p:cNvSpPr>
+          <p:nvPr>
+            <p:ph type="title"/>
+          </p:nvPr>
+        </p:nvSpPr>
+        <p:spPr>
+          <a:xfrm>
+            <a:off x="533399" y="284634"/>
+            <a:ext cx="7467600" cy="1143000"/>
+          </a:xfrm>
+        </p:spPr>
+        <p:txBody>
+          <a:bodyPr/>
+          <a:lstStyle/>
+          <a:p>
+            <a:r>
+              <a:rPr lang="en-US" dirty="0" err="1"/>
+              <a:t>Programação</a:t>
+            </a:r>
+            <a:r>
+              <a:rPr lang="en-US" dirty="0"/>
+              <a:t> do </a:t>
+            </a:r>
+            <a:r>
+              <a:rPr lang="en-US" dirty="0" err="1"/>
+              <a:t>Formulário</a:t>
+            </a:r>
+            <a:r>
+              <a:rPr lang="en-US" dirty="0"/>
+              <a:t> – </a:t>
+            </a:r>
+            <a:br>
+              <a:rPr lang="en-US" dirty="0"/>
+            </a:br>
+            <a:r>
+              <a:rPr lang="en-US" dirty="0"/>
+              <a:t>Unit chat</a:t>
+            </a:r>
+            <a:endParaRPr lang="pt-BR" dirty="0"/>
+          </a:p>
+        </p:txBody>
+      </p:sp>
+      <p:sp>
+        <p:nvSpPr>
+          <p:cNvPr id="7" name="CaixaDeTexto 6">
+            <a:extLst>
+              <a:ext uri="{FF2B5EF4-FFF2-40B4-BE49-F238E27FC236}">
+                <a16:creationId xmlns:a16="http://schemas.microsoft.com/office/drawing/2014/main" id="{3DEDD811-99A8-47D6-B90D-C1764AE61B1E}"/>
+              </a:ext>
+            </a:extLst>
+          </p:cNvPr>
+          <p:cNvSpPr txBox="1"/>
+          <p:nvPr/>
+        </p:nvSpPr>
+        <p:spPr>
+          <a:xfrm>
+            <a:off x="4191000" y="1490008"/>
+            <a:ext cx="4343400" cy="1938992"/>
+          </a:xfrm>
+          <a:prstGeom prst="rect">
+            <a:avLst/>
+          </a:prstGeom>
+          <a:noFill/>
+        </p:spPr>
+        <p:txBody>
+          <a:bodyPr wrap="square" rtlCol="0">
+            <a:spAutoFit/>
+          </a:bodyPr>
+          <a:lstStyle/>
+          <a:p>
+            <a:pPr marL="342900" indent="-342900" algn="ctr">
+              <a:buFont typeface="Arial" panose="020B0604020202020204" pitchFamily="34" charset="0"/>
+              <a:buChar char="•"/>
+            </a:pPr>
+            <a:r>
+              <a:rPr lang="en-US" sz="2400" dirty="0" err="1"/>
+              <a:t>Abaixo</a:t>
+            </a:r>
+            <a:r>
+              <a:rPr lang="en-US" sz="2400" dirty="0"/>
+              <a:t> da clausula </a:t>
+            </a:r>
+            <a:r>
+              <a:rPr lang="en-US" sz="2400" b="1" dirty="0"/>
+              <a:t>public</a:t>
+            </a:r>
+            <a:r>
+              <a:rPr lang="en-US" sz="2400" dirty="0"/>
+              <a:t> da </a:t>
+            </a:r>
+            <a:r>
+              <a:rPr lang="en-US" sz="2400" dirty="0" err="1"/>
+              <a:t>classe</a:t>
+            </a:r>
+            <a:r>
+              <a:rPr lang="en-US" sz="2400" dirty="0"/>
+              <a:t> </a:t>
+            </a:r>
+            <a:r>
+              <a:rPr lang="en-US" sz="2400" b="1" dirty="0" err="1"/>
+              <a:t>TfrmChat</a:t>
+            </a:r>
+            <a:r>
+              <a:rPr lang="en-US" sz="2400" b="1" dirty="0"/>
+              <a:t> </a:t>
+            </a:r>
+            <a:r>
+              <a:rPr lang="en-US" sz="2400" dirty="0"/>
+              <a:t>declare as </a:t>
+            </a:r>
+            <a:r>
+              <a:rPr lang="en-US" sz="2400" dirty="0" err="1"/>
+              <a:t>variáveis</a:t>
+            </a:r>
+            <a:r>
+              <a:rPr lang="en-US" sz="2400" dirty="0"/>
+              <a:t> de classes </a:t>
+            </a:r>
+            <a:r>
+              <a:rPr lang="en-US" sz="2400" dirty="0" err="1"/>
+              <a:t>conforme</a:t>
+            </a:r>
+            <a:r>
+              <a:rPr lang="en-US" sz="2400" dirty="0"/>
+              <a:t> a </a:t>
+            </a:r>
+            <a:r>
+              <a:rPr lang="en-US" sz="2400" dirty="0" err="1"/>
+              <a:t>imagem</a:t>
+            </a:r>
+            <a:r>
+              <a:rPr lang="en-US" sz="2400" dirty="0"/>
+              <a:t> </a:t>
+            </a:r>
+            <a:r>
+              <a:rPr lang="en-US" sz="2400" dirty="0" err="1"/>
+              <a:t>ao</a:t>
+            </a:r>
+            <a:r>
+              <a:rPr lang="en-US" sz="2400" dirty="0"/>
+              <a:t> </a:t>
+            </a:r>
+            <a:r>
+              <a:rPr lang="en-US" sz="2400" dirty="0" err="1"/>
+              <a:t>lado</a:t>
+            </a:r>
+            <a:r>
+              <a:rPr lang="en-US" sz="2400" dirty="0"/>
+              <a:t> </a:t>
+            </a:r>
+          </a:p>
+        </p:txBody>
+      </p:sp>
+      <p:pic>
+        <p:nvPicPr>
+          <p:cNvPr id="9" name="Imagem 8">
+            <a:extLst>
+              <a:ext uri="{FF2B5EF4-FFF2-40B4-BE49-F238E27FC236}">
+                <a16:creationId xmlns:a16="http://schemas.microsoft.com/office/drawing/2014/main" id="{6A62204F-FCA9-4F5D-A059-B511CC88AC98}"/>
+              </a:ext>
+            </a:extLst>
+          </p:cNvPr>
+          <p:cNvPicPr>
+            <a:picLocks noChangeAspect="1"/>
+          </p:cNvPicPr>
+          <p:nvPr/>
+        </p:nvPicPr>
+        <p:blipFill>
+          <a:blip r:embed="rId2"/>
+          <a:stretch>
+            <a:fillRect/>
+          </a:stretch>
+        </p:blipFill>
+        <p:spPr>
+          <a:xfrm>
+            <a:off x="626578" y="2514600"/>
+            <a:ext cx="3861311" cy="4081957"/>
+          </a:xfrm>
+          <a:prstGeom prst="rect">
+            <a:avLst/>
+          </a:prstGeom>
+        </p:spPr>
+      </p:pic>
+    </p:spTree>
+    <p:extLst>
+      <p:ext uri="{BB962C8B-B14F-4D97-AF65-F5344CB8AC3E}">
+        <p14:creationId xmlns:p14="http://schemas.microsoft.com/office/powerpoint/2010/main" val="659241941"/>
+      </p:ext>
+    </p:extLst>
+  </p:cSld>
+  <p:clrMapOvr>
+    <a:masterClrMapping/>
+  </p:clrMapOvr>
+</p:sld>
+</file>
+
+<file path=ppt/slides/slide111.xml><?xml version="1.0" encoding="utf-8"?>
+<p:sld xmlns:a="http://schemas.openxmlformats.org/drawingml/2006/main" xmlns:r="http://schemas.openxmlformats.org/officeDocument/2006/relationships" xmlns:p="http://schemas.openxmlformats.org/presentationml/2006/main">
+  <p:cSld>
+    <p:spTree>
+      <p:nvGrpSpPr>
+        <p:cNvPr id="1" name=""/>
+        <p:cNvGrpSpPr/>
+        <p:nvPr/>
+      </p:nvGrpSpPr>
+      <p:grpSpPr>
+        <a:xfrm>
+          <a:off x="0" y="0"/>
+          <a:ext cx="0" cy="0"/>
+          <a:chOff x="0" y="0"/>
+          <a:chExt cx="0" cy="0"/>
+        </a:xfrm>
+      </p:grpSpPr>
+      <p:sp>
+        <p:nvSpPr>
+          <p:cNvPr id="4" name="Título 1">
+            <a:extLst>
+              <a:ext uri="{FF2B5EF4-FFF2-40B4-BE49-F238E27FC236}">
+                <a16:creationId xmlns:a16="http://schemas.microsoft.com/office/drawing/2014/main" id="{7821B861-0796-4AA6-8E3D-6BC19F908E86}"/>
+              </a:ext>
+            </a:extLst>
+          </p:cNvPr>
+          <p:cNvSpPr>
+            <a:spLocks noGrp="1"/>
+          </p:cNvSpPr>
+          <p:nvPr>
+            <p:ph type="title"/>
+          </p:nvPr>
+        </p:nvSpPr>
+        <p:spPr>
+          <a:xfrm>
+            <a:off x="533399" y="284634"/>
+            <a:ext cx="7467600" cy="1143000"/>
+          </a:xfrm>
+        </p:spPr>
+        <p:txBody>
+          <a:bodyPr/>
+          <a:lstStyle/>
+          <a:p>
+            <a:r>
+              <a:rPr lang="en-US" dirty="0" err="1"/>
+              <a:t>Programação</a:t>
+            </a:r>
+            <a:r>
+              <a:rPr lang="en-US" dirty="0"/>
+              <a:t> do </a:t>
+            </a:r>
+            <a:r>
+              <a:rPr lang="en-US" dirty="0" err="1"/>
+              <a:t>Formulário</a:t>
+            </a:r>
+            <a:r>
+              <a:rPr lang="en-US" dirty="0"/>
+              <a:t> – </a:t>
+            </a:r>
+            <a:br>
+              <a:rPr lang="en-US" dirty="0"/>
+            </a:br>
+            <a:r>
+              <a:rPr lang="en-US" dirty="0"/>
+              <a:t>Unit chat</a:t>
+            </a:r>
+            <a:endParaRPr lang="pt-BR" dirty="0"/>
+          </a:p>
+        </p:txBody>
+      </p:sp>
+      <p:pic>
+        <p:nvPicPr>
+          <p:cNvPr id="6" name="Imagem 5">
+            <a:extLst>
+              <a:ext uri="{FF2B5EF4-FFF2-40B4-BE49-F238E27FC236}">
+                <a16:creationId xmlns:a16="http://schemas.microsoft.com/office/drawing/2014/main" id="{A3EF0F35-FE01-4CA5-AA72-47F63B64F11E}"/>
+              </a:ext>
+            </a:extLst>
+          </p:cNvPr>
+          <p:cNvPicPr>
+            <a:picLocks noChangeAspect="1"/>
+          </p:cNvPicPr>
+          <p:nvPr/>
+        </p:nvPicPr>
+        <p:blipFill>
+          <a:blip r:embed="rId2"/>
+          <a:stretch>
+            <a:fillRect/>
+          </a:stretch>
+        </p:blipFill>
+        <p:spPr>
+          <a:xfrm>
+            <a:off x="609600" y="2933449"/>
+            <a:ext cx="7162801" cy="1036418"/>
+          </a:xfrm>
+          <a:prstGeom prst="rect">
+            <a:avLst/>
+          </a:prstGeom>
+        </p:spPr>
+      </p:pic>
+      <p:sp>
+        <p:nvSpPr>
+          <p:cNvPr id="7" name="CaixaDeTexto 6">
+            <a:extLst>
+              <a:ext uri="{FF2B5EF4-FFF2-40B4-BE49-F238E27FC236}">
+                <a16:creationId xmlns:a16="http://schemas.microsoft.com/office/drawing/2014/main" id="{51DDC246-D62A-4135-BEC3-BF196E250C39}"/>
+              </a:ext>
+            </a:extLst>
+          </p:cNvPr>
+          <p:cNvSpPr txBox="1"/>
+          <p:nvPr/>
+        </p:nvSpPr>
+        <p:spPr>
+          <a:xfrm>
+            <a:off x="609600" y="1752600"/>
+            <a:ext cx="7848600" cy="830997"/>
+          </a:xfrm>
+          <a:prstGeom prst="rect">
+            <a:avLst/>
+          </a:prstGeom>
+          <a:noFill/>
+        </p:spPr>
+        <p:txBody>
+          <a:bodyPr wrap="square" rtlCol="0">
+            <a:spAutoFit/>
+          </a:bodyPr>
+          <a:lstStyle/>
+          <a:p>
+            <a:pPr marL="342900" indent="-342900">
+              <a:buFont typeface="Arial" panose="020B0604020202020204" pitchFamily="34" charset="0"/>
+              <a:buChar char="•"/>
+            </a:pPr>
+            <a:r>
+              <a:rPr lang="en-US" sz="2400" dirty="0"/>
+              <a:t>Na unit e </a:t>
+            </a:r>
+            <a:r>
+              <a:rPr lang="en-US" sz="2400" dirty="0" err="1"/>
+              <a:t>abaixo</a:t>
+            </a:r>
+            <a:r>
+              <a:rPr lang="en-US" sz="2400" dirty="0"/>
+              <a:t> da clausula </a:t>
+            </a:r>
+            <a:r>
+              <a:rPr lang="en-US" sz="2400" b="1" dirty="0"/>
+              <a:t>var </a:t>
+            </a:r>
+            <a:r>
+              <a:rPr lang="en-US" sz="2400" dirty="0" err="1"/>
+              <a:t>crie</a:t>
+            </a:r>
+            <a:r>
+              <a:rPr lang="en-US" sz="2400" dirty="0"/>
+              <a:t> </a:t>
+            </a:r>
+            <a:r>
+              <a:rPr lang="en-US" sz="2400" dirty="0" err="1"/>
+              <a:t>uma</a:t>
+            </a:r>
+            <a:r>
+              <a:rPr lang="en-US" sz="2400" dirty="0"/>
+              <a:t> clausula</a:t>
+            </a:r>
+            <a:r>
+              <a:rPr lang="en-US" sz="2400" b="1" dirty="0"/>
+              <a:t> const </a:t>
+            </a:r>
+            <a:r>
+              <a:rPr lang="en-US" sz="2400" dirty="0"/>
+              <a:t>e declare as </a:t>
+            </a:r>
+            <a:r>
+              <a:rPr lang="en-US" sz="2400" dirty="0" err="1"/>
+              <a:t>seguintes</a:t>
+            </a:r>
+            <a:r>
+              <a:rPr lang="en-US" sz="2400" dirty="0"/>
+              <a:t> </a:t>
+            </a:r>
+            <a:r>
+              <a:rPr lang="en-US" sz="2400" dirty="0" err="1"/>
+              <a:t>constantes</a:t>
+            </a:r>
+            <a:endParaRPr lang="en-US" sz="2400" b="1" dirty="0"/>
+          </a:p>
+        </p:txBody>
+      </p:sp>
+      <p:sp>
+        <p:nvSpPr>
+          <p:cNvPr id="8" name="CaixaDeTexto 7">
+            <a:extLst>
+              <a:ext uri="{FF2B5EF4-FFF2-40B4-BE49-F238E27FC236}">
+                <a16:creationId xmlns:a16="http://schemas.microsoft.com/office/drawing/2014/main" id="{778FA5B0-9F7E-41C9-BDF0-5878984354E4}"/>
+              </a:ext>
+            </a:extLst>
+          </p:cNvPr>
+          <p:cNvSpPr txBox="1"/>
+          <p:nvPr/>
+        </p:nvSpPr>
+        <p:spPr>
+          <a:xfrm>
+            <a:off x="609600" y="4419600"/>
+            <a:ext cx="8077200" cy="830997"/>
+          </a:xfrm>
+          <a:prstGeom prst="rect">
+            <a:avLst/>
+          </a:prstGeom>
+          <a:noFill/>
+        </p:spPr>
+        <p:txBody>
+          <a:bodyPr wrap="square" rtlCol="0">
+            <a:spAutoFit/>
+          </a:bodyPr>
+          <a:lstStyle/>
+          <a:p>
+            <a:pPr marL="342900" indent="-342900">
+              <a:buFont typeface="Arial" panose="020B0604020202020204" pitchFamily="34" charset="0"/>
+              <a:buChar char="•"/>
+            </a:pPr>
+            <a:r>
+              <a:rPr lang="en-US" sz="2400" dirty="0" err="1"/>
+              <a:t>Abaixo</a:t>
+            </a:r>
+            <a:r>
+              <a:rPr lang="en-US" sz="2400" dirty="0"/>
+              <a:t> de </a:t>
+            </a:r>
+            <a:r>
+              <a:rPr lang="en-US" sz="2400" b="1" dirty="0"/>
+              <a:t>implementation </a:t>
+            </a:r>
+            <a:r>
+              <a:rPr lang="en-US" sz="2400" dirty="0"/>
+              <a:t>declare </a:t>
+            </a:r>
+            <a:r>
+              <a:rPr lang="en-US" sz="2400" dirty="0" err="1"/>
+              <a:t>uma</a:t>
+            </a:r>
+            <a:r>
+              <a:rPr lang="en-US" sz="2400" dirty="0"/>
+              <a:t> clausula </a:t>
+            </a:r>
+            <a:r>
+              <a:rPr lang="en-US" sz="2400" b="1" dirty="0"/>
+              <a:t>uses </a:t>
+            </a:r>
+            <a:r>
+              <a:rPr lang="en-US" sz="2400" dirty="0"/>
+              <a:t>e declare a unit principal, </a:t>
+            </a:r>
+            <a:r>
+              <a:rPr lang="en-US" sz="2400" dirty="0" err="1"/>
+              <a:t>como</a:t>
+            </a:r>
+            <a:r>
+              <a:rPr lang="en-US" sz="2400" dirty="0"/>
+              <a:t> </a:t>
+            </a:r>
+            <a:r>
+              <a:rPr lang="en-US" sz="2400" dirty="0" err="1"/>
+              <a:t>abaixo</a:t>
+            </a:r>
+            <a:r>
+              <a:rPr lang="en-US" sz="2400" dirty="0"/>
+              <a:t>:</a:t>
+            </a:r>
+            <a:endParaRPr lang="en-US" sz="2400" b="1" dirty="0"/>
+          </a:p>
+        </p:txBody>
+      </p:sp>
+      <p:pic>
+        <p:nvPicPr>
+          <p:cNvPr id="10" name="Imagem 9">
+            <a:extLst>
+              <a:ext uri="{FF2B5EF4-FFF2-40B4-BE49-F238E27FC236}">
+                <a16:creationId xmlns:a16="http://schemas.microsoft.com/office/drawing/2014/main" id="{5EC1771A-A2B0-46CC-A36B-E1574A1E0ED7}"/>
+              </a:ext>
+            </a:extLst>
+          </p:cNvPr>
+          <p:cNvPicPr>
+            <a:picLocks noChangeAspect="1"/>
+          </p:cNvPicPr>
+          <p:nvPr/>
+        </p:nvPicPr>
+        <p:blipFill>
+          <a:blip r:embed="rId3"/>
+          <a:stretch>
+            <a:fillRect/>
+          </a:stretch>
+        </p:blipFill>
+        <p:spPr>
+          <a:xfrm>
+            <a:off x="622852" y="5472646"/>
+            <a:ext cx="2249242" cy="455368"/>
+          </a:xfrm>
+          <a:prstGeom prst="rect">
+            <a:avLst/>
+          </a:prstGeom>
+        </p:spPr>
+      </p:pic>
+    </p:spTree>
+    <p:extLst>
+      <p:ext uri="{BB962C8B-B14F-4D97-AF65-F5344CB8AC3E}">
+        <p14:creationId xmlns:p14="http://schemas.microsoft.com/office/powerpoint/2010/main" val="1768602673"/>
+      </p:ext>
+    </p:extLst>
+  </p:cSld>
+  <p:clrMapOvr>
+    <a:masterClrMapping/>
+  </p:clrMapOvr>
+</p:sld>
+</file>
+
+<file path=ppt/slides/slide112.xml><?xml version="1.0" encoding="utf-8"?>
+<p:sld xmlns:a="http://schemas.openxmlformats.org/drawingml/2006/main" xmlns:r="http://schemas.openxmlformats.org/officeDocument/2006/relationships" xmlns:p="http://schemas.openxmlformats.org/presentationml/2006/main">
+  <p:cSld>
+    <p:spTree>
+      <p:nvGrpSpPr>
+        <p:cNvPr id="1" name=""/>
+        <p:cNvGrpSpPr/>
+        <p:nvPr/>
+      </p:nvGrpSpPr>
+      <p:grpSpPr>
+        <a:xfrm>
+          <a:off x="0" y="0"/>
+          <a:ext cx="0" cy="0"/>
+          <a:chOff x="0" y="0"/>
+          <a:chExt cx="0" cy="0"/>
+        </a:xfrm>
+      </p:grpSpPr>
+      <p:sp>
+        <p:nvSpPr>
+          <p:cNvPr id="4" name="Título 1">
+            <a:extLst>
+              <a:ext uri="{FF2B5EF4-FFF2-40B4-BE49-F238E27FC236}">
+                <a16:creationId xmlns:a16="http://schemas.microsoft.com/office/drawing/2014/main" id="{2BD508C9-24AC-4ADE-88ED-FFCD790176AD}"/>
+              </a:ext>
+            </a:extLst>
+          </p:cNvPr>
+          <p:cNvSpPr>
+            <a:spLocks noGrp="1"/>
+          </p:cNvSpPr>
+          <p:nvPr>
+            <p:ph type="title"/>
+          </p:nvPr>
+        </p:nvSpPr>
+        <p:spPr>
+          <a:xfrm>
+            <a:off x="533399" y="284634"/>
+            <a:ext cx="7467600" cy="1143000"/>
+          </a:xfrm>
+        </p:spPr>
+        <p:txBody>
+          <a:bodyPr/>
+          <a:lstStyle/>
+          <a:p>
+            <a:r>
+              <a:rPr lang="en-US" dirty="0" err="1"/>
+              <a:t>Programação</a:t>
+            </a:r>
+            <a:r>
+              <a:rPr lang="en-US" dirty="0"/>
+              <a:t> do </a:t>
+            </a:r>
+            <a:r>
+              <a:rPr lang="en-US" dirty="0" err="1"/>
+              <a:t>Formulário</a:t>
+            </a:r>
+            <a:r>
+              <a:rPr lang="en-US" dirty="0"/>
+              <a:t> – </a:t>
+            </a:r>
+            <a:br>
+              <a:rPr lang="en-US" dirty="0"/>
+            </a:br>
+            <a:r>
+              <a:rPr lang="en-US" dirty="0"/>
+              <a:t>Unit chat</a:t>
+            </a:r>
+            <a:endParaRPr lang="pt-BR" dirty="0"/>
+          </a:p>
+        </p:txBody>
+      </p:sp>
+      <p:sp>
+        <p:nvSpPr>
+          <p:cNvPr id="5" name="CaixaDeTexto 4">
+            <a:extLst>
+              <a:ext uri="{FF2B5EF4-FFF2-40B4-BE49-F238E27FC236}">
+                <a16:creationId xmlns:a16="http://schemas.microsoft.com/office/drawing/2014/main" id="{B9565688-6A32-41E2-B06B-BA5D77C98642}"/>
+              </a:ext>
+            </a:extLst>
+          </p:cNvPr>
+          <p:cNvSpPr txBox="1"/>
+          <p:nvPr/>
+        </p:nvSpPr>
+        <p:spPr>
+          <a:xfrm>
+            <a:off x="685800" y="1828800"/>
+            <a:ext cx="7772400" cy="830997"/>
+          </a:xfrm>
+          <a:prstGeom prst="rect">
+            <a:avLst/>
+          </a:prstGeom>
+          <a:noFill/>
+        </p:spPr>
+        <p:txBody>
+          <a:bodyPr wrap="square" rtlCol="0">
+            <a:spAutoFit/>
+          </a:bodyPr>
+          <a:lstStyle/>
+          <a:p>
+            <a:pPr marL="342900" indent="-342900">
+              <a:buFont typeface="Arial" panose="020B0604020202020204" pitchFamily="34" charset="0"/>
+              <a:buChar char="•"/>
+            </a:pPr>
+            <a:r>
+              <a:rPr lang="en-US" sz="2400" dirty="0"/>
+              <a:t>Nos </a:t>
+            </a:r>
+            <a:r>
+              <a:rPr lang="en-US" sz="2400" dirty="0" err="1"/>
+              <a:t>eventos</a:t>
+            </a:r>
+            <a:r>
+              <a:rPr lang="en-US" sz="2400" dirty="0"/>
+              <a:t> </a:t>
+            </a:r>
+            <a:r>
+              <a:rPr lang="en-US" sz="2400" b="1" dirty="0" err="1"/>
+              <a:t>OnClick</a:t>
+            </a:r>
+            <a:r>
+              <a:rPr lang="en-US" sz="2400" dirty="0"/>
+              <a:t> dos </a:t>
+            </a:r>
+            <a:r>
+              <a:rPr lang="en-US" sz="2400" dirty="0" err="1"/>
+              <a:t>botões</a:t>
+            </a:r>
+            <a:r>
+              <a:rPr lang="en-US" sz="2400" dirty="0"/>
+              <a:t> </a:t>
+            </a:r>
+            <a:r>
+              <a:rPr lang="en-US" sz="2400" b="1" dirty="0"/>
+              <a:t>Button1</a:t>
+            </a:r>
+            <a:r>
+              <a:rPr lang="en-US" sz="2400" dirty="0"/>
+              <a:t> e </a:t>
+            </a:r>
+            <a:r>
+              <a:rPr lang="en-US" sz="2400" b="1" dirty="0"/>
+              <a:t>Button2</a:t>
+            </a:r>
+            <a:r>
+              <a:rPr lang="en-US" sz="2400" dirty="0"/>
+              <a:t> </a:t>
+            </a:r>
+            <a:r>
+              <a:rPr lang="en-US" sz="2400" dirty="0" err="1"/>
+              <a:t>faça</a:t>
+            </a:r>
+            <a:r>
+              <a:rPr lang="en-US" sz="2400" dirty="0"/>
+              <a:t> a </a:t>
+            </a:r>
+            <a:r>
+              <a:rPr lang="en-US" sz="2400" dirty="0" err="1"/>
+              <a:t>programação</a:t>
+            </a:r>
+            <a:r>
+              <a:rPr lang="en-US" sz="2400" dirty="0"/>
+              <a:t> </a:t>
+            </a:r>
+            <a:r>
+              <a:rPr lang="en-US" sz="2400" dirty="0" err="1"/>
+              <a:t>conforme</a:t>
+            </a:r>
+            <a:r>
+              <a:rPr lang="en-US" sz="2400" dirty="0"/>
+              <a:t> </a:t>
+            </a:r>
+            <a:r>
+              <a:rPr lang="en-US" sz="2400" dirty="0" err="1"/>
+              <a:t>abaixo</a:t>
+            </a:r>
+            <a:endParaRPr lang="en-US" sz="2400" dirty="0"/>
+          </a:p>
+        </p:txBody>
+      </p:sp>
+      <p:pic>
+        <p:nvPicPr>
+          <p:cNvPr id="7" name="Imagem 6">
+            <a:extLst>
+              <a:ext uri="{FF2B5EF4-FFF2-40B4-BE49-F238E27FC236}">
+                <a16:creationId xmlns:a16="http://schemas.microsoft.com/office/drawing/2014/main" id="{A4F51530-9C5B-4702-A84F-AE9888F8BA65}"/>
+              </a:ext>
+            </a:extLst>
+          </p:cNvPr>
+          <p:cNvPicPr>
+            <a:picLocks noChangeAspect="1"/>
+          </p:cNvPicPr>
+          <p:nvPr/>
+        </p:nvPicPr>
+        <p:blipFill>
+          <a:blip r:embed="rId2"/>
+          <a:stretch>
+            <a:fillRect/>
+          </a:stretch>
+        </p:blipFill>
+        <p:spPr>
+          <a:xfrm>
+            <a:off x="1143000" y="3027833"/>
+            <a:ext cx="5052391" cy="1905000"/>
+          </a:xfrm>
+          <a:prstGeom prst="rect">
+            <a:avLst/>
+          </a:prstGeom>
+        </p:spPr>
+      </p:pic>
+    </p:spTree>
+    <p:extLst>
+      <p:ext uri="{BB962C8B-B14F-4D97-AF65-F5344CB8AC3E}">
+        <p14:creationId xmlns:p14="http://schemas.microsoft.com/office/powerpoint/2010/main" val="820431402"/>
+      </p:ext>
+    </p:extLst>
+  </p:cSld>
+  <p:clrMapOvr>
+    <a:masterClrMapping/>
+  </p:clrMapOvr>
+</p:sld>
+</file>
+
+<file path=ppt/slides/slide113.xml><?xml version="1.0" encoding="utf-8"?>
+<p:sld xmlns:a="http://schemas.openxmlformats.org/drawingml/2006/main" xmlns:r="http://schemas.openxmlformats.org/officeDocument/2006/relationships" xmlns:p="http://schemas.openxmlformats.org/presentationml/2006/main">
+  <p:cSld>
+    <p:spTree>
+      <p:nvGrpSpPr>
+        <p:cNvPr id="1" name=""/>
+        <p:cNvGrpSpPr/>
+        <p:nvPr/>
+      </p:nvGrpSpPr>
+      <p:grpSpPr>
+        <a:xfrm>
+          <a:off x="0" y="0"/>
+          <a:ext cx="0" cy="0"/>
+          <a:chOff x="0" y="0"/>
+          <a:chExt cx="0" cy="0"/>
+        </a:xfrm>
+      </p:grpSpPr>
+      <p:sp>
+        <p:nvSpPr>
+          <p:cNvPr id="4" name="Título 1">
+            <a:extLst>
+              <a:ext uri="{FF2B5EF4-FFF2-40B4-BE49-F238E27FC236}">
+                <a16:creationId xmlns:a16="http://schemas.microsoft.com/office/drawing/2014/main" id="{F1F0E112-27FC-4F5D-BEF7-B23B91EF4667}"/>
+              </a:ext>
+            </a:extLst>
+          </p:cNvPr>
+          <p:cNvSpPr>
+            <a:spLocks noGrp="1"/>
+          </p:cNvSpPr>
+          <p:nvPr>
+            <p:ph type="title"/>
+          </p:nvPr>
+        </p:nvSpPr>
+        <p:spPr>
+          <a:xfrm>
+            <a:off x="533399" y="284634"/>
+            <a:ext cx="7467600" cy="1143000"/>
+          </a:xfrm>
+        </p:spPr>
+        <p:txBody>
+          <a:bodyPr/>
+          <a:lstStyle/>
+          <a:p>
+            <a:r>
+              <a:rPr lang="en-US" dirty="0" err="1"/>
+              <a:t>Programação</a:t>
+            </a:r>
+            <a:r>
+              <a:rPr lang="en-US" dirty="0"/>
+              <a:t> do </a:t>
+            </a:r>
+            <a:r>
+              <a:rPr lang="en-US" dirty="0" err="1"/>
+              <a:t>Formulário</a:t>
+            </a:r>
+            <a:r>
+              <a:rPr lang="en-US" dirty="0"/>
+              <a:t> – </a:t>
+            </a:r>
+            <a:br>
+              <a:rPr lang="en-US" dirty="0"/>
+            </a:br>
+            <a:r>
+              <a:rPr lang="en-US" dirty="0"/>
+              <a:t>Unit chat</a:t>
+            </a:r>
+            <a:endParaRPr lang="pt-BR" dirty="0"/>
+          </a:p>
+        </p:txBody>
+      </p:sp>
+      <p:pic>
+        <p:nvPicPr>
+          <p:cNvPr id="6" name="Imagem 5">
+            <a:extLst>
+              <a:ext uri="{FF2B5EF4-FFF2-40B4-BE49-F238E27FC236}">
+                <a16:creationId xmlns:a16="http://schemas.microsoft.com/office/drawing/2014/main" id="{AB9180D8-0497-441B-AAF6-B299FD5AC3D3}"/>
+              </a:ext>
+            </a:extLst>
+          </p:cNvPr>
+          <p:cNvPicPr>
+            <a:picLocks noChangeAspect="1"/>
+          </p:cNvPicPr>
+          <p:nvPr/>
+        </p:nvPicPr>
+        <p:blipFill>
+          <a:blip r:embed="rId2"/>
+          <a:stretch>
+            <a:fillRect/>
+          </a:stretch>
+        </p:blipFill>
+        <p:spPr>
+          <a:xfrm>
+            <a:off x="609600" y="3048000"/>
+            <a:ext cx="6916615" cy="1981200"/>
+          </a:xfrm>
+          <a:prstGeom prst="rect">
+            <a:avLst/>
+          </a:prstGeom>
+        </p:spPr>
+      </p:pic>
+      <p:sp>
+        <p:nvSpPr>
+          <p:cNvPr id="7" name="CaixaDeTexto 6">
+            <a:extLst>
+              <a:ext uri="{FF2B5EF4-FFF2-40B4-BE49-F238E27FC236}">
+                <a16:creationId xmlns:a16="http://schemas.microsoft.com/office/drawing/2014/main" id="{E304463B-5CE3-4137-8648-8D1B56342D22}"/>
+              </a:ext>
+            </a:extLst>
+          </p:cNvPr>
+          <p:cNvSpPr txBox="1"/>
+          <p:nvPr/>
+        </p:nvSpPr>
+        <p:spPr>
+          <a:xfrm>
+            <a:off x="533400" y="1600200"/>
+            <a:ext cx="8305800" cy="1200329"/>
+          </a:xfrm>
+          <a:prstGeom prst="rect">
+            <a:avLst/>
+          </a:prstGeom>
+          <a:noFill/>
+        </p:spPr>
+        <p:txBody>
+          <a:bodyPr wrap="square" rtlCol="0">
+            <a:spAutoFit/>
+          </a:bodyPr>
+          <a:lstStyle/>
+          <a:p>
+            <a:pPr marL="342900" indent="-342900">
+              <a:buFont typeface="Arial" panose="020B0604020202020204" pitchFamily="34" charset="0"/>
+              <a:buChar char="•"/>
+            </a:pPr>
+            <a:r>
+              <a:rPr lang="en-US" sz="2400" dirty="0"/>
+              <a:t>No </a:t>
+            </a:r>
+            <a:r>
+              <a:rPr lang="en-US" sz="2400" dirty="0" err="1"/>
+              <a:t>evento</a:t>
+            </a:r>
+            <a:r>
+              <a:rPr lang="en-US" sz="2400" b="1" dirty="0"/>
+              <a:t> </a:t>
+            </a:r>
+            <a:r>
+              <a:rPr lang="en-US" sz="2400" b="1" dirty="0" err="1"/>
+              <a:t>OnShow</a:t>
+            </a:r>
+            <a:r>
+              <a:rPr lang="en-US" sz="2400" b="1" dirty="0"/>
+              <a:t> </a:t>
+            </a:r>
+            <a:r>
+              <a:rPr lang="en-US" sz="2400" dirty="0"/>
+              <a:t>do </a:t>
+            </a:r>
+            <a:r>
+              <a:rPr lang="en-US" sz="2400" dirty="0" err="1"/>
+              <a:t>formulário</a:t>
+            </a:r>
+            <a:r>
+              <a:rPr lang="en-US" sz="2400" dirty="0"/>
+              <a:t> </a:t>
+            </a:r>
+            <a:r>
+              <a:rPr lang="en-US" sz="2400" b="1" dirty="0" err="1"/>
+              <a:t>frmChat</a:t>
+            </a:r>
+            <a:r>
+              <a:rPr lang="en-US" sz="2400" b="1" dirty="0"/>
+              <a:t> </a:t>
+            </a:r>
+            <a:r>
+              <a:rPr lang="en-US" sz="2400" dirty="0" err="1"/>
+              <a:t>faremos</a:t>
+            </a:r>
+            <a:r>
+              <a:rPr lang="en-US" sz="2400" dirty="0"/>
+              <a:t> a </a:t>
+            </a:r>
+            <a:r>
+              <a:rPr lang="en-US" sz="2400" dirty="0" err="1"/>
+              <a:t>programação</a:t>
+            </a:r>
+            <a:r>
+              <a:rPr lang="en-US" sz="2400" dirty="0"/>
+              <a:t> para </a:t>
+            </a:r>
+            <a:r>
+              <a:rPr lang="en-US" sz="2400" dirty="0" err="1"/>
+              <a:t>listar</a:t>
+            </a:r>
+            <a:r>
+              <a:rPr lang="en-US" sz="2400" dirty="0"/>
+              <a:t> </a:t>
+            </a:r>
+            <a:r>
+              <a:rPr lang="en-US" sz="2400" dirty="0" err="1"/>
+              <a:t>os</a:t>
+            </a:r>
+            <a:r>
+              <a:rPr lang="en-US" sz="2400" dirty="0"/>
+              <a:t> devices </a:t>
+            </a:r>
+            <a:r>
+              <a:rPr lang="en-US" sz="2400" dirty="0" err="1"/>
+              <a:t>pareados</a:t>
+            </a:r>
+            <a:r>
+              <a:rPr lang="en-US" sz="2400" dirty="0"/>
+              <a:t> dentro do </a:t>
+            </a:r>
+            <a:r>
+              <a:rPr lang="en-US" sz="2400" dirty="0" err="1"/>
+              <a:t>ComboBox</a:t>
+            </a:r>
+            <a:r>
+              <a:rPr lang="en-US" sz="2400" dirty="0"/>
+              <a:t> </a:t>
+            </a:r>
+            <a:r>
+              <a:rPr lang="en-US" sz="2400" b="1" dirty="0" err="1"/>
+              <a:t>cbDispositivo</a:t>
+            </a:r>
+            <a:r>
+              <a:rPr lang="en-US" sz="2400" b="1" dirty="0"/>
+              <a:t> </a:t>
+            </a:r>
+            <a:r>
+              <a:rPr lang="en-US" sz="2400" dirty="0"/>
+              <a:t>para o </a:t>
+            </a:r>
+            <a:r>
+              <a:rPr lang="en-US" sz="2400" dirty="0" err="1"/>
+              <a:t>usuário</a:t>
+            </a:r>
+            <a:r>
+              <a:rPr lang="en-US" sz="2400" dirty="0"/>
+              <a:t> </a:t>
+            </a:r>
+            <a:r>
+              <a:rPr lang="en-US" sz="2400" dirty="0" err="1"/>
+              <a:t>selecionar</a:t>
+            </a:r>
+            <a:endParaRPr lang="en-US" sz="2400" b="1" dirty="0"/>
+          </a:p>
+        </p:txBody>
+      </p:sp>
+    </p:spTree>
+    <p:extLst>
+      <p:ext uri="{BB962C8B-B14F-4D97-AF65-F5344CB8AC3E}">
+        <p14:creationId xmlns:p14="http://schemas.microsoft.com/office/powerpoint/2010/main" val="32069349"/>
+      </p:ext>
+    </p:extLst>
+  </p:cSld>
+  <p:clrMapOvr>
+    <a:masterClrMapping/>
+  </p:clrMapOvr>
+</p:sld>
+</file>
+
+<file path=ppt/slides/slide114.xml><?xml version="1.0" encoding="utf-8"?>
+<p:sld xmlns:a="http://schemas.openxmlformats.org/drawingml/2006/main" xmlns:r="http://schemas.openxmlformats.org/officeDocument/2006/relationships" xmlns:p="http://schemas.openxmlformats.org/presentationml/2006/main">
+  <p:cSld>
+    <p:spTree>
+      <p:nvGrpSpPr>
+        <p:cNvPr id="1" name=""/>
+        <p:cNvGrpSpPr/>
+        <p:nvPr/>
+      </p:nvGrpSpPr>
+      <p:grpSpPr>
+        <a:xfrm>
+          <a:off x="0" y="0"/>
+          <a:ext cx="0" cy="0"/>
+          <a:chOff x="0" y="0"/>
+          <a:chExt cx="0" cy="0"/>
+        </a:xfrm>
+      </p:grpSpPr>
+      <p:sp>
+        <p:nvSpPr>
+          <p:cNvPr id="4" name="Título 1">
+            <a:extLst>
+              <a:ext uri="{FF2B5EF4-FFF2-40B4-BE49-F238E27FC236}">
+                <a16:creationId xmlns:a16="http://schemas.microsoft.com/office/drawing/2014/main" id="{E63763DA-F3AF-4481-B11B-7636C768B581}"/>
+              </a:ext>
+            </a:extLst>
+          </p:cNvPr>
+          <p:cNvSpPr>
+            <a:spLocks noGrp="1"/>
+          </p:cNvSpPr>
+          <p:nvPr>
+            <p:ph type="title"/>
+          </p:nvPr>
+        </p:nvSpPr>
+        <p:spPr>
+          <a:xfrm>
+            <a:off x="533399" y="284634"/>
+            <a:ext cx="7467600" cy="1143000"/>
+          </a:xfrm>
+        </p:spPr>
+        <p:txBody>
+          <a:bodyPr/>
+          <a:lstStyle/>
+          <a:p>
+            <a:r>
+              <a:rPr lang="en-US" dirty="0" err="1"/>
+              <a:t>Programação</a:t>
+            </a:r>
+            <a:r>
+              <a:rPr lang="en-US" dirty="0"/>
+              <a:t> do </a:t>
+            </a:r>
+            <a:r>
+              <a:rPr lang="en-US" dirty="0" err="1"/>
+              <a:t>Formulário</a:t>
+            </a:r>
+            <a:r>
+              <a:rPr lang="en-US" dirty="0"/>
+              <a:t> – </a:t>
+            </a:r>
+            <a:br>
+              <a:rPr lang="en-US" dirty="0"/>
+            </a:br>
+            <a:r>
+              <a:rPr lang="en-US" dirty="0"/>
+              <a:t>Unit chat</a:t>
+            </a:r>
+            <a:endParaRPr lang="pt-BR" dirty="0"/>
+          </a:p>
+        </p:txBody>
+      </p:sp>
+      <p:pic>
+        <p:nvPicPr>
+          <p:cNvPr id="8" name="Imagem 7">
+            <a:extLst>
+              <a:ext uri="{FF2B5EF4-FFF2-40B4-BE49-F238E27FC236}">
+                <a16:creationId xmlns:a16="http://schemas.microsoft.com/office/drawing/2014/main" id="{3C16FB06-85D2-404D-BB03-9598336A40A1}"/>
+              </a:ext>
+            </a:extLst>
+          </p:cNvPr>
+          <p:cNvPicPr>
+            <a:picLocks noChangeAspect="1"/>
+          </p:cNvPicPr>
+          <p:nvPr/>
+        </p:nvPicPr>
+        <p:blipFill>
+          <a:blip r:embed="rId2"/>
+          <a:stretch>
+            <a:fillRect/>
+          </a:stretch>
+        </p:blipFill>
+        <p:spPr>
+          <a:xfrm>
+            <a:off x="640080" y="3581400"/>
+            <a:ext cx="5989320" cy="1143000"/>
+          </a:xfrm>
+          <a:prstGeom prst="rect">
+            <a:avLst/>
+          </a:prstGeom>
+        </p:spPr>
+      </p:pic>
+      <p:sp>
+        <p:nvSpPr>
+          <p:cNvPr id="9" name="CaixaDeTexto 8">
+            <a:extLst>
+              <a:ext uri="{FF2B5EF4-FFF2-40B4-BE49-F238E27FC236}">
+                <a16:creationId xmlns:a16="http://schemas.microsoft.com/office/drawing/2014/main" id="{F6B05E8D-5C99-4840-8A74-02422DA0D156}"/>
+              </a:ext>
+            </a:extLst>
+          </p:cNvPr>
+          <p:cNvSpPr txBox="1"/>
+          <p:nvPr/>
+        </p:nvSpPr>
+        <p:spPr>
+          <a:xfrm>
+            <a:off x="599660" y="1752600"/>
+            <a:ext cx="8087140" cy="1569660"/>
+          </a:xfrm>
+          <a:prstGeom prst="rect">
+            <a:avLst/>
+          </a:prstGeom>
+          <a:noFill/>
+        </p:spPr>
+        <p:txBody>
+          <a:bodyPr wrap="square" rtlCol="0">
+            <a:spAutoFit/>
+          </a:bodyPr>
+          <a:lstStyle/>
+          <a:p>
+            <a:pPr marL="342900" indent="-342900">
+              <a:buFont typeface="Arial" panose="020B0604020202020204" pitchFamily="34" charset="0"/>
+              <a:buChar char="•"/>
+            </a:pPr>
+            <a:r>
+              <a:rPr lang="en-US" sz="2400" dirty="0"/>
+              <a:t>No </a:t>
+            </a:r>
+            <a:r>
+              <a:rPr lang="en-US" sz="2400" dirty="0" err="1"/>
+              <a:t>evento</a:t>
+            </a:r>
+            <a:r>
+              <a:rPr lang="en-US" sz="2400" dirty="0"/>
+              <a:t> </a:t>
+            </a:r>
+            <a:r>
+              <a:rPr lang="en-US" sz="2400" b="1" dirty="0" err="1"/>
+              <a:t>OnChange</a:t>
+            </a:r>
+            <a:r>
+              <a:rPr lang="en-US" sz="2400" b="1" dirty="0"/>
+              <a:t> </a:t>
+            </a:r>
+            <a:r>
+              <a:rPr lang="en-US" sz="2400" dirty="0"/>
+              <a:t>do </a:t>
+            </a:r>
+            <a:r>
+              <a:rPr lang="en-US" sz="2400" dirty="0" err="1"/>
+              <a:t>ComboBox</a:t>
+            </a:r>
+            <a:r>
+              <a:rPr lang="en-US" sz="2400" b="1" dirty="0"/>
+              <a:t> </a:t>
+            </a:r>
+            <a:r>
+              <a:rPr lang="en-US" sz="2400" b="1" dirty="0" err="1"/>
+              <a:t>cbDispositivo</a:t>
+            </a:r>
+            <a:r>
+              <a:rPr lang="en-US" sz="2400" b="1" dirty="0"/>
+              <a:t> </a:t>
+            </a:r>
+            <a:r>
+              <a:rPr lang="en-US" sz="2400" dirty="0" err="1"/>
+              <a:t>faremos</a:t>
+            </a:r>
+            <a:r>
+              <a:rPr lang="en-US" sz="2400" dirty="0"/>
+              <a:t> a </a:t>
+            </a:r>
+            <a:r>
+              <a:rPr lang="en-US" sz="2400" dirty="0" err="1"/>
+              <a:t>programação</a:t>
+            </a:r>
+            <a:r>
+              <a:rPr lang="en-US" sz="2400" dirty="0"/>
+              <a:t> para mudar o </a:t>
+            </a:r>
+            <a:r>
+              <a:rPr lang="en-US" sz="2400" dirty="0" err="1"/>
+              <a:t>atual</a:t>
+            </a:r>
+            <a:r>
+              <a:rPr lang="en-US" sz="2400" dirty="0"/>
+              <a:t> device da </a:t>
+            </a:r>
+            <a:r>
+              <a:rPr lang="en-US" sz="2400" dirty="0" err="1"/>
+              <a:t>variável</a:t>
+            </a:r>
+            <a:r>
+              <a:rPr lang="en-US" sz="2400" dirty="0"/>
+              <a:t> </a:t>
+            </a:r>
+            <a:r>
+              <a:rPr lang="en-US" sz="2400" b="1" dirty="0" err="1"/>
+              <a:t>FDispositivo</a:t>
+            </a:r>
+            <a:r>
+              <a:rPr lang="en-US" sz="2400" b="1" dirty="0"/>
+              <a:t> </a:t>
+            </a:r>
+            <a:r>
+              <a:rPr lang="en-US" sz="2400" dirty="0"/>
+              <a:t>que </a:t>
+            </a:r>
+            <a:r>
+              <a:rPr lang="en-US" sz="2400" dirty="0" err="1"/>
+              <a:t>guarda</a:t>
+            </a:r>
+            <a:r>
+              <a:rPr lang="en-US" sz="2400" dirty="0"/>
+              <a:t> qual o </a:t>
+            </a:r>
+            <a:r>
+              <a:rPr lang="en-US" sz="2400" dirty="0" err="1"/>
+              <a:t>dispositivo</a:t>
+            </a:r>
+            <a:r>
+              <a:rPr lang="en-US" sz="2400" dirty="0"/>
+              <a:t> que </a:t>
+            </a:r>
+            <a:r>
+              <a:rPr lang="en-US" sz="2400" dirty="0" err="1"/>
+              <a:t>queremos</a:t>
+            </a:r>
+            <a:r>
+              <a:rPr lang="en-US" sz="2400" dirty="0"/>
+              <a:t> </a:t>
+            </a:r>
+            <a:r>
+              <a:rPr lang="en-US" sz="2400" dirty="0" err="1"/>
+              <a:t>enviar</a:t>
+            </a:r>
+            <a:r>
+              <a:rPr lang="en-US" sz="2400" dirty="0"/>
+              <a:t> dados</a:t>
+            </a:r>
+            <a:r>
+              <a:rPr lang="en-US" sz="2400" b="1" dirty="0"/>
+              <a:t> </a:t>
+            </a:r>
+          </a:p>
+        </p:txBody>
+      </p:sp>
+    </p:spTree>
+    <p:extLst>
+      <p:ext uri="{BB962C8B-B14F-4D97-AF65-F5344CB8AC3E}">
+        <p14:creationId xmlns:p14="http://schemas.microsoft.com/office/powerpoint/2010/main" val="2761530929"/>
+      </p:ext>
+    </p:extLst>
+  </p:cSld>
+  <p:clrMapOvr>
+    <a:masterClrMapping/>
+  </p:clrMapOvr>
+</p:sld>
+</file>
+
+<file path=ppt/slides/slide115.xml><?xml version="1.0" encoding="utf-8"?>
+<p:sld xmlns:a="http://schemas.openxmlformats.org/drawingml/2006/main" xmlns:r="http://schemas.openxmlformats.org/officeDocument/2006/relationships" xmlns:p="http://schemas.openxmlformats.org/presentationml/2006/main">
+  <p:cSld>
+    <p:spTree>
+      <p:nvGrpSpPr>
+        <p:cNvPr id="1" name=""/>
+        <p:cNvGrpSpPr/>
+        <p:nvPr/>
+      </p:nvGrpSpPr>
+      <p:grpSpPr>
+        <a:xfrm>
+          <a:off x="0" y="0"/>
+          <a:ext cx="0" cy="0"/>
+          <a:chOff x="0" y="0"/>
+          <a:chExt cx="0" cy="0"/>
+        </a:xfrm>
+      </p:grpSpPr>
+    </p:spTree>
+    <p:extLst>
+      <p:ext uri="{BB962C8B-B14F-4D97-AF65-F5344CB8AC3E}">
+        <p14:creationId xmlns:p14="http://schemas.microsoft.com/office/powerpoint/2010/main" val="4119921838"/>
       </p:ext>
     </p:extLst>
   </p:cSld>

</xml_diff>